<commit_message>
Commit of version 3
</commit_message>
<xml_diff>
--- a/ai_compression_project.pptx
+++ b/ai_compression_project.pptx
@@ -5,10 +5,10 @@
     <p:sldMasterId id="2147483648" r:id="rId4"/>
   </p:sldMasterIdLst>
   <p:notesMasterIdLst>
-    <p:notesMasterId r:id="rId30"/>
+    <p:notesMasterId r:id="rId33"/>
   </p:notesMasterIdLst>
   <p:handoutMasterIdLst>
-    <p:handoutMasterId r:id="rId31"/>
+    <p:handoutMasterId r:id="rId34"/>
   </p:handoutMasterIdLst>
   <p:sldIdLst>
     <p:sldId id="281" r:id="rId5"/>
@@ -35,7 +35,10 @@
     <p:sldId id="308" r:id="rId26"/>
     <p:sldId id="309" r:id="rId27"/>
     <p:sldId id="310" r:id="rId28"/>
-    <p:sldId id="291" r:id="rId29"/>
+    <p:sldId id="312" r:id="rId29"/>
+    <p:sldId id="311" r:id="rId30"/>
+    <p:sldId id="313" r:id="rId31"/>
+    <p:sldId id="291" r:id="rId32"/>
   </p:sldIdLst>
   <p:sldSz cx="12192000" cy="6858000"/>
   <p:notesSz cx="6858000" cy="9144000"/>
@@ -2401,6 +2404,330 @@
         <p:cNvPr id="1" name="">
           <a:extLst>
             <a:ext uri="{FF2B5EF4-FFF2-40B4-BE49-F238E27FC236}">
+              <a16:creationId xmlns:a16="http://schemas.microsoft.com/office/drawing/2014/main" xmlns="" id="{84847B3D-F9FE-E845-0A9E-7B3E4737F607}"/>
+            </a:ext>
+          </a:extLst>
+        </p:cNvPr>
+        <p:cNvGrpSpPr/>
+        <p:nvPr/>
+      </p:nvGrpSpPr>
+      <p:grpSpPr>
+        <a:xfrm>
+          <a:off x="0" y="0"/>
+          <a:ext cx="0" cy="0"/>
+          <a:chOff x="0" y="0"/>
+          <a:chExt cx="0" cy="0"/>
+        </a:xfrm>
+      </p:grpSpPr>
+      <p:sp>
+        <p:nvSpPr>
+          <p:cNvPr id="2" name="Slide Image Placeholder 1">
+            <a:extLst>
+              <a:ext uri="{FF2B5EF4-FFF2-40B4-BE49-F238E27FC236}">
+                <a16:creationId xmlns:a16="http://schemas.microsoft.com/office/drawing/2014/main" xmlns="" id="{A65C55DC-40F4-B8B2-A44F-CEE7EA9104C1}"/>
+              </a:ext>
+            </a:extLst>
+          </p:cNvPr>
+          <p:cNvSpPr>
+            <a:spLocks noGrp="1" noRot="1" noChangeAspect="1"/>
+          </p:cNvSpPr>
+          <p:nvPr>
+            <p:ph type="sldImg"/>
+          </p:nvPr>
+        </p:nvSpPr>
+        <p:spPr/>
+      </p:sp>
+      <p:sp>
+        <p:nvSpPr>
+          <p:cNvPr id="3" name="Notes Placeholder 2">
+            <a:extLst>
+              <a:ext uri="{FF2B5EF4-FFF2-40B4-BE49-F238E27FC236}">
+                <a16:creationId xmlns:a16="http://schemas.microsoft.com/office/drawing/2014/main" xmlns="" id="{AFAEFE12-CFF9-2E00-9808-098A1D824723}"/>
+              </a:ext>
+            </a:extLst>
+          </p:cNvPr>
+          <p:cNvSpPr>
+            <a:spLocks noGrp="1"/>
+          </p:cNvSpPr>
+          <p:nvPr>
+            <p:ph type="body" idx="1"/>
+          </p:nvPr>
+        </p:nvSpPr>
+        <p:spPr/>
+        <p:txBody>
+          <a:bodyPr/>
+          <a:lstStyle/>
+          <a:p>
+            <a:endParaRPr lang="en-US" dirty="0"/>
+          </a:p>
+        </p:txBody>
+      </p:sp>
+      <p:sp>
+        <p:nvSpPr>
+          <p:cNvPr id="4" name="Slide Number Placeholder 3">
+            <a:extLst>
+              <a:ext uri="{FF2B5EF4-FFF2-40B4-BE49-F238E27FC236}">
+                <a16:creationId xmlns:a16="http://schemas.microsoft.com/office/drawing/2014/main" xmlns="" id="{85084F94-5BAE-E3B2-298D-1E3D1D48D1F6}"/>
+              </a:ext>
+            </a:extLst>
+          </p:cNvPr>
+          <p:cNvSpPr>
+            <a:spLocks noGrp="1"/>
+          </p:cNvSpPr>
+          <p:nvPr>
+            <p:ph type="sldNum" sz="quarter" idx="5"/>
+          </p:nvPr>
+        </p:nvSpPr>
+        <p:spPr/>
+        <p:txBody>
+          <a:bodyPr/>
+          <a:lstStyle/>
+          <a:p>
+            <a:fld id="{55247812-3409-784D-BAE7-ABE53735D59F}" type="slidenum">
+              <a:rPr lang="en-US" smtClean="0"/>
+              <a:t>25</a:t>
+            </a:fld>
+            <a:endParaRPr lang="en-US"/>
+          </a:p>
+        </p:txBody>
+      </p:sp>
+    </p:spTree>
+    <p:extLst>
+      <p:ext uri="{BB962C8B-B14F-4D97-AF65-F5344CB8AC3E}">
+        <p14:creationId xmlns:p14="http://schemas.microsoft.com/office/powerpoint/2010/main" val="1899534547"/>
+      </p:ext>
+    </p:extLst>
+  </p:cSld>
+  <p:clrMapOvr>
+    <a:masterClrMapping/>
+  </p:clrMapOvr>
+</p:notes>
+</file>
+
+<file path=ppt/notesSlides/notesSlide25.xml><?xml version="1.0" encoding="utf-8"?>
+<p:notes xmlns:a="http://schemas.openxmlformats.org/drawingml/2006/main" xmlns:r="http://schemas.openxmlformats.org/officeDocument/2006/relationships" xmlns:p="http://schemas.openxmlformats.org/presentationml/2006/main">
+  <p:cSld>
+    <p:spTree>
+      <p:nvGrpSpPr>
+        <p:cNvPr id="1" name="">
+          <a:extLst>
+            <a:ext uri="{FF2B5EF4-FFF2-40B4-BE49-F238E27FC236}">
+              <a16:creationId xmlns:a16="http://schemas.microsoft.com/office/drawing/2014/main" xmlns="" id="{84847B3D-F9FE-E845-0A9E-7B3E4737F607}"/>
+            </a:ext>
+          </a:extLst>
+        </p:cNvPr>
+        <p:cNvGrpSpPr/>
+        <p:nvPr/>
+      </p:nvGrpSpPr>
+      <p:grpSpPr>
+        <a:xfrm>
+          <a:off x="0" y="0"/>
+          <a:ext cx="0" cy="0"/>
+          <a:chOff x="0" y="0"/>
+          <a:chExt cx="0" cy="0"/>
+        </a:xfrm>
+      </p:grpSpPr>
+      <p:sp>
+        <p:nvSpPr>
+          <p:cNvPr id="2" name="Slide Image Placeholder 1">
+            <a:extLst>
+              <a:ext uri="{FF2B5EF4-FFF2-40B4-BE49-F238E27FC236}">
+                <a16:creationId xmlns:a16="http://schemas.microsoft.com/office/drawing/2014/main" xmlns="" id="{A65C55DC-40F4-B8B2-A44F-CEE7EA9104C1}"/>
+              </a:ext>
+            </a:extLst>
+          </p:cNvPr>
+          <p:cNvSpPr>
+            <a:spLocks noGrp="1" noRot="1" noChangeAspect="1"/>
+          </p:cNvSpPr>
+          <p:nvPr>
+            <p:ph type="sldImg"/>
+          </p:nvPr>
+        </p:nvSpPr>
+        <p:spPr/>
+      </p:sp>
+      <p:sp>
+        <p:nvSpPr>
+          <p:cNvPr id="3" name="Notes Placeholder 2">
+            <a:extLst>
+              <a:ext uri="{FF2B5EF4-FFF2-40B4-BE49-F238E27FC236}">
+                <a16:creationId xmlns:a16="http://schemas.microsoft.com/office/drawing/2014/main" xmlns="" id="{AFAEFE12-CFF9-2E00-9808-098A1D824723}"/>
+              </a:ext>
+            </a:extLst>
+          </p:cNvPr>
+          <p:cNvSpPr>
+            <a:spLocks noGrp="1"/>
+          </p:cNvSpPr>
+          <p:nvPr>
+            <p:ph type="body" idx="1"/>
+          </p:nvPr>
+        </p:nvSpPr>
+        <p:spPr/>
+        <p:txBody>
+          <a:bodyPr/>
+          <a:lstStyle/>
+          <a:p>
+            <a:endParaRPr lang="en-US" dirty="0"/>
+          </a:p>
+        </p:txBody>
+      </p:sp>
+      <p:sp>
+        <p:nvSpPr>
+          <p:cNvPr id="4" name="Slide Number Placeholder 3">
+            <a:extLst>
+              <a:ext uri="{FF2B5EF4-FFF2-40B4-BE49-F238E27FC236}">
+                <a16:creationId xmlns:a16="http://schemas.microsoft.com/office/drawing/2014/main" xmlns="" id="{85084F94-5BAE-E3B2-298D-1E3D1D48D1F6}"/>
+              </a:ext>
+            </a:extLst>
+          </p:cNvPr>
+          <p:cNvSpPr>
+            <a:spLocks noGrp="1"/>
+          </p:cNvSpPr>
+          <p:nvPr>
+            <p:ph type="sldNum" sz="quarter" idx="5"/>
+          </p:nvPr>
+        </p:nvSpPr>
+        <p:spPr/>
+        <p:txBody>
+          <a:bodyPr/>
+          <a:lstStyle/>
+          <a:p>
+            <a:fld id="{55247812-3409-784D-BAE7-ABE53735D59F}" type="slidenum">
+              <a:rPr lang="en-US" smtClean="0"/>
+              <a:t>26</a:t>
+            </a:fld>
+            <a:endParaRPr lang="en-US"/>
+          </a:p>
+        </p:txBody>
+      </p:sp>
+    </p:spTree>
+    <p:extLst>
+      <p:ext uri="{BB962C8B-B14F-4D97-AF65-F5344CB8AC3E}">
+        <p14:creationId xmlns:p14="http://schemas.microsoft.com/office/powerpoint/2010/main" val="1899534547"/>
+      </p:ext>
+    </p:extLst>
+  </p:cSld>
+  <p:clrMapOvr>
+    <a:masterClrMapping/>
+  </p:clrMapOvr>
+</p:notes>
+</file>
+
+<file path=ppt/notesSlides/notesSlide26.xml><?xml version="1.0" encoding="utf-8"?>
+<p:notes xmlns:a="http://schemas.openxmlformats.org/drawingml/2006/main" xmlns:r="http://schemas.openxmlformats.org/officeDocument/2006/relationships" xmlns:p="http://schemas.openxmlformats.org/presentationml/2006/main">
+  <p:cSld>
+    <p:spTree>
+      <p:nvGrpSpPr>
+        <p:cNvPr id="1" name="">
+          <a:extLst>
+            <a:ext uri="{FF2B5EF4-FFF2-40B4-BE49-F238E27FC236}">
+              <a16:creationId xmlns:a16="http://schemas.microsoft.com/office/drawing/2014/main" xmlns="" id="{84847B3D-F9FE-E845-0A9E-7B3E4737F607}"/>
+            </a:ext>
+          </a:extLst>
+        </p:cNvPr>
+        <p:cNvGrpSpPr/>
+        <p:nvPr/>
+      </p:nvGrpSpPr>
+      <p:grpSpPr>
+        <a:xfrm>
+          <a:off x="0" y="0"/>
+          <a:ext cx="0" cy="0"/>
+          <a:chOff x="0" y="0"/>
+          <a:chExt cx="0" cy="0"/>
+        </a:xfrm>
+      </p:grpSpPr>
+      <p:sp>
+        <p:nvSpPr>
+          <p:cNvPr id="2" name="Slide Image Placeholder 1">
+            <a:extLst>
+              <a:ext uri="{FF2B5EF4-FFF2-40B4-BE49-F238E27FC236}">
+                <a16:creationId xmlns:a16="http://schemas.microsoft.com/office/drawing/2014/main" xmlns="" id="{A65C55DC-40F4-B8B2-A44F-CEE7EA9104C1}"/>
+              </a:ext>
+            </a:extLst>
+          </p:cNvPr>
+          <p:cNvSpPr>
+            <a:spLocks noGrp="1" noRot="1" noChangeAspect="1"/>
+          </p:cNvSpPr>
+          <p:nvPr>
+            <p:ph type="sldImg"/>
+          </p:nvPr>
+        </p:nvSpPr>
+        <p:spPr/>
+      </p:sp>
+      <p:sp>
+        <p:nvSpPr>
+          <p:cNvPr id="3" name="Notes Placeholder 2">
+            <a:extLst>
+              <a:ext uri="{FF2B5EF4-FFF2-40B4-BE49-F238E27FC236}">
+                <a16:creationId xmlns:a16="http://schemas.microsoft.com/office/drawing/2014/main" xmlns="" id="{AFAEFE12-CFF9-2E00-9808-098A1D824723}"/>
+              </a:ext>
+            </a:extLst>
+          </p:cNvPr>
+          <p:cNvSpPr>
+            <a:spLocks noGrp="1"/>
+          </p:cNvSpPr>
+          <p:nvPr>
+            <p:ph type="body" idx="1"/>
+          </p:nvPr>
+        </p:nvSpPr>
+        <p:spPr/>
+        <p:txBody>
+          <a:bodyPr/>
+          <a:lstStyle/>
+          <a:p>
+            <a:endParaRPr lang="en-US" dirty="0"/>
+          </a:p>
+        </p:txBody>
+      </p:sp>
+      <p:sp>
+        <p:nvSpPr>
+          <p:cNvPr id="4" name="Slide Number Placeholder 3">
+            <a:extLst>
+              <a:ext uri="{FF2B5EF4-FFF2-40B4-BE49-F238E27FC236}">
+                <a16:creationId xmlns:a16="http://schemas.microsoft.com/office/drawing/2014/main" xmlns="" id="{85084F94-5BAE-E3B2-298D-1E3D1D48D1F6}"/>
+              </a:ext>
+            </a:extLst>
+          </p:cNvPr>
+          <p:cNvSpPr>
+            <a:spLocks noGrp="1"/>
+          </p:cNvSpPr>
+          <p:nvPr>
+            <p:ph type="sldNum" sz="quarter" idx="5"/>
+          </p:nvPr>
+        </p:nvSpPr>
+        <p:spPr/>
+        <p:txBody>
+          <a:bodyPr/>
+          <a:lstStyle/>
+          <a:p>
+            <a:fld id="{55247812-3409-784D-BAE7-ABE53735D59F}" type="slidenum">
+              <a:rPr lang="en-US" smtClean="0"/>
+              <a:t>27</a:t>
+            </a:fld>
+            <a:endParaRPr lang="en-US"/>
+          </a:p>
+        </p:txBody>
+      </p:sp>
+    </p:spTree>
+    <p:extLst>
+      <p:ext uri="{BB962C8B-B14F-4D97-AF65-F5344CB8AC3E}">
+        <p14:creationId xmlns:p14="http://schemas.microsoft.com/office/powerpoint/2010/main" val="1899534547"/>
+      </p:ext>
+    </p:extLst>
+  </p:cSld>
+  <p:clrMapOvr>
+    <a:masterClrMapping/>
+  </p:clrMapOvr>
+</p:notes>
+</file>
+
+<file path=ppt/notesSlides/notesSlide27.xml><?xml version="1.0" encoding="utf-8"?>
+<p:notes xmlns:a="http://schemas.openxmlformats.org/drawingml/2006/main" xmlns:r="http://schemas.openxmlformats.org/officeDocument/2006/relationships" xmlns:p="http://schemas.openxmlformats.org/presentationml/2006/main">
+  <p:cSld>
+    <p:spTree>
+      <p:nvGrpSpPr>
+        <p:cNvPr id="1" name="">
+          <a:extLst>
+            <a:ext uri="{FF2B5EF4-FFF2-40B4-BE49-F238E27FC236}">
               <a16:creationId xmlns:a16="http://schemas.microsoft.com/office/drawing/2014/main" xmlns="" id="{84F15084-9E64-0732-2172-D06E24D20324}"/>
             </a:ext>
           </a:extLst>
@@ -2482,7 +2809,7 @@
           <a:p>
             <a:fld id="{55247812-3409-784D-BAE7-ABE53735D59F}" type="slidenum">
               <a:rPr lang="en-US" smtClean="0"/>
-              <a:t>25</a:t>
+              <a:t>28</a:t>
             </a:fld>
             <a:endParaRPr lang="en-US"/>
           </a:p>
@@ -8755,7 +9082,7 @@
         <p:spPr>
           <a:xfrm>
             <a:off x="5283200" y="3980656"/>
-            <a:ext cx="6096000" cy="2031325"/>
+            <a:ext cx="6096000" cy="923330"/>
           </a:xfrm>
           <a:prstGeom prst="rect">
             <a:avLst/>
@@ -8774,14 +9101,6 @@
                 </a:solidFill>
               </a:rPr>
               <a:t>Architecture(2 layers):</a:t>
-            </a:r>
-            <a:r>
-              <a:rPr lang="en-US" b="1" dirty="0" smtClean="0">
-                <a:solidFill>
-                  <a:schemeClr val="bg1"/>
-                </a:solidFill>
-              </a:rPr>
-              <a:t/>
             </a:r>
             <a:br>
               <a:rPr lang="en-US" b="1" dirty="0" smtClean="0">
@@ -8798,12 +9117,12 @@
           </a:p>
           <a:p>
             <a:r>
-              <a:rPr lang="en-US" b="1" dirty="0" smtClean="0">
-                <a:solidFill>
-                  <a:schemeClr val="bg1"/>
-                </a:solidFill>
-              </a:rPr>
-              <a:t>Encoder</a:t>
+              <a:rPr lang="en-US" dirty="0">
+                <a:solidFill>
+                  <a:schemeClr val="bg1"/>
+                </a:solidFill>
+              </a:rPr>
+              <a:t>Encoder, Decoder – </a:t>
             </a:r>
             <a:r>
               <a:rPr lang="en-US" dirty="0" smtClean="0">
@@ -8811,55 +9130,33 @@
                   <a:schemeClr val="bg1"/>
                 </a:solidFill>
               </a:rPr>
-              <a:t>: Conv2D (3→32) extracts low-level features, Conv2D (32→64) captures patterns.</a:t>
-            </a:r>
-            <a:br>
+              <a:t>2 </a:t>
+            </a:r>
+            <a:r>
+              <a:rPr lang="en-US" dirty="0">
+                <a:solidFill>
+                  <a:schemeClr val="bg1"/>
+                </a:solidFill>
+              </a:rPr>
+              <a:t>layers(AI model size – </a:t>
+            </a:r>
+            <a:r>
               <a:rPr lang="en-US" dirty="0" smtClean="0">
                 <a:solidFill>
                   <a:schemeClr val="bg1"/>
                 </a:solidFill>
               </a:rPr>
-            </a:br>
-            <a:endParaRPr lang="en-US" dirty="0" smtClean="0">
-              <a:solidFill>
-                <a:schemeClr val="bg1"/>
-              </a:solidFill>
-            </a:endParaRPr>
-          </a:p>
-          <a:p>
-            <a:r>
-              <a:rPr lang="en-US" b="1" dirty="0" smtClean="0">
-                <a:solidFill>
-                  <a:schemeClr val="bg1"/>
-                </a:solidFill>
-              </a:rPr>
-              <a:t>Decoder</a:t>
-            </a:r>
-            <a:r>
-              <a:rPr lang="en-US" dirty="0" smtClean="0">
-                <a:solidFill>
-                  <a:schemeClr val="bg1"/>
-                </a:solidFill>
-              </a:rPr>
-              <a:t>: ConvTranspose2D (64→32) </a:t>
-            </a:r>
-            <a:r>
-              <a:rPr lang="en-US" dirty="0" err="1" smtClean="0">
-                <a:solidFill>
-                  <a:schemeClr val="bg1"/>
-                </a:solidFill>
-              </a:rPr>
-              <a:t>upsamples</a:t>
-            </a:r>
-            <a:r>
-              <a:rPr lang="en-US" dirty="0" smtClean="0">
-                <a:solidFill>
-                  <a:schemeClr val="bg1"/>
-                </a:solidFill>
-              </a:rPr>
-              <a:t>, ConvTranspose2D (32→3, Sigmoid) reconstructs the image.</a:t>
-            </a:r>
-            <a:endParaRPr lang="en-US" dirty="0">
+              <a:t>0.1MB</a:t>
+            </a:r>
+            <a:r>
+              <a:rPr lang="en-US" dirty="0">
+                <a:solidFill>
+                  <a:schemeClr val="bg1"/>
+                </a:solidFill>
+              </a:rPr>
+              <a:t>)</a:t>
+            </a:r>
+            <a:endParaRPr lang="ru-RU" dirty="0">
               <a:solidFill>
                 <a:schemeClr val="bg1"/>
               </a:solidFill>
@@ -11032,7 +11329,7 @@
         <p:spPr>
           <a:xfrm>
             <a:off x="5283200" y="3980656"/>
-            <a:ext cx="6096000" cy="2585323"/>
+            <a:ext cx="6096000" cy="923330"/>
           </a:xfrm>
           <a:prstGeom prst="rect">
             <a:avLst/>
@@ -11067,58 +11364,12 @@
           </a:p>
           <a:p>
             <a:r>
-              <a:rPr lang="en-US" dirty="0">
-                <a:solidFill>
-                  <a:schemeClr val="bg1"/>
-                </a:solidFill>
-              </a:rPr>
-              <a:t>Encoder: Conv2D (3→16) extracts low-level features, Conv2D (16→32) captures patterns, Conv2D (32→32) refines representation.</a:t>
-            </a:r>
-            <a:endParaRPr lang="ru-RU" dirty="0">
-              <a:solidFill>
-                <a:schemeClr val="bg1"/>
-              </a:solidFill>
-            </a:endParaRPr>
-          </a:p>
-          <a:p>
-            <a:r>
-              <a:rPr lang="en-US" dirty="0">
-                <a:solidFill>
-                  <a:schemeClr val="bg1"/>
-                </a:solidFill>
-              </a:rPr>
-              <a:t/>
-            </a:r>
-            <a:br>
-              <a:rPr lang="en-US" dirty="0">
-                <a:solidFill>
-                  <a:schemeClr val="bg1"/>
-                </a:solidFill>
-              </a:rPr>
-            </a:br>
-            <a:r>
-              <a:rPr lang="en-US" dirty="0">
-                <a:solidFill>
-                  <a:schemeClr val="bg1"/>
-                </a:solidFill>
-              </a:rPr>
-              <a:t>Decoder: ConvTranspose2D (32→32) </a:t>
-            </a:r>
-            <a:r>
-              <a:rPr lang="en-US" dirty="0" err="1">
-                <a:solidFill>
-                  <a:schemeClr val="bg1"/>
-                </a:solidFill>
-              </a:rPr>
-              <a:t>upsamples</a:t>
-            </a:r>
-            <a:r>
-              <a:rPr lang="en-US" dirty="0">
-                <a:solidFill>
-                  <a:schemeClr val="bg1"/>
-                </a:solidFill>
-              </a:rPr>
-              <a:t>, ConvTranspose2D (32→16) restores details, ConvTranspose2D (16→3, Sigmoid) reconstructs the image.</a:t>
+              <a:rPr lang="en-US" dirty="0" smtClean="0">
+                <a:solidFill>
+                  <a:schemeClr val="bg1"/>
+                </a:solidFill>
+              </a:rPr>
+              <a:t>Encoder, Decoder – 3 layers(AI model size – 0.4MB)</a:t>
             </a:r>
             <a:endParaRPr lang="ru-RU" dirty="0">
               <a:solidFill>
@@ -12954,6 +13205,59 @@
           </a:p>
         </p:txBody>
       </p:sp>
+      <p:sp>
+        <p:nvSpPr>
+          <p:cNvPr id="4" name="Заголовок 1"/>
+          <p:cNvSpPr txBox="1">
+            <a:spLocks/>
+          </p:cNvSpPr>
+          <p:nvPr/>
+        </p:nvSpPr>
+        <p:spPr>
+          <a:xfrm>
+            <a:off x="2201925" y="2042160"/>
+            <a:ext cx="7653418" cy="1378498"/>
+          </a:xfrm>
+          <a:prstGeom prst="rect">
+            <a:avLst/>
+          </a:prstGeom>
+        </p:spPr>
+        <p:txBody>
+          <a:bodyPr vert="horz" lIns="91440" tIns="45720" rIns="91440" bIns="45720" rtlCol="0" anchor="ctr" anchorCtr="0">
+            <a:noAutofit/>
+          </a:bodyPr>
+          <a:lstStyle>
+            <a:lvl1pPr algn="ctr" defTabSz="914400" rtl="0" eaLnBrk="1" latinLnBrk="0" hangingPunct="1">
+              <a:lnSpc>
+                <a:spcPct val="90000"/>
+              </a:lnSpc>
+              <a:spcBef>
+                <a:spcPct val="0"/>
+              </a:spcBef>
+              <a:buNone/>
+              <a:defRPr sz="4800" kern="1200" cap="all" spc="300" baseline="0">
+                <a:solidFill>
+                  <a:schemeClr val="bg1"/>
+                </a:solidFill>
+                <a:latin typeface="+mj-lt"/>
+                <a:ea typeface="+mj-ea"/>
+                <a:cs typeface="+mj-cs"/>
+              </a:defRPr>
+            </a:lvl1pPr>
+          </a:lstStyle>
+          <a:p>
+            <a:r>
+              <a:rPr lang="en-US" sz="2800" dirty="0" smtClean="0"/>
+              <a:t>File size is smaller, but we need to work on them a little bit more to compete with jpeg/</a:t>
+            </a:r>
+            <a:r>
+              <a:rPr lang="en-US" sz="2800" dirty="0" err="1" smtClean="0"/>
+              <a:t>webm</a:t>
+            </a:r>
+            <a:endParaRPr lang="en-US" sz="2800" dirty="0"/>
+          </a:p>
+        </p:txBody>
+      </p:sp>
     </p:spTree>
     <p:extLst>
       <p:ext uri="{BB962C8B-B14F-4D97-AF65-F5344CB8AC3E}">
@@ -13598,7 +13902,7 @@
         <p:spPr>
           <a:xfrm>
             <a:off x="5283200" y="3980656"/>
-            <a:ext cx="6096000" cy="2585323"/>
+            <a:ext cx="6096000" cy="923330"/>
           </a:xfrm>
           <a:prstGeom prst="rect">
             <a:avLst/>
@@ -13633,58 +13937,28 @@
           </a:p>
           <a:p>
             <a:r>
+              <a:rPr lang="en-US" dirty="0" smtClean="0">
+                <a:solidFill>
+                  <a:schemeClr val="bg1"/>
+                </a:solidFill>
+              </a:rPr>
+              <a:t>Encoder &amp; Decoder</a:t>
+            </a:r>
+            <a:r>
               <a:rPr lang="en-US" dirty="0">
                 <a:solidFill>
                   <a:schemeClr val="bg1"/>
                 </a:solidFill>
               </a:rPr>
-              <a:t>Encoder: Conv2D (3→16) extracts low-level features, Conv2D (16→32) captures patterns, Conv2D (32→32) refines representation.</a:t>
-            </a:r>
-            <a:endParaRPr lang="ru-RU" dirty="0">
-              <a:solidFill>
-                <a:schemeClr val="bg1"/>
-              </a:solidFill>
-            </a:endParaRPr>
-          </a:p>
-          <a:p>
-            <a:r>
-              <a:rPr lang="en-US" dirty="0">
-                <a:solidFill>
-                  <a:schemeClr val="bg1"/>
-                </a:solidFill>
-              </a:rPr>
-              <a:t/>
-            </a:r>
-            <a:br>
-              <a:rPr lang="en-US" dirty="0">
-                <a:solidFill>
-                  <a:schemeClr val="bg1"/>
-                </a:solidFill>
-              </a:rPr>
-            </a:br>
-            <a:r>
-              <a:rPr lang="en-US" dirty="0">
-                <a:solidFill>
-                  <a:schemeClr val="bg1"/>
-                </a:solidFill>
-              </a:rPr>
-              <a:t>Decoder: ConvTranspose2D (32→32) </a:t>
-            </a:r>
-            <a:r>
-              <a:rPr lang="en-US" dirty="0" err="1">
-                <a:solidFill>
-                  <a:schemeClr val="bg1"/>
-                </a:solidFill>
-              </a:rPr>
-              <a:t>upsamples</a:t>
-            </a:r>
-            <a:r>
-              <a:rPr lang="en-US" dirty="0">
-                <a:solidFill>
-                  <a:schemeClr val="bg1"/>
-                </a:solidFill>
-              </a:rPr>
-              <a:t>, ConvTranspose2D (32→16) restores details, ConvTranspose2D (16→3, Sigmoid) reconstructs the image.</a:t>
+              <a:t>: </a:t>
+            </a:r>
+            <a:r>
+              <a:rPr lang="en-US" dirty="0" smtClean="0">
+                <a:solidFill>
+                  <a:schemeClr val="bg1"/>
+                </a:solidFill>
+              </a:rPr>
+              <a:t>5 layers(AI model size – 4MB)</a:t>
             </a:r>
             <a:endParaRPr lang="ru-RU" dirty="0">
               <a:solidFill>
@@ -13914,18 +14188,22 @@
           </a:lstStyle>
           <a:p>
             <a:r>
-              <a:rPr lang="ru-RU" sz="3600" dirty="0" smtClean="0"/>
-              <a:t>100</a:t>
-            </a:r>
-            <a:r>
               <a:rPr lang="en-US" sz="3600" dirty="0" smtClean="0"/>
-              <a:t> kb encoded</a:t>
+              <a:t>4.62kb </a:t>
+            </a:r>
+            <a:r>
+              <a:rPr lang="en-US" sz="3600" dirty="0"/>
+              <a:t>encoded</a:t>
             </a:r>
           </a:p>
           <a:p>
             <a:r>
               <a:rPr lang="en-US" sz="3600" dirty="0" smtClean="0"/>
-              <a:t>26.4KB decoded</a:t>
+              <a:t>29KB </a:t>
+            </a:r>
+            <a:r>
+              <a:rPr lang="en-US" sz="3600" dirty="0"/>
+              <a:t>decoded</a:t>
             </a:r>
             <a:endParaRPr lang="ru-RU" sz="3600" dirty="0"/>
           </a:p>
@@ -14016,47 +14294,6 @@
         <p:spPr bwMode="auto">
           <a:xfrm>
             <a:off x="2138588" y="663348"/>
-            <a:ext cx="2487839" cy="2487839"/>
-          </a:xfrm>
-          <a:prstGeom prst="rect">
-            <a:avLst/>
-          </a:prstGeom>
-          <a:noFill/>
-          <a:extLst>
-            <a:ext uri="{909E8E84-426E-40DD-AFC4-6F175D3DCCD1}">
-              <a14:hiddenFill xmlns:a14="http://schemas.microsoft.com/office/drawing/2010/main">
-                <a:solidFill>
-                  <a:srgbClr val="FFFFFF"/>
-                </a:solidFill>
-              </a14:hiddenFill>
-            </a:ext>
-          </a:extLst>
-        </p:spPr>
-      </p:pic>
-      <p:pic>
-        <p:nvPicPr>
-          <p:cNvPr id="5" name="Picture 3" descr="C:\Users\grigo\OneDrive\Рабочий стол\00000.png_decoded.png"/>
-          <p:cNvPicPr>
-            <a:picLocks noChangeAspect="1" noChangeArrowheads="1"/>
-          </p:cNvPicPr>
-          <p:nvPr/>
-        </p:nvPicPr>
-        <p:blipFill>
-          <a:blip r:embed="rId5">
-            <a:extLst>
-              <a:ext uri="{28A0092B-C50C-407E-A947-70E740481C1C}">
-                <a14:useLocalDpi xmlns:a14="http://schemas.microsoft.com/office/drawing/2010/main" val="0"/>
-              </a:ext>
-            </a:extLst>
-          </a:blip>
-          <a:srcRect/>
-          <a:stretch>
-            <a:fillRect/>
-          </a:stretch>
-        </p:blipFill>
-        <p:spPr bwMode="auto">
-          <a:xfrm>
-            <a:off x="7698345" y="663348"/>
             <a:ext cx="2487839" cy="2487839"/>
           </a:xfrm>
           <a:prstGeom prst="rect">
@@ -14125,14 +14362,14 @@
       </p:sp>
       <p:pic>
         <p:nvPicPr>
-          <p:cNvPr id="1026" name="Picture 2"/>
+          <p:cNvPr id="5" name="Picture 2"/>
           <p:cNvPicPr>
             <a:picLocks noChangeAspect="1" noChangeArrowheads="1"/>
           </p:cNvPicPr>
           <p:nvPr/>
         </p:nvPicPr>
         <p:blipFill>
-          <a:blip r:embed="rId6">
+          <a:blip r:embed="rId5">
             <a:extLst>
               <a:ext uri="{28A0092B-C50C-407E-A947-70E740481C1C}">
                 <a14:useLocalDpi xmlns:a14="http://schemas.microsoft.com/office/drawing/2010/main" val="0"/>
@@ -14146,8 +14383,72 @@
         </p:blipFill>
         <p:spPr bwMode="auto">
           <a:xfrm>
-            <a:off x="2569082" y="4545901"/>
-            <a:ext cx="2670671" cy="2225678"/>
+            <a:off x="7686770" y="663347"/>
+            <a:ext cx="2487839" cy="2487839"/>
+          </a:xfrm>
+          <a:prstGeom prst="rect">
+            <a:avLst/>
+          </a:prstGeom>
+          <a:noFill/>
+          <a:ln>
+            <a:noFill/>
+          </a:ln>
+          <a:effectLst/>
+          <a:extLst>
+            <a:ext uri="{909E8E84-426E-40DD-AFC4-6F175D3DCCD1}">
+              <a14:hiddenFill xmlns:a14="http://schemas.microsoft.com/office/drawing/2010/main">
+                <a:solidFill>
+                  <a:schemeClr val="accent1"/>
+                </a:solidFill>
+              </a14:hiddenFill>
+            </a:ext>
+            <a:ext uri="{91240B29-F687-4F45-9708-019B960494DF}">
+              <a14:hiddenLine xmlns:a14="http://schemas.microsoft.com/office/drawing/2010/main" w="9525">
+                <a:solidFill>
+                  <a:schemeClr val="tx1"/>
+                </a:solidFill>
+                <a:miter lim="800000"/>
+                <a:headEnd/>
+                <a:tailEnd/>
+              </a14:hiddenLine>
+            </a:ext>
+            <a:ext uri="{AF507438-7753-43E0-B8FC-AC1667EBCBE1}">
+              <a14:hiddenEffects xmlns:a14="http://schemas.microsoft.com/office/drawing/2010/main">
+                <a:effectLst>
+                  <a:outerShdw dist="35921" dir="2700000" algn="ctr" rotWithShape="0">
+                    <a:schemeClr val="bg2"/>
+                  </a:outerShdw>
+                </a:effectLst>
+              </a14:hiddenEffects>
+            </a:ext>
+          </a:extLst>
+        </p:spPr>
+      </p:pic>
+      <p:pic>
+        <p:nvPicPr>
+          <p:cNvPr id="6" name="Picture 2"/>
+          <p:cNvPicPr>
+            <a:picLocks noChangeAspect="1" noChangeArrowheads="1"/>
+          </p:cNvPicPr>
+          <p:nvPr/>
+        </p:nvPicPr>
+        <p:blipFill>
+          <a:blip r:embed="rId6" cstate="print">
+            <a:extLst>
+              <a:ext uri="{28A0092B-C50C-407E-A947-70E740481C1C}">
+                <a14:useLocalDpi xmlns:a14="http://schemas.microsoft.com/office/drawing/2010/main" val="0"/>
+              </a:ext>
+            </a:extLst>
+          </a:blip>
+          <a:srcRect/>
+          <a:stretch>
+            <a:fillRect/>
+          </a:stretch>
+        </p:blipFill>
+        <p:spPr bwMode="auto">
+          <a:xfrm>
+            <a:off x="2258535" y="4641532"/>
+            <a:ext cx="4067636" cy="2216468"/>
           </a:xfrm>
           <a:prstGeom prst="rect">
             <a:avLst/>
@@ -14260,11 +14561,6 @@
               </a:rPr>
               <a:t>3</a:t>
             </a:r>
-            <a:endParaRPr lang="ru-RU" sz="7200" dirty="0">
-              <a:solidFill>
-                <a:schemeClr val="bg1"/>
-              </a:solidFill>
-            </a:endParaRPr>
           </a:p>
         </p:txBody>
       </p:sp>
@@ -14311,7 +14607,23 @@
                   <a:schemeClr val="bg1"/>
                 </a:solidFill>
               </a:rPr>
-              <a:t>170 minutes</a:t>
+              <a:t>25</a:t>
+            </a:r>
+            <a:r>
+              <a:rPr lang="en-US" sz="2400" dirty="0" smtClean="0">
+                <a:solidFill>
+                  <a:schemeClr val="bg1"/>
+                </a:solidFill>
+              </a:rPr>
+              <a:t>0 </a:t>
+            </a:r>
+            <a:r>
+              <a:rPr lang="en-US" sz="2400" dirty="0" smtClean="0">
+                <a:solidFill>
+                  <a:schemeClr val="bg1"/>
+                </a:solidFill>
+              </a:rPr>
+              <a:t>minutes</a:t>
             </a:r>
             <a:endParaRPr lang="ru-RU" sz="2400" dirty="0">
               <a:solidFill>
@@ -14378,9 +14690,108 @@
           </a:p>
         </p:txBody>
       </p:sp>
+      <p:sp>
+        <p:nvSpPr>
+          <p:cNvPr id="15" name="Заголовок 1"/>
+          <p:cNvSpPr txBox="1">
+            <a:spLocks/>
+          </p:cNvSpPr>
+          <p:nvPr/>
+        </p:nvSpPr>
+        <p:spPr>
+          <a:xfrm>
+            <a:off x="6244390" y="3687760"/>
+            <a:ext cx="5372600" cy="625642"/>
+          </a:xfrm>
+          <a:prstGeom prst="rect">
+            <a:avLst/>
+          </a:prstGeom>
+        </p:spPr>
+        <p:txBody>
+          <a:bodyPr vert="horz" lIns="91440" tIns="45720" rIns="91440" bIns="45720" rtlCol="0" anchor="ctr" anchorCtr="0">
+            <a:noAutofit/>
+          </a:bodyPr>
+          <a:lstStyle>
+            <a:lvl1pPr algn="ctr" defTabSz="914400" rtl="0" eaLnBrk="1" latinLnBrk="0" hangingPunct="1">
+              <a:lnSpc>
+                <a:spcPct val="90000"/>
+              </a:lnSpc>
+              <a:spcBef>
+                <a:spcPct val="0"/>
+              </a:spcBef>
+              <a:buNone/>
+              <a:defRPr sz="4800" kern="1200" cap="all" spc="300" baseline="0">
+                <a:solidFill>
+                  <a:schemeClr val="bg1"/>
+                </a:solidFill>
+                <a:latin typeface="+mj-lt"/>
+                <a:ea typeface="+mj-ea"/>
+                <a:cs typeface="+mj-cs"/>
+              </a:defRPr>
+            </a:lvl1pPr>
+          </a:lstStyle>
+          <a:p>
+            <a:r>
+              <a:rPr lang="en-US" sz="3600" dirty="0" smtClean="0"/>
+              <a:t>5.8</a:t>
+            </a:r>
+            <a:r>
+              <a:rPr lang="en-US" sz="3600" dirty="0" smtClean="0"/>
+              <a:t>kb </a:t>
+            </a:r>
+            <a:r>
+              <a:rPr lang="en-US" sz="3600" dirty="0"/>
+              <a:t>encoded</a:t>
+            </a:r>
+          </a:p>
+          <a:p>
+            <a:r>
+              <a:rPr lang="en-US" sz="3600" dirty="0" smtClean="0"/>
+              <a:t>25KB </a:t>
+            </a:r>
+            <a:r>
+              <a:rPr lang="en-US" sz="3600" dirty="0"/>
+              <a:t>decoded</a:t>
+            </a:r>
+            <a:endParaRPr lang="ru-RU" sz="3600" dirty="0"/>
+          </a:p>
+        </p:txBody>
+      </p:sp>
+      <p:sp>
+        <p:nvSpPr>
+          <p:cNvPr id="16" name="Заголовок 1"/>
+          <p:cNvSpPr>
+            <a:spLocks noGrp="1"/>
+          </p:cNvSpPr>
+          <p:nvPr>
+            <p:ph type="ctrTitle"/>
+          </p:nvPr>
+        </p:nvSpPr>
+        <p:spPr>
+          <a:xfrm>
+            <a:off x="2249905" y="3657600"/>
+            <a:ext cx="2378241" cy="625642"/>
+          </a:xfrm>
+        </p:spPr>
+        <p:txBody>
+          <a:bodyPr/>
+          <a:lstStyle/>
+          <a:p>
+            <a:r>
+              <a:rPr lang="ru-RU" sz="3600" dirty="0" smtClean="0"/>
+              <a:t>34</a:t>
+            </a:r>
+            <a:r>
+              <a:rPr lang="en-US" sz="3600" dirty="0" smtClean="0"/>
+              <a:t>KB</a:t>
+            </a:r>
+            <a:endParaRPr lang="ru-RU" sz="3600" dirty="0"/>
+          </a:p>
+        </p:txBody>
+      </p:sp>
       <p:pic>
         <p:nvPicPr>
-          <p:cNvPr id="14" name="Picture 6"/>
+          <p:cNvPr id="17" name="Picture 2" descr="C:\Users\grigo\OneDrive\Рабочий стол\00000.png"/>
           <p:cNvPicPr>
             <a:picLocks noChangeAspect="1" noChangeArrowheads="1"/>
           </p:cNvPicPr>
@@ -14401,8 +14812,49 @@
         </p:blipFill>
         <p:spPr bwMode="auto">
           <a:xfrm>
-            <a:off x="2027238" y="4706576"/>
-            <a:ext cx="4469815" cy="2152493"/>
+            <a:off x="2138588" y="663348"/>
+            <a:ext cx="2487839" cy="2487839"/>
+          </a:xfrm>
+          <a:prstGeom prst="rect">
+            <a:avLst/>
+          </a:prstGeom>
+          <a:noFill/>
+          <a:extLst>
+            <a:ext uri="{909E8E84-426E-40DD-AFC4-6F175D3DCCD1}">
+              <a14:hiddenFill xmlns:a14="http://schemas.microsoft.com/office/drawing/2010/main">
+                <a:solidFill>
+                  <a:srgbClr val="FFFFFF"/>
+                </a:solidFill>
+              </a14:hiddenFill>
+            </a:ext>
+          </a:extLst>
+        </p:spPr>
+      </p:pic>
+      <p:pic>
+        <p:nvPicPr>
+          <p:cNvPr id="2051" name="Picture 3"/>
+          <p:cNvPicPr>
+            <a:picLocks noChangeAspect="1" noChangeArrowheads="1"/>
+          </p:cNvPicPr>
+          <p:nvPr/>
+        </p:nvPicPr>
+        <p:blipFill>
+          <a:blip r:embed="rId4">
+            <a:extLst>
+              <a:ext uri="{28A0092B-C50C-407E-A947-70E740481C1C}">
+                <a14:useLocalDpi xmlns:a14="http://schemas.microsoft.com/office/drawing/2010/main" val="0"/>
+              </a:ext>
+            </a:extLst>
+          </a:blip>
+          <a:srcRect/>
+          <a:stretch>
+            <a:fillRect/>
+          </a:stretch>
+        </p:blipFill>
+        <p:spPr bwMode="auto">
+          <a:xfrm>
+            <a:off x="7883244" y="4999321"/>
+            <a:ext cx="4308756" cy="1858679"/>
           </a:xfrm>
           <a:prstGeom prst="rect">
             <a:avLst/>
@@ -14442,103 +14894,16 @@
           </a:extLst>
         </p:spPr>
       </p:pic>
-      <p:sp>
-        <p:nvSpPr>
-          <p:cNvPr id="15" name="Заголовок 1"/>
-          <p:cNvSpPr txBox="1">
-            <a:spLocks/>
-          </p:cNvSpPr>
-          <p:nvPr/>
-        </p:nvSpPr>
-        <p:spPr>
-          <a:xfrm>
-            <a:off x="6244390" y="3687760"/>
-            <a:ext cx="5372600" cy="625642"/>
-          </a:xfrm>
-          <a:prstGeom prst="rect">
-            <a:avLst/>
-          </a:prstGeom>
-        </p:spPr>
-        <p:txBody>
-          <a:bodyPr vert="horz" lIns="91440" tIns="45720" rIns="91440" bIns="45720" rtlCol="0" anchor="ctr" anchorCtr="0">
-            <a:noAutofit/>
-          </a:bodyPr>
-          <a:lstStyle>
-            <a:lvl1pPr algn="ctr" defTabSz="914400" rtl="0" eaLnBrk="1" latinLnBrk="0" hangingPunct="1">
-              <a:lnSpc>
-                <a:spcPct val="90000"/>
-              </a:lnSpc>
-              <a:spcBef>
-                <a:spcPct val="0"/>
-              </a:spcBef>
-              <a:buNone/>
-              <a:defRPr sz="4800" kern="1200" cap="all" spc="300" baseline="0">
-                <a:solidFill>
-                  <a:schemeClr val="bg1"/>
-                </a:solidFill>
-                <a:latin typeface="+mj-lt"/>
-                <a:ea typeface="+mj-ea"/>
-                <a:cs typeface="+mj-cs"/>
-              </a:defRPr>
-            </a:lvl1pPr>
-          </a:lstStyle>
-          <a:p>
-            <a:r>
-              <a:rPr lang="en-US" sz="3600" dirty="0" smtClean="0"/>
-              <a:t>100kb encoded</a:t>
-            </a:r>
-          </a:p>
-          <a:p>
-            <a:r>
-              <a:rPr lang="en-US" sz="3600" dirty="0" smtClean="0"/>
-              <a:t>30KB decoded</a:t>
-            </a:r>
-            <a:endParaRPr lang="ru-RU" sz="3600" dirty="0"/>
-          </a:p>
-        </p:txBody>
-      </p:sp>
-      <p:sp>
-        <p:nvSpPr>
-          <p:cNvPr id="16" name="Заголовок 1"/>
-          <p:cNvSpPr>
-            <a:spLocks noGrp="1"/>
-          </p:cNvSpPr>
-          <p:nvPr>
-            <p:ph type="ctrTitle"/>
-          </p:nvPr>
-        </p:nvSpPr>
-        <p:spPr>
-          <a:xfrm>
-            <a:off x="2249905" y="3657600"/>
-            <a:ext cx="2378241" cy="625642"/>
-          </a:xfrm>
-        </p:spPr>
-        <p:txBody>
-          <a:bodyPr/>
-          <a:lstStyle/>
-          <a:p>
-            <a:r>
-              <a:rPr lang="ru-RU" sz="3600" dirty="0" smtClean="0"/>
-              <a:t>34</a:t>
-            </a:r>
-            <a:r>
-              <a:rPr lang="en-US" sz="3600" dirty="0" smtClean="0"/>
-              <a:t>KB</a:t>
-            </a:r>
-            <a:endParaRPr lang="ru-RU" sz="3600" dirty="0"/>
-          </a:p>
-        </p:txBody>
-      </p:sp>
       <p:pic>
         <p:nvPicPr>
-          <p:cNvPr id="17" name="Picture 2" descr="C:\Users\grigo\OneDrive\Рабочий стол\00000.png"/>
+          <p:cNvPr id="11" name="Picture 2"/>
           <p:cNvPicPr>
             <a:picLocks noChangeAspect="1" noChangeArrowheads="1"/>
           </p:cNvPicPr>
           <p:nvPr/>
         </p:nvPicPr>
         <p:blipFill>
-          <a:blip r:embed="rId4">
+          <a:blip r:embed="rId5" cstate="print">
             <a:extLst>
               <a:ext uri="{28A0092B-C50C-407E-A947-70E740481C1C}">
                 <a14:useLocalDpi xmlns:a14="http://schemas.microsoft.com/office/drawing/2010/main" val="0"/>
@@ -14552,49 +14917,8 @@
         </p:blipFill>
         <p:spPr bwMode="auto">
           <a:xfrm>
-            <a:off x="2138588" y="663348"/>
-            <a:ext cx="2487839" cy="2487839"/>
-          </a:xfrm>
-          <a:prstGeom prst="rect">
-            <a:avLst/>
-          </a:prstGeom>
-          <a:noFill/>
-          <a:extLst>
-            <a:ext uri="{909E8E84-426E-40DD-AFC4-6F175D3DCCD1}">
-              <a14:hiddenFill xmlns:a14="http://schemas.microsoft.com/office/drawing/2010/main">
-                <a:solidFill>
-                  <a:srgbClr val="FFFFFF"/>
-                </a:solidFill>
-              </a14:hiddenFill>
-            </a:ext>
-          </a:extLst>
-        </p:spPr>
-      </p:pic>
-      <p:pic>
-        <p:nvPicPr>
-          <p:cNvPr id="2051" name="Picture 3"/>
-          <p:cNvPicPr>
-            <a:picLocks noChangeAspect="1" noChangeArrowheads="1"/>
-          </p:cNvPicPr>
-          <p:nvPr/>
-        </p:nvPicPr>
-        <p:blipFill>
-          <a:blip r:embed="rId5">
-            <a:extLst>
-              <a:ext uri="{28A0092B-C50C-407E-A947-70E740481C1C}">
-                <a14:useLocalDpi xmlns:a14="http://schemas.microsoft.com/office/drawing/2010/main" val="0"/>
-              </a:ext>
-            </a:extLst>
-          </a:blip>
-          <a:srcRect/>
-          <a:stretch>
-            <a:fillRect/>
-          </a:stretch>
-        </p:blipFill>
-        <p:spPr bwMode="auto">
-          <a:xfrm>
-            <a:off x="7883244" y="4999321"/>
-            <a:ext cx="4308756" cy="1858679"/>
+            <a:off x="2258535" y="4641532"/>
+            <a:ext cx="4067636" cy="2216468"/>
           </a:xfrm>
           <a:prstGeom prst="rect">
             <a:avLst/>
@@ -14636,7 +14960,7 @@
       </p:pic>
       <p:pic>
         <p:nvPicPr>
-          <p:cNvPr id="1026" name="Picture 2" descr="C:\Users\grigo\OneDrive\Documents\GitHub\inf_theory_project\compressed_images\00000.png_decoded.png"/>
+          <p:cNvPr id="10" name="Picture 2" descr="C:\Users\grigo\OneDrive\Documents\GitHub\inf_theory_project\compressed_images\00000.png_decoded.png"/>
           <p:cNvPicPr>
             <a:picLocks noChangeAspect="1" noChangeArrowheads="1"/>
           </p:cNvPicPr>
@@ -14657,8 +14981,8 @@
         </p:blipFill>
         <p:spPr bwMode="auto">
           <a:xfrm>
-            <a:off x="7694876" y="663348"/>
-            <a:ext cx="2487839" cy="2487839"/>
+            <a:off x="7665929" y="663348"/>
+            <a:ext cx="2487838" cy="2487838"/>
           </a:xfrm>
           <a:prstGeom prst="rect">
             <a:avLst/>
@@ -14748,11 +15072,6 @@
               </a:rPr>
               <a:t>3</a:t>
             </a:r>
-            <a:endParaRPr lang="ru-RU" sz="7200" dirty="0">
-              <a:solidFill>
-                <a:schemeClr val="bg1"/>
-              </a:solidFill>
-            </a:endParaRPr>
           </a:p>
         </p:txBody>
       </p:sp>
@@ -14807,7 +15126,7 @@
       </p:sp>
       <p:pic>
         <p:nvPicPr>
-          <p:cNvPr id="2050" name="Picture 2"/>
+          <p:cNvPr id="2" name="Picture 2"/>
           <p:cNvPicPr>
             <a:picLocks noChangeAspect="1" noChangeArrowheads="1"/>
           </p:cNvPicPr>
@@ -14828,8 +15147,8 @@
         </p:blipFill>
         <p:spPr bwMode="auto">
           <a:xfrm>
-            <a:off x="487366" y="1087048"/>
-            <a:ext cx="5380729" cy="2868329"/>
+            <a:off x="607719" y="1037635"/>
+            <a:ext cx="5349794" cy="2861198"/>
           </a:xfrm>
           <a:prstGeom prst="rect">
             <a:avLst/>
@@ -14871,7 +15190,7 @@
       </p:pic>
       <p:pic>
         <p:nvPicPr>
-          <p:cNvPr id="2051" name="Picture 3"/>
+          <p:cNvPr id="4" name="Picture 3"/>
           <p:cNvPicPr>
             <a:picLocks noChangeAspect="1" noChangeArrowheads="1"/>
           </p:cNvPicPr>
@@ -14892,8 +15211,8 @@
         </p:blipFill>
         <p:spPr bwMode="auto">
           <a:xfrm>
-            <a:off x="6349825" y="1230675"/>
-            <a:ext cx="5034277" cy="2581074"/>
+            <a:off x="6211995" y="1037635"/>
+            <a:ext cx="5383739" cy="2861198"/>
           </a:xfrm>
           <a:prstGeom prst="rect">
             <a:avLst/>
@@ -14935,7 +15254,7 @@
       </p:pic>
       <p:pic>
         <p:nvPicPr>
-          <p:cNvPr id="2052" name="Picture 4"/>
+          <p:cNvPr id="5" name="Picture 4"/>
           <p:cNvPicPr>
             <a:picLocks noChangeAspect="1" noChangeArrowheads="1"/>
           </p:cNvPicPr>
@@ -14956,8 +15275,8 @@
         </p:blipFill>
         <p:spPr bwMode="auto">
           <a:xfrm>
-            <a:off x="3564497" y="4091873"/>
-            <a:ext cx="4928273" cy="2555025"/>
+            <a:off x="3780416" y="4125118"/>
+            <a:ext cx="4496435" cy="2474755"/>
           </a:xfrm>
           <a:prstGeom prst="rect">
             <a:avLst/>
@@ -15011,6 +15330,1049 @@
 </file>
 
 <file path=ppt/slides/slide25.xml><?xml version="1.0" encoding="utf-8"?>
+<p:sld xmlns:a="http://schemas.openxmlformats.org/drawingml/2006/main" xmlns:r="http://schemas.openxmlformats.org/officeDocument/2006/relationships" xmlns:p="http://schemas.openxmlformats.org/presentationml/2006/main">
+  <p:cSld>
+    <p:spTree>
+      <p:nvGrpSpPr>
+        <p:cNvPr id="1" name="">
+          <a:extLst>
+            <a:ext uri="{FF2B5EF4-FFF2-40B4-BE49-F238E27FC236}">
+              <a16:creationId xmlns:a16="http://schemas.microsoft.com/office/drawing/2014/main" xmlns="" id="{EF87400A-AA39-C6BD-0F50-19DF27F0BEE1}"/>
+            </a:ext>
+          </a:extLst>
+        </p:cNvPr>
+        <p:cNvGrpSpPr/>
+        <p:nvPr/>
+      </p:nvGrpSpPr>
+      <p:grpSpPr>
+        <a:xfrm>
+          <a:off x="0" y="0"/>
+          <a:ext cx="0" cy="0"/>
+          <a:chOff x="0" y="0"/>
+          <a:chExt cx="0" cy="0"/>
+        </a:xfrm>
+      </p:grpSpPr>
+      <p:sp>
+        <p:nvSpPr>
+          <p:cNvPr id="3" name="Прямоугольник 2"/>
+          <p:cNvSpPr/>
+          <p:nvPr/>
+        </p:nvSpPr>
+        <p:spPr>
+          <a:xfrm>
+            <a:off x="0" y="5658740"/>
+            <a:ext cx="1876926" cy="1200329"/>
+          </a:xfrm>
+          <a:prstGeom prst="rect">
+            <a:avLst/>
+          </a:prstGeom>
+        </p:spPr>
+        <p:txBody>
+          <a:bodyPr wrap="square">
+            <a:spAutoFit/>
+          </a:bodyPr>
+          <a:lstStyle/>
+          <a:p>
+            <a:r>
+              <a:rPr lang="en-US" sz="7200" dirty="0" smtClean="0">
+                <a:solidFill>
+                  <a:schemeClr val="bg1"/>
+                </a:solidFill>
+              </a:rPr>
+              <a:t>V</a:t>
+            </a:r>
+            <a:r>
+              <a:rPr lang="ru-RU" sz="7200" dirty="0">
+                <a:solidFill>
+                  <a:schemeClr val="bg1"/>
+                </a:solidFill>
+              </a:rPr>
+              <a:t>3</a:t>
+            </a:r>
+          </a:p>
+        </p:txBody>
+      </p:sp>
+      <p:sp>
+        <p:nvSpPr>
+          <p:cNvPr id="13" name="Заголовок 1"/>
+          <p:cNvSpPr txBox="1">
+            <a:spLocks/>
+          </p:cNvSpPr>
+          <p:nvPr/>
+        </p:nvSpPr>
+        <p:spPr>
+          <a:xfrm>
+            <a:off x="0" y="132080"/>
+            <a:ext cx="7653418" cy="625642"/>
+          </a:xfrm>
+          <a:prstGeom prst="rect">
+            <a:avLst/>
+          </a:prstGeom>
+        </p:spPr>
+        <p:txBody>
+          <a:bodyPr vert="horz" lIns="91440" tIns="45720" rIns="91440" bIns="45720" rtlCol="0" anchor="ctr" anchorCtr="0">
+            <a:noAutofit/>
+          </a:bodyPr>
+          <a:lstStyle>
+            <a:lvl1pPr algn="ctr" defTabSz="914400" rtl="0" eaLnBrk="1" latinLnBrk="0" hangingPunct="1">
+              <a:lnSpc>
+                <a:spcPct val="90000"/>
+              </a:lnSpc>
+              <a:spcBef>
+                <a:spcPct val="0"/>
+              </a:spcBef>
+              <a:buNone/>
+              <a:defRPr sz="4800" kern="1200" cap="all" spc="300" baseline="0">
+                <a:solidFill>
+                  <a:schemeClr val="bg1"/>
+                </a:solidFill>
+                <a:latin typeface="+mj-lt"/>
+                <a:ea typeface="+mj-ea"/>
+                <a:cs typeface="+mj-cs"/>
+              </a:defRPr>
+            </a:lvl1pPr>
+          </a:lstStyle>
+          <a:p>
+            <a:r>
+              <a:rPr lang="en-US" sz="2800" dirty="0" smtClean="0"/>
+              <a:t>Compression of the encoded image file(.</a:t>
+            </a:r>
+            <a:r>
+              <a:rPr lang="en-US" sz="2800" dirty="0" err="1" smtClean="0"/>
+              <a:t>pt</a:t>
+            </a:r>
+            <a:r>
+              <a:rPr lang="en-US" sz="2800" dirty="0" smtClean="0"/>
+              <a:t> file)</a:t>
+            </a:r>
+            <a:endParaRPr lang="en-US" sz="2800" dirty="0"/>
+          </a:p>
+        </p:txBody>
+      </p:sp>
+      <p:sp>
+        <p:nvSpPr>
+          <p:cNvPr id="7" name="Прямоугольник 6"/>
+          <p:cNvSpPr/>
+          <p:nvPr/>
+        </p:nvSpPr>
+        <p:spPr>
+          <a:xfrm>
+            <a:off x="8128000" y="444901"/>
+            <a:ext cx="2942658" cy="830997"/>
+          </a:xfrm>
+          <a:prstGeom prst="rect">
+            <a:avLst/>
+          </a:prstGeom>
+        </p:spPr>
+        <p:txBody>
+          <a:bodyPr wrap="square">
+            <a:spAutoFit/>
+          </a:bodyPr>
+          <a:lstStyle/>
+          <a:p>
+            <a:pPr marL="457200" indent="-457200">
+              <a:buAutoNum type="arabicParenR"/>
+            </a:pPr>
+            <a:r>
+              <a:rPr lang="en-US" sz="2400" dirty="0" smtClean="0">
+                <a:solidFill>
+                  <a:schemeClr val="bg1"/>
+                </a:solidFill>
+              </a:rPr>
+              <a:t>With </a:t>
+            </a:r>
+            <a:r>
+              <a:rPr lang="en-US" sz="2400" dirty="0" err="1" smtClean="0">
+                <a:solidFill>
+                  <a:schemeClr val="bg1"/>
+                </a:solidFill>
+              </a:rPr>
+              <a:t>gzip</a:t>
+            </a:r>
+            <a:r>
+              <a:rPr lang="en-US" sz="2400" dirty="0" smtClean="0">
+                <a:solidFill>
+                  <a:schemeClr val="bg1"/>
+                </a:solidFill>
+              </a:rPr>
+              <a:t>: 5.89KB</a:t>
+            </a:r>
+          </a:p>
+          <a:p>
+            <a:r>
+              <a:rPr lang="en-US" sz="2400" dirty="0" smtClean="0">
+                <a:solidFill>
+                  <a:schemeClr val="bg1"/>
+                </a:solidFill>
+              </a:rPr>
+              <a:t>No loss</a:t>
+            </a:r>
+            <a:endParaRPr lang="ru-RU" sz="2400" dirty="0">
+              <a:solidFill>
+                <a:schemeClr val="bg1"/>
+              </a:solidFill>
+            </a:endParaRPr>
+          </a:p>
+        </p:txBody>
+      </p:sp>
+      <p:sp>
+        <p:nvSpPr>
+          <p:cNvPr id="8" name="Прямоугольник 7"/>
+          <p:cNvSpPr/>
+          <p:nvPr/>
+        </p:nvSpPr>
+        <p:spPr>
+          <a:xfrm>
+            <a:off x="8128000" y="1634317"/>
+            <a:ext cx="4318000" cy="830997"/>
+          </a:xfrm>
+          <a:prstGeom prst="rect">
+            <a:avLst/>
+          </a:prstGeom>
+        </p:spPr>
+        <p:txBody>
+          <a:bodyPr wrap="square">
+            <a:spAutoFit/>
+          </a:bodyPr>
+          <a:lstStyle/>
+          <a:p>
+            <a:r>
+              <a:rPr lang="en-US" sz="2400" dirty="0">
+                <a:solidFill>
+                  <a:schemeClr val="bg1"/>
+                </a:solidFill>
+              </a:rPr>
+              <a:t>2</a:t>
+            </a:r>
+            <a:r>
+              <a:rPr lang="en-US" sz="2400" dirty="0" smtClean="0">
+                <a:solidFill>
+                  <a:schemeClr val="bg1"/>
+                </a:solidFill>
+              </a:rPr>
+              <a:t>) </a:t>
+            </a:r>
+            <a:r>
+              <a:rPr lang="en-US" sz="2400" dirty="0" err="1" smtClean="0">
+                <a:solidFill>
+                  <a:schemeClr val="bg1"/>
+                </a:solidFill>
+              </a:rPr>
+              <a:t>Lzma</a:t>
+            </a:r>
+            <a:r>
+              <a:rPr lang="en-US" sz="2400" dirty="0" smtClean="0">
+                <a:solidFill>
+                  <a:schemeClr val="bg1"/>
+                </a:solidFill>
+              </a:rPr>
+              <a:t> instead of </a:t>
+            </a:r>
+            <a:r>
+              <a:rPr lang="en-US" sz="2400" dirty="0" err="1" smtClean="0">
+                <a:solidFill>
+                  <a:schemeClr val="bg1"/>
+                </a:solidFill>
+              </a:rPr>
+              <a:t>gzip</a:t>
+            </a:r>
+            <a:r>
+              <a:rPr lang="en-US" sz="2400" dirty="0" smtClean="0">
+                <a:solidFill>
+                  <a:schemeClr val="bg1"/>
+                </a:solidFill>
+              </a:rPr>
+              <a:t>: 5.58KB</a:t>
+            </a:r>
+          </a:p>
+          <a:p>
+            <a:r>
+              <a:rPr lang="en-US" sz="2400" dirty="0" smtClean="0">
+                <a:solidFill>
+                  <a:schemeClr val="bg1"/>
+                </a:solidFill>
+              </a:rPr>
+              <a:t>No loss</a:t>
+            </a:r>
+            <a:endParaRPr lang="en-US" sz="2400" dirty="0">
+              <a:solidFill>
+                <a:schemeClr val="bg1"/>
+              </a:solidFill>
+            </a:endParaRPr>
+          </a:p>
+        </p:txBody>
+      </p:sp>
+      <p:sp>
+        <p:nvSpPr>
+          <p:cNvPr id="9" name="Прямоугольник 8"/>
+          <p:cNvSpPr/>
+          <p:nvPr/>
+        </p:nvSpPr>
+        <p:spPr>
+          <a:xfrm>
+            <a:off x="8128000" y="2690407"/>
+            <a:ext cx="4064000" cy="3416320"/>
+          </a:xfrm>
+          <a:prstGeom prst="rect">
+            <a:avLst/>
+          </a:prstGeom>
+        </p:spPr>
+        <p:txBody>
+          <a:bodyPr wrap="square">
+            <a:spAutoFit/>
+          </a:bodyPr>
+          <a:lstStyle/>
+          <a:p>
+            <a:r>
+              <a:rPr lang="en-US" sz="2400" dirty="0" smtClean="0">
+                <a:solidFill>
+                  <a:schemeClr val="bg1"/>
+                </a:solidFill>
+              </a:rPr>
+              <a:t>3) </a:t>
+            </a:r>
+            <a:r>
+              <a:rPr lang="en-US" sz="2400" dirty="0" err="1" smtClean="0">
+                <a:solidFill>
+                  <a:schemeClr val="bg1"/>
+                </a:solidFill>
+              </a:rPr>
+              <a:t>Lzma</a:t>
+            </a:r>
+            <a:r>
+              <a:rPr lang="ru-RU" sz="2400" dirty="0" smtClean="0">
+                <a:solidFill>
+                  <a:schemeClr val="bg1"/>
+                </a:solidFill>
+              </a:rPr>
+              <a:t> + </a:t>
+            </a:r>
+            <a:r>
+              <a:rPr lang="en-US" sz="2400" dirty="0" smtClean="0">
+                <a:solidFill>
+                  <a:schemeClr val="bg1"/>
+                </a:solidFill>
+              </a:rPr>
+              <a:t>quantization(FP16 </a:t>
+            </a:r>
+            <a:r>
+              <a:rPr lang="en-US" sz="2400" dirty="0">
+                <a:solidFill>
+                  <a:schemeClr val="bg1"/>
+                </a:solidFill>
+              </a:rPr>
+              <a:t>→ </a:t>
+            </a:r>
+            <a:r>
+              <a:rPr lang="en-US" sz="2400" dirty="0" smtClean="0">
+                <a:solidFill>
+                  <a:schemeClr val="bg1"/>
+                </a:solidFill>
+              </a:rPr>
+              <a:t>INT8): 2.9KB</a:t>
+            </a:r>
+          </a:p>
+          <a:p>
+            <a:endParaRPr lang="ru-RU" sz="2400" dirty="0" smtClean="0">
+              <a:solidFill>
+                <a:schemeClr val="bg1"/>
+              </a:solidFill>
+            </a:endParaRPr>
+          </a:p>
+          <a:p>
+            <a:r>
+              <a:rPr lang="en-US" sz="2400" dirty="0">
+                <a:solidFill>
+                  <a:schemeClr val="bg1"/>
+                </a:solidFill>
+              </a:rPr>
+              <a:t>The weight of a neuron narrows the </a:t>
+            </a:r>
+            <a:r>
+              <a:rPr lang="en-US" sz="2400" dirty="0" smtClean="0">
+                <a:solidFill>
+                  <a:schemeClr val="bg1"/>
+                </a:solidFill>
+              </a:rPr>
+              <a:t>range</a:t>
+            </a:r>
+            <a:r>
+              <a:rPr lang="ru-RU" sz="2400" dirty="0" smtClean="0">
+                <a:solidFill>
+                  <a:schemeClr val="bg1"/>
+                </a:solidFill>
+              </a:rPr>
+              <a:t> </a:t>
+            </a:r>
+            <a:r>
+              <a:rPr lang="en-US" sz="2400" dirty="0" smtClean="0">
+                <a:solidFill>
+                  <a:schemeClr val="bg1"/>
+                </a:solidFill>
+              </a:rPr>
+              <a:t>to [-127, 128]</a:t>
+            </a:r>
+            <a:endParaRPr lang="ru-RU" sz="2400" dirty="0" smtClean="0">
+              <a:solidFill>
+                <a:schemeClr val="bg1"/>
+              </a:solidFill>
+            </a:endParaRPr>
+          </a:p>
+          <a:p>
+            <a:endParaRPr lang="en-US" sz="2400" dirty="0" smtClean="0">
+              <a:solidFill>
+                <a:schemeClr val="bg1"/>
+              </a:solidFill>
+            </a:endParaRPr>
+          </a:p>
+          <a:p>
+            <a:r>
+              <a:rPr lang="en-US" sz="2400" dirty="0" smtClean="0">
+                <a:solidFill>
+                  <a:schemeClr val="bg1"/>
+                </a:solidFill>
+              </a:rPr>
+              <a:t>Loss is so small, that there is no difference, because</a:t>
+            </a:r>
+            <a:endParaRPr lang="ru-RU" sz="2400" dirty="0">
+              <a:solidFill>
+                <a:schemeClr val="bg1"/>
+              </a:solidFill>
+            </a:endParaRPr>
+          </a:p>
+        </p:txBody>
+      </p:sp>
+      <p:pic>
+        <p:nvPicPr>
+          <p:cNvPr id="10" name="Picture 2"/>
+          <p:cNvPicPr>
+            <a:picLocks noChangeAspect="1" noChangeArrowheads="1"/>
+          </p:cNvPicPr>
+          <p:nvPr/>
+        </p:nvPicPr>
+        <p:blipFill>
+          <a:blip r:embed="rId3" cstate="print">
+            <a:extLst>
+              <a:ext uri="{28A0092B-C50C-407E-A947-70E740481C1C}">
+                <a14:useLocalDpi xmlns:a14="http://schemas.microsoft.com/office/drawing/2010/main" val="0"/>
+              </a:ext>
+            </a:extLst>
+          </a:blip>
+          <a:srcRect/>
+          <a:stretch>
+            <a:fillRect/>
+          </a:stretch>
+        </p:blipFill>
+        <p:spPr bwMode="auto">
+          <a:xfrm>
+            <a:off x="98085" y="1513947"/>
+            <a:ext cx="3557681" cy="1902733"/>
+          </a:xfrm>
+          <a:prstGeom prst="rect">
+            <a:avLst/>
+          </a:prstGeom>
+          <a:noFill/>
+          <a:ln>
+            <a:noFill/>
+          </a:ln>
+          <a:effectLst/>
+          <a:extLst>
+            <a:ext uri="{909E8E84-426E-40DD-AFC4-6F175D3DCCD1}">
+              <a14:hiddenFill xmlns:a14="http://schemas.microsoft.com/office/drawing/2010/main">
+                <a:solidFill>
+                  <a:schemeClr val="accent1"/>
+                </a:solidFill>
+              </a14:hiddenFill>
+            </a:ext>
+            <a:ext uri="{91240B29-F687-4F45-9708-019B960494DF}">
+              <a14:hiddenLine xmlns:a14="http://schemas.microsoft.com/office/drawing/2010/main" w="9525">
+                <a:solidFill>
+                  <a:schemeClr val="tx1"/>
+                </a:solidFill>
+                <a:miter lim="800000"/>
+                <a:headEnd/>
+                <a:tailEnd/>
+              </a14:hiddenLine>
+            </a:ext>
+            <a:ext uri="{AF507438-7753-43E0-B8FC-AC1667EBCBE1}">
+              <a14:hiddenEffects xmlns:a14="http://schemas.microsoft.com/office/drawing/2010/main">
+                <a:effectLst>
+                  <a:outerShdw dist="35921" dir="2700000" algn="ctr" rotWithShape="0">
+                    <a:schemeClr val="bg2"/>
+                  </a:outerShdw>
+                </a:effectLst>
+              </a14:hiddenEffects>
+            </a:ext>
+          </a:extLst>
+        </p:spPr>
+      </p:pic>
+      <p:pic>
+        <p:nvPicPr>
+          <p:cNvPr id="3074" name="Picture 2"/>
+          <p:cNvPicPr>
+            <a:picLocks noChangeAspect="1" noChangeArrowheads="1"/>
+          </p:cNvPicPr>
+          <p:nvPr/>
+        </p:nvPicPr>
+        <p:blipFill>
+          <a:blip r:embed="rId4" cstate="print">
+            <a:extLst>
+              <a:ext uri="{28A0092B-C50C-407E-A947-70E740481C1C}">
+                <a14:useLocalDpi xmlns:a14="http://schemas.microsoft.com/office/drawing/2010/main" val="0"/>
+              </a:ext>
+            </a:extLst>
+          </a:blip>
+          <a:srcRect/>
+          <a:stretch>
+            <a:fillRect/>
+          </a:stretch>
+        </p:blipFill>
+        <p:spPr bwMode="auto">
+          <a:xfrm>
+            <a:off x="3960893" y="1513947"/>
+            <a:ext cx="3692525" cy="1902733"/>
+          </a:xfrm>
+          <a:prstGeom prst="rect">
+            <a:avLst/>
+          </a:prstGeom>
+          <a:noFill/>
+          <a:ln>
+            <a:noFill/>
+          </a:ln>
+          <a:effectLst/>
+          <a:extLst>
+            <a:ext uri="{909E8E84-426E-40DD-AFC4-6F175D3DCCD1}">
+              <a14:hiddenFill xmlns:a14="http://schemas.microsoft.com/office/drawing/2010/main">
+                <a:solidFill>
+                  <a:schemeClr val="accent1"/>
+                </a:solidFill>
+              </a14:hiddenFill>
+            </a:ext>
+            <a:ext uri="{91240B29-F687-4F45-9708-019B960494DF}">
+              <a14:hiddenLine xmlns:a14="http://schemas.microsoft.com/office/drawing/2010/main" w="9525">
+                <a:solidFill>
+                  <a:schemeClr val="tx1"/>
+                </a:solidFill>
+                <a:miter lim="800000"/>
+                <a:headEnd/>
+                <a:tailEnd/>
+              </a14:hiddenLine>
+            </a:ext>
+            <a:ext uri="{AF507438-7753-43E0-B8FC-AC1667EBCBE1}">
+              <a14:hiddenEffects xmlns:a14="http://schemas.microsoft.com/office/drawing/2010/main">
+                <a:effectLst>
+                  <a:outerShdw dist="35921" dir="2700000" algn="ctr" rotWithShape="0">
+                    <a:schemeClr val="bg2"/>
+                  </a:outerShdw>
+                </a:effectLst>
+              </a14:hiddenEffects>
+            </a:ext>
+          </a:extLst>
+        </p:spPr>
+      </p:pic>
+      <p:sp>
+        <p:nvSpPr>
+          <p:cNvPr id="12" name="Прямоугольник 11"/>
+          <p:cNvSpPr/>
+          <p:nvPr/>
+        </p:nvSpPr>
+        <p:spPr>
+          <a:xfrm>
+            <a:off x="2117555" y="1045065"/>
+            <a:ext cx="3418308" cy="461665"/>
+          </a:xfrm>
+          <a:prstGeom prst="rect">
+            <a:avLst/>
+          </a:prstGeom>
+        </p:spPr>
+        <p:txBody>
+          <a:bodyPr wrap="square">
+            <a:spAutoFit/>
+          </a:bodyPr>
+          <a:lstStyle/>
+          <a:p>
+            <a:r>
+              <a:rPr lang="en-US" sz="2400" dirty="0" smtClean="0">
+                <a:solidFill>
+                  <a:schemeClr val="bg1"/>
+                </a:solidFill>
+              </a:rPr>
+              <a:t>No loss after compression</a:t>
+            </a:r>
+            <a:endParaRPr lang="ru-RU" sz="2400" dirty="0">
+              <a:solidFill>
+                <a:schemeClr val="bg1"/>
+              </a:solidFill>
+            </a:endParaRPr>
+          </a:p>
+        </p:txBody>
+      </p:sp>
+      <p:pic>
+        <p:nvPicPr>
+          <p:cNvPr id="3075" name="Picture 3"/>
+          <p:cNvPicPr>
+            <a:picLocks noChangeAspect="1" noChangeArrowheads="1"/>
+          </p:cNvPicPr>
+          <p:nvPr/>
+        </p:nvPicPr>
+        <p:blipFill>
+          <a:blip r:embed="rId5">
+            <a:extLst>
+              <a:ext uri="{28A0092B-C50C-407E-A947-70E740481C1C}">
+                <a14:useLocalDpi xmlns:a14="http://schemas.microsoft.com/office/drawing/2010/main" val="0"/>
+              </a:ext>
+            </a:extLst>
+          </a:blip>
+          <a:srcRect/>
+          <a:stretch>
+            <a:fillRect/>
+          </a:stretch>
+        </p:blipFill>
+        <p:spPr bwMode="auto">
+          <a:xfrm>
+            <a:off x="1528996" y="3652319"/>
+            <a:ext cx="5911486" cy="3206749"/>
+          </a:xfrm>
+          <a:prstGeom prst="rect">
+            <a:avLst/>
+          </a:prstGeom>
+          <a:noFill/>
+          <a:ln>
+            <a:noFill/>
+          </a:ln>
+          <a:effectLst/>
+          <a:extLst>
+            <a:ext uri="{909E8E84-426E-40DD-AFC4-6F175D3DCCD1}">
+              <a14:hiddenFill xmlns:a14="http://schemas.microsoft.com/office/drawing/2010/main">
+                <a:solidFill>
+                  <a:schemeClr val="accent1"/>
+                </a:solidFill>
+              </a14:hiddenFill>
+            </a:ext>
+            <a:ext uri="{91240B29-F687-4F45-9708-019B960494DF}">
+              <a14:hiddenLine xmlns:a14="http://schemas.microsoft.com/office/drawing/2010/main" w="9525">
+                <a:solidFill>
+                  <a:schemeClr val="tx1"/>
+                </a:solidFill>
+                <a:miter lim="800000"/>
+                <a:headEnd/>
+                <a:tailEnd/>
+              </a14:hiddenLine>
+            </a:ext>
+            <a:ext uri="{AF507438-7753-43E0-B8FC-AC1667EBCBE1}">
+              <a14:hiddenEffects xmlns:a14="http://schemas.microsoft.com/office/drawing/2010/main">
+                <a:effectLst>
+                  <a:outerShdw dist="35921" dir="2700000" algn="ctr" rotWithShape="0">
+                    <a:schemeClr val="bg2"/>
+                  </a:outerShdw>
+                </a:effectLst>
+              </a14:hiddenEffects>
+            </a:ext>
+          </a:extLst>
+        </p:spPr>
+      </p:pic>
+    </p:spTree>
+    <p:extLst>
+      <p:ext uri="{BB962C8B-B14F-4D97-AF65-F5344CB8AC3E}">
+        <p14:creationId xmlns:p14="http://schemas.microsoft.com/office/powerpoint/2010/main" val="4078670568"/>
+      </p:ext>
+    </p:extLst>
+  </p:cSld>
+  <p:clrMapOvr>
+    <a:masterClrMapping/>
+  </p:clrMapOvr>
+</p:sld>
+</file>
+
+<file path=ppt/slides/slide26.xml><?xml version="1.0" encoding="utf-8"?>
+<p:sld xmlns:a="http://schemas.openxmlformats.org/drawingml/2006/main" xmlns:r="http://schemas.openxmlformats.org/officeDocument/2006/relationships" xmlns:p="http://schemas.openxmlformats.org/presentationml/2006/main">
+  <p:cSld>
+    <p:spTree>
+      <p:nvGrpSpPr>
+        <p:cNvPr id="1" name="">
+          <a:extLst>
+            <a:ext uri="{FF2B5EF4-FFF2-40B4-BE49-F238E27FC236}">
+              <a16:creationId xmlns:a16="http://schemas.microsoft.com/office/drawing/2014/main" xmlns="" id="{EF87400A-AA39-C6BD-0F50-19DF27F0BEE1}"/>
+            </a:ext>
+          </a:extLst>
+        </p:cNvPr>
+        <p:cNvGrpSpPr/>
+        <p:nvPr/>
+      </p:nvGrpSpPr>
+      <p:grpSpPr>
+        <a:xfrm>
+          <a:off x="0" y="0"/>
+          <a:ext cx="0" cy="0"/>
+          <a:chOff x="0" y="0"/>
+          <a:chExt cx="0" cy="0"/>
+        </a:xfrm>
+      </p:grpSpPr>
+      <p:sp>
+        <p:nvSpPr>
+          <p:cNvPr id="3" name="Прямоугольник 2"/>
+          <p:cNvSpPr/>
+          <p:nvPr/>
+        </p:nvSpPr>
+        <p:spPr>
+          <a:xfrm>
+            <a:off x="0" y="5658740"/>
+            <a:ext cx="1876926" cy="1200329"/>
+          </a:xfrm>
+          <a:prstGeom prst="rect">
+            <a:avLst/>
+          </a:prstGeom>
+        </p:spPr>
+        <p:txBody>
+          <a:bodyPr wrap="square">
+            <a:spAutoFit/>
+          </a:bodyPr>
+          <a:lstStyle/>
+          <a:p>
+            <a:r>
+              <a:rPr lang="en-US" sz="7200" dirty="0" smtClean="0">
+                <a:solidFill>
+                  <a:schemeClr val="bg1"/>
+                </a:solidFill>
+              </a:rPr>
+              <a:t>V</a:t>
+            </a:r>
+            <a:r>
+              <a:rPr lang="en-US" sz="7200" dirty="0">
+                <a:solidFill>
+                  <a:schemeClr val="bg1"/>
+                </a:solidFill>
+              </a:rPr>
+              <a:t>3</a:t>
+            </a:r>
+            <a:endParaRPr lang="ru-RU" sz="7200" dirty="0">
+              <a:solidFill>
+                <a:schemeClr val="bg1"/>
+              </a:solidFill>
+            </a:endParaRPr>
+          </a:p>
+        </p:txBody>
+      </p:sp>
+      <p:sp>
+        <p:nvSpPr>
+          <p:cNvPr id="13" name="Заголовок 1"/>
+          <p:cNvSpPr txBox="1">
+            <a:spLocks/>
+          </p:cNvSpPr>
+          <p:nvPr/>
+        </p:nvSpPr>
+        <p:spPr>
+          <a:xfrm>
+            <a:off x="2201925" y="173736"/>
+            <a:ext cx="7653418" cy="625642"/>
+          </a:xfrm>
+          <a:prstGeom prst="rect">
+            <a:avLst/>
+          </a:prstGeom>
+        </p:spPr>
+        <p:txBody>
+          <a:bodyPr vert="horz" lIns="91440" tIns="45720" rIns="91440" bIns="45720" rtlCol="0" anchor="ctr" anchorCtr="0">
+            <a:noAutofit/>
+          </a:bodyPr>
+          <a:lstStyle>
+            <a:lvl1pPr algn="ctr" defTabSz="914400" rtl="0" eaLnBrk="1" latinLnBrk="0" hangingPunct="1">
+              <a:lnSpc>
+                <a:spcPct val="90000"/>
+              </a:lnSpc>
+              <a:spcBef>
+                <a:spcPct val="0"/>
+              </a:spcBef>
+              <a:buNone/>
+              <a:defRPr sz="4800" kern="1200" cap="all" spc="300" baseline="0">
+                <a:solidFill>
+                  <a:schemeClr val="bg1"/>
+                </a:solidFill>
+                <a:latin typeface="+mj-lt"/>
+                <a:ea typeface="+mj-ea"/>
+                <a:cs typeface="+mj-cs"/>
+              </a:defRPr>
+            </a:lvl1pPr>
+          </a:lstStyle>
+          <a:p>
+            <a:r>
+              <a:rPr lang="en-US" sz="2800" dirty="0" smtClean="0"/>
+              <a:t>Conclusion and next step</a:t>
+            </a:r>
+            <a:endParaRPr lang="en-US" sz="2800" dirty="0"/>
+          </a:p>
+        </p:txBody>
+      </p:sp>
+      <p:sp>
+        <p:nvSpPr>
+          <p:cNvPr id="4" name="Заголовок 1"/>
+          <p:cNvSpPr txBox="1">
+            <a:spLocks/>
+          </p:cNvSpPr>
+          <p:nvPr/>
+        </p:nvSpPr>
+        <p:spPr>
+          <a:xfrm>
+            <a:off x="629920" y="2042160"/>
+            <a:ext cx="10739120" cy="1378498"/>
+          </a:xfrm>
+          <a:prstGeom prst="rect">
+            <a:avLst/>
+          </a:prstGeom>
+        </p:spPr>
+        <p:txBody>
+          <a:bodyPr vert="horz" lIns="91440" tIns="45720" rIns="91440" bIns="45720" rtlCol="0" anchor="ctr" anchorCtr="0">
+            <a:noAutofit/>
+          </a:bodyPr>
+          <a:lstStyle>
+            <a:lvl1pPr algn="ctr" defTabSz="914400" rtl="0" eaLnBrk="1" latinLnBrk="0" hangingPunct="1">
+              <a:lnSpc>
+                <a:spcPct val="90000"/>
+              </a:lnSpc>
+              <a:spcBef>
+                <a:spcPct val="0"/>
+              </a:spcBef>
+              <a:buNone/>
+              <a:defRPr sz="4800" kern="1200" cap="all" spc="300" baseline="0">
+                <a:solidFill>
+                  <a:schemeClr val="bg1"/>
+                </a:solidFill>
+                <a:latin typeface="+mj-lt"/>
+                <a:ea typeface="+mj-ea"/>
+                <a:cs typeface="+mj-cs"/>
+              </a:defRPr>
+            </a:lvl1pPr>
+          </a:lstStyle>
+          <a:p>
+            <a:r>
+              <a:rPr lang="en-US" sz="2800" dirty="0" smtClean="0"/>
+              <a:t>Now size can compete with jpeg, we need to work on quality.</a:t>
+            </a:r>
+          </a:p>
+          <a:p>
+            <a:r>
+              <a:rPr lang="en-US" sz="2800" dirty="0" smtClean="0"/>
+              <a:t>We will test </a:t>
+            </a:r>
+            <a:r>
+              <a:rPr lang="en-US" sz="2800" dirty="0"/>
+              <a:t>different </a:t>
+            </a:r>
+            <a:r>
+              <a:rPr lang="en-US" sz="2800" dirty="0" smtClean="0"/>
+              <a:t>hypotheses</a:t>
+            </a:r>
+            <a:r>
+              <a:rPr lang="ru-RU" sz="2800" dirty="0" smtClean="0"/>
+              <a:t> </a:t>
+            </a:r>
+            <a:r>
+              <a:rPr lang="en-US" sz="2800" dirty="0" smtClean="0"/>
+              <a:t>for that – optimizations, different loss/activation functions</a:t>
+            </a:r>
+            <a:endParaRPr lang="en-US" sz="2800" dirty="0"/>
+          </a:p>
+        </p:txBody>
+      </p:sp>
+    </p:spTree>
+    <p:extLst>
+      <p:ext uri="{BB962C8B-B14F-4D97-AF65-F5344CB8AC3E}">
+        <p14:creationId xmlns:p14="http://schemas.microsoft.com/office/powerpoint/2010/main" val="1915478618"/>
+      </p:ext>
+    </p:extLst>
+  </p:cSld>
+  <p:clrMapOvr>
+    <a:masterClrMapping/>
+  </p:clrMapOvr>
+</p:sld>
+</file>
+
+<file path=ppt/slides/slide27.xml><?xml version="1.0" encoding="utf-8"?>
+<p:sld xmlns:a="http://schemas.openxmlformats.org/drawingml/2006/main" xmlns:r="http://schemas.openxmlformats.org/officeDocument/2006/relationships" xmlns:p="http://schemas.openxmlformats.org/presentationml/2006/main">
+  <p:cSld>
+    <p:spTree>
+      <p:nvGrpSpPr>
+        <p:cNvPr id="1" name="">
+          <a:extLst>
+            <a:ext uri="{FF2B5EF4-FFF2-40B4-BE49-F238E27FC236}">
+              <a16:creationId xmlns:a16="http://schemas.microsoft.com/office/drawing/2014/main" xmlns="" id="{EF87400A-AA39-C6BD-0F50-19DF27F0BEE1}"/>
+            </a:ext>
+          </a:extLst>
+        </p:cNvPr>
+        <p:cNvGrpSpPr/>
+        <p:nvPr/>
+      </p:nvGrpSpPr>
+      <p:grpSpPr>
+        <a:xfrm>
+          <a:off x="0" y="0"/>
+          <a:ext cx="0" cy="0"/>
+          <a:chOff x="0" y="0"/>
+          <a:chExt cx="0" cy="0"/>
+        </a:xfrm>
+      </p:grpSpPr>
+      <p:sp>
+        <p:nvSpPr>
+          <p:cNvPr id="3" name="Прямоугольник 2"/>
+          <p:cNvSpPr/>
+          <p:nvPr/>
+        </p:nvSpPr>
+        <p:spPr>
+          <a:xfrm>
+            <a:off x="0" y="5658740"/>
+            <a:ext cx="1876926" cy="1200329"/>
+          </a:xfrm>
+          <a:prstGeom prst="rect">
+            <a:avLst/>
+          </a:prstGeom>
+        </p:spPr>
+        <p:txBody>
+          <a:bodyPr wrap="square">
+            <a:spAutoFit/>
+          </a:bodyPr>
+          <a:lstStyle/>
+          <a:p>
+            <a:r>
+              <a:rPr lang="en-US" sz="7200" dirty="0" smtClean="0">
+                <a:solidFill>
+                  <a:schemeClr val="bg1"/>
+                </a:solidFill>
+              </a:rPr>
+              <a:t>V</a:t>
+            </a:r>
+            <a:r>
+              <a:rPr lang="en-US" sz="7200" dirty="0">
+                <a:solidFill>
+                  <a:schemeClr val="bg1"/>
+                </a:solidFill>
+              </a:rPr>
+              <a:t>4</a:t>
+            </a:r>
+            <a:endParaRPr lang="ru-RU" sz="7200" dirty="0">
+              <a:solidFill>
+                <a:schemeClr val="bg1"/>
+              </a:solidFill>
+            </a:endParaRPr>
+          </a:p>
+        </p:txBody>
+      </p:sp>
+      <p:sp>
+        <p:nvSpPr>
+          <p:cNvPr id="13" name="Заголовок 1"/>
+          <p:cNvSpPr txBox="1">
+            <a:spLocks/>
+          </p:cNvSpPr>
+          <p:nvPr/>
+        </p:nvSpPr>
+        <p:spPr>
+          <a:xfrm>
+            <a:off x="2201925" y="173736"/>
+            <a:ext cx="7653418" cy="625642"/>
+          </a:xfrm>
+          <a:prstGeom prst="rect">
+            <a:avLst/>
+          </a:prstGeom>
+        </p:spPr>
+        <p:txBody>
+          <a:bodyPr vert="horz" lIns="91440" tIns="45720" rIns="91440" bIns="45720" rtlCol="0" anchor="ctr" anchorCtr="0">
+            <a:noAutofit/>
+          </a:bodyPr>
+          <a:lstStyle>
+            <a:lvl1pPr algn="ctr" defTabSz="914400" rtl="0" eaLnBrk="1" latinLnBrk="0" hangingPunct="1">
+              <a:lnSpc>
+                <a:spcPct val="90000"/>
+              </a:lnSpc>
+              <a:spcBef>
+                <a:spcPct val="0"/>
+              </a:spcBef>
+              <a:buNone/>
+              <a:defRPr sz="4800" kern="1200" cap="all" spc="300" baseline="0">
+                <a:solidFill>
+                  <a:schemeClr val="bg1"/>
+                </a:solidFill>
+                <a:latin typeface="+mj-lt"/>
+                <a:ea typeface="+mj-ea"/>
+                <a:cs typeface="+mj-cs"/>
+              </a:defRPr>
+            </a:lvl1pPr>
+          </a:lstStyle>
+          <a:p>
+            <a:r>
+              <a:rPr lang="ru-RU" sz="2800" dirty="0" smtClean="0"/>
+              <a:t>1</a:t>
+            </a:r>
+            <a:r>
+              <a:rPr lang="en-US" sz="2800" dirty="0"/>
+              <a:t>hypothesis</a:t>
+            </a:r>
+            <a:endParaRPr lang="en-US" sz="2800" dirty="0"/>
+          </a:p>
+        </p:txBody>
+      </p:sp>
+      <p:sp>
+        <p:nvSpPr>
+          <p:cNvPr id="4" name="Заголовок 1"/>
+          <p:cNvSpPr txBox="1">
+            <a:spLocks/>
+          </p:cNvSpPr>
+          <p:nvPr/>
+        </p:nvSpPr>
+        <p:spPr>
+          <a:xfrm>
+            <a:off x="629920" y="2042160"/>
+            <a:ext cx="10739120" cy="1378498"/>
+          </a:xfrm>
+          <a:prstGeom prst="rect">
+            <a:avLst/>
+          </a:prstGeom>
+        </p:spPr>
+        <p:txBody>
+          <a:bodyPr vert="horz" lIns="91440" tIns="45720" rIns="91440" bIns="45720" rtlCol="0" anchor="ctr" anchorCtr="0">
+            <a:noAutofit/>
+          </a:bodyPr>
+          <a:lstStyle>
+            <a:lvl1pPr algn="ctr" defTabSz="914400" rtl="0" eaLnBrk="1" latinLnBrk="0" hangingPunct="1">
+              <a:lnSpc>
+                <a:spcPct val="90000"/>
+              </a:lnSpc>
+              <a:spcBef>
+                <a:spcPct val="0"/>
+              </a:spcBef>
+              <a:buNone/>
+              <a:defRPr sz="4800" kern="1200" cap="all" spc="300" baseline="0">
+                <a:solidFill>
+                  <a:schemeClr val="bg1"/>
+                </a:solidFill>
+                <a:latin typeface="+mj-lt"/>
+                <a:ea typeface="+mj-ea"/>
+                <a:cs typeface="+mj-cs"/>
+              </a:defRPr>
+            </a:lvl1pPr>
+          </a:lstStyle>
+          <a:p>
+            <a:r>
+              <a:rPr lang="en-US" sz="2800" dirty="0" smtClean="0"/>
+              <a:t>Hypothesis</a:t>
+            </a:r>
+            <a:r>
+              <a:rPr lang="ru-RU" sz="2800" dirty="0" smtClean="0"/>
+              <a:t> - </a:t>
+            </a:r>
+            <a:endParaRPr lang="en-US" sz="2800" dirty="0"/>
+          </a:p>
+        </p:txBody>
+      </p:sp>
+    </p:spTree>
+    <p:extLst>
+      <p:ext uri="{BB962C8B-B14F-4D97-AF65-F5344CB8AC3E}">
+        <p14:creationId xmlns:p14="http://schemas.microsoft.com/office/powerpoint/2010/main" val="3571996370"/>
+      </p:ext>
+    </p:extLst>
+  </p:cSld>
+  <p:clrMapOvr>
+    <a:masterClrMapping/>
+  </p:clrMapOvr>
+</p:sld>
+</file>
+
+<file path=ppt/slides/slide28.xml><?xml version="1.0" encoding="utf-8"?>
 <p:sld xmlns:a="http://schemas.openxmlformats.org/drawingml/2006/main" xmlns:r="http://schemas.openxmlformats.org/officeDocument/2006/relationships" xmlns:p="http://schemas.openxmlformats.org/presentationml/2006/main">
   <p:cSld>
     <p:spTree>

</xml_diff>

<commit_message>
Last version of code 128x128
</commit_message>
<xml_diff>
--- a/ai_compression_project.pptx
+++ b/ai_compression_project.pptx
@@ -5,10 +5,10 @@
     <p:sldMasterId id="2147483648" r:id="rId4"/>
   </p:sldMasterIdLst>
   <p:notesMasterIdLst>
-    <p:notesMasterId r:id="rId35"/>
+    <p:notesMasterId r:id="rId39"/>
   </p:notesMasterIdLst>
   <p:handoutMasterIdLst>
-    <p:handoutMasterId r:id="rId36"/>
+    <p:handoutMasterId r:id="rId40"/>
   </p:handoutMasterIdLst>
   <p:sldIdLst>
     <p:sldId id="281" r:id="rId5"/>
@@ -40,7 +40,11 @@
     <p:sldId id="313" r:id="rId31"/>
     <p:sldId id="314" r:id="rId32"/>
     <p:sldId id="315" r:id="rId33"/>
-    <p:sldId id="291" r:id="rId34"/>
+    <p:sldId id="316" r:id="rId34"/>
+    <p:sldId id="317" r:id="rId35"/>
+    <p:sldId id="318" r:id="rId36"/>
+    <p:sldId id="319" r:id="rId37"/>
+    <p:sldId id="291" r:id="rId38"/>
   </p:sldIdLst>
   <p:sldSz cx="12192000" cy="6858000"/>
   <p:notesSz cx="6858000" cy="9144000"/>
@@ -141,10 +145,10 @@
   </p:defaultTextStyle>
   <p:extLst>
     <p:ext uri="{EFAFB233-063F-42B5-8137-9DF3F51BA10A}">
-      <p15:sldGuideLst xmlns="" xmlns:p15="http://schemas.microsoft.com/office/powerpoint/2012/main"/>
+      <p15:sldGuideLst xmlns:p15="http://schemas.microsoft.com/office/powerpoint/2012/main" xmlns=""/>
     </p:ext>
     <p:ext uri="{2D200454-40CA-4A62-9FC3-DE9A4176ACB9}">
-      <p15:notesGuideLst xmlns="" xmlns:p15="http://schemas.microsoft.com/office/powerpoint/2012/main"/>
+      <p15:notesGuideLst xmlns:p15="http://schemas.microsoft.com/office/powerpoint/2012/main" xmlns=""/>
     </p:ext>
   </p:extLst>
 </p:presentation>
@@ -183,7 +187,7 @@
           <p:cNvPr id="2" name="Header Placeholder 1">
             <a:extLst>
               <a:ext uri="{FF2B5EF4-FFF2-40B4-BE49-F238E27FC236}">
-                <a16:creationId xmlns="" xmlns:a16="http://schemas.microsoft.com/office/drawing/2014/main" id="{3976AB79-C677-3DB7-78CF-9305D5861483}"/>
+                <a16:creationId xmlns:a16="http://schemas.microsoft.com/office/drawing/2014/main" xmlns="" id="{3976AB79-C677-3DB7-78CF-9305D5861483}"/>
               </a:ext>
             </a:extLst>
           </p:cNvPr>
@@ -220,7 +224,7 @@
           <p:cNvPr id="3" name="Date Placeholder 2">
             <a:extLst>
               <a:ext uri="{FF2B5EF4-FFF2-40B4-BE49-F238E27FC236}">
-                <a16:creationId xmlns="" xmlns:a16="http://schemas.microsoft.com/office/drawing/2014/main" id="{113AB137-CEA6-0244-F12B-1ECC21172D00}"/>
+                <a16:creationId xmlns:a16="http://schemas.microsoft.com/office/drawing/2014/main" xmlns="" id="{113AB137-CEA6-0244-F12B-1ECC21172D00}"/>
               </a:ext>
             </a:extLst>
           </p:cNvPr>
@@ -261,7 +265,7 @@
           <p:cNvPr id="4" name="Footer Placeholder 3">
             <a:extLst>
               <a:ext uri="{FF2B5EF4-FFF2-40B4-BE49-F238E27FC236}">
-                <a16:creationId xmlns="" xmlns:a16="http://schemas.microsoft.com/office/drawing/2014/main" id="{0868EC96-C6CC-F2AF-D90F-143F4D20A07A}"/>
+                <a16:creationId xmlns:a16="http://schemas.microsoft.com/office/drawing/2014/main" xmlns="" id="{0868EC96-C6CC-F2AF-D90F-143F4D20A07A}"/>
               </a:ext>
             </a:extLst>
           </p:cNvPr>
@@ -298,7 +302,7 @@
           <p:cNvPr id="5" name="Slide Number Placeholder 4">
             <a:extLst>
               <a:ext uri="{FF2B5EF4-FFF2-40B4-BE49-F238E27FC236}">
-                <a16:creationId xmlns="" xmlns:a16="http://schemas.microsoft.com/office/drawing/2014/main" id="{94F8EC8D-EF88-0275-F75C-A789924433BA}"/>
+                <a16:creationId xmlns:a16="http://schemas.microsoft.com/office/drawing/2014/main" xmlns="" id="{94F8EC8D-EF88-0275-F75C-A789924433BA}"/>
               </a:ext>
             </a:extLst>
           </p:cNvPr>
@@ -786,7 +790,7 @@
         <p:cNvPr id="1" name="">
           <a:extLst>
             <a:ext uri="{FF2B5EF4-FFF2-40B4-BE49-F238E27FC236}">
-              <a16:creationId xmlns="" xmlns:a16="http://schemas.microsoft.com/office/drawing/2014/main" id="{84847B3D-F9FE-E845-0A9E-7B3E4737F607}"/>
+              <a16:creationId xmlns:a16="http://schemas.microsoft.com/office/drawing/2014/main" xmlns="" id="{84847B3D-F9FE-E845-0A9E-7B3E4737F607}"/>
             </a:ext>
           </a:extLst>
         </p:cNvPr>
@@ -806,7 +810,7 @@
           <p:cNvPr id="2" name="Slide Image Placeholder 1">
             <a:extLst>
               <a:ext uri="{FF2B5EF4-FFF2-40B4-BE49-F238E27FC236}">
-                <a16:creationId xmlns="" xmlns:a16="http://schemas.microsoft.com/office/drawing/2014/main" id="{A65C55DC-40F4-B8B2-A44F-CEE7EA9104C1}"/>
+                <a16:creationId xmlns:a16="http://schemas.microsoft.com/office/drawing/2014/main" xmlns="" id="{A65C55DC-40F4-B8B2-A44F-CEE7EA9104C1}"/>
               </a:ext>
             </a:extLst>
           </p:cNvPr>
@@ -824,7 +828,7 @@
           <p:cNvPr id="3" name="Notes Placeholder 2">
             <a:extLst>
               <a:ext uri="{FF2B5EF4-FFF2-40B4-BE49-F238E27FC236}">
-                <a16:creationId xmlns="" xmlns:a16="http://schemas.microsoft.com/office/drawing/2014/main" id="{AFAEFE12-CFF9-2E00-9808-098A1D824723}"/>
+                <a16:creationId xmlns:a16="http://schemas.microsoft.com/office/drawing/2014/main" xmlns="" id="{AFAEFE12-CFF9-2E00-9808-098A1D824723}"/>
               </a:ext>
             </a:extLst>
           </p:cNvPr>
@@ -849,7 +853,7 @@
           <p:cNvPr id="4" name="Slide Number Placeholder 3">
             <a:extLst>
               <a:ext uri="{FF2B5EF4-FFF2-40B4-BE49-F238E27FC236}">
-                <a16:creationId xmlns="" xmlns:a16="http://schemas.microsoft.com/office/drawing/2014/main" id="{85084F94-5BAE-E3B2-298D-1E3D1D48D1F6}"/>
+                <a16:creationId xmlns:a16="http://schemas.microsoft.com/office/drawing/2014/main" xmlns="" id="{85084F94-5BAE-E3B2-298D-1E3D1D48D1F6}"/>
               </a:ext>
             </a:extLst>
           </p:cNvPr>
@@ -894,7 +898,7 @@
         <p:cNvPr id="1" name="">
           <a:extLst>
             <a:ext uri="{FF2B5EF4-FFF2-40B4-BE49-F238E27FC236}">
-              <a16:creationId xmlns="" xmlns:a16="http://schemas.microsoft.com/office/drawing/2014/main" id="{84847B3D-F9FE-E845-0A9E-7B3E4737F607}"/>
+              <a16:creationId xmlns:a16="http://schemas.microsoft.com/office/drawing/2014/main" xmlns="" id="{84847B3D-F9FE-E845-0A9E-7B3E4737F607}"/>
             </a:ext>
           </a:extLst>
         </p:cNvPr>
@@ -914,7 +918,7 @@
           <p:cNvPr id="2" name="Slide Image Placeholder 1">
             <a:extLst>
               <a:ext uri="{FF2B5EF4-FFF2-40B4-BE49-F238E27FC236}">
-                <a16:creationId xmlns="" xmlns:a16="http://schemas.microsoft.com/office/drawing/2014/main" id="{A65C55DC-40F4-B8B2-A44F-CEE7EA9104C1}"/>
+                <a16:creationId xmlns:a16="http://schemas.microsoft.com/office/drawing/2014/main" xmlns="" id="{A65C55DC-40F4-B8B2-A44F-CEE7EA9104C1}"/>
               </a:ext>
             </a:extLst>
           </p:cNvPr>
@@ -932,7 +936,7 @@
           <p:cNvPr id="3" name="Notes Placeholder 2">
             <a:extLst>
               <a:ext uri="{FF2B5EF4-FFF2-40B4-BE49-F238E27FC236}">
-                <a16:creationId xmlns="" xmlns:a16="http://schemas.microsoft.com/office/drawing/2014/main" id="{AFAEFE12-CFF9-2E00-9808-098A1D824723}"/>
+                <a16:creationId xmlns:a16="http://schemas.microsoft.com/office/drawing/2014/main" xmlns="" id="{AFAEFE12-CFF9-2E00-9808-098A1D824723}"/>
               </a:ext>
             </a:extLst>
           </p:cNvPr>
@@ -957,7 +961,7 @@
           <p:cNvPr id="4" name="Slide Number Placeholder 3">
             <a:extLst>
               <a:ext uri="{FF2B5EF4-FFF2-40B4-BE49-F238E27FC236}">
-                <a16:creationId xmlns="" xmlns:a16="http://schemas.microsoft.com/office/drawing/2014/main" id="{85084F94-5BAE-E3B2-298D-1E3D1D48D1F6}"/>
+                <a16:creationId xmlns:a16="http://schemas.microsoft.com/office/drawing/2014/main" xmlns="" id="{85084F94-5BAE-E3B2-298D-1E3D1D48D1F6}"/>
               </a:ext>
             </a:extLst>
           </p:cNvPr>
@@ -1002,7 +1006,7 @@
         <p:cNvPr id="1" name="">
           <a:extLst>
             <a:ext uri="{FF2B5EF4-FFF2-40B4-BE49-F238E27FC236}">
-              <a16:creationId xmlns="" xmlns:a16="http://schemas.microsoft.com/office/drawing/2014/main" id="{84847B3D-F9FE-E845-0A9E-7B3E4737F607}"/>
+              <a16:creationId xmlns:a16="http://schemas.microsoft.com/office/drawing/2014/main" xmlns="" id="{84847B3D-F9FE-E845-0A9E-7B3E4737F607}"/>
             </a:ext>
           </a:extLst>
         </p:cNvPr>
@@ -1022,7 +1026,7 @@
           <p:cNvPr id="2" name="Slide Image Placeholder 1">
             <a:extLst>
               <a:ext uri="{FF2B5EF4-FFF2-40B4-BE49-F238E27FC236}">
-                <a16:creationId xmlns="" xmlns:a16="http://schemas.microsoft.com/office/drawing/2014/main" id="{A65C55DC-40F4-B8B2-A44F-CEE7EA9104C1}"/>
+                <a16:creationId xmlns:a16="http://schemas.microsoft.com/office/drawing/2014/main" xmlns="" id="{A65C55DC-40F4-B8B2-A44F-CEE7EA9104C1}"/>
               </a:ext>
             </a:extLst>
           </p:cNvPr>
@@ -1040,7 +1044,7 @@
           <p:cNvPr id="3" name="Notes Placeholder 2">
             <a:extLst>
               <a:ext uri="{FF2B5EF4-FFF2-40B4-BE49-F238E27FC236}">
-                <a16:creationId xmlns="" xmlns:a16="http://schemas.microsoft.com/office/drawing/2014/main" id="{AFAEFE12-CFF9-2E00-9808-098A1D824723}"/>
+                <a16:creationId xmlns:a16="http://schemas.microsoft.com/office/drawing/2014/main" xmlns="" id="{AFAEFE12-CFF9-2E00-9808-098A1D824723}"/>
               </a:ext>
             </a:extLst>
           </p:cNvPr>
@@ -1065,7 +1069,7 @@
           <p:cNvPr id="4" name="Slide Number Placeholder 3">
             <a:extLst>
               <a:ext uri="{FF2B5EF4-FFF2-40B4-BE49-F238E27FC236}">
-                <a16:creationId xmlns="" xmlns:a16="http://schemas.microsoft.com/office/drawing/2014/main" id="{85084F94-5BAE-E3B2-298D-1E3D1D48D1F6}"/>
+                <a16:creationId xmlns:a16="http://schemas.microsoft.com/office/drawing/2014/main" xmlns="" id="{85084F94-5BAE-E3B2-298D-1E3D1D48D1F6}"/>
               </a:ext>
             </a:extLst>
           </p:cNvPr>
@@ -1110,7 +1114,7 @@
         <p:cNvPr id="1" name="">
           <a:extLst>
             <a:ext uri="{FF2B5EF4-FFF2-40B4-BE49-F238E27FC236}">
-              <a16:creationId xmlns="" xmlns:a16="http://schemas.microsoft.com/office/drawing/2014/main" id="{84847B3D-F9FE-E845-0A9E-7B3E4737F607}"/>
+              <a16:creationId xmlns:a16="http://schemas.microsoft.com/office/drawing/2014/main" xmlns="" id="{84847B3D-F9FE-E845-0A9E-7B3E4737F607}"/>
             </a:ext>
           </a:extLst>
         </p:cNvPr>
@@ -1130,7 +1134,7 @@
           <p:cNvPr id="2" name="Slide Image Placeholder 1">
             <a:extLst>
               <a:ext uri="{FF2B5EF4-FFF2-40B4-BE49-F238E27FC236}">
-                <a16:creationId xmlns="" xmlns:a16="http://schemas.microsoft.com/office/drawing/2014/main" id="{A65C55DC-40F4-B8B2-A44F-CEE7EA9104C1}"/>
+                <a16:creationId xmlns:a16="http://schemas.microsoft.com/office/drawing/2014/main" xmlns="" id="{A65C55DC-40F4-B8B2-A44F-CEE7EA9104C1}"/>
               </a:ext>
             </a:extLst>
           </p:cNvPr>
@@ -1148,7 +1152,7 @@
           <p:cNvPr id="3" name="Notes Placeholder 2">
             <a:extLst>
               <a:ext uri="{FF2B5EF4-FFF2-40B4-BE49-F238E27FC236}">
-                <a16:creationId xmlns="" xmlns:a16="http://schemas.microsoft.com/office/drawing/2014/main" id="{AFAEFE12-CFF9-2E00-9808-098A1D824723}"/>
+                <a16:creationId xmlns:a16="http://schemas.microsoft.com/office/drawing/2014/main" xmlns="" id="{AFAEFE12-CFF9-2E00-9808-098A1D824723}"/>
               </a:ext>
             </a:extLst>
           </p:cNvPr>
@@ -1173,7 +1177,7 @@
           <p:cNvPr id="4" name="Slide Number Placeholder 3">
             <a:extLst>
               <a:ext uri="{FF2B5EF4-FFF2-40B4-BE49-F238E27FC236}">
-                <a16:creationId xmlns="" xmlns:a16="http://schemas.microsoft.com/office/drawing/2014/main" id="{85084F94-5BAE-E3B2-298D-1E3D1D48D1F6}"/>
+                <a16:creationId xmlns:a16="http://schemas.microsoft.com/office/drawing/2014/main" xmlns="" id="{85084F94-5BAE-E3B2-298D-1E3D1D48D1F6}"/>
               </a:ext>
             </a:extLst>
           </p:cNvPr>
@@ -1218,7 +1222,7 @@
         <p:cNvPr id="1" name="">
           <a:extLst>
             <a:ext uri="{FF2B5EF4-FFF2-40B4-BE49-F238E27FC236}">
-              <a16:creationId xmlns="" xmlns:a16="http://schemas.microsoft.com/office/drawing/2014/main" id="{84847B3D-F9FE-E845-0A9E-7B3E4737F607}"/>
+              <a16:creationId xmlns:a16="http://schemas.microsoft.com/office/drawing/2014/main" xmlns="" id="{84847B3D-F9FE-E845-0A9E-7B3E4737F607}"/>
             </a:ext>
           </a:extLst>
         </p:cNvPr>
@@ -1238,7 +1242,7 @@
           <p:cNvPr id="2" name="Slide Image Placeholder 1">
             <a:extLst>
               <a:ext uri="{FF2B5EF4-FFF2-40B4-BE49-F238E27FC236}">
-                <a16:creationId xmlns="" xmlns:a16="http://schemas.microsoft.com/office/drawing/2014/main" id="{A65C55DC-40F4-B8B2-A44F-CEE7EA9104C1}"/>
+                <a16:creationId xmlns:a16="http://schemas.microsoft.com/office/drawing/2014/main" xmlns="" id="{A65C55DC-40F4-B8B2-A44F-CEE7EA9104C1}"/>
               </a:ext>
             </a:extLst>
           </p:cNvPr>
@@ -1256,7 +1260,7 @@
           <p:cNvPr id="3" name="Notes Placeholder 2">
             <a:extLst>
               <a:ext uri="{FF2B5EF4-FFF2-40B4-BE49-F238E27FC236}">
-                <a16:creationId xmlns="" xmlns:a16="http://schemas.microsoft.com/office/drawing/2014/main" id="{AFAEFE12-CFF9-2E00-9808-098A1D824723}"/>
+                <a16:creationId xmlns:a16="http://schemas.microsoft.com/office/drawing/2014/main" xmlns="" id="{AFAEFE12-CFF9-2E00-9808-098A1D824723}"/>
               </a:ext>
             </a:extLst>
           </p:cNvPr>
@@ -1281,7 +1285,7 @@
           <p:cNvPr id="4" name="Slide Number Placeholder 3">
             <a:extLst>
               <a:ext uri="{FF2B5EF4-FFF2-40B4-BE49-F238E27FC236}">
-                <a16:creationId xmlns="" xmlns:a16="http://schemas.microsoft.com/office/drawing/2014/main" id="{85084F94-5BAE-E3B2-298D-1E3D1D48D1F6}"/>
+                <a16:creationId xmlns:a16="http://schemas.microsoft.com/office/drawing/2014/main" xmlns="" id="{85084F94-5BAE-E3B2-298D-1E3D1D48D1F6}"/>
               </a:ext>
             </a:extLst>
           </p:cNvPr>
@@ -1326,7 +1330,7 @@
         <p:cNvPr id="1" name="">
           <a:extLst>
             <a:ext uri="{FF2B5EF4-FFF2-40B4-BE49-F238E27FC236}">
-              <a16:creationId xmlns="" xmlns:a16="http://schemas.microsoft.com/office/drawing/2014/main" id="{84847B3D-F9FE-E845-0A9E-7B3E4737F607}"/>
+              <a16:creationId xmlns:a16="http://schemas.microsoft.com/office/drawing/2014/main" xmlns="" id="{84847B3D-F9FE-E845-0A9E-7B3E4737F607}"/>
             </a:ext>
           </a:extLst>
         </p:cNvPr>
@@ -1346,7 +1350,7 @@
           <p:cNvPr id="2" name="Slide Image Placeholder 1">
             <a:extLst>
               <a:ext uri="{FF2B5EF4-FFF2-40B4-BE49-F238E27FC236}">
-                <a16:creationId xmlns="" xmlns:a16="http://schemas.microsoft.com/office/drawing/2014/main" id="{A65C55DC-40F4-B8B2-A44F-CEE7EA9104C1}"/>
+                <a16:creationId xmlns:a16="http://schemas.microsoft.com/office/drawing/2014/main" xmlns="" id="{A65C55DC-40F4-B8B2-A44F-CEE7EA9104C1}"/>
               </a:ext>
             </a:extLst>
           </p:cNvPr>
@@ -1364,7 +1368,7 @@
           <p:cNvPr id="3" name="Notes Placeholder 2">
             <a:extLst>
               <a:ext uri="{FF2B5EF4-FFF2-40B4-BE49-F238E27FC236}">
-                <a16:creationId xmlns="" xmlns:a16="http://schemas.microsoft.com/office/drawing/2014/main" id="{AFAEFE12-CFF9-2E00-9808-098A1D824723}"/>
+                <a16:creationId xmlns:a16="http://schemas.microsoft.com/office/drawing/2014/main" xmlns="" id="{AFAEFE12-CFF9-2E00-9808-098A1D824723}"/>
               </a:ext>
             </a:extLst>
           </p:cNvPr>
@@ -1389,7 +1393,7 @@
           <p:cNvPr id="4" name="Slide Number Placeholder 3">
             <a:extLst>
               <a:ext uri="{FF2B5EF4-FFF2-40B4-BE49-F238E27FC236}">
-                <a16:creationId xmlns="" xmlns:a16="http://schemas.microsoft.com/office/drawing/2014/main" id="{85084F94-5BAE-E3B2-298D-1E3D1D48D1F6}"/>
+                <a16:creationId xmlns:a16="http://schemas.microsoft.com/office/drawing/2014/main" xmlns="" id="{85084F94-5BAE-E3B2-298D-1E3D1D48D1F6}"/>
               </a:ext>
             </a:extLst>
           </p:cNvPr>
@@ -1434,7 +1438,7 @@
         <p:cNvPr id="1" name="">
           <a:extLst>
             <a:ext uri="{FF2B5EF4-FFF2-40B4-BE49-F238E27FC236}">
-              <a16:creationId xmlns="" xmlns:a16="http://schemas.microsoft.com/office/drawing/2014/main" id="{84847B3D-F9FE-E845-0A9E-7B3E4737F607}"/>
+              <a16:creationId xmlns:a16="http://schemas.microsoft.com/office/drawing/2014/main" xmlns="" id="{84847B3D-F9FE-E845-0A9E-7B3E4737F607}"/>
             </a:ext>
           </a:extLst>
         </p:cNvPr>
@@ -1454,7 +1458,7 @@
           <p:cNvPr id="2" name="Slide Image Placeholder 1">
             <a:extLst>
               <a:ext uri="{FF2B5EF4-FFF2-40B4-BE49-F238E27FC236}">
-                <a16:creationId xmlns="" xmlns:a16="http://schemas.microsoft.com/office/drawing/2014/main" id="{A65C55DC-40F4-B8B2-A44F-CEE7EA9104C1}"/>
+                <a16:creationId xmlns:a16="http://schemas.microsoft.com/office/drawing/2014/main" xmlns="" id="{A65C55DC-40F4-B8B2-A44F-CEE7EA9104C1}"/>
               </a:ext>
             </a:extLst>
           </p:cNvPr>
@@ -1472,7 +1476,7 @@
           <p:cNvPr id="3" name="Notes Placeholder 2">
             <a:extLst>
               <a:ext uri="{FF2B5EF4-FFF2-40B4-BE49-F238E27FC236}">
-                <a16:creationId xmlns="" xmlns:a16="http://schemas.microsoft.com/office/drawing/2014/main" id="{AFAEFE12-CFF9-2E00-9808-098A1D824723}"/>
+                <a16:creationId xmlns:a16="http://schemas.microsoft.com/office/drawing/2014/main" xmlns="" id="{AFAEFE12-CFF9-2E00-9808-098A1D824723}"/>
               </a:ext>
             </a:extLst>
           </p:cNvPr>
@@ -1497,7 +1501,7 @@
           <p:cNvPr id="4" name="Slide Number Placeholder 3">
             <a:extLst>
               <a:ext uri="{FF2B5EF4-FFF2-40B4-BE49-F238E27FC236}">
-                <a16:creationId xmlns="" xmlns:a16="http://schemas.microsoft.com/office/drawing/2014/main" id="{85084F94-5BAE-E3B2-298D-1E3D1D48D1F6}"/>
+                <a16:creationId xmlns:a16="http://schemas.microsoft.com/office/drawing/2014/main" xmlns="" id="{85084F94-5BAE-E3B2-298D-1E3D1D48D1F6}"/>
               </a:ext>
             </a:extLst>
           </p:cNvPr>
@@ -1542,7 +1546,7 @@
         <p:cNvPr id="1" name="">
           <a:extLst>
             <a:ext uri="{FF2B5EF4-FFF2-40B4-BE49-F238E27FC236}">
-              <a16:creationId xmlns="" xmlns:a16="http://schemas.microsoft.com/office/drawing/2014/main" id="{84847B3D-F9FE-E845-0A9E-7B3E4737F607}"/>
+              <a16:creationId xmlns:a16="http://schemas.microsoft.com/office/drawing/2014/main" xmlns="" id="{84847B3D-F9FE-E845-0A9E-7B3E4737F607}"/>
             </a:ext>
           </a:extLst>
         </p:cNvPr>
@@ -1562,7 +1566,7 @@
           <p:cNvPr id="2" name="Slide Image Placeholder 1">
             <a:extLst>
               <a:ext uri="{FF2B5EF4-FFF2-40B4-BE49-F238E27FC236}">
-                <a16:creationId xmlns="" xmlns:a16="http://schemas.microsoft.com/office/drawing/2014/main" id="{A65C55DC-40F4-B8B2-A44F-CEE7EA9104C1}"/>
+                <a16:creationId xmlns:a16="http://schemas.microsoft.com/office/drawing/2014/main" xmlns="" id="{A65C55DC-40F4-B8B2-A44F-CEE7EA9104C1}"/>
               </a:ext>
             </a:extLst>
           </p:cNvPr>
@@ -1580,7 +1584,7 @@
           <p:cNvPr id="3" name="Notes Placeholder 2">
             <a:extLst>
               <a:ext uri="{FF2B5EF4-FFF2-40B4-BE49-F238E27FC236}">
-                <a16:creationId xmlns="" xmlns:a16="http://schemas.microsoft.com/office/drawing/2014/main" id="{AFAEFE12-CFF9-2E00-9808-098A1D824723}"/>
+                <a16:creationId xmlns:a16="http://schemas.microsoft.com/office/drawing/2014/main" xmlns="" id="{AFAEFE12-CFF9-2E00-9808-098A1D824723}"/>
               </a:ext>
             </a:extLst>
           </p:cNvPr>
@@ -1605,7 +1609,7 @@
           <p:cNvPr id="4" name="Slide Number Placeholder 3">
             <a:extLst>
               <a:ext uri="{FF2B5EF4-FFF2-40B4-BE49-F238E27FC236}">
-                <a16:creationId xmlns="" xmlns:a16="http://schemas.microsoft.com/office/drawing/2014/main" id="{85084F94-5BAE-E3B2-298D-1E3D1D48D1F6}"/>
+                <a16:creationId xmlns:a16="http://schemas.microsoft.com/office/drawing/2014/main" xmlns="" id="{85084F94-5BAE-E3B2-298D-1E3D1D48D1F6}"/>
               </a:ext>
             </a:extLst>
           </p:cNvPr>
@@ -1650,7 +1654,7 @@
         <p:cNvPr id="1" name="">
           <a:extLst>
             <a:ext uri="{FF2B5EF4-FFF2-40B4-BE49-F238E27FC236}">
-              <a16:creationId xmlns="" xmlns:a16="http://schemas.microsoft.com/office/drawing/2014/main" id="{84847B3D-F9FE-E845-0A9E-7B3E4737F607}"/>
+              <a16:creationId xmlns:a16="http://schemas.microsoft.com/office/drawing/2014/main" xmlns="" id="{84847B3D-F9FE-E845-0A9E-7B3E4737F607}"/>
             </a:ext>
           </a:extLst>
         </p:cNvPr>
@@ -1670,7 +1674,7 @@
           <p:cNvPr id="2" name="Slide Image Placeholder 1">
             <a:extLst>
               <a:ext uri="{FF2B5EF4-FFF2-40B4-BE49-F238E27FC236}">
-                <a16:creationId xmlns="" xmlns:a16="http://schemas.microsoft.com/office/drawing/2014/main" id="{A65C55DC-40F4-B8B2-A44F-CEE7EA9104C1}"/>
+                <a16:creationId xmlns:a16="http://schemas.microsoft.com/office/drawing/2014/main" xmlns="" id="{A65C55DC-40F4-B8B2-A44F-CEE7EA9104C1}"/>
               </a:ext>
             </a:extLst>
           </p:cNvPr>
@@ -1688,7 +1692,7 @@
           <p:cNvPr id="3" name="Notes Placeholder 2">
             <a:extLst>
               <a:ext uri="{FF2B5EF4-FFF2-40B4-BE49-F238E27FC236}">
-                <a16:creationId xmlns="" xmlns:a16="http://schemas.microsoft.com/office/drawing/2014/main" id="{AFAEFE12-CFF9-2E00-9808-098A1D824723}"/>
+                <a16:creationId xmlns:a16="http://schemas.microsoft.com/office/drawing/2014/main" xmlns="" id="{AFAEFE12-CFF9-2E00-9808-098A1D824723}"/>
               </a:ext>
             </a:extLst>
           </p:cNvPr>
@@ -1713,7 +1717,7 @@
           <p:cNvPr id="4" name="Slide Number Placeholder 3">
             <a:extLst>
               <a:ext uri="{FF2B5EF4-FFF2-40B4-BE49-F238E27FC236}">
-                <a16:creationId xmlns="" xmlns:a16="http://schemas.microsoft.com/office/drawing/2014/main" id="{85084F94-5BAE-E3B2-298D-1E3D1D48D1F6}"/>
+                <a16:creationId xmlns:a16="http://schemas.microsoft.com/office/drawing/2014/main" xmlns="" id="{85084F94-5BAE-E3B2-298D-1E3D1D48D1F6}"/>
               </a:ext>
             </a:extLst>
           </p:cNvPr>
@@ -1758,7 +1762,7 @@
         <p:cNvPr id="1" name="">
           <a:extLst>
             <a:ext uri="{FF2B5EF4-FFF2-40B4-BE49-F238E27FC236}">
-              <a16:creationId xmlns="" xmlns:a16="http://schemas.microsoft.com/office/drawing/2014/main" id="{84847B3D-F9FE-E845-0A9E-7B3E4737F607}"/>
+              <a16:creationId xmlns:a16="http://schemas.microsoft.com/office/drawing/2014/main" xmlns="" id="{84847B3D-F9FE-E845-0A9E-7B3E4737F607}"/>
             </a:ext>
           </a:extLst>
         </p:cNvPr>
@@ -1778,7 +1782,7 @@
           <p:cNvPr id="2" name="Slide Image Placeholder 1">
             <a:extLst>
               <a:ext uri="{FF2B5EF4-FFF2-40B4-BE49-F238E27FC236}">
-                <a16:creationId xmlns="" xmlns:a16="http://schemas.microsoft.com/office/drawing/2014/main" id="{A65C55DC-40F4-B8B2-A44F-CEE7EA9104C1}"/>
+                <a16:creationId xmlns:a16="http://schemas.microsoft.com/office/drawing/2014/main" xmlns="" id="{A65C55DC-40F4-B8B2-A44F-CEE7EA9104C1}"/>
               </a:ext>
             </a:extLst>
           </p:cNvPr>
@@ -1796,7 +1800,7 @@
           <p:cNvPr id="3" name="Notes Placeholder 2">
             <a:extLst>
               <a:ext uri="{FF2B5EF4-FFF2-40B4-BE49-F238E27FC236}">
-                <a16:creationId xmlns="" xmlns:a16="http://schemas.microsoft.com/office/drawing/2014/main" id="{AFAEFE12-CFF9-2E00-9808-098A1D824723}"/>
+                <a16:creationId xmlns:a16="http://schemas.microsoft.com/office/drawing/2014/main" xmlns="" id="{AFAEFE12-CFF9-2E00-9808-098A1D824723}"/>
               </a:ext>
             </a:extLst>
           </p:cNvPr>
@@ -1821,7 +1825,7 @@
           <p:cNvPr id="4" name="Slide Number Placeholder 3">
             <a:extLst>
               <a:ext uri="{FF2B5EF4-FFF2-40B4-BE49-F238E27FC236}">
-                <a16:creationId xmlns="" xmlns:a16="http://schemas.microsoft.com/office/drawing/2014/main" id="{85084F94-5BAE-E3B2-298D-1E3D1D48D1F6}"/>
+                <a16:creationId xmlns:a16="http://schemas.microsoft.com/office/drawing/2014/main" xmlns="" id="{85084F94-5BAE-E3B2-298D-1E3D1D48D1F6}"/>
               </a:ext>
             </a:extLst>
           </p:cNvPr>
@@ -1866,7 +1870,7 @@
         <p:cNvPr id="1" name="">
           <a:extLst>
             <a:ext uri="{FF2B5EF4-FFF2-40B4-BE49-F238E27FC236}">
-              <a16:creationId xmlns="" xmlns:a16="http://schemas.microsoft.com/office/drawing/2014/main" id="{89563512-A8BA-1764-87C7-A00C34FD03E8}"/>
+              <a16:creationId xmlns:a16="http://schemas.microsoft.com/office/drawing/2014/main" xmlns="" id="{89563512-A8BA-1764-87C7-A00C34FD03E8}"/>
             </a:ext>
           </a:extLst>
         </p:cNvPr>
@@ -1886,7 +1890,7 @@
           <p:cNvPr id="2" name="Slide Image Placeholder 1">
             <a:extLst>
               <a:ext uri="{FF2B5EF4-FFF2-40B4-BE49-F238E27FC236}">
-                <a16:creationId xmlns="" xmlns:a16="http://schemas.microsoft.com/office/drawing/2014/main" id="{F8D8F7F0-68B1-3C8C-3974-1CFE7D3952A7}"/>
+                <a16:creationId xmlns:a16="http://schemas.microsoft.com/office/drawing/2014/main" xmlns="" id="{F8D8F7F0-68B1-3C8C-3974-1CFE7D3952A7}"/>
               </a:ext>
             </a:extLst>
           </p:cNvPr>
@@ -1904,7 +1908,7 @@
           <p:cNvPr id="3" name="Notes Placeholder 2">
             <a:extLst>
               <a:ext uri="{FF2B5EF4-FFF2-40B4-BE49-F238E27FC236}">
-                <a16:creationId xmlns="" xmlns:a16="http://schemas.microsoft.com/office/drawing/2014/main" id="{7893E87E-9A62-BE42-B48F-A4960F0B96B7}"/>
+                <a16:creationId xmlns:a16="http://schemas.microsoft.com/office/drawing/2014/main" xmlns="" id="{7893E87E-9A62-BE42-B48F-A4960F0B96B7}"/>
               </a:ext>
             </a:extLst>
           </p:cNvPr>
@@ -1929,7 +1933,7 @@
           <p:cNvPr id="4" name="Slide Number Placeholder 3">
             <a:extLst>
               <a:ext uri="{FF2B5EF4-FFF2-40B4-BE49-F238E27FC236}">
-                <a16:creationId xmlns="" xmlns:a16="http://schemas.microsoft.com/office/drawing/2014/main" id="{61190961-0558-0020-C7FC-07CF6AD55449}"/>
+                <a16:creationId xmlns:a16="http://schemas.microsoft.com/office/drawing/2014/main" xmlns="" id="{61190961-0558-0020-C7FC-07CF6AD55449}"/>
               </a:ext>
             </a:extLst>
           </p:cNvPr>
@@ -1974,7 +1978,7 @@
         <p:cNvPr id="1" name="">
           <a:extLst>
             <a:ext uri="{FF2B5EF4-FFF2-40B4-BE49-F238E27FC236}">
-              <a16:creationId xmlns="" xmlns:a16="http://schemas.microsoft.com/office/drawing/2014/main" id="{84847B3D-F9FE-E845-0A9E-7B3E4737F607}"/>
+              <a16:creationId xmlns:a16="http://schemas.microsoft.com/office/drawing/2014/main" xmlns="" id="{84847B3D-F9FE-E845-0A9E-7B3E4737F607}"/>
             </a:ext>
           </a:extLst>
         </p:cNvPr>
@@ -1994,7 +1998,7 @@
           <p:cNvPr id="2" name="Slide Image Placeholder 1">
             <a:extLst>
               <a:ext uri="{FF2B5EF4-FFF2-40B4-BE49-F238E27FC236}">
-                <a16:creationId xmlns="" xmlns:a16="http://schemas.microsoft.com/office/drawing/2014/main" id="{A65C55DC-40F4-B8B2-A44F-CEE7EA9104C1}"/>
+                <a16:creationId xmlns:a16="http://schemas.microsoft.com/office/drawing/2014/main" xmlns="" id="{A65C55DC-40F4-B8B2-A44F-CEE7EA9104C1}"/>
               </a:ext>
             </a:extLst>
           </p:cNvPr>
@@ -2012,7 +2016,7 @@
           <p:cNvPr id="3" name="Notes Placeholder 2">
             <a:extLst>
               <a:ext uri="{FF2B5EF4-FFF2-40B4-BE49-F238E27FC236}">
-                <a16:creationId xmlns="" xmlns:a16="http://schemas.microsoft.com/office/drawing/2014/main" id="{AFAEFE12-CFF9-2E00-9808-098A1D824723}"/>
+                <a16:creationId xmlns:a16="http://schemas.microsoft.com/office/drawing/2014/main" xmlns="" id="{AFAEFE12-CFF9-2E00-9808-098A1D824723}"/>
               </a:ext>
             </a:extLst>
           </p:cNvPr>
@@ -2037,7 +2041,7 @@
           <p:cNvPr id="4" name="Slide Number Placeholder 3">
             <a:extLst>
               <a:ext uri="{FF2B5EF4-FFF2-40B4-BE49-F238E27FC236}">
-                <a16:creationId xmlns="" xmlns:a16="http://schemas.microsoft.com/office/drawing/2014/main" id="{85084F94-5BAE-E3B2-298D-1E3D1D48D1F6}"/>
+                <a16:creationId xmlns:a16="http://schemas.microsoft.com/office/drawing/2014/main" xmlns="" id="{85084F94-5BAE-E3B2-298D-1E3D1D48D1F6}"/>
               </a:ext>
             </a:extLst>
           </p:cNvPr>
@@ -2082,7 +2086,7 @@
         <p:cNvPr id="1" name="">
           <a:extLst>
             <a:ext uri="{FF2B5EF4-FFF2-40B4-BE49-F238E27FC236}">
-              <a16:creationId xmlns="" xmlns:a16="http://schemas.microsoft.com/office/drawing/2014/main" id="{84847B3D-F9FE-E845-0A9E-7B3E4737F607}"/>
+              <a16:creationId xmlns:a16="http://schemas.microsoft.com/office/drawing/2014/main" xmlns="" id="{84847B3D-F9FE-E845-0A9E-7B3E4737F607}"/>
             </a:ext>
           </a:extLst>
         </p:cNvPr>
@@ -2102,7 +2106,7 @@
           <p:cNvPr id="2" name="Slide Image Placeholder 1">
             <a:extLst>
               <a:ext uri="{FF2B5EF4-FFF2-40B4-BE49-F238E27FC236}">
-                <a16:creationId xmlns="" xmlns:a16="http://schemas.microsoft.com/office/drawing/2014/main" id="{A65C55DC-40F4-B8B2-A44F-CEE7EA9104C1}"/>
+                <a16:creationId xmlns:a16="http://schemas.microsoft.com/office/drawing/2014/main" xmlns="" id="{A65C55DC-40F4-B8B2-A44F-CEE7EA9104C1}"/>
               </a:ext>
             </a:extLst>
           </p:cNvPr>
@@ -2120,7 +2124,7 @@
           <p:cNvPr id="3" name="Notes Placeholder 2">
             <a:extLst>
               <a:ext uri="{FF2B5EF4-FFF2-40B4-BE49-F238E27FC236}">
-                <a16:creationId xmlns="" xmlns:a16="http://schemas.microsoft.com/office/drawing/2014/main" id="{AFAEFE12-CFF9-2E00-9808-098A1D824723}"/>
+                <a16:creationId xmlns:a16="http://schemas.microsoft.com/office/drawing/2014/main" xmlns="" id="{AFAEFE12-CFF9-2E00-9808-098A1D824723}"/>
               </a:ext>
             </a:extLst>
           </p:cNvPr>
@@ -2145,7 +2149,7 @@
           <p:cNvPr id="4" name="Slide Number Placeholder 3">
             <a:extLst>
               <a:ext uri="{FF2B5EF4-FFF2-40B4-BE49-F238E27FC236}">
-                <a16:creationId xmlns="" xmlns:a16="http://schemas.microsoft.com/office/drawing/2014/main" id="{85084F94-5BAE-E3B2-298D-1E3D1D48D1F6}"/>
+                <a16:creationId xmlns:a16="http://schemas.microsoft.com/office/drawing/2014/main" xmlns="" id="{85084F94-5BAE-E3B2-298D-1E3D1D48D1F6}"/>
               </a:ext>
             </a:extLst>
           </p:cNvPr>
@@ -2190,7 +2194,7 @@
         <p:cNvPr id="1" name="">
           <a:extLst>
             <a:ext uri="{FF2B5EF4-FFF2-40B4-BE49-F238E27FC236}">
-              <a16:creationId xmlns="" xmlns:a16="http://schemas.microsoft.com/office/drawing/2014/main" id="{84847B3D-F9FE-E845-0A9E-7B3E4737F607}"/>
+              <a16:creationId xmlns:a16="http://schemas.microsoft.com/office/drawing/2014/main" xmlns="" id="{84847B3D-F9FE-E845-0A9E-7B3E4737F607}"/>
             </a:ext>
           </a:extLst>
         </p:cNvPr>
@@ -2210,7 +2214,7 @@
           <p:cNvPr id="2" name="Slide Image Placeholder 1">
             <a:extLst>
               <a:ext uri="{FF2B5EF4-FFF2-40B4-BE49-F238E27FC236}">
-                <a16:creationId xmlns="" xmlns:a16="http://schemas.microsoft.com/office/drawing/2014/main" id="{A65C55DC-40F4-B8B2-A44F-CEE7EA9104C1}"/>
+                <a16:creationId xmlns:a16="http://schemas.microsoft.com/office/drawing/2014/main" xmlns="" id="{A65C55DC-40F4-B8B2-A44F-CEE7EA9104C1}"/>
               </a:ext>
             </a:extLst>
           </p:cNvPr>
@@ -2228,7 +2232,7 @@
           <p:cNvPr id="3" name="Notes Placeholder 2">
             <a:extLst>
               <a:ext uri="{FF2B5EF4-FFF2-40B4-BE49-F238E27FC236}">
-                <a16:creationId xmlns="" xmlns:a16="http://schemas.microsoft.com/office/drawing/2014/main" id="{AFAEFE12-CFF9-2E00-9808-098A1D824723}"/>
+                <a16:creationId xmlns:a16="http://schemas.microsoft.com/office/drawing/2014/main" xmlns="" id="{AFAEFE12-CFF9-2E00-9808-098A1D824723}"/>
               </a:ext>
             </a:extLst>
           </p:cNvPr>
@@ -2253,7 +2257,7 @@
           <p:cNvPr id="4" name="Slide Number Placeholder 3">
             <a:extLst>
               <a:ext uri="{FF2B5EF4-FFF2-40B4-BE49-F238E27FC236}">
-                <a16:creationId xmlns="" xmlns:a16="http://schemas.microsoft.com/office/drawing/2014/main" id="{85084F94-5BAE-E3B2-298D-1E3D1D48D1F6}"/>
+                <a16:creationId xmlns:a16="http://schemas.microsoft.com/office/drawing/2014/main" xmlns="" id="{85084F94-5BAE-E3B2-298D-1E3D1D48D1F6}"/>
               </a:ext>
             </a:extLst>
           </p:cNvPr>
@@ -2298,7 +2302,7 @@
         <p:cNvPr id="1" name="">
           <a:extLst>
             <a:ext uri="{FF2B5EF4-FFF2-40B4-BE49-F238E27FC236}">
-              <a16:creationId xmlns="" xmlns:a16="http://schemas.microsoft.com/office/drawing/2014/main" id="{84847B3D-F9FE-E845-0A9E-7B3E4737F607}"/>
+              <a16:creationId xmlns:a16="http://schemas.microsoft.com/office/drawing/2014/main" xmlns="" id="{84847B3D-F9FE-E845-0A9E-7B3E4737F607}"/>
             </a:ext>
           </a:extLst>
         </p:cNvPr>
@@ -2318,7 +2322,7 @@
           <p:cNvPr id="2" name="Slide Image Placeholder 1">
             <a:extLst>
               <a:ext uri="{FF2B5EF4-FFF2-40B4-BE49-F238E27FC236}">
-                <a16:creationId xmlns="" xmlns:a16="http://schemas.microsoft.com/office/drawing/2014/main" id="{A65C55DC-40F4-B8B2-A44F-CEE7EA9104C1}"/>
+                <a16:creationId xmlns:a16="http://schemas.microsoft.com/office/drawing/2014/main" xmlns="" id="{A65C55DC-40F4-B8B2-A44F-CEE7EA9104C1}"/>
               </a:ext>
             </a:extLst>
           </p:cNvPr>
@@ -2336,7 +2340,7 @@
           <p:cNvPr id="3" name="Notes Placeholder 2">
             <a:extLst>
               <a:ext uri="{FF2B5EF4-FFF2-40B4-BE49-F238E27FC236}">
-                <a16:creationId xmlns="" xmlns:a16="http://schemas.microsoft.com/office/drawing/2014/main" id="{AFAEFE12-CFF9-2E00-9808-098A1D824723}"/>
+                <a16:creationId xmlns:a16="http://schemas.microsoft.com/office/drawing/2014/main" xmlns="" id="{AFAEFE12-CFF9-2E00-9808-098A1D824723}"/>
               </a:ext>
             </a:extLst>
           </p:cNvPr>
@@ -2361,7 +2365,7 @@
           <p:cNvPr id="4" name="Slide Number Placeholder 3">
             <a:extLst>
               <a:ext uri="{FF2B5EF4-FFF2-40B4-BE49-F238E27FC236}">
-                <a16:creationId xmlns="" xmlns:a16="http://schemas.microsoft.com/office/drawing/2014/main" id="{85084F94-5BAE-E3B2-298D-1E3D1D48D1F6}"/>
+                <a16:creationId xmlns:a16="http://schemas.microsoft.com/office/drawing/2014/main" xmlns="" id="{85084F94-5BAE-E3B2-298D-1E3D1D48D1F6}"/>
               </a:ext>
             </a:extLst>
           </p:cNvPr>
@@ -2406,7 +2410,7 @@
         <p:cNvPr id="1" name="">
           <a:extLst>
             <a:ext uri="{FF2B5EF4-FFF2-40B4-BE49-F238E27FC236}">
-              <a16:creationId xmlns="" xmlns:a16="http://schemas.microsoft.com/office/drawing/2014/main" id="{84847B3D-F9FE-E845-0A9E-7B3E4737F607}"/>
+              <a16:creationId xmlns:a16="http://schemas.microsoft.com/office/drawing/2014/main" xmlns="" id="{84847B3D-F9FE-E845-0A9E-7B3E4737F607}"/>
             </a:ext>
           </a:extLst>
         </p:cNvPr>
@@ -2426,7 +2430,7 @@
           <p:cNvPr id="2" name="Slide Image Placeholder 1">
             <a:extLst>
               <a:ext uri="{FF2B5EF4-FFF2-40B4-BE49-F238E27FC236}">
-                <a16:creationId xmlns="" xmlns:a16="http://schemas.microsoft.com/office/drawing/2014/main" id="{A65C55DC-40F4-B8B2-A44F-CEE7EA9104C1}"/>
+                <a16:creationId xmlns:a16="http://schemas.microsoft.com/office/drawing/2014/main" xmlns="" id="{A65C55DC-40F4-B8B2-A44F-CEE7EA9104C1}"/>
               </a:ext>
             </a:extLst>
           </p:cNvPr>
@@ -2444,7 +2448,7 @@
           <p:cNvPr id="3" name="Notes Placeholder 2">
             <a:extLst>
               <a:ext uri="{FF2B5EF4-FFF2-40B4-BE49-F238E27FC236}">
-                <a16:creationId xmlns="" xmlns:a16="http://schemas.microsoft.com/office/drawing/2014/main" id="{AFAEFE12-CFF9-2E00-9808-098A1D824723}"/>
+                <a16:creationId xmlns:a16="http://schemas.microsoft.com/office/drawing/2014/main" xmlns="" id="{AFAEFE12-CFF9-2E00-9808-098A1D824723}"/>
               </a:ext>
             </a:extLst>
           </p:cNvPr>
@@ -2469,7 +2473,7 @@
           <p:cNvPr id="4" name="Slide Number Placeholder 3">
             <a:extLst>
               <a:ext uri="{FF2B5EF4-FFF2-40B4-BE49-F238E27FC236}">
-                <a16:creationId xmlns="" xmlns:a16="http://schemas.microsoft.com/office/drawing/2014/main" id="{85084F94-5BAE-E3B2-298D-1E3D1D48D1F6}"/>
+                <a16:creationId xmlns:a16="http://schemas.microsoft.com/office/drawing/2014/main" xmlns="" id="{85084F94-5BAE-E3B2-298D-1E3D1D48D1F6}"/>
               </a:ext>
             </a:extLst>
           </p:cNvPr>
@@ -2514,7 +2518,7 @@
         <p:cNvPr id="1" name="">
           <a:extLst>
             <a:ext uri="{FF2B5EF4-FFF2-40B4-BE49-F238E27FC236}">
-              <a16:creationId xmlns="" xmlns:a16="http://schemas.microsoft.com/office/drawing/2014/main" id="{84847B3D-F9FE-E845-0A9E-7B3E4737F607}"/>
+              <a16:creationId xmlns:a16="http://schemas.microsoft.com/office/drawing/2014/main" xmlns="" id="{84847B3D-F9FE-E845-0A9E-7B3E4737F607}"/>
             </a:ext>
           </a:extLst>
         </p:cNvPr>
@@ -2534,7 +2538,7 @@
           <p:cNvPr id="2" name="Slide Image Placeholder 1">
             <a:extLst>
               <a:ext uri="{FF2B5EF4-FFF2-40B4-BE49-F238E27FC236}">
-                <a16:creationId xmlns="" xmlns:a16="http://schemas.microsoft.com/office/drawing/2014/main" id="{A65C55DC-40F4-B8B2-A44F-CEE7EA9104C1}"/>
+                <a16:creationId xmlns:a16="http://schemas.microsoft.com/office/drawing/2014/main" xmlns="" id="{A65C55DC-40F4-B8B2-A44F-CEE7EA9104C1}"/>
               </a:ext>
             </a:extLst>
           </p:cNvPr>
@@ -2552,7 +2556,7 @@
           <p:cNvPr id="3" name="Notes Placeholder 2">
             <a:extLst>
               <a:ext uri="{FF2B5EF4-FFF2-40B4-BE49-F238E27FC236}">
-                <a16:creationId xmlns="" xmlns:a16="http://schemas.microsoft.com/office/drawing/2014/main" id="{AFAEFE12-CFF9-2E00-9808-098A1D824723}"/>
+                <a16:creationId xmlns:a16="http://schemas.microsoft.com/office/drawing/2014/main" xmlns="" id="{AFAEFE12-CFF9-2E00-9808-098A1D824723}"/>
               </a:ext>
             </a:extLst>
           </p:cNvPr>
@@ -2577,7 +2581,7 @@
           <p:cNvPr id="4" name="Slide Number Placeholder 3">
             <a:extLst>
               <a:ext uri="{FF2B5EF4-FFF2-40B4-BE49-F238E27FC236}">
-                <a16:creationId xmlns="" xmlns:a16="http://schemas.microsoft.com/office/drawing/2014/main" id="{85084F94-5BAE-E3B2-298D-1E3D1D48D1F6}"/>
+                <a16:creationId xmlns:a16="http://schemas.microsoft.com/office/drawing/2014/main" xmlns="" id="{85084F94-5BAE-E3B2-298D-1E3D1D48D1F6}"/>
               </a:ext>
             </a:extLst>
           </p:cNvPr>
@@ -2622,7 +2626,7 @@
         <p:cNvPr id="1" name="">
           <a:extLst>
             <a:ext uri="{FF2B5EF4-FFF2-40B4-BE49-F238E27FC236}">
-              <a16:creationId xmlns="" xmlns:a16="http://schemas.microsoft.com/office/drawing/2014/main" id="{84847B3D-F9FE-E845-0A9E-7B3E4737F607}"/>
+              <a16:creationId xmlns:a16="http://schemas.microsoft.com/office/drawing/2014/main" xmlns="" id="{84847B3D-F9FE-E845-0A9E-7B3E4737F607}"/>
             </a:ext>
           </a:extLst>
         </p:cNvPr>
@@ -2642,7 +2646,7 @@
           <p:cNvPr id="2" name="Slide Image Placeholder 1">
             <a:extLst>
               <a:ext uri="{FF2B5EF4-FFF2-40B4-BE49-F238E27FC236}">
-                <a16:creationId xmlns="" xmlns:a16="http://schemas.microsoft.com/office/drawing/2014/main" id="{A65C55DC-40F4-B8B2-A44F-CEE7EA9104C1}"/>
+                <a16:creationId xmlns:a16="http://schemas.microsoft.com/office/drawing/2014/main" xmlns="" id="{A65C55DC-40F4-B8B2-A44F-CEE7EA9104C1}"/>
               </a:ext>
             </a:extLst>
           </p:cNvPr>
@@ -2660,7 +2664,7 @@
           <p:cNvPr id="3" name="Notes Placeholder 2">
             <a:extLst>
               <a:ext uri="{FF2B5EF4-FFF2-40B4-BE49-F238E27FC236}">
-                <a16:creationId xmlns="" xmlns:a16="http://schemas.microsoft.com/office/drawing/2014/main" id="{AFAEFE12-CFF9-2E00-9808-098A1D824723}"/>
+                <a16:creationId xmlns:a16="http://schemas.microsoft.com/office/drawing/2014/main" xmlns="" id="{AFAEFE12-CFF9-2E00-9808-098A1D824723}"/>
               </a:ext>
             </a:extLst>
           </p:cNvPr>
@@ -2685,7 +2689,7 @@
           <p:cNvPr id="4" name="Slide Number Placeholder 3">
             <a:extLst>
               <a:ext uri="{FF2B5EF4-FFF2-40B4-BE49-F238E27FC236}">
-                <a16:creationId xmlns="" xmlns:a16="http://schemas.microsoft.com/office/drawing/2014/main" id="{85084F94-5BAE-E3B2-298D-1E3D1D48D1F6}"/>
+                <a16:creationId xmlns:a16="http://schemas.microsoft.com/office/drawing/2014/main" xmlns="" id="{85084F94-5BAE-E3B2-298D-1E3D1D48D1F6}"/>
               </a:ext>
             </a:extLst>
           </p:cNvPr>
@@ -2730,7 +2734,7 @@
         <p:cNvPr id="1" name="">
           <a:extLst>
             <a:ext uri="{FF2B5EF4-FFF2-40B4-BE49-F238E27FC236}">
-              <a16:creationId xmlns="" xmlns:a16="http://schemas.microsoft.com/office/drawing/2014/main" id="{84847B3D-F9FE-E845-0A9E-7B3E4737F607}"/>
+              <a16:creationId xmlns:a16="http://schemas.microsoft.com/office/drawing/2014/main" xmlns="" id="{84847B3D-F9FE-E845-0A9E-7B3E4737F607}"/>
             </a:ext>
           </a:extLst>
         </p:cNvPr>
@@ -2750,7 +2754,7 @@
           <p:cNvPr id="2" name="Slide Image Placeholder 1">
             <a:extLst>
               <a:ext uri="{FF2B5EF4-FFF2-40B4-BE49-F238E27FC236}">
-                <a16:creationId xmlns="" xmlns:a16="http://schemas.microsoft.com/office/drawing/2014/main" id="{A65C55DC-40F4-B8B2-A44F-CEE7EA9104C1}"/>
+                <a16:creationId xmlns:a16="http://schemas.microsoft.com/office/drawing/2014/main" xmlns="" id="{A65C55DC-40F4-B8B2-A44F-CEE7EA9104C1}"/>
               </a:ext>
             </a:extLst>
           </p:cNvPr>
@@ -2768,7 +2772,7 @@
           <p:cNvPr id="3" name="Notes Placeholder 2">
             <a:extLst>
               <a:ext uri="{FF2B5EF4-FFF2-40B4-BE49-F238E27FC236}">
-                <a16:creationId xmlns="" xmlns:a16="http://schemas.microsoft.com/office/drawing/2014/main" id="{AFAEFE12-CFF9-2E00-9808-098A1D824723}"/>
+                <a16:creationId xmlns:a16="http://schemas.microsoft.com/office/drawing/2014/main" xmlns="" id="{AFAEFE12-CFF9-2E00-9808-098A1D824723}"/>
               </a:ext>
             </a:extLst>
           </p:cNvPr>
@@ -2793,7 +2797,7 @@
           <p:cNvPr id="4" name="Slide Number Placeholder 3">
             <a:extLst>
               <a:ext uri="{FF2B5EF4-FFF2-40B4-BE49-F238E27FC236}">
-                <a16:creationId xmlns="" xmlns:a16="http://schemas.microsoft.com/office/drawing/2014/main" id="{85084F94-5BAE-E3B2-298D-1E3D1D48D1F6}"/>
+                <a16:creationId xmlns:a16="http://schemas.microsoft.com/office/drawing/2014/main" xmlns="" id="{85084F94-5BAE-E3B2-298D-1E3D1D48D1F6}"/>
               </a:ext>
             </a:extLst>
           </p:cNvPr>
@@ -2838,7 +2842,7 @@
         <p:cNvPr id="1" name="">
           <a:extLst>
             <a:ext uri="{FF2B5EF4-FFF2-40B4-BE49-F238E27FC236}">
-              <a16:creationId xmlns="" xmlns:a16="http://schemas.microsoft.com/office/drawing/2014/main" id="{84847B3D-F9FE-E845-0A9E-7B3E4737F607}"/>
+              <a16:creationId xmlns:a16="http://schemas.microsoft.com/office/drawing/2014/main" xmlns="" id="{84847B3D-F9FE-E845-0A9E-7B3E4737F607}"/>
             </a:ext>
           </a:extLst>
         </p:cNvPr>
@@ -2858,7 +2862,7 @@
           <p:cNvPr id="2" name="Slide Image Placeholder 1">
             <a:extLst>
               <a:ext uri="{FF2B5EF4-FFF2-40B4-BE49-F238E27FC236}">
-                <a16:creationId xmlns="" xmlns:a16="http://schemas.microsoft.com/office/drawing/2014/main" id="{A65C55DC-40F4-B8B2-A44F-CEE7EA9104C1}"/>
+                <a16:creationId xmlns:a16="http://schemas.microsoft.com/office/drawing/2014/main" xmlns="" id="{A65C55DC-40F4-B8B2-A44F-CEE7EA9104C1}"/>
               </a:ext>
             </a:extLst>
           </p:cNvPr>
@@ -2876,7 +2880,7 @@
           <p:cNvPr id="3" name="Notes Placeholder 2">
             <a:extLst>
               <a:ext uri="{FF2B5EF4-FFF2-40B4-BE49-F238E27FC236}">
-                <a16:creationId xmlns="" xmlns:a16="http://schemas.microsoft.com/office/drawing/2014/main" id="{AFAEFE12-CFF9-2E00-9808-098A1D824723}"/>
+                <a16:creationId xmlns:a16="http://schemas.microsoft.com/office/drawing/2014/main" xmlns="" id="{AFAEFE12-CFF9-2E00-9808-098A1D824723}"/>
               </a:ext>
             </a:extLst>
           </p:cNvPr>
@@ -2901,7 +2905,7 @@
           <p:cNvPr id="4" name="Slide Number Placeholder 3">
             <a:extLst>
               <a:ext uri="{FF2B5EF4-FFF2-40B4-BE49-F238E27FC236}">
-                <a16:creationId xmlns="" xmlns:a16="http://schemas.microsoft.com/office/drawing/2014/main" id="{85084F94-5BAE-E3B2-298D-1E3D1D48D1F6}"/>
+                <a16:creationId xmlns:a16="http://schemas.microsoft.com/office/drawing/2014/main" xmlns="" id="{85084F94-5BAE-E3B2-298D-1E3D1D48D1F6}"/>
               </a:ext>
             </a:extLst>
           </p:cNvPr>
@@ -2946,7 +2950,7 @@
         <p:cNvPr id="1" name="">
           <a:extLst>
             <a:ext uri="{FF2B5EF4-FFF2-40B4-BE49-F238E27FC236}">
-              <a16:creationId xmlns="" xmlns:a16="http://schemas.microsoft.com/office/drawing/2014/main" id="{84F15084-9E64-0732-2172-D06E24D20324}"/>
+              <a16:creationId xmlns:a16="http://schemas.microsoft.com/office/drawing/2014/main" xmlns="" id="{84847B3D-F9FE-E845-0A9E-7B3E4737F607}"/>
             </a:ext>
           </a:extLst>
         </p:cNvPr>
@@ -2966,7 +2970,7 @@
           <p:cNvPr id="2" name="Slide Image Placeholder 1">
             <a:extLst>
               <a:ext uri="{FF2B5EF4-FFF2-40B4-BE49-F238E27FC236}">
-                <a16:creationId xmlns="" xmlns:a16="http://schemas.microsoft.com/office/drawing/2014/main" id="{7CCBBEEF-0F58-7DB2-13AB-6DAFC52BE070}"/>
+                <a16:creationId xmlns:a16="http://schemas.microsoft.com/office/drawing/2014/main" xmlns="" id="{A65C55DC-40F4-B8B2-A44F-CEE7EA9104C1}"/>
               </a:ext>
             </a:extLst>
           </p:cNvPr>
@@ -2984,7 +2988,7 @@
           <p:cNvPr id="3" name="Notes Placeholder 2">
             <a:extLst>
               <a:ext uri="{FF2B5EF4-FFF2-40B4-BE49-F238E27FC236}">
-                <a16:creationId xmlns="" xmlns:a16="http://schemas.microsoft.com/office/drawing/2014/main" id="{C62C92A2-0E82-6EA1-AA1F-C125D6D8C6A8}"/>
+                <a16:creationId xmlns:a16="http://schemas.microsoft.com/office/drawing/2014/main" xmlns="" id="{AFAEFE12-CFF9-2E00-9808-098A1D824723}"/>
               </a:ext>
             </a:extLst>
           </p:cNvPr>
@@ -3000,7 +3004,7 @@
           <a:bodyPr/>
           <a:lstStyle/>
           <a:p>
-            <a:endParaRPr lang="en-US"/>
+            <a:endParaRPr lang="en-US" dirty="0"/>
           </a:p>
         </p:txBody>
       </p:sp>
@@ -3009,7 +3013,7 @@
           <p:cNvPr id="4" name="Slide Number Placeholder 3">
             <a:extLst>
               <a:ext uri="{FF2B5EF4-FFF2-40B4-BE49-F238E27FC236}">
-                <a16:creationId xmlns="" xmlns:a16="http://schemas.microsoft.com/office/drawing/2014/main" id="{F80306BD-3757-CA40-4082-AACA5F6DB656}"/>
+                <a16:creationId xmlns:a16="http://schemas.microsoft.com/office/drawing/2014/main" xmlns="" id="{85084F94-5BAE-E3B2-298D-1E3D1D48D1F6}"/>
               </a:ext>
             </a:extLst>
           </p:cNvPr>
@@ -3036,7 +3040,7 @@
     </p:spTree>
     <p:extLst>
       <p:ext uri="{BB962C8B-B14F-4D97-AF65-F5344CB8AC3E}">
-        <p14:creationId xmlns:p14="http://schemas.microsoft.com/office/powerpoint/2010/main" val="2113507462"/>
+        <p14:creationId xmlns:p14="http://schemas.microsoft.com/office/powerpoint/2010/main" val="1899534547"/>
       </p:ext>
     </p:extLst>
   </p:cSld>
@@ -3054,7 +3058,7 @@
         <p:cNvPr id="1" name="">
           <a:extLst>
             <a:ext uri="{FF2B5EF4-FFF2-40B4-BE49-F238E27FC236}">
-              <a16:creationId xmlns="" xmlns:a16="http://schemas.microsoft.com/office/drawing/2014/main" id="{413E0E2F-FB5F-19AD-18FD-02AFD3C3D2A7}"/>
+              <a16:creationId xmlns:a16="http://schemas.microsoft.com/office/drawing/2014/main" xmlns="" id="{413E0E2F-FB5F-19AD-18FD-02AFD3C3D2A7}"/>
             </a:ext>
           </a:extLst>
         </p:cNvPr>
@@ -3074,7 +3078,7 @@
           <p:cNvPr id="2" name="Slide Image Placeholder 1">
             <a:extLst>
               <a:ext uri="{FF2B5EF4-FFF2-40B4-BE49-F238E27FC236}">
-                <a16:creationId xmlns="" xmlns:a16="http://schemas.microsoft.com/office/drawing/2014/main" id="{7836B388-51EF-10FA-3783-0696B2AF7329}"/>
+                <a16:creationId xmlns:a16="http://schemas.microsoft.com/office/drawing/2014/main" xmlns="" id="{7836B388-51EF-10FA-3783-0696B2AF7329}"/>
               </a:ext>
             </a:extLst>
           </p:cNvPr>
@@ -3092,7 +3096,7 @@
           <p:cNvPr id="3" name="Notes Placeholder 2">
             <a:extLst>
               <a:ext uri="{FF2B5EF4-FFF2-40B4-BE49-F238E27FC236}">
-                <a16:creationId xmlns="" xmlns:a16="http://schemas.microsoft.com/office/drawing/2014/main" id="{31C1FAC0-00E4-5BDB-5727-4597CCDC9776}"/>
+                <a16:creationId xmlns:a16="http://schemas.microsoft.com/office/drawing/2014/main" xmlns="" id="{31C1FAC0-00E4-5BDB-5727-4597CCDC9776}"/>
               </a:ext>
             </a:extLst>
           </p:cNvPr>
@@ -3117,7 +3121,7 @@
           <p:cNvPr id="4" name="Slide Number Placeholder 3">
             <a:extLst>
               <a:ext uri="{FF2B5EF4-FFF2-40B4-BE49-F238E27FC236}">
-                <a16:creationId xmlns="" xmlns:a16="http://schemas.microsoft.com/office/drawing/2014/main" id="{387CD11C-29A5-A450-5B49-9B2C8F5A483A}"/>
+                <a16:creationId xmlns:a16="http://schemas.microsoft.com/office/drawing/2014/main" xmlns="" id="{387CD11C-29A5-A450-5B49-9B2C8F5A483A}"/>
               </a:ext>
             </a:extLst>
           </p:cNvPr>
@@ -3145,6 +3149,438 @@
     <p:extLst>
       <p:ext uri="{BB962C8B-B14F-4D97-AF65-F5344CB8AC3E}">
         <p14:creationId xmlns:p14="http://schemas.microsoft.com/office/powerpoint/2010/main" val="194684776"/>
+      </p:ext>
+    </p:extLst>
+  </p:cSld>
+  <p:clrMapOvr>
+    <a:masterClrMapping/>
+  </p:clrMapOvr>
+</p:notes>
+</file>
+
+<file path=ppt/notesSlides/notesSlide30.xml><?xml version="1.0" encoding="utf-8"?>
+<p:notes xmlns:a="http://schemas.openxmlformats.org/drawingml/2006/main" xmlns:r="http://schemas.openxmlformats.org/officeDocument/2006/relationships" xmlns:p="http://schemas.openxmlformats.org/presentationml/2006/main">
+  <p:cSld>
+    <p:spTree>
+      <p:nvGrpSpPr>
+        <p:cNvPr id="1" name="">
+          <a:extLst>
+            <a:ext uri="{FF2B5EF4-FFF2-40B4-BE49-F238E27FC236}">
+              <a16:creationId xmlns:a16="http://schemas.microsoft.com/office/drawing/2014/main" xmlns="" id="{84847B3D-F9FE-E845-0A9E-7B3E4737F607}"/>
+            </a:ext>
+          </a:extLst>
+        </p:cNvPr>
+        <p:cNvGrpSpPr/>
+        <p:nvPr/>
+      </p:nvGrpSpPr>
+      <p:grpSpPr>
+        <a:xfrm>
+          <a:off x="0" y="0"/>
+          <a:ext cx="0" cy="0"/>
+          <a:chOff x="0" y="0"/>
+          <a:chExt cx="0" cy="0"/>
+        </a:xfrm>
+      </p:grpSpPr>
+      <p:sp>
+        <p:nvSpPr>
+          <p:cNvPr id="2" name="Slide Image Placeholder 1">
+            <a:extLst>
+              <a:ext uri="{FF2B5EF4-FFF2-40B4-BE49-F238E27FC236}">
+                <a16:creationId xmlns:a16="http://schemas.microsoft.com/office/drawing/2014/main" xmlns="" id="{A65C55DC-40F4-B8B2-A44F-CEE7EA9104C1}"/>
+              </a:ext>
+            </a:extLst>
+          </p:cNvPr>
+          <p:cNvSpPr>
+            <a:spLocks noGrp="1" noRot="1" noChangeAspect="1"/>
+          </p:cNvSpPr>
+          <p:nvPr>
+            <p:ph type="sldImg"/>
+          </p:nvPr>
+        </p:nvSpPr>
+        <p:spPr/>
+      </p:sp>
+      <p:sp>
+        <p:nvSpPr>
+          <p:cNvPr id="3" name="Notes Placeholder 2">
+            <a:extLst>
+              <a:ext uri="{FF2B5EF4-FFF2-40B4-BE49-F238E27FC236}">
+                <a16:creationId xmlns:a16="http://schemas.microsoft.com/office/drawing/2014/main" xmlns="" id="{AFAEFE12-CFF9-2E00-9808-098A1D824723}"/>
+              </a:ext>
+            </a:extLst>
+          </p:cNvPr>
+          <p:cNvSpPr>
+            <a:spLocks noGrp="1"/>
+          </p:cNvSpPr>
+          <p:nvPr>
+            <p:ph type="body" idx="1"/>
+          </p:nvPr>
+        </p:nvSpPr>
+        <p:spPr/>
+        <p:txBody>
+          <a:bodyPr/>
+          <a:lstStyle/>
+          <a:p>
+            <a:endParaRPr lang="en-US" dirty="0"/>
+          </a:p>
+        </p:txBody>
+      </p:sp>
+      <p:sp>
+        <p:nvSpPr>
+          <p:cNvPr id="4" name="Slide Number Placeholder 3">
+            <a:extLst>
+              <a:ext uri="{FF2B5EF4-FFF2-40B4-BE49-F238E27FC236}">
+                <a16:creationId xmlns:a16="http://schemas.microsoft.com/office/drawing/2014/main" xmlns="" id="{85084F94-5BAE-E3B2-298D-1E3D1D48D1F6}"/>
+              </a:ext>
+            </a:extLst>
+          </p:cNvPr>
+          <p:cNvSpPr>
+            <a:spLocks noGrp="1"/>
+          </p:cNvSpPr>
+          <p:nvPr>
+            <p:ph type="sldNum" sz="quarter" idx="5"/>
+          </p:nvPr>
+        </p:nvSpPr>
+        <p:spPr/>
+        <p:txBody>
+          <a:bodyPr/>
+          <a:lstStyle/>
+          <a:p>
+            <a:fld id="{55247812-3409-784D-BAE7-ABE53735D59F}" type="slidenum">
+              <a:rPr lang="en-US" smtClean="0"/>
+              <a:t>31</a:t>
+            </a:fld>
+            <a:endParaRPr lang="en-US"/>
+          </a:p>
+        </p:txBody>
+      </p:sp>
+    </p:spTree>
+    <p:extLst>
+      <p:ext uri="{BB962C8B-B14F-4D97-AF65-F5344CB8AC3E}">
+        <p14:creationId xmlns:p14="http://schemas.microsoft.com/office/powerpoint/2010/main" val="1899534547"/>
+      </p:ext>
+    </p:extLst>
+  </p:cSld>
+  <p:clrMapOvr>
+    <a:masterClrMapping/>
+  </p:clrMapOvr>
+</p:notes>
+</file>
+
+<file path=ppt/notesSlides/notesSlide31.xml><?xml version="1.0" encoding="utf-8"?>
+<p:notes xmlns:a="http://schemas.openxmlformats.org/drawingml/2006/main" xmlns:r="http://schemas.openxmlformats.org/officeDocument/2006/relationships" xmlns:p="http://schemas.openxmlformats.org/presentationml/2006/main">
+  <p:cSld>
+    <p:spTree>
+      <p:nvGrpSpPr>
+        <p:cNvPr id="1" name="">
+          <a:extLst>
+            <a:ext uri="{FF2B5EF4-FFF2-40B4-BE49-F238E27FC236}">
+              <a16:creationId xmlns:a16="http://schemas.microsoft.com/office/drawing/2014/main" xmlns="" id="{84847B3D-F9FE-E845-0A9E-7B3E4737F607}"/>
+            </a:ext>
+          </a:extLst>
+        </p:cNvPr>
+        <p:cNvGrpSpPr/>
+        <p:nvPr/>
+      </p:nvGrpSpPr>
+      <p:grpSpPr>
+        <a:xfrm>
+          <a:off x="0" y="0"/>
+          <a:ext cx="0" cy="0"/>
+          <a:chOff x="0" y="0"/>
+          <a:chExt cx="0" cy="0"/>
+        </a:xfrm>
+      </p:grpSpPr>
+      <p:sp>
+        <p:nvSpPr>
+          <p:cNvPr id="2" name="Slide Image Placeholder 1">
+            <a:extLst>
+              <a:ext uri="{FF2B5EF4-FFF2-40B4-BE49-F238E27FC236}">
+                <a16:creationId xmlns:a16="http://schemas.microsoft.com/office/drawing/2014/main" xmlns="" id="{A65C55DC-40F4-B8B2-A44F-CEE7EA9104C1}"/>
+              </a:ext>
+            </a:extLst>
+          </p:cNvPr>
+          <p:cNvSpPr>
+            <a:spLocks noGrp="1" noRot="1" noChangeAspect="1"/>
+          </p:cNvSpPr>
+          <p:nvPr>
+            <p:ph type="sldImg"/>
+          </p:nvPr>
+        </p:nvSpPr>
+        <p:spPr/>
+      </p:sp>
+      <p:sp>
+        <p:nvSpPr>
+          <p:cNvPr id="3" name="Notes Placeholder 2">
+            <a:extLst>
+              <a:ext uri="{FF2B5EF4-FFF2-40B4-BE49-F238E27FC236}">
+                <a16:creationId xmlns:a16="http://schemas.microsoft.com/office/drawing/2014/main" xmlns="" id="{AFAEFE12-CFF9-2E00-9808-098A1D824723}"/>
+              </a:ext>
+            </a:extLst>
+          </p:cNvPr>
+          <p:cNvSpPr>
+            <a:spLocks noGrp="1"/>
+          </p:cNvSpPr>
+          <p:nvPr>
+            <p:ph type="body" idx="1"/>
+          </p:nvPr>
+        </p:nvSpPr>
+        <p:spPr/>
+        <p:txBody>
+          <a:bodyPr/>
+          <a:lstStyle/>
+          <a:p>
+            <a:endParaRPr lang="en-US" dirty="0"/>
+          </a:p>
+        </p:txBody>
+      </p:sp>
+      <p:sp>
+        <p:nvSpPr>
+          <p:cNvPr id="4" name="Slide Number Placeholder 3">
+            <a:extLst>
+              <a:ext uri="{FF2B5EF4-FFF2-40B4-BE49-F238E27FC236}">
+                <a16:creationId xmlns:a16="http://schemas.microsoft.com/office/drawing/2014/main" xmlns="" id="{85084F94-5BAE-E3B2-298D-1E3D1D48D1F6}"/>
+              </a:ext>
+            </a:extLst>
+          </p:cNvPr>
+          <p:cNvSpPr>
+            <a:spLocks noGrp="1"/>
+          </p:cNvSpPr>
+          <p:nvPr>
+            <p:ph type="sldNum" sz="quarter" idx="5"/>
+          </p:nvPr>
+        </p:nvSpPr>
+        <p:spPr/>
+        <p:txBody>
+          <a:bodyPr/>
+          <a:lstStyle/>
+          <a:p>
+            <a:fld id="{55247812-3409-784D-BAE7-ABE53735D59F}" type="slidenum">
+              <a:rPr lang="en-US" smtClean="0"/>
+              <a:t>32</a:t>
+            </a:fld>
+            <a:endParaRPr lang="en-US"/>
+          </a:p>
+        </p:txBody>
+      </p:sp>
+    </p:spTree>
+    <p:extLst>
+      <p:ext uri="{BB962C8B-B14F-4D97-AF65-F5344CB8AC3E}">
+        <p14:creationId xmlns:p14="http://schemas.microsoft.com/office/powerpoint/2010/main" val="1899534547"/>
+      </p:ext>
+    </p:extLst>
+  </p:cSld>
+  <p:clrMapOvr>
+    <a:masterClrMapping/>
+  </p:clrMapOvr>
+</p:notes>
+</file>
+
+<file path=ppt/notesSlides/notesSlide32.xml><?xml version="1.0" encoding="utf-8"?>
+<p:notes xmlns:a="http://schemas.openxmlformats.org/drawingml/2006/main" xmlns:r="http://schemas.openxmlformats.org/officeDocument/2006/relationships" xmlns:p="http://schemas.openxmlformats.org/presentationml/2006/main">
+  <p:cSld>
+    <p:spTree>
+      <p:nvGrpSpPr>
+        <p:cNvPr id="1" name="">
+          <a:extLst>
+            <a:ext uri="{FF2B5EF4-FFF2-40B4-BE49-F238E27FC236}">
+              <a16:creationId xmlns:a16="http://schemas.microsoft.com/office/drawing/2014/main" xmlns="" id="{84847B3D-F9FE-E845-0A9E-7B3E4737F607}"/>
+            </a:ext>
+          </a:extLst>
+        </p:cNvPr>
+        <p:cNvGrpSpPr/>
+        <p:nvPr/>
+      </p:nvGrpSpPr>
+      <p:grpSpPr>
+        <a:xfrm>
+          <a:off x="0" y="0"/>
+          <a:ext cx="0" cy="0"/>
+          <a:chOff x="0" y="0"/>
+          <a:chExt cx="0" cy="0"/>
+        </a:xfrm>
+      </p:grpSpPr>
+      <p:sp>
+        <p:nvSpPr>
+          <p:cNvPr id="2" name="Slide Image Placeholder 1">
+            <a:extLst>
+              <a:ext uri="{FF2B5EF4-FFF2-40B4-BE49-F238E27FC236}">
+                <a16:creationId xmlns:a16="http://schemas.microsoft.com/office/drawing/2014/main" xmlns="" id="{A65C55DC-40F4-B8B2-A44F-CEE7EA9104C1}"/>
+              </a:ext>
+            </a:extLst>
+          </p:cNvPr>
+          <p:cNvSpPr>
+            <a:spLocks noGrp="1" noRot="1" noChangeAspect="1"/>
+          </p:cNvSpPr>
+          <p:nvPr>
+            <p:ph type="sldImg"/>
+          </p:nvPr>
+        </p:nvSpPr>
+        <p:spPr/>
+      </p:sp>
+      <p:sp>
+        <p:nvSpPr>
+          <p:cNvPr id="3" name="Notes Placeholder 2">
+            <a:extLst>
+              <a:ext uri="{FF2B5EF4-FFF2-40B4-BE49-F238E27FC236}">
+                <a16:creationId xmlns:a16="http://schemas.microsoft.com/office/drawing/2014/main" xmlns="" id="{AFAEFE12-CFF9-2E00-9808-098A1D824723}"/>
+              </a:ext>
+            </a:extLst>
+          </p:cNvPr>
+          <p:cNvSpPr>
+            <a:spLocks noGrp="1"/>
+          </p:cNvSpPr>
+          <p:nvPr>
+            <p:ph type="body" idx="1"/>
+          </p:nvPr>
+        </p:nvSpPr>
+        <p:spPr/>
+        <p:txBody>
+          <a:bodyPr/>
+          <a:lstStyle/>
+          <a:p>
+            <a:endParaRPr lang="en-US" dirty="0"/>
+          </a:p>
+        </p:txBody>
+      </p:sp>
+      <p:sp>
+        <p:nvSpPr>
+          <p:cNvPr id="4" name="Slide Number Placeholder 3">
+            <a:extLst>
+              <a:ext uri="{FF2B5EF4-FFF2-40B4-BE49-F238E27FC236}">
+                <a16:creationId xmlns:a16="http://schemas.microsoft.com/office/drawing/2014/main" xmlns="" id="{85084F94-5BAE-E3B2-298D-1E3D1D48D1F6}"/>
+              </a:ext>
+            </a:extLst>
+          </p:cNvPr>
+          <p:cNvSpPr>
+            <a:spLocks noGrp="1"/>
+          </p:cNvSpPr>
+          <p:nvPr>
+            <p:ph type="sldNum" sz="quarter" idx="5"/>
+          </p:nvPr>
+        </p:nvSpPr>
+        <p:spPr/>
+        <p:txBody>
+          <a:bodyPr/>
+          <a:lstStyle/>
+          <a:p>
+            <a:fld id="{55247812-3409-784D-BAE7-ABE53735D59F}" type="slidenum">
+              <a:rPr lang="en-US" smtClean="0"/>
+              <a:t>33</a:t>
+            </a:fld>
+            <a:endParaRPr lang="en-US"/>
+          </a:p>
+        </p:txBody>
+      </p:sp>
+    </p:spTree>
+    <p:extLst>
+      <p:ext uri="{BB962C8B-B14F-4D97-AF65-F5344CB8AC3E}">
+        <p14:creationId xmlns:p14="http://schemas.microsoft.com/office/powerpoint/2010/main" val="1899534547"/>
+      </p:ext>
+    </p:extLst>
+  </p:cSld>
+  <p:clrMapOvr>
+    <a:masterClrMapping/>
+  </p:clrMapOvr>
+</p:notes>
+</file>
+
+<file path=ppt/notesSlides/notesSlide33.xml><?xml version="1.0" encoding="utf-8"?>
+<p:notes xmlns:a="http://schemas.openxmlformats.org/drawingml/2006/main" xmlns:r="http://schemas.openxmlformats.org/officeDocument/2006/relationships" xmlns:p="http://schemas.openxmlformats.org/presentationml/2006/main">
+  <p:cSld>
+    <p:spTree>
+      <p:nvGrpSpPr>
+        <p:cNvPr id="1" name="">
+          <a:extLst>
+            <a:ext uri="{FF2B5EF4-FFF2-40B4-BE49-F238E27FC236}">
+              <a16:creationId xmlns:a16="http://schemas.microsoft.com/office/drawing/2014/main" xmlns="" id="{84F15084-9E64-0732-2172-D06E24D20324}"/>
+            </a:ext>
+          </a:extLst>
+        </p:cNvPr>
+        <p:cNvGrpSpPr/>
+        <p:nvPr/>
+      </p:nvGrpSpPr>
+      <p:grpSpPr>
+        <a:xfrm>
+          <a:off x="0" y="0"/>
+          <a:ext cx="0" cy="0"/>
+          <a:chOff x="0" y="0"/>
+          <a:chExt cx="0" cy="0"/>
+        </a:xfrm>
+      </p:grpSpPr>
+      <p:sp>
+        <p:nvSpPr>
+          <p:cNvPr id="2" name="Slide Image Placeholder 1">
+            <a:extLst>
+              <a:ext uri="{FF2B5EF4-FFF2-40B4-BE49-F238E27FC236}">
+                <a16:creationId xmlns:a16="http://schemas.microsoft.com/office/drawing/2014/main" xmlns="" id="{7CCBBEEF-0F58-7DB2-13AB-6DAFC52BE070}"/>
+              </a:ext>
+            </a:extLst>
+          </p:cNvPr>
+          <p:cNvSpPr>
+            <a:spLocks noGrp="1" noRot="1" noChangeAspect="1"/>
+          </p:cNvSpPr>
+          <p:nvPr>
+            <p:ph type="sldImg"/>
+          </p:nvPr>
+        </p:nvSpPr>
+        <p:spPr/>
+      </p:sp>
+      <p:sp>
+        <p:nvSpPr>
+          <p:cNvPr id="3" name="Notes Placeholder 2">
+            <a:extLst>
+              <a:ext uri="{FF2B5EF4-FFF2-40B4-BE49-F238E27FC236}">
+                <a16:creationId xmlns:a16="http://schemas.microsoft.com/office/drawing/2014/main" xmlns="" id="{C62C92A2-0E82-6EA1-AA1F-C125D6D8C6A8}"/>
+              </a:ext>
+            </a:extLst>
+          </p:cNvPr>
+          <p:cNvSpPr>
+            <a:spLocks noGrp="1"/>
+          </p:cNvSpPr>
+          <p:nvPr>
+            <p:ph type="body" idx="1"/>
+          </p:nvPr>
+        </p:nvSpPr>
+        <p:spPr/>
+        <p:txBody>
+          <a:bodyPr/>
+          <a:lstStyle/>
+          <a:p>
+            <a:endParaRPr lang="en-US"/>
+          </a:p>
+        </p:txBody>
+      </p:sp>
+      <p:sp>
+        <p:nvSpPr>
+          <p:cNvPr id="4" name="Slide Number Placeholder 3">
+            <a:extLst>
+              <a:ext uri="{FF2B5EF4-FFF2-40B4-BE49-F238E27FC236}">
+                <a16:creationId xmlns:a16="http://schemas.microsoft.com/office/drawing/2014/main" xmlns="" id="{F80306BD-3757-CA40-4082-AACA5F6DB656}"/>
+              </a:ext>
+            </a:extLst>
+          </p:cNvPr>
+          <p:cNvSpPr>
+            <a:spLocks noGrp="1"/>
+          </p:cNvSpPr>
+          <p:nvPr>
+            <p:ph type="sldNum" sz="quarter" idx="5"/>
+          </p:nvPr>
+        </p:nvSpPr>
+        <p:spPr/>
+        <p:txBody>
+          <a:bodyPr/>
+          <a:lstStyle/>
+          <a:p>
+            <a:fld id="{55247812-3409-784D-BAE7-ABE53735D59F}" type="slidenum">
+              <a:rPr lang="en-US" smtClean="0"/>
+              <a:t>34</a:t>
+            </a:fld>
+            <a:endParaRPr lang="en-US"/>
+          </a:p>
+        </p:txBody>
+      </p:sp>
+    </p:spTree>
+    <p:extLst>
+      <p:ext uri="{BB962C8B-B14F-4D97-AF65-F5344CB8AC3E}">
+        <p14:creationId xmlns:p14="http://schemas.microsoft.com/office/powerpoint/2010/main" val="2113507462"/>
       </p:ext>
     </p:extLst>
   </p:cSld>
@@ -3162,7 +3598,7 @@
         <p:cNvPr id="1" name="">
           <a:extLst>
             <a:ext uri="{FF2B5EF4-FFF2-40B4-BE49-F238E27FC236}">
-              <a16:creationId xmlns="" xmlns:a16="http://schemas.microsoft.com/office/drawing/2014/main" id="{32CDD179-4403-A07F-630C-A153B2FB9440}"/>
+              <a16:creationId xmlns:a16="http://schemas.microsoft.com/office/drawing/2014/main" xmlns="" id="{32CDD179-4403-A07F-630C-A153B2FB9440}"/>
             </a:ext>
           </a:extLst>
         </p:cNvPr>
@@ -3182,7 +3618,7 @@
           <p:cNvPr id="2" name="Slide Image Placeholder 1">
             <a:extLst>
               <a:ext uri="{FF2B5EF4-FFF2-40B4-BE49-F238E27FC236}">
-                <a16:creationId xmlns="" xmlns:a16="http://schemas.microsoft.com/office/drawing/2014/main" id="{C5371C59-0780-417A-50AE-5F81ED51E3DD}"/>
+                <a16:creationId xmlns:a16="http://schemas.microsoft.com/office/drawing/2014/main" xmlns="" id="{C5371C59-0780-417A-50AE-5F81ED51E3DD}"/>
               </a:ext>
             </a:extLst>
           </p:cNvPr>
@@ -3200,7 +3636,7 @@
           <p:cNvPr id="3" name="Notes Placeholder 2">
             <a:extLst>
               <a:ext uri="{FF2B5EF4-FFF2-40B4-BE49-F238E27FC236}">
-                <a16:creationId xmlns="" xmlns:a16="http://schemas.microsoft.com/office/drawing/2014/main" id="{3877DC73-D2E6-4C8A-5B32-AAE3B3DEC3E1}"/>
+                <a16:creationId xmlns:a16="http://schemas.microsoft.com/office/drawing/2014/main" xmlns="" id="{3877DC73-D2E6-4C8A-5B32-AAE3B3DEC3E1}"/>
               </a:ext>
             </a:extLst>
           </p:cNvPr>
@@ -3225,7 +3661,7 @@
           <p:cNvPr id="4" name="Slide Number Placeholder 3">
             <a:extLst>
               <a:ext uri="{FF2B5EF4-FFF2-40B4-BE49-F238E27FC236}">
-                <a16:creationId xmlns="" xmlns:a16="http://schemas.microsoft.com/office/drawing/2014/main" id="{A53F2668-F7D8-0DD8-090D-8D685CDFDF82}"/>
+                <a16:creationId xmlns:a16="http://schemas.microsoft.com/office/drawing/2014/main" xmlns="" id="{A53F2668-F7D8-0DD8-090D-8D685CDFDF82}"/>
               </a:ext>
             </a:extLst>
           </p:cNvPr>
@@ -3270,7 +3706,7 @@
         <p:cNvPr id="1" name="">
           <a:extLst>
             <a:ext uri="{FF2B5EF4-FFF2-40B4-BE49-F238E27FC236}">
-              <a16:creationId xmlns="" xmlns:a16="http://schemas.microsoft.com/office/drawing/2014/main" id="{611B77C4-0D39-64D6-A86B-642112E29695}"/>
+              <a16:creationId xmlns:a16="http://schemas.microsoft.com/office/drawing/2014/main" xmlns="" id="{611B77C4-0D39-64D6-A86B-642112E29695}"/>
             </a:ext>
           </a:extLst>
         </p:cNvPr>
@@ -3290,7 +3726,7 @@
           <p:cNvPr id="2" name="Slide Image Placeholder 1">
             <a:extLst>
               <a:ext uri="{FF2B5EF4-FFF2-40B4-BE49-F238E27FC236}">
-                <a16:creationId xmlns="" xmlns:a16="http://schemas.microsoft.com/office/drawing/2014/main" id="{248CF8F3-1596-3F28-5175-2E3D216F2B36}"/>
+                <a16:creationId xmlns:a16="http://schemas.microsoft.com/office/drawing/2014/main" xmlns="" id="{248CF8F3-1596-3F28-5175-2E3D216F2B36}"/>
               </a:ext>
             </a:extLst>
           </p:cNvPr>
@@ -3308,7 +3744,7 @@
           <p:cNvPr id="3" name="Notes Placeholder 2">
             <a:extLst>
               <a:ext uri="{FF2B5EF4-FFF2-40B4-BE49-F238E27FC236}">
-                <a16:creationId xmlns="" xmlns:a16="http://schemas.microsoft.com/office/drawing/2014/main" id="{8DAF0CB2-EC6B-167D-32D1-6BCC4A35A007}"/>
+                <a16:creationId xmlns:a16="http://schemas.microsoft.com/office/drawing/2014/main" xmlns="" id="{8DAF0CB2-EC6B-167D-32D1-6BCC4A35A007}"/>
               </a:ext>
             </a:extLst>
           </p:cNvPr>
@@ -3333,7 +3769,7 @@
           <p:cNvPr id="4" name="Slide Number Placeholder 3">
             <a:extLst>
               <a:ext uri="{FF2B5EF4-FFF2-40B4-BE49-F238E27FC236}">
-                <a16:creationId xmlns="" xmlns:a16="http://schemas.microsoft.com/office/drawing/2014/main" id="{4B9C545A-1AD5-BFF5-B687-7B9BD552CC0D}"/>
+                <a16:creationId xmlns:a16="http://schemas.microsoft.com/office/drawing/2014/main" xmlns="" id="{4B9C545A-1AD5-BFF5-B687-7B9BD552CC0D}"/>
               </a:ext>
             </a:extLst>
           </p:cNvPr>
@@ -3378,7 +3814,7 @@
         <p:cNvPr id="1" name="">
           <a:extLst>
             <a:ext uri="{FF2B5EF4-FFF2-40B4-BE49-F238E27FC236}">
-              <a16:creationId xmlns="" xmlns:a16="http://schemas.microsoft.com/office/drawing/2014/main" id="{3E01EA9D-0D8E-B3B3-3471-A72EA7077645}"/>
+              <a16:creationId xmlns:a16="http://schemas.microsoft.com/office/drawing/2014/main" xmlns="" id="{3E01EA9D-0D8E-B3B3-3471-A72EA7077645}"/>
             </a:ext>
           </a:extLst>
         </p:cNvPr>
@@ -3398,7 +3834,7 @@
           <p:cNvPr id="2" name="Slide Image Placeholder 1">
             <a:extLst>
               <a:ext uri="{FF2B5EF4-FFF2-40B4-BE49-F238E27FC236}">
-                <a16:creationId xmlns="" xmlns:a16="http://schemas.microsoft.com/office/drawing/2014/main" id="{7B90D1D5-C864-5E4C-3C40-4D43E6C4296D}"/>
+                <a16:creationId xmlns:a16="http://schemas.microsoft.com/office/drawing/2014/main" xmlns="" id="{7B90D1D5-C864-5E4C-3C40-4D43E6C4296D}"/>
               </a:ext>
             </a:extLst>
           </p:cNvPr>
@@ -3416,7 +3852,7 @@
           <p:cNvPr id="3" name="Notes Placeholder 2">
             <a:extLst>
               <a:ext uri="{FF2B5EF4-FFF2-40B4-BE49-F238E27FC236}">
-                <a16:creationId xmlns="" xmlns:a16="http://schemas.microsoft.com/office/drawing/2014/main" id="{ED9CB586-8860-3BD8-3381-DA1CEFABC39B}"/>
+                <a16:creationId xmlns:a16="http://schemas.microsoft.com/office/drawing/2014/main" xmlns="" id="{ED9CB586-8860-3BD8-3381-DA1CEFABC39B}"/>
               </a:ext>
             </a:extLst>
           </p:cNvPr>
@@ -3441,7 +3877,7 @@
           <p:cNvPr id="4" name="Slide Number Placeholder 3">
             <a:extLst>
               <a:ext uri="{FF2B5EF4-FFF2-40B4-BE49-F238E27FC236}">
-                <a16:creationId xmlns="" xmlns:a16="http://schemas.microsoft.com/office/drawing/2014/main" id="{C0A432A5-CFDC-1082-A3A3-88230315F764}"/>
+                <a16:creationId xmlns:a16="http://schemas.microsoft.com/office/drawing/2014/main" xmlns="" id="{C0A432A5-CFDC-1082-A3A3-88230315F764}"/>
               </a:ext>
             </a:extLst>
           </p:cNvPr>
@@ -3486,7 +3922,7 @@
         <p:cNvPr id="1" name="">
           <a:extLst>
             <a:ext uri="{FF2B5EF4-FFF2-40B4-BE49-F238E27FC236}">
-              <a16:creationId xmlns="" xmlns:a16="http://schemas.microsoft.com/office/drawing/2014/main" id="{3E01EA9D-0D8E-B3B3-3471-A72EA7077645}"/>
+              <a16:creationId xmlns:a16="http://schemas.microsoft.com/office/drawing/2014/main" xmlns="" id="{3E01EA9D-0D8E-B3B3-3471-A72EA7077645}"/>
             </a:ext>
           </a:extLst>
         </p:cNvPr>
@@ -3506,7 +3942,7 @@
           <p:cNvPr id="2" name="Slide Image Placeholder 1">
             <a:extLst>
               <a:ext uri="{FF2B5EF4-FFF2-40B4-BE49-F238E27FC236}">
-                <a16:creationId xmlns="" xmlns:a16="http://schemas.microsoft.com/office/drawing/2014/main" id="{7B90D1D5-C864-5E4C-3C40-4D43E6C4296D}"/>
+                <a16:creationId xmlns:a16="http://schemas.microsoft.com/office/drawing/2014/main" xmlns="" id="{7B90D1D5-C864-5E4C-3C40-4D43E6C4296D}"/>
               </a:ext>
             </a:extLst>
           </p:cNvPr>
@@ -3524,7 +3960,7 @@
           <p:cNvPr id="3" name="Notes Placeholder 2">
             <a:extLst>
               <a:ext uri="{FF2B5EF4-FFF2-40B4-BE49-F238E27FC236}">
-                <a16:creationId xmlns="" xmlns:a16="http://schemas.microsoft.com/office/drawing/2014/main" id="{ED9CB586-8860-3BD8-3381-DA1CEFABC39B}"/>
+                <a16:creationId xmlns:a16="http://schemas.microsoft.com/office/drawing/2014/main" xmlns="" id="{ED9CB586-8860-3BD8-3381-DA1CEFABC39B}"/>
               </a:ext>
             </a:extLst>
           </p:cNvPr>
@@ -3549,7 +3985,7 @@
           <p:cNvPr id="4" name="Slide Number Placeholder 3">
             <a:extLst>
               <a:ext uri="{FF2B5EF4-FFF2-40B4-BE49-F238E27FC236}">
-                <a16:creationId xmlns="" xmlns:a16="http://schemas.microsoft.com/office/drawing/2014/main" id="{C0A432A5-CFDC-1082-A3A3-88230315F764}"/>
+                <a16:creationId xmlns:a16="http://schemas.microsoft.com/office/drawing/2014/main" xmlns="" id="{C0A432A5-CFDC-1082-A3A3-88230315F764}"/>
               </a:ext>
             </a:extLst>
           </p:cNvPr>
@@ -3594,7 +4030,7 @@
         <p:cNvPr id="1" name="">
           <a:extLst>
             <a:ext uri="{FF2B5EF4-FFF2-40B4-BE49-F238E27FC236}">
-              <a16:creationId xmlns="" xmlns:a16="http://schemas.microsoft.com/office/drawing/2014/main" id="{5EB58F29-43BC-250B-F029-F71591A0B61F}"/>
+              <a16:creationId xmlns:a16="http://schemas.microsoft.com/office/drawing/2014/main" xmlns="" id="{5EB58F29-43BC-250B-F029-F71591A0B61F}"/>
             </a:ext>
           </a:extLst>
         </p:cNvPr>
@@ -3614,7 +4050,7 @@
           <p:cNvPr id="2" name="Slide Image Placeholder 1">
             <a:extLst>
               <a:ext uri="{FF2B5EF4-FFF2-40B4-BE49-F238E27FC236}">
-                <a16:creationId xmlns="" xmlns:a16="http://schemas.microsoft.com/office/drawing/2014/main" id="{5DE86BF1-A149-E84A-3F16-6B3EA6508255}"/>
+                <a16:creationId xmlns:a16="http://schemas.microsoft.com/office/drawing/2014/main" xmlns="" id="{5DE86BF1-A149-E84A-3F16-6B3EA6508255}"/>
               </a:ext>
             </a:extLst>
           </p:cNvPr>
@@ -3632,7 +4068,7 @@
           <p:cNvPr id="3" name="Notes Placeholder 2">
             <a:extLst>
               <a:ext uri="{FF2B5EF4-FFF2-40B4-BE49-F238E27FC236}">
-                <a16:creationId xmlns="" xmlns:a16="http://schemas.microsoft.com/office/drawing/2014/main" id="{CA0F34B0-7045-260E-477B-11A6EFF1956C}"/>
+                <a16:creationId xmlns:a16="http://schemas.microsoft.com/office/drawing/2014/main" xmlns="" id="{CA0F34B0-7045-260E-477B-11A6EFF1956C}"/>
               </a:ext>
             </a:extLst>
           </p:cNvPr>
@@ -3657,7 +4093,7 @@
           <p:cNvPr id="4" name="Slide Number Placeholder 3">
             <a:extLst>
               <a:ext uri="{FF2B5EF4-FFF2-40B4-BE49-F238E27FC236}">
-                <a16:creationId xmlns="" xmlns:a16="http://schemas.microsoft.com/office/drawing/2014/main" id="{A5688479-B809-6A48-F4C5-5339F475891A}"/>
+                <a16:creationId xmlns:a16="http://schemas.microsoft.com/office/drawing/2014/main" xmlns="" id="{A5688479-B809-6A48-F4C5-5339F475891A}"/>
               </a:ext>
             </a:extLst>
           </p:cNvPr>
@@ -3702,7 +4138,7 @@
         <p:cNvPr id="1" name="">
           <a:extLst>
             <a:ext uri="{FF2B5EF4-FFF2-40B4-BE49-F238E27FC236}">
-              <a16:creationId xmlns="" xmlns:a16="http://schemas.microsoft.com/office/drawing/2014/main" id="{84847B3D-F9FE-E845-0A9E-7B3E4737F607}"/>
+              <a16:creationId xmlns:a16="http://schemas.microsoft.com/office/drawing/2014/main" xmlns="" id="{84847B3D-F9FE-E845-0A9E-7B3E4737F607}"/>
             </a:ext>
           </a:extLst>
         </p:cNvPr>
@@ -3722,7 +4158,7 @@
           <p:cNvPr id="2" name="Slide Image Placeholder 1">
             <a:extLst>
               <a:ext uri="{FF2B5EF4-FFF2-40B4-BE49-F238E27FC236}">
-                <a16:creationId xmlns="" xmlns:a16="http://schemas.microsoft.com/office/drawing/2014/main" id="{A65C55DC-40F4-B8B2-A44F-CEE7EA9104C1}"/>
+                <a16:creationId xmlns:a16="http://schemas.microsoft.com/office/drawing/2014/main" xmlns="" id="{A65C55DC-40F4-B8B2-A44F-CEE7EA9104C1}"/>
               </a:ext>
             </a:extLst>
           </p:cNvPr>
@@ -3740,7 +4176,7 @@
           <p:cNvPr id="3" name="Notes Placeholder 2">
             <a:extLst>
               <a:ext uri="{FF2B5EF4-FFF2-40B4-BE49-F238E27FC236}">
-                <a16:creationId xmlns="" xmlns:a16="http://schemas.microsoft.com/office/drawing/2014/main" id="{AFAEFE12-CFF9-2E00-9808-098A1D824723}"/>
+                <a16:creationId xmlns:a16="http://schemas.microsoft.com/office/drawing/2014/main" xmlns="" id="{AFAEFE12-CFF9-2E00-9808-098A1D824723}"/>
               </a:ext>
             </a:extLst>
           </p:cNvPr>
@@ -3765,7 +4201,7 @@
           <p:cNvPr id="4" name="Slide Number Placeholder 3">
             <a:extLst>
               <a:ext uri="{FF2B5EF4-FFF2-40B4-BE49-F238E27FC236}">
-                <a16:creationId xmlns="" xmlns:a16="http://schemas.microsoft.com/office/drawing/2014/main" id="{85084F94-5BAE-E3B2-298D-1E3D1D48D1F6}"/>
+                <a16:creationId xmlns:a16="http://schemas.microsoft.com/office/drawing/2014/main" xmlns="" id="{85084F94-5BAE-E3B2-298D-1E3D1D48D1F6}"/>
               </a:ext>
             </a:extLst>
           </p:cNvPr>
@@ -3832,7 +4268,7 @@
           <p:cNvPr id="7" name="Picture Placeholder 6">
             <a:extLst>
               <a:ext uri="{FF2B5EF4-FFF2-40B4-BE49-F238E27FC236}">
-                <a16:creationId xmlns="" xmlns:a16="http://schemas.microsoft.com/office/drawing/2014/main" id="{7A7F58C7-D277-8F14-F024-4B41D20D054F}"/>
+                <a16:creationId xmlns:a16="http://schemas.microsoft.com/office/drawing/2014/main" xmlns="" id="{7A7F58C7-D277-8F14-F024-4B41D20D054F}"/>
               </a:ext>
             </a:extLst>
           </p:cNvPr>
@@ -3877,7 +4313,7 @@
           <p:cNvPr id="6" name="Title 1">
             <a:extLst>
               <a:ext uri="{FF2B5EF4-FFF2-40B4-BE49-F238E27FC236}">
-                <a16:creationId xmlns="" xmlns:a16="http://schemas.microsoft.com/office/drawing/2014/main" id="{2E8C189B-2E00-67DA-E342-3440F5EBB4CE}"/>
+                <a16:creationId xmlns:a16="http://schemas.microsoft.com/office/drawing/2014/main" xmlns="" id="{2E8C189B-2E00-67DA-E342-3440F5EBB4CE}"/>
               </a:ext>
             </a:extLst>
           </p:cNvPr>
@@ -3950,7 +4386,7 @@
           <p:cNvPr id="2" name="Title 1">
             <a:extLst>
               <a:ext uri="{FF2B5EF4-FFF2-40B4-BE49-F238E27FC236}">
-                <a16:creationId xmlns="" xmlns:a16="http://schemas.microsoft.com/office/drawing/2014/main" id="{0C40C44A-93E6-6C58-5E88-AFDC594EC27A}"/>
+                <a16:creationId xmlns:a16="http://schemas.microsoft.com/office/drawing/2014/main" xmlns="" id="{0C40C44A-93E6-6C58-5E88-AFDC594EC27A}"/>
               </a:ext>
             </a:extLst>
           </p:cNvPr>
@@ -3989,7 +4425,7 @@
           <p:cNvPr id="8" name="Content Placeholder 10">
             <a:extLst>
               <a:ext uri="{FF2B5EF4-FFF2-40B4-BE49-F238E27FC236}">
-                <a16:creationId xmlns="" xmlns:a16="http://schemas.microsoft.com/office/drawing/2014/main" id="{A524C1E0-92FE-D7D2-83A7-46D29A838874}"/>
+                <a16:creationId xmlns:a16="http://schemas.microsoft.com/office/drawing/2014/main" xmlns="" id="{A524C1E0-92FE-D7D2-83A7-46D29A838874}"/>
               </a:ext>
             </a:extLst>
           </p:cNvPr>
@@ -4137,7 +4573,7 @@
           <p:cNvPr id="11" name="Content Placeholder 10">
             <a:extLst>
               <a:ext uri="{FF2B5EF4-FFF2-40B4-BE49-F238E27FC236}">
-                <a16:creationId xmlns="" xmlns:a16="http://schemas.microsoft.com/office/drawing/2014/main" id="{427E0367-8E38-8905-DC9A-D0C376A591A7}"/>
+                <a16:creationId xmlns:a16="http://schemas.microsoft.com/office/drawing/2014/main" xmlns="" id="{427E0367-8E38-8905-DC9A-D0C376A591A7}"/>
               </a:ext>
             </a:extLst>
           </p:cNvPr>
@@ -4285,10 +4721,10 @@
           <p:cNvPr id="10" name="Rectangle 9">
             <a:extLst>
               <a:ext uri="{FF2B5EF4-FFF2-40B4-BE49-F238E27FC236}">
-                <a16:creationId xmlns="" xmlns:a16="http://schemas.microsoft.com/office/drawing/2014/main" id="{43D847DE-29F2-8ABB-1718-34BED4F37718}"/>
+                <a16:creationId xmlns:a16="http://schemas.microsoft.com/office/drawing/2014/main" xmlns="" id="{43D847DE-29F2-8ABB-1718-34BED4F37718}"/>
               </a:ext>
               <a:ext uri="{C183D7F6-B498-43B3-948B-1728B52AA6E4}">
-                <adec:decorative xmlns="" xmlns:adec="http://schemas.microsoft.com/office/drawing/2017/decorative" val="1"/>
+                <adec:decorative xmlns:adec="http://schemas.microsoft.com/office/drawing/2017/decorative" xmlns="" val="1"/>
               </a:ext>
             </a:extLst>
           </p:cNvPr>
@@ -4357,7 +4793,7 @@
           <p:cNvPr id="5" name="Date Placeholder 4">
             <a:extLst>
               <a:ext uri="{FF2B5EF4-FFF2-40B4-BE49-F238E27FC236}">
-                <a16:creationId xmlns="" xmlns:a16="http://schemas.microsoft.com/office/drawing/2014/main" id="{C6CFCEB5-4092-FD13-478E-51CD74FDB82E}"/>
+                <a16:creationId xmlns:a16="http://schemas.microsoft.com/office/drawing/2014/main" xmlns="" id="{C6CFCEB5-4092-FD13-478E-51CD74FDB82E}"/>
               </a:ext>
             </a:extLst>
           </p:cNvPr>
@@ -4386,7 +4822,7 @@
           <p:cNvPr id="6" name="Footer Placeholder 5">
             <a:extLst>
               <a:ext uri="{FF2B5EF4-FFF2-40B4-BE49-F238E27FC236}">
-                <a16:creationId xmlns="" xmlns:a16="http://schemas.microsoft.com/office/drawing/2014/main" id="{5D077A4D-E7C0-912D-293F-D93F0CB5CA49}"/>
+                <a16:creationId xmlns:a16="http://schemas.microsoft.com/office/drawing/2014/main" xmlns="" id="{5D077A4D-E7C0-912D-293F-D93F0CB5CA49}"/>
               </a:ext>
             </a:extLst>
           </p:cNvPr>
@@ -4411,7 +4847,7 @@
           <p:cNvPr id="7" name="Slide Number Placeholder 6">
             <a:extLst>
               <a:ext uri="{FF2B5EF4-FFF2-40B4-BE49-F238E27FC236}">
-                <a16:creationId xmlns="" xmlns:a16="http://schemas.microsoft.com/office/drawing/2014/main" id="{CA6AA9E1-334B-5F8F-8A92-67DD095F7838}"/>
+                <a16:creationId xmlns:a16="http://schemas.microsoft.com/office/drawing/2014/main" xmlns="" id="{CA6AA9E1-334B-5F8F-8A92-67DD095F7838}"/>
               </a:ext>
             </a:extLst>
           </p:cNvPr>
@@ -4470,7 +4906,7 @@
           <p:cNvPr id="2" name="Title 1">
             <a:extLst>
               <a:ext uri="{FF2B5EF4-FFF2-40B4-BE49-F238E27FC236}">
-                <a16:creationId xmlns="" xmlns:a16="http://schemas.microsoft.com/office/drawing/2014/main" id="{F657BD59-35CC-9BB3-8621-6FA3356F81AA}"/>
+                <a16:creationId xmlns:a16="http://schemas.microsoft.com/office/drawing/2014/main" xmlns="" id="{F657BD59-35CC-9BB3-8621-6FA3356F81AA}"/>
               </a:ext>
             </a:extLst>
           </p:cNvPr>
@@ -4504,7 +4940,7 @@
           <p:cNvPr id="8" name="Table Placeholder 7">
             <a:extLst>
               <a:ext uri="{FF2B5EF4-FFF2-40B4-BE49-F238E27FC236}">
-                <a16:creationId xmlns="" xmlns:a16="http://schemas.microsoft.com/office/drawing/2014/main" id="{0CEAFE70-86D3-8690-31CA-F9A1FBA494D0}"/>
+                <a16:creationId xmlns:a16="http://schemas.microsoft.com/office/drawing/2014/main" xmlns="" id="{0CEAFE70-86D3-8690-31CA-F9A1FBA494D0}"/>
               </a:ext>
             </a:extLst>
           </p:cNvPr>
@@ -4542,7 +4978,7 @@
           <p:cNvPr id="4" name="Date Placeholder 3">
             <a:extLst>
               <a:ext uri="{FF2B5EF4-FFF2-40B4-BE49-F238E27FC236}">
-                <a16:creationId xmlns="" xmlns:a16="http://schemas.microsoft.com/office/drawing/2014/main" id="{8C56EB0F-63C8-5F75-A333-3413A9DC6F76}"/>
+                <a16:creationId xmlns:a16="http://schemas.microsoft.com/office/drawing/2014/main" xmlns="" id="{8C56EB0F-63C8-5F75-A333-3413A9DC6F76}"/>
               </a:ext>
             </a:extLst>
           </p:cNvPr>
@@ -4571,7 +5007,7 @@
           <p:cNvPr id="5" name="Footer Placeholder 4">
             <a:extLst>
               <a:ext uri="{FF2B5EF4-FFF2-40B4-BE49-F238E27FC236}">
-                <a16:creationId xmlns="" xmlns:a16="http://schemas.microsoft.com/office/drawing/2014/main" id="{4D4DE333-25B4-E092-1CC4-C3D20BA25168}"/>
+                <a16:creationId xmlns:a16="http://schemas.microsoft.com/office/drawing/2014/main" xmlns="" id="{4D4DE333-25B4-E092-1CC4-C3D20BA25168}"/>
               </a:ext>
             </a:extLst>
           </p:cNvPr>
@@ -4596,7 +5032,7 @@
           <p:cNvPr id="6" name="Slide Number Placeholder 5">
             <a:extLst>
               <a:ext uri="{FF2B5EF4-FFF2-40B4-BE49-F238E27FC236}">
-                <a16:creationId xmlns="" xmlns:a16="http://schemas.microsoft.com/office/drawing/2014/main" id="{8F1AF200-E81F-A326-0EDB-4B93C71D9BF4}"/>
+                <a16:creationId xmlns:a16="http://schemas.microsoft.com/office/drawing/2014/main" xmlns="" id="{8F1AF200-E81F-A326-0EDB-4B93C71D9BF4}"/>
               </a:ext>
             </a:extLst>
           </p:cNvPr>
@@ -4655,7 +5091,7 @@
           <p:cNvPr id="12" name="Picture Placeholder 11">
             <a:extLst>
               <a:ext uri="{FF2B5EF4-FFF2-40B4-BE49-F238E27FC236}">
-                <a16:creationId xmlns="" xmlns:a16="http://schemas.microsoft.com/office/drawing/2014/main" id="{76EE6F3F-63EB-5C0E-2307-3B7CBBA1C374}"/>
+                <a16:creationId xmlns:a16="http://schemas.microsoft.com/office/drawing/2014/main" xmlns="" id="{76EE6F3F-63EB-5C0E-2307-3B7CBBA1C374}"/>
               </a:ext>
             </a:extLst>
           </p:cNvPr>
@@ -4703,7 +5139,7 @@
           <p:cNvPr id="2" name="Title 1">
             <a:extLst>
               <a:ext uri="{FF2B5EF4-FFF2-40B4-BE49-F238E27FC236}">
-                <a16:creationId xmlns="" xmlns:a16="http://schemas.microsoft.com/office/drawing/2014/main" id="{F657BD59-35CC-9BB3-8621-6FA3356F81AA}"/>
+                <a16:creationId xmlns:a16="http://schemas.microsoft.com/office/drawing/2014/main" xmlns="" id="{F657BD59-35CC-9BB3-8621-6FA3356F81AA}"/>
               </a:ext>
             </a:extLst>
           </p:cNvPr>
@@ -4749,7 +5185,7 @@
           <p:cNvPr id="10" name="Text Placeholder 9">
             <a:extLst>
               <a:ext uri="{FF2B5EF4-FFF2-40B4-BE49-F238E27FC236}">
-                <a16:creationId xmlns="" xmlns:a16="http://schemas.microsoft.com/office/drawing/2014/main" id="{E12DA517-30B0-BC62-0422-F995FB9189E2}"/>
+                <a16:creationId xmlns:a16="http://schemas.microsoft.com/office/drawing/2014/main" xmlns="" id="{E12DA517-30B0-BC62-0422-F995FB9189E2}"/>
               </a:ext>
             </a:extLst>
           </p:cNvPr>
@@ -4871,7 +5307,7 @@
           <p:cNvPr id="2" name="Title 1">
             <a:extLst>
               <a:ext uri="{FF2B5EF4-FFF2-40B4-BE49-F238E27FC236}">
-                <a16:creationId xmlns="" xmlns:a16="http://schemas.microsoft.com/office/drawing/2014/main" id="{F657BD59-35CC-9BB3-8621-6FA3356F81AA}"/>
+                <a16:creationId xmlns:a16="http://schemas.microsoft.com/office/drawing/2014/main" xmlns="" id="{F657BD59-35CC-9BB3-8621-6FA3356F81AA}"/>
               </a:ext>
             </a:extLst>
           </p:cNvPr>
@@ -4910,7 +5346,7 @@
           <p:cNvPr id="10" name="Picture Placeholder 9">
             <a:extLst>
               <a:ext uri="{FF2B5EF4-FFF2-40B4-BE49-F238E27FC236}">
-                <a16:creationId xmlns="" xmlns:a16="http://schemas.microsoft.com/office/drawing/2014/main" id="{6B8CBAD6-FC79-B2BB-0B67-26429A6D4C8C}"/>
+                <a16:creationId xmlns:a16="http://schemas.microsoft.com/office/drawing/2014/main" xmlns="" id="{6B8CBAD6-FC79-B2BB-0B67-26429A6D4C8C}"/>
               </a:ext>
             </a:extLst>
           </p:cNvPr>
@@ -4957,7 +5393,7 @@
           <p:cNvPr id="3" name="Content Placeholder 2">
             <a:extLst>
               <a:ext uri="{FF2B5EF4-FFF2-40B4-BE49-F238E27FC236}">
-                <a16:creationId xmlns="" xmlns:a16="http://schemas.microsoft.com/office/drawing/2014/main" id="{A772710C-A212-1B12-06CD-FA2A14F89D68}"/>
+                <a16:creationId xmlns:a16="http://schemas.microsoft.com/office/drawing/2014/main" xmlns="" id="{A772710C-A212-1B12-06CD-FA2A14F89D68}"/>
               </a:ext>
             </a:extLst>
           </p:cNvPr>
@@ -5072,10 +5508,10 @@
           <p:cNvPr id="11" name="Rectangle 10">
             <a:extLst>
               <a:ext uri="{FF2B5EF4-FFF2-40B4-BE49-F238E27FC236}">
-                <a16:creationId xmlns="" xmlns:a16="http://schemas.microsoft.com/office/drawing/2014/main" id="{934796A3-781D-5244-DAB8-2D6EE0AC3B70}"/>
+                <a16:creationId xmlns:a16="http://schemas.microsoft.com/office/drawing/2014/main" xmlns="" id="{934796A3-781D-5244-DAB8-2D6EE0AC3B70}"/>
               </a:ext>
               <a:ext uri="{C183D7F6-B498-43B3-948B-1728B52AA6E4}">
-                <adec:decorative xmlns="" xmlns:adec="http://schemas.microsoft.com/office/drawing/2017/decorative" val="1"/>
+                <adec:decorative xmlns:adec="http://schemas.microsoft.com/office/drawing/2017/decorative" xmlns="" val="1"/>
               </a:ext>
             </a:extLst>
           </p:cNvPr>
@@ -5151,7 +5587,7 @@
   </p:clrMapOvr>
   <p:extLst>
     <p:ext uri="{DCECCB84-F9BA-43D5-87BE-67443E8EF086}">
-      <p15:sldGuideLst xmlns="" xmlns:p15="http://schemas.microsoft.com/office/powerpoint/2012/main">
+      <p15:sldGuideLst xmlns:p15="http://schemas.microsoft.com/office/powerpoint/2012/main" xmlns="">
         <p15:guide id="1" orient="horz" pos="2160" userDrawn="1">
           <p15:clr>
             <a:srgbClr val="FBAE40"/>
@@ -5190,7 +5626,7 @@
           <p:cNvPr id="2" name="Title 1">
             <a:extLst>
               <a:ext uri="{FF2B5EF4-FFF2-40B4-BE49-F238E27FC236}">
-                <a16:creationId xmlns="" xmlns:a16="http://schemas.microsoft.com/office/drawing/2014/main" id="{32772C41-A024-2F33-1F04-21E003FA7291}"/>
+                <a16:creationId xmlns:a16="http://schemas.microsoft.com/office/drawing/2014/main" xmlns="" id="{32772C41-A024-2F33-1F04-21E003FA7291}"/>
               </a:ext>
             </a:extLst>
           </p:cNvPr>
@@ -5230,7 +5666,7 @@
           <p:cNvPr id="12" name="Picture Placeholder 11">
             <a:extLst>
               <a:ext uri="{FF2B5EF4-FFF2-40B4-BE49-F238E27FC236}">
-                <a16:creationId xmlns="" xmlns:a16="http://schemas.microsoft.com/office/drawing/2014/main" id="{82836803-D9E6-3DF1-3B90-1E7E677CC7B7}"/>
+                <a16:creationId xmlns:a16="http://schemas.microsoft.com/office/drawing/2014/main" xmlns="" id="{82836803-D9E6-3DF1-3B90-1E7E677CC7B7}"/>
               </a:ext>
             </a:extLst>
           </p:cNvPr>
@@ -5276,7 +5712,7 @@
           <p:cNvPr id="3" name="Subtitle 2">
             <a:extLst>
               <a:ext uri="{FF2B5EF4-FFF2-40B4-BE49-F238E27FC236}">
-                <a16:creationId xmlns="" xmlns:a16="http://schemas.microsoft.com/office/drawing/2014/main" id="{473BC2DF-9C2A-052C-AD2C-0A8ABAA50374}"/>
+                <a16:creationId xmlns:a16="http://schemas.microsoft.com/office/drawing/2014/main" xmlns="" id="{473BC2DF-9C2A-052C-AD2C-0A8ABAA50374}"/>
               </a:ext>
             </a:extLst>
           </p:cNvPr>
@@ -5402,7 +5838,7 @@
           <p:cNvPr id="2" name="Title 1">
             <a:extLst>
               <a:ext uri="{FF2B5EF4-FFF2-40B4-BE49-F238E27FC236}">
-                <a16:creationId xmlns="" xmlns:a16="http://schemas.microsoft.com/office/drawing/2014/main" id="{F657BD59-35CC-9BB3-8621-6FA3356F81AA}"/>
+                <a16:creationId xmlns:a16="http://schemas.microsoft.com/office/drawing/2014/main" xmlns="" id="{F657BD59-35CC-9BB3-8621-6FA3356F81AA}"/>
               </a:ext>
             </a:extLst>
           </p:cNvPr>
@@ -5441,7 +5877,7 @@
           <p:cNvPr id="10" name="Picture Placeholder 9">
             <a:extLst>
               <a:ext uri="{FF2B5EF4-FFF2-40B4-BE49-F238E27FC236}">
-                <a16:creationId xmlns="" xmlns:a16="http://schemas.microsoft.com/office/drawing/2014/main" id="{511A5385-FB23-93A8-2B8F-9887244244DF}"/>
+                <a16:creationId xmlns:a16="http://schemas.microsoft.com/office/drawing/2014/main" xmlns="" id="{511A5385-FB23-93A8-2B8F-9887244244DF}"/>
               </a:ext>
             </a:extLst>
           </p:cNvPr>
@@ -5482,7 +5918,7 @@
           <p:cNvPr id="3" name="Content Placeholder 2">
             <a:extLst>
               <a:ext uri="{FF2B5EF4-FFF2-40B4-BE49-F238E27FC236}">
-                <a16:creationId xmlns="" xmlns:a16="http://schemas.microsoft.com/office/drawing/2014/main" id="{A772710C-A212-1B12-06CD-FA2A14F89D68}"/>
+                <a16:creationId xmlns:a16="http://schemas.microsoft.com/office/drawing/2014/main" xmlns="" id="{A772710C-A212-1B12-06CD-FA2A14F89D68}"/>
               </a:ext>
             </a:extLst>
           </p:cNvPr>
@@ -5617,10 +6053,10 @@
           <p:cNvPr id="8" name="Rectangle 7">
             <a:extLst>
               <a:ext uri="{FF2B5EF4-FFF2-40B4-BE49-F238E27FC236}">
-                <a16:creationId xmlns="" xmlns:a16="http://schemas.microsoft.com/office/drawing/2014/main" id="{50E25A87-9155-9E07-878F-CEC0B137C2D7}"/>
+                <a16:creationId xmlns:a16="http://schemas.microsoft.com/office/drawing/2014/main" xmlns="" id="{50E25A87-9155-9E07-878F-CEC0B137C2D7}"/>
               </a:ext>
               <a:ext uri="{C183D7F6-B498-43B3-948B-1728B52AA6E4}">
-                <adec:decorative xmlns="" xmlns:adec="http://schemas.microsoft.com/office/drawing/2017/decorative" val="1"/>
+                <adec:decorative xmlns:adec="http://schemas.microsoft.com/office/drawing/2017/decorative" xmlns="" val="1"/>
               </a:ext>
             </a:extLst>
           </p:cNvPr>
@@ -5719,7 +6155,7 @@
           <p:cNvPr id="2" name="Title 1">
             <a:extLst>
               <a:ext uri="{FF2B5EF4-FFF2-40B4-BE49-F238E27FC236}">
-                <a16:creationId xmlns="" xmlns:a16="http://schemas.microsoft.com/office/drawing/2014/main" id="{32772C41-A024-2F33-1F04-21E003FA7291}"/>
+                <a16:creationId xmlns:a16="http://schemas.microsoft.com/office/drawing/2014/main" xmlns="" id="{32772C41-A024-2F33-1F04-21E003FA7291}"/>
               </a:ext>
             </a:extLst>
           </p:cNvPr>
@@ -5758,7 +6194,7 @@
           <p:cNvPr id="3" name="Subtitle 2">
             <a:extLst>
               <a:ext uri="{FF2B5EF4-FFF2-40B4-BE49-F238E27FC236}">
-                <a16:creationId xmlns="" xmlns:a16="http://schemas.microsoft.com/office/drawing/2014/main" id="{473BC2DF-9C2A-052C-AD2C-0A8ABAA50374}"/>
+                <a16:creationId xmlns:a16="http://schemas.microsoft.com/office/drawing/2014/main" xmlns="" id="{473BC2DF-9C2A-052C-AD2C-0A8ABAA50374}"/>
               </a:ext>
             </a:extLst>
           </p:cNvPr>
@@ -5884,10 +6320,10 @@
           <p:cNvPr id="10" name="Rectangle 9">
             <a:extLst>
               <a:ext uri="{FF2B5EF4-FFF2-40B4-BE49-F238E27FC236}">
-                <a16:creationId xmlns="" xmlns:a16="http://schemas.microsoft.com/office/drawing/2014/main" id="{29577E27-B60E-C6DD-BAAF-5CCC3D59E5D5}"/>
+                <a16:creationId xmlns:a16="http://schemas.microsoft.com/office/drawing/2014/main" xmlns="" id="{29577E27-B60E-C6DD-BAAF-5CCC3D59E5D5}"/>
               </a:ext>
               <a:ext uri="{C183D7F6-B498-43B3-948B-1728B52AA6E4}">
-                <adec:decorative xmlns="" xmlns:adec="http://schemas.microsoft.com/office/drawing/2017/decorative" val="1"/>
+                <adec:decorative xmlns:adec="http://schemas.microsoft.com/office/drawing/2017/decorative" xmlns="" val="1"/>
               </a:ext>
             </a:extLst>
           </p:cNvPr>
@@ -5956,7 +6392,7 @@
           <p:cNvPr id="2" name="Title 1">
             <a:extLst>
               <a:ext uri="{FF2B5EF4-FFF2-40B4-BE49-F238E27FC236}">
-                <a16:creationId xmlns="" xmlns:a16="http://schemas.microsoft.com/office/drawing/2014/main" id="{0C40C44A-93E6-6C58-5E88-AFDC594EC27A}"/>
+                <a16:creationId xmlns:a16="http://schemas.microsoft.com/office/drawing/2014/main" xmlns="" id="{0C40C44A-93E6-6C58-5E88-AFDC594EC27A}"/>
               </a:ext>
             </a:extLst>
           </p:cNvPr>
@@ -5995,7 +6431,7 @@
           <p:cNvPr id="9" name="Content Placeholder 10">
             <a:extLst>
               <a:ext uri="{FF2B5EF4-FFF2-40B4-BE49-F238E27FC236}">
-                <a16:creationId xmlns="" xmlns:a16="http://schemas.microsoft.com/office/drawing/2014/main" id="{964CA031-27E0-D0AA-1451-A904CCF234FE}"/>
+                <a16:creationId xmlns:a16="http://schemas.microsoft.com/office/drawing/2014/main" xmlns="" id="{964CA031-27E0-D0AA-1451-A904CCF234FE}"/>
               </a:ext>
             </a:extLst>
           </p:cNvPr>
@@ -6140,7 +6576,7 @@
           <p:cNvPr id="12" name="Content Placeholder 10">
             <a:extLst>
               <a:ext uri="{FF2B5EF4-FFF2-40B4-BE49-F238E27FC236}">
-                <a16:creationId xmlns="" xmlns:a16="http://schemas.microsoft.com/office/drawing/2014/main" id="{81FE0D7D-86B7-CCD2-A7A1-70E95846B542}"/>
+                <a16:creationId xmlns:a16="http://schemas.microsoft.com/office/drawing/2014/main" xmlns="" id="{81FE0D7D-86B7-CCD2-A7A1-70E95846B542}"/>
               </a:ext>
             </a:extLst>
           </p:cNvPr>
@@ -6285,7 +6721,7 @@
           <p:cNvPr id="5" name="Date Placeholder 4">
             <a:extLst>
               <a:ext uri="{FF2B5EF4-FFF2-40B4-BE49-F238E27FC236}">
-                <a16:creationId xmlns="" xmlns:a16="http://schemas.microsoft.com/office/drawing/2014/main" id="{C6CFCEB5-4092-FD13-478E-51CD74FDB82E}"/>
+                <a16:creationId xmlns:a16="http://schemas.microsoft.com/office/drawing/2014/main" xmlns="" id="{C6CFCEB5-4092-FD13-478E-51CD74FDB82E}"/>
               </a:ext>
             </a:extLst>
           </p:cNvPr>
@@ -6314,7 +6750,7 @@
           <p:cNvPr id="6" name="Footer Placeholder 5">
             <a:extLst>
               <a:ext uri="{FF2B5EF4-FFF2-40B4-BE49-F238E27FC236}">
-                <a16:creationId xmlns="" xmlns:a16="http://schemas.microsoft.com/office/drawing/2014/main" id="{5D077A4D-E7C0-912D-293F-D93F0CB5CA49}"/>
+                <a16:creationId xmlns:a16="http://schemas.microsoft.com/office/drawing/2014/main" xmlns="" id="{5D077A4D-E7C0-912D-293F-D93F0CB5CA49}"/>
               </a:ext>
             </a:extLst>
           </p:cNvPr>
@@ -6339,7 +6775,7 @@
           <p:cNvPr id="7" name="Slide Number Placeholder 6">
             <a:extLst>
               <a:ext uri="{FF2B5EF4-FFF2-40B4-BE49-F238E27FC236}">
-                <a16:creationId xmlns="" xmlns:a16="http://schemas.microsoft.com/office/drawing/2014/main" id="{CA6AA9E1-334B-5F8F-8A92-67DD095F7838}"/>
+                <a16:creationId xmlns:a16="http://schemas.microsoft.com/office/drawing/2014/main" xmlns="" id="{CA6AA9E1-334B-5F8F-8A92-67DD095F7838}"/>
               </a:ext>
             </a:extLst>
           </p:cNvPr>
@@ -6398,7 +6834,7 @@
           <p:cNvPr id="2" name="Title 1">
             <a:extLst>
               <a:ext uri="{FF2B5EF4-FFF2-40B4-BE49-F238E27FC236}">
-                <a16:creationId xmlns="" xmlns:a16="http://schemas.microsoft.com/office/drawing/2014/main" id="{0C40C44A-93E6-6C58-5E88-AFDC594EC27A}"/>
+                <a16:creationId xmlns:a16="http://schemas.microsoft.com/office/drawing/2014/main" xmlns="" id="{0C40C44A-93E6-6C58-5E88-AFDC594EC27A}"/>
               </a:ext>
             </a:extLst>
           </p:cNvPr>
@@ -6437,7 +6873,7 @@
           <p:cNvPr id="11" name="Content Placeholder 10">
             <a:extLst>
               <a:ext uri="{FF2B5EF4-FFF2-40B4-BE49-F238E27FC236}">
-                <a16:creationId xmlns="" xmlns:a16="http://schemas.microsoft.com/office/drawing/2014/main" id="{2D2DE411-9D7C-15AE-0B59-F26B2BF8C522}"/>
+                <a16:creationId xmlns:a16="http://schemas.microsoft.com/office/drawing/2014/main" xmlns="" id="{2D2DE411-9D7C-15AE-0B59-F26B2BF8C522}"/>
               </a:ext>
             </a:extLst>
           </p:cNvPr>
@@ -6575,7 +7011,7 @@
           <p:cNvPr id="4" name="Content Placeholder 10">
             <a:extLst>
               <a:ext uri="{FF2B5EF4-FFF2-40B4-BE49-F238E27FC236}">
-                <a16:creationId xmlns="" xmlns:a16="http://schemas.microsoft.com/office/drawing/2014/main" id="{60FEDE7C-502F-ECFE-4136-E99206849C2A}"/>
+                <a16:creationId xmlns:a16="http://schemas.microsoft.com/office/drawing/2014/main" xmlns="" id="{60FEDE7C-502F-ECFE-4136-E99206849C2A}"/>
               </a:ext>
             </a:extLst>
           </p:cNvPr>
@@ -6720,7 +7156,7 @@
           <p:cNvPr id="5" name="Date Placeholder 4">
             <a:extLst>
               <a:ext uri="{FF2B5EF4-FFF2-40B4-BE49-F238E27FC236}">
-                <a16:creationId xmlns="" xmlns:a16="http://schemas.microsoft.com/office/drawing/2014/main" id="{C6CFCEB5-4092-FD13-478E-51CD74FDB82E}"/>
+                <a16:creationId xmlns:a16="http://schemas.microsoft.com/office/drawing/2014/main" xmlns="" id="{C6CFCEB5-4092-FD13-478E-51CD74FDB82E}"/>
               </a:ext>
             </a:extLst>
           </p:cNvPr>
@@ -6749,7 +7185,7 @@
           <p:cNvPr id="6" name="Footer Placeholder 5">
             <a:extLst>
               <a:ext uri="{FF2B5EF4-FFF2-40B4-BE49-F238E27FC236}">
-                <a16:creationId xmlns="" xmlns:a16="http://schemas.microsoft.com/office/drawing/2014/main" id="{5D077A4D-E7C0-912D-293F-D93F0CB5CA49}"/>
+                <a16:creationId xmlns:a16="http://schemas.microsoft.com/office/drawing/2014/main" xmlns="" id="{5D077A4D-E7C0-912D-293F-D93F0CB5CA49}"/>
               </a:ext>
             </a:extLst>
           </p:cNvPr>
@@ -6774,7 +7210,7 @@
           <p:cNvPr id="7" name="Slide Number Placeholder 6">
             <a:extLst>
               <a:ext uri="{FF2B5EF4-FFF2-40B4-BE49-F238E27FC236}">
-                <a16:creationId xmlns="" xmlns:a16="http://schemas.microsoft.com/office/drawing/2014/main" id="{CA6AA9E1-334B-5F8F-8A92-67DD095F7838}"/>
+                <a16:creationId xmlns:a16="http://schemas.microsoft.com/office/drawing/2014/main" xmlns="" id="{CA6AA9E1-334B-5F8F-8A92-67DD095F7838}"/>
               </a:ext>
             </a:extLst>
           </p:cNvPr>
@@ -6833,7 +7269,7 @@
           <p:cNvPr id="2" name="Title 1">
             <a:extLst>
               <a:ext uri="{FF2B5EF4-FFF2-40B4-BE49-F238E27FC236}">
-                <a16:creationId xmlns="" xmlns:a16="http://schemas.microsoft.com/office/drawing/2014/main" id="{0C40C44A-93E6-6C58-5E88-AFDC594EC27A}"/>
+                <a16:creationId xmlns:a16="http://schemas.microsoft.com/office/drawing/2014/main" xmlns="" id="{0C40C44A-93E6-6C58-5E88-AFDC594EC27A}"/>
               </a:ext>
             </a:extLst>
           </p:cNvPr>
@@ -6873,7 +7309,7 @@
           <p:cNvPr id="4" name="Content Placeholder 10">
             <a:extLst>
               <a:ext uri="{FF2B5EF4-FFF2-40B4-BE49-F238E27FC236}">
-                <a16:creationId xmlns="" xmlns:a16="http://schemas.microsoft.com/office/drawing/2014/main" id="{5F30E2A0-23EF-51B1-8ABD-00429EEA0642}"/>
+                <a16:creationId xmlns:a16="http://schemas.microsoft.com/office/drawing/2014/main" xmlns="" id="{5F30E2A0-23EF-51B1-8ABD-00429EEA0642}"/>
               </a:ext>
             </a:extLst>
           </p:cNvPr>
@@ -7018,7 +7454,7 @@
           <p:cNvPr id="11" name="Picture Placeholder 10">
             <a:extLst>
               <a:ext uri="{FF2B5EF4-FFF2-40B4-BE49-F238E27FC236}">
-                <a16:creationId xmlns="" xmlns:a16="http://schemas.microsoft.com/office/drawing/2014/main" id="{AF15552F-C66B-341F-2D37-0389710BA5E2}"/>
+                <a16:creationId xmlns:a16="http://schemas.microsoft.com/office/drawing/2014/main" xmlns="" id="{AF15552F-C66B-341F-2D37-0389710BA5E2}"/>
               </a:ext>
             </a:extLst>
           </p:cNvPr>
@@ -7059,10 +7495,10 @@
           <p:cNvPr id="12" name="Rectangle 11">
             <a:extLst>
               <a:ext uri="{FF2B5EF4-FFF2-40B4-BE49-F238E27FC236}">
-                <a16:creationId xmlns="" xmlns:a16="http://schemas.microsoft.com/office/drawing/2014/main" id="{0D8DCC6D-8B88-7BE0-7240-F743AE09EC48}"/>
+                <a16:creationId xmlns:a16="http://schemas.microsoft.com/office/drawing/2014/main" xmlns="" id="{0D8DCC6D-8B88-7BE0-7240-F743AE09EC48}"/>
               </a:ext>
               <a:ext uri="{C183D7F6-B498-43B3-948B-1728B52AA6E4}">
-                <adec:decorative xmlns="" xmlns:adec="http://schemas.microsoft.com/office/drawing/2017/decorative" val="1"/>
+                <adec:decorative xmlns:adec="http://schemas.microsoft.com/office/drawing/2017/decorative" xmlns="" val="1"/>
               </a:ext>
             </a:extLst>
           </p:cNvPr>
@@ -7161,7 +7597,7 @@
           <p:cNvPr id="2" name="Title 1">
             <a:extLst>
               <a:ext uri="{FF2B5EF4-FFF2-40B4-BE49-F238E27FC236}">
-                <a16:creationId xmlns="" xmlns:a16="http://schemas.microsoft.com/office/drawing/2014/main" id="{0C40C44A-93E6-6C58-5E88-AFDC594EC27A}"/>
+                <a16:creationId xmlns:a16="http://schemas.microsoft.com/office/drawing/2014/main" xmlns="" id="{0C40C44A-93E6-6C58-5E88-AFDC594EC27A}"/>
               </a:ext>
             </a:extLst>
           </p:cNvPr>
@@ -7200,7 +7636,7 @@
           <p:cNvPr id="4" name="Content Placeholder 10">
             <a:extLst>
               <a:ext uri="{FF2B5EF4-FFF2-40B4-BE49-F238E27FC236}">
-                <a16:creationId xmlns="" xmlns:a16="http://schemas.microsoft.com/office/drawing/2014/main" id="{9C3ED3BF-FF6B-07FA-72C4-F6102A8558AF}"/>
+                <a16:creationId xmlns:a16="http://schemas.microsoft.com/office/drawing/2014/main" xmlns="" id="{9C3ED3BF-FF6B-07FA-72C4-F6102A8558AF}"/>
               </a:ext>
             </a:extLst>
           </p:cNvPr>
@@ -7345,7 +7781,7 @@
           <p:cNvPr id="8" name="Table Placeholder 7">
             <a:extLst>
               <a:ext uri="{FF2B5EF4-FFF2-40B4-BE49-F238E27FC236}">
-                <a16:creationId xmlns="" xmlns:a16="http://schemas.microsoft.com/office/drawing/2014/main" id="{423FEB60-8FB5-7F10-EDD7-8AB4B3139EF6}"/>
+                <a16:creationId xmlns:a16="http://schemas.microsoft.com/office/drawing/2014/main" xmlns="" id="{423FEB60-8FB5-7F10-EDD7-8AB4B3139EF6}"/>
               </a:ext>
             </a:extLst>
           </p:cNvPr>
@@ -7379,7 +7815,7 @@
           <p:cNvPr id="5" name="Date Placeholder 4">
             <a:extLst>
               <a:ext uri="{FF2B5EF4-FFF2-40B4-BE49-F238E27FC236}">
-                <a16:creationId xmlns="" xmlns:a16="http://schemas.microsoft.com/office/drawing/2014/main" id="{C6CFCEB5-4092-FD13-478E-51CD74FDB82E}"/>
+                <a16:creationId xmlns:a16="http://schemas.microsoft.com/office/drawing/2014/main" xmlns="" id="{C6CFCEB5-4092-FD13-478E-51CD74FDB82E}"/>
               </a:ext>
             </a:extLst>
           </p:cNvPr>
@@ -7408,7 +7844,7 @@
           <p:cNvPr id="6" name="Footer Placeholder 5">
             <a:extLst>
               <a:ext uri="{FF2B5EF4-FFF2-40B4-BE49-F238E27FC236}">
-                <a16:creationId xmlns="" xmlns:a16="http://schemas.microsoft.com/office/drawing/2014/main" id="{5D077A4D-E7C0-912D-293F-D93F0CB5CA49}"/>
+                <a16:creationId xmlns:a16="http://schemas.microsoft.com/office/drawing/2014/main" xmlns="" id="{5D077A4D-E7C0-912D-293F-D93F0CB5CA49}"/>
               </a:ext>
             </a:extLst>
           </p:cNvPr>
@@ -7433,7 +7869,7 @@
           <p:cNvPr id="7" name="Slide Number Placeholder 6">
             <a:extLst>
               <a:ext uri="{FF2B5EF4-FFF2-40B4-BE49-F238E27FC236}">
-                <a16:creationId xmlns="" xmlns:a16="http://schemas.microsoft.com/office/drawing/2014/main" id="{CA6AA9E1-334B-5F8F-8A92-67DD095F7838}"/>
+                <a16:creationId xmlns:a16="http://schemas.microsoft.com/office/drawing/2014/main" xmlns="" id="{CA6AA9E1-334B-5F8F-8A92-67DD095F7838}"/>
               </a:ext>
             </a:extLst>
           </p:cNvPr>
@@ -7497,7 +7933,7 @@
           <p:cNvPr id="2" name="Title Placeholder 1">
             <a:extLst>
               <a:ext uri="{FF2B5EF4-FFF2-40B4-BE49-F238E27FC236}">
-                <a16:creationId xmlns="" xmlns:a16="http://schemas.microsoft.com/office/drawing/2014/main" id="{4FD97564-C310-6E8C-8689-CE18881B4A17}"/>
+                <a16:creationId xmlns:a16="http://schemas.microsoft.com/office/drawing/2014/main" xmlns="" id="{4FD97564-C310-6E8C-8689-CE18881B4A17}"/>
               </a:ext>
             </a:extLst>
           </p:cNvPr>
@@ -7536,7 +7972,7 @@
           <p:cNvPr id="3" name="Text Placeholder 2">
             <a:extLst>
               <a:ext uri="{FF2B5EF4-FFF2-40B4-BE49-F238E27FC236}">
-                <a16:creationId xmlns="" xmlns:a16="http://schemas.microsoft.com/office/drawing/2014/main" id="{0FAD99FA-26D9-873B-BE7F-26FEC5C233A2}"/>
+                <a16:creationId xmlns:a16="http://schemas.microsoft.com/office/drawing/2014/main" xmlns="" id="{0FAD99FA-26D9-873B-BE7F-26FEC5C233A2}"/>
               </a:ext>
             </a:extLst>
           </p:cNvPr>
@@ -7604,7 +8040,7 @@
           <p:cNvPr id="4" name="Date Placeholder 3">
             <a:extLst>
               <a:ext uri="{FF2B5EF4-FFF2-40B4-BE49-F238E27FC236}">
-                <a16:creationId xmlns="" xmlns:a16="http://schemas.microsoft.com/office/drawing/2014/main" id="{C319819E-0266-97DD-DFD1-BAAA06AE3236}"/>
+                <a16:creationId xmlns:a16="http://schemas.microsoft.com/office/drawing/2014/main" xmlns="" id="{C319819E-0266-97DD-DFD1-BAAA06AE3236}"/>
               </a:ext>
             </a:extLst>
           </p:cNvPr>
@@ -7651,7 +8087,7 @@
           <p:cNvPr id="5" name="Footer Placeholder 4">
             <a:extLst>
               <a:ext uri="{FF2B5EF4-FFF2-40B4-BE49-F238E27FC236}">
-                <a16:creationId xmlns="" xmlns:a16="http://schemas.microsoft.com/office/drawing/2014/main" id="{2BFD19C9-01CE-9E2A-CDA5-C15940F055F7}"/>
+                <a16:creationId xmlns:a16="http://schemas.microsoft.com/office/drawing/2014/main" xmlns="" id="{2BFD19C9-01CE-9E2A-CDA5-C15940F055F7}"/>
               </a:ext>
             </a:extLst>
           </p:cNvPr>
@@ -7694,7 +8130,7 @@
           <p:cNvPr id="6" name="Slide Number Placeholder 5">
             <a:extLst>
               <a:ext uri="{FF2B5EF4-FFF2-40B4-BE49-F238E27FC236}">
-                <a16:creationId xmlns="" xmlns:a16="http://schemas.microsoft.com/office/drawing/2014/main" id="{A1801085-7B28-048D-E3D3-9C3614268DA7}"/>
+                <a16:creationId xmlns:a16="http://schemas.microsoft.com/office/drawing/2014/main" xmlns="" id="{A1801085-7B28-048D-E3D3-9C3614268DA7}"/>
               </a:ext>
             </a:extLst>
           </p:cNvPr>
@@ -8063,7 +8499,7 @@
           <p:cNvPr id="6" name="Title 5">
             <a:extLst>
               <a:ext uri="{FF2B5EF4-FFF2-40B4-BE49-F238E27FC236}">
-                <a16:creationId xmlns="" xmlns:a16="http://schemas.microsoft.com/office/drawing/2014/main" id="{F20A922B-22EC-7FD8-FA8C-2FFAC558BD66}"/>
+                <a16:creationId xmlns:a16="http://schemas.microsoft.com/office/drawing/2014/main" xmlns="" id="{F20A922B-22EC-7FD8-FA8C-2FFAC558BD66}"/>
               </a:ext>
             </a:extLst>
           </p:cNvPr>
@@ -8136,7 +8572,7 @@
           <p:cNvPr id="7" name="TextBox 6">
             <a:extLst>
               <a:ext uri="{FF2B5EF4-FFF2-40B4-BE49-F238E27FC236}">
-                <a16:creationId xmlns="" xmlns:a16="http://schemas.microsoft.com/office/drawing/2014/main" id="{80FDA16B-36A0-D5C1-2B07-8EE49AE7A5F9}"/>
+                <a16:creationId xmlns:a16="http://schemas.microsoft.com/office/drawing/2014/main" xmlns="" id="{80FDA16B-36A0-D5C1-2B07-8EE49AE7A5F9}"/>
               </a:ext>
             </a:extLst>
           </p:cNvPr>
@@ -8243,7 +8679,7 @@
         <p:cNvPr id="1" name="">
           <a:extLst>
             <a:ext uri="{FF2B5EF4-FFF2-40B4-BE49-F238E27FC236}">
-              <a16:creationId xmlns="" xmlns:a16="http://schemas.microsoft.com/office/drawing/2014/main" id="{EF87400A-AA39-C6BD-0F50-19DF27F0BEE1}"/>
+              <a16:creationId xmlns:a16="http://schemas.microsoft.com/office/drawing/2014/main" xmlns="" id="{EF87400A-AA39-C6BD-0F50-19DF27F0BEE1}"/>
             </a:ext>
           </a:extLst>
         </p:cNvPr>
@@ -8263,7 +8699,7 @@
           <p:cNvPr id="7" name="Title 6">
             <a:extLst>
               <a:ext uri="{FF2B5EF4-FFF2-40B4-BE49-F238E27FC236}">
-                <a16:creationId xmlns="" xmlns:a16="http://schemas.microsoft.com/office/drawing/2014/main" id="{DDE79998-A15C-2CB6-B04B-53D589C36C00}"/>
+                <a16:creationId xmlns:a16="http://schemas.microsoft.com/office/drawing/2014/main" xmlns="" id="{DDE79998-A15C-2CB6-B04B-53D589C36C00}"/>
               </a:ext>
             </a:extLst>
           </p:cNvPr>
@@ -8307,7 +8743,7 @@
           <p:cNvPr id="4" name="TextBox 3">
             <a:extLst>
               <a:ext uri="{FF2B5EF4-FFF2-40B4-BE49-F238E27FC236}">
-                <a16:creationId xmlns="" xmlns:a16="http://schemas.microsoft.com/office/drawing/2014/main" id="{879E6C82-14DA-B822-B0AD-CDBC55F93D43}"/>
+                <a16:creationId xmlns:a16="http://schemas.microsoft.com/office/drawing/2014/main" xmlns="" id="{879E6C82-14DA-B822-B0AD-CDBC55F93D43}"/>
               </a:ext>
             </a:extLst>
           </p:cNvPr>
@@ -8393,7 +8829,7 @@
           <p:cNvPr id="18" name="Arc 17">
             <a:extLst>
               <a:ext uri="{FF2B5EF4-FFF2-40B4-BE49-F238E27FC236}">
-                <a16:creationId xmlns="" xmlns:a16="http://schemas.microsoft.com/office/drawing/2014/main" id="{9B8D2FA6-CA42-5B24-DF6B-A4BC73628119}"/>
+                <a16:creationId xmlns:a16="http://schemas.microsoft.com/office/drawing/2014/main" xmlns="" id="{9B8D2FA6-CA42-5B24-DF6B-A4BC73628119}"/>
               </a:ext>
             </a:extLst>
           </p:cNvPr>
@@ -8437,7 +8873,7 @@
           <p:cNvPr id="19" name="TextBox 18">
             <a:extLst>
               <a:ext uri="{FF2B5EF4-FFF2-40B4-BE49-F238E27FC236}">
-                <a16:creationId xmlns="" xmlns:a16="http://schemas.microsoft.com/office/drawing/2014/main" id="{1D79FC21-9495-9973-2B02-EC44707476AF}"/>
+                <a16:creationId xmlns:a16="http://schemas.microsoft.com/office/drawing/2014/main" xmlns="" id="{1D79FC21-9495-9973-2B02-EC44707476AF}"/>
               </a:ext>
             </a:extLst>
           </p:cNvPr>
@@ -8496,7 +8932,7 @@
           <p:cNvPr id="21" name="Arc 20">
             <a:extLst>
               <a:ext uri="{FF2B5EF4-FFF2-40B4-BE49-F238E27FC236}">
-                <a16:creationId xmlns="" xmlns:a16="http://schemas.microsoft.com/office/drawing/2014/main" id="{D625BEE6-1977-BBA6-6801-FA5F97103C62}"/>
+                <a16:creationId xmlns:a16="http://schemas.microsoft.com/office/drawing/2014/main" xmlns="" id="{D625BEE6-1977-BBA6-6801-FA5F97103C62}"/>
               </a:ext>
             </a:extLst>
           </p:cNvPr>
@@ -8543,7 +8979,7 @@
           <p:cNvPr id="22" name="TextBox 21">
             <a:extLst>
               <a:ext uri="{FF2B5EF4-FFF2-40B4-BE49-F238E27FC236}">
-                <a16:creationId xmlns="" xmlns:a16="http://schemas.microsoft.com/office/drawing/2014/main" id="{3C172C52-0068-4260-6B4B-32D95D57BAE3}"/>
+                <a16:creationId xmlns:a16="http://schemas.microsoft.com/office/drawing/2014/main" xmlns="" id="{3C172C52-0068-4260-6B4B-32D95D57BAE3}"/>
               </a:ext>
             </a:extLst>
           </p:cNvPr>
@@ -8625,7 +9061,7 @@
           <p:cNvPr id="23" name="Arc 22">
             <a:extLst>
               <a:ext uri="{FF2B5EF4-FFF2-40B4-BE49-F238E27FC236}">
-                <a16:creationId xmlns="" xmlns:a16="http://schemas.microsoft.com/office/drawing/2014/main" id="{E9F44C23-2D8C-90B8-227F-6E591C8E4A94}"/>
+                <a16:creationId xmlns:a16="http://schemas.microsoft.com/office/drawing/2014/main" xmlns="" id="{E9F44C23-2D8C-90B8-227F-6E591C8E4A94}"/>
               </a:ext>
             </a:extLst>
           </p:cNvPr>
@@ -8685,7 +9121,7 @@
         <p:cNvPr id="1" name="">
           <a:extLst>
             <a:ext uri="{FF2B5EF4-FFF2-40B4-BE49-F238E27FC236}">
-              <a16:creationId xmlns="" xmlns:a16="http://schemas.microsoft.com/office/drawing/2014/main" id="{EF87400A-AA39-C6BD-0F50-19DF27F0BEE1}"/>
+              <a16:creationId xmlns:a16="http://schemas.microsoft.com/office/drawing/2014/main" xmlns="" id="{EF87400A-AA39-C6BD-0F50-19DF27F0BEE1}"/>
             </a:ext>
           </a:extLst>
         </p:cNvPr>
@@ -8705,7 +9141,7 @@
           <p:cNvPr id="7" name="Title 6">
             <a:extLst>
               <a:ext uri="{FF2B5EF4-FFF2-40B4-BE49-F238E27FC236}">
-                <a16:creationId xmlns="" xmlns:a16="http://schemas.microsoft.com/office/drawing/2014/main" id="{DDE79998-A15C-2CB6-B04B-53D589C36C00}"/>
+                <a16:creationId xmlns:a16="http://schemas.microsoft.com/office/drawing/2014/main" xmlns="" id="{DDE79998-A15C-2CB6-B04B-53D589C36C00}"/>
               </a:ext>
             </a:extLst>
           </p:cNvPr>
@@ -9403,7 +9839,7 @@
         <p:cNvPr id="1" name="">
           <a:extLst>
             <a:ext uri="{FF2B5EF4-FFF2-40B4-BE49-F238E27FC236}">
-              <a16:creationId xmlns="" xmlns:a16="http://schemas.microsoft.com/office/drawing/2014/main" id="{EF87400A-AA39-C6BD-0F50-19DF27F0BEE1}"/>
+              <a16:creationId xmlns:a16="http://schemas.microsoft.com/office/drawing/2014/main" xmlns="" id="{EF87400A-AA39-C6BD-0F50-19DF27F0BEE1}"/>
             </a:ext>
           </a:extLst>
         </p:cNvPr>
@@ -9887,7 +10323,7 @@
         <p:cNvPr id="1" name="">
           <a:extLst>
             <a:ext uri="{FF2B5EF4-FFF2-40B4-BE49-F238E27FC236}">
-              <a16:creationId xmlns="" xmlns:a16="http://schemas.microsoft.com/office/drawing/2014/main" id="{EF87400A-AA39-C6BD-0F50-19DF27F0BEE1}"/>
+              <a16:creationId xmlns:a16="http://schemas.microsoft.com/office/drawing/2014/main" xmlns="" id="{EF87400A-AA39-C6BD-0F50-19DF27F0BEE1}"/>
             </a:ext>
           </a:extLst>
         </p:cNvPr>
@@ -10375,7 +10811,7 @@
         <p:cNvPr id="1" name="">
           <a:extLst>
             <a:ext uri="{FF2B5EF4-FFF2-40B4-BE49-F238E27FC236}">
-              <a16:creationId xmlns="" xmlns:a16="http://schemas.microsoft.com/office/drawing/2014/main" id="{EF87400A-AA39-C6BD-0F50-19DF27F0BEE1}"/>
+              <a16:creationId xmlns:a16="http://schemas.microsoft.com/office/drawing/2014/main" xmlns="" id="{EF87400A-AA39-C6BD-0F50-19DF27F0BEE1}"/>
             </a:ext>
           </a:extLst>
         </p:cNvPr>
@@ -10697,7 +11133,7 @@
         <p:cNvPr id="1" name="">
           <a:extLst>
             <a:ext uri="{FF2B5EF4-FFF2-40B4-BE49-F238E27FC236}">
-              <a16:creationId xmlns="" xmlns:a16="http://schemas.microsoft.com/office/drawing/2014/main" id="{EF87400A-AA39-C6BD-0F50-19DF27F0BEE1}"/>
+              <a16:creationId xmlns:a16="http://schemas.microsoft.com/office/drawing/2014/main" xmlns="" id="{EF87400A-AA39-C6BD-0F50-19DF27F0BEE1}"/>
             </a:ext>
           </a:extLst>
         </p:cNvPr>
@@ -10932,7 +11368,7 @@
         <p:cNvPr id="1" name="">
           <a:extLst>
             <a:ext uri="{FF2B5EF4-FFF2-40B4-BE49-F238E27FC236}">
-              <a16:creationId xmlns="" xmlns:a16="http://schemas.microsoft.com/office/drawing/2014/main" id="{EF87400A-AA39-C6BD-0F50-19DF27F0BEE1}"/>
+              <a16:creationId xmlns:a16="http://schemas.microsoft.com/office/drawing/2014/main" xmlns="" id="{EF87400A-AA39-C6BD-0F50-19DF27F0BEE1}"/>
             </a:ext>
           </a:extLst>
         </p:cNvPr>
@@ -10952,7 +11388,7 @@
           <p:cNvPr id="7" name="Title 6">
             <a:extLst>
               <a:ext uri="{FF2B5EF4-FFF2-40B4-BE49-F238E27FC236}">
-                <a16:creationId xmlns="" xmlns:a16="http://schemas.microsoft.com/office/drawing/2014/main" id="{DDE79998-A15C-2CB6-B04B-53D589C36C00}"/>
+                <a16:creationId xmlns:a16="http://schemas.microsoft.com/office/drawing/2014/main" xmlns="" id="{DDE79998-A15C-2CB6-B04B-53D589C36C00}"/>
               </a:ext>
             </a:extLst>
           </p:cNvPr>
@@ -11619,7 +12055,7 @@
         <p:cNvPr id="1" name="">
           <a:extLst>
             <a:ext uri="{FF2B5EF4-FFF2-40B4-BE49-F238E27FC236}">
-              <a16:creationId xmlns="" xmlns:a16="http://schemas.microsoft.com/office/drawing/2014/main" id="{EF87400A-AA39-C6BD-0F50-19DF27F0BEE1}"/>
+              <a16:creationId xmlns:a16="http://schemas.microsoft.com/office/drawing/2014/main" xmlns="" id="{EF87400A-AA39-C6BD-0F50-19DF27F0BEE1}"/>
             </a:ext>
           </a:extLst>
         </p:cNvPr>
@@ -12099,7 +12535,7 @@
         <p:cNvPr id="1" name="">
           <a:extLst>
             <a:ext uri="{FF2B5EF4-FFF2-40B4-BE49-F238E27FC236}">
-              <a16:creationId xmlns="" xmlns:a16="http://schemas.microsoft.com/office/drawing/2014/main" id="{EF87400A-AA39-C6BD-0F50-19DF27F0BEE1}"/>
+              <a16:creationId xmlns:a16="http://schemas.microsoft.com/office/drawing/2014/main" xmlns="" id="{EF87400A-AA39-C6BD-0F50-19DF27F0BEE1}"/>
             </a:ext>
           </a:extLst>
         </p:cNvPr>
@@ -12591,7 +13027,7 @@
         <p:cNvPr id="1" name="">
           <a:extLst>
             <a:ext uri="{FF2B5EF4-FFF2-40B4-BE49-F238E27FC236}">
-              <a16:creationId xmlns="" xmlns:a16="http://schemas.microsoft.com/office/drawing/2014/main" id="{EF87400A-AA39-C6BD-0F50-19DF27F0BEE1}"/>
+              <a16:creationId xmlns:a16="http://schemas.microsoft.com/office/drawing/2014/main" xmlns="" id="{EF87400A-AA39-C6BD-0F50-19DF27F0BEE1}"/>
             </a:ext>
           </a:extLst>
         </p:cNvPr>
@@ -12927,7 +13363,7 @@
           <p:cNvPr id="7" name="Title 6">
             <a:extLst>
               <a:ext uri="{FF2B5EF4-FFF2-40B4-BE49-F238E27FC236}">
-                <a16:creationId xmlns="" xmlns:a16="http://schemas.microsoft.com/office/drawing/2014/main" id="{2B1821E8-F378-D74B-E865-C40990E3D41F}"/>
+                <a16:creationId xmlns:a16="http://schemas.microsoft.com/office/drawing/2014/main" xmlns="" id="{2B1821E8-F378-D74B-E865-C40990E3D41F}"/>
               </a:ext>
             </a:extLst>
           </p:cNvPr>
@@ -12960,7 +13396,7 @@
           <p:cNvPr id="8" name="TextBox 7">
             <a:extLst>
               <a:ext uri="{FF2B5EF4-FFF2-40B4-BE49-F238E27FC236}">
-                <a16:creationId xmlns="" xmlns:a16="http://schemas.microsoft.com/office/drawing/2014/main" id="{FA6ECF98-C929-063C-BFD6-AA57AAC2A02F}"/>
+                <a16:creationId xmlns:a16="http://schemas.microsoft.com/office/drawing/2014/main" xmlns="" id="{FA6ECF98-C929-063C-BFD6-AA57AAC2A02F}"/>
               </a:ext>
             </a:extLst>
           </p:cNvPr>
@@ -13104,7 +13540,7 @@
           <p:cNvPr id="9" name="TextBox 8">
             <a:extLst>
               <a:ext uri="{FF2B5EF4-FFF2-40B4-BE49-F238E27FC236}">
-                <a16:creationId xmlns="" xmlns:a16="http://schemas.microsoft.com/office/drawing/2014/main" id="{867A665E-4508-A316-4C04-8788127440A7}"/>
+                <a16:creationId xmlns:a16="http://schemas.microsoft.com/office/drawing/2014/main" xmlns="" id="{867A665E-4508-A316-4C04-8788127440A7}"/>
               </a:ext>
             </a:extLst>
           </p:cNvPr>
@@ -13314,7 +13750,7 @@
         <p:cNvPr id="1" name="">
           <a:extLst>
             <a:ext uri="{FF2B5EF4-FFF2-40B4-BE49-F238E27FC236}">
-              <a16:creationId xmlns="" xmlns:a16="http://schemas.microsoft.com/office/drawing/2014/main" id="{EF87400A-AA39-C6BD-0F50-19DF27F0BEE1}"/>
+              <a16:creationId xmlns:a16="http://schemas.microsoft.com/office/drawing/2014/main" xmlns="" id="{EF87400A-AA39-C6BD-0F50-19DF27F0BEE1}"/>
             </a:ext>
           </a:extLst>
         </p:cNvPr>
@@ -13497,7 +13933,7 @@
         <p:cNvPr id="1" name="">
           <a:extLst>
             <a:ext uri="{FF2B5EF4-FFF2-40B4-BE49-F238E27FC236}">
-              <a16:creationId xmlns="" xmlns:a16="http://schemas.microsoft.com/office/drawing/2014/main" id="{EF87400A-AA39-C6BD-0F50-19DF27F0BEE1}"/>
+              <a16:creationId xmlns:a16="http://schemas.microsoft.com/office/drawing/2014/main" xmlns="" id="{EF87400A-AA39-C6BD-0F50-19DF27F0BEE1}"/>
             </a:ext>
           </a:extLst>
         </p:cNvPr>
@@ -13517,7 +13953,7 @@
           <p:cNvPr id="7" name="Title 6">
             <a:extLst>
               <a:ext uri="{FF2B5EF4-FFF2-40B4-BE49-F238E27FC236}">
-                <a16:creationId xmlns="" xmlns:a16="http://schemas.microsoft.com/office/drawing/2014/main" id="{DDE79998-A15C-2CB6-B04B-53D589C36C00}"/>
+                <a16:creationId xmlns:a16="http://schemas.microsoft.com/office/drawing/2014/main" xmlns="" id="{DDE79998-A15C-2CB6-B04B-53D589C36C00}"/>
               </a:ext>
             </a:extLst>
           </p:cNvPr>
@@ -14232,7 +14668,7 @@
         <p:cNvPr id="1" name="">
           <a:extLst>
             <a:ext uri="{FF2B5EF4-FFF2-40B4-BE49-F238E27FC236}">
-              <a16:creationId xmlns="" xmlns:a16="http://schemas.microsoft.com/office/drawing/2014/main" id="{EF87400A-AA39-C6BD-0F50-19DF27F0BEE1}"/>
+              <a16:creationId xmlns:a16="http://schemas.microsoft.com/office/drawing/2014/main" xmlns="" id="{EF87400A-AA39-C6BD-0F50-19DF27F0BEE1}"/>
             </a:ext>
           </a:extLst>
         </p:cNvPr>
@@ -14751,7 +15187,7 @@
         <p:cNvPr id="1" name="">
           <a:extLst>
             <a:ext uri="{FF2B5EF4-FFF2-40B4-BE49-F238E27FC236}">
-              <a16:creationId xmlns="" xmlns:a16="http://schemas.microsoft.com/office/drawing/2014/main" id="{EF87400A-AA39-C6BD-0F50-19DF27F0BEE1}"/>
+              <a16:creationId xmlns:a16="http://schemas.microsoft.com/office/drawing/2014/main" xmlns="" id="{EF87400A-AA39-C6BD-0F50-19DF27F0BEE1}"/>
             </a:ext>
           </a:extLst>
         </p:cNvPr>
@@ -15242,7 +15678,7 @@
         <p:cNvPr id="1" name="">
           <a:extLst>
             <a:ext uri="{FF2B5EF4-FFF2-40B4-BE49-F238E27FC236}">
-              <a16:creationId xmlns="" xmlns:a16="http://schemas.microsoft.com/office/drawing/2014/main" id="{EF87400A-AA39-C6BD-0F50-19DF27F0BEE1}"/>
+              <a16:creationId xmlns:a16="http://schemas.microsoft.com/office/drawing/2014/main" xmlns="" id="{EF87400A-AA39-C6BD-0F50-19DF27F0BEE1}"/>
             </a:ext>
           </a:extLst>
         </p:cNvPr>
@@ -15559,7 +15995,7 @@
         <p:cNvPr id="1" name="">
           <a:extLst>
             <a:ext uri="{FF2B5EF4-FFF2-40B4-BE49-F238E27FC236}">
-              <a16:creationId xmlns="" xmlns:a16="http://schemas.microsoft.com/office/drawing/2014/main" id="{EF87400A-AA39-C6BD-0F50-19DF27F0BEE1}"/>
+              <a16:creationId xmlns:a16="http://schemas.microsoft.com/office/drawing/2014/main" xmlns="" id="{EF87400A-AA39-C6BD-0F50-19DF27F0BEE1}"/>
             </a:ext>
           </a:extLst>
         </p:cNvPr>
@@ -16203,7 +16639,7 @@
         <p:cNvPr id="1" name="">
           <a:extLst>
             <a:ext uri="{FF2B5EF4-FFF2-40B4-BE49-F238E27FC236}">
-              <a16:creationId xmlns="" xmlns:a16="http://schemas.microsoft.com/office/drawing/2014/main" id="{EF87400A-AA39-C6BD-0F50-19DF27F0BEE1}"/>
+              <a16:creationId xmlns:a16="http://schemas.microsoft.com/office/drawing/2014/main" xmlns="" id="{EF87400A-AA39-C6BD-0F50-19DF27F0BEE1}"/>
             </a:ext>
           </a:extLst>
         </p:cNvPr>
@@ -16404,7 +16840,7 @@
         <p:cNvPr id="1" name="">
           <a:extLst>
             <a:ext uri="{FF2B5EF4-FFF2-40B4-BE49-F238E27FC236}">
-              <a16:creationId xmlns="" xmlns:a16="http://schemas.microsoft.com/office/drawing/2014/main" id="{EF87400A-AA39-C6BD-0F50-19DF27F0BEE1}"/>
+              <a16:creationId xmlns:a16="http://schemas.microsoft.com/office/drawing/2014/main" xmlns="" id="{EF87400A-AA39-C6BD-0F50-19DF27F0BEE1}"/>
             </a:ext>
           </a:extLst>
         </p:cNvPr>
@@ -17136,7 +17572,7 @@
         <p:cNvPr id="1" name="">
           <a:extLst>
             <a:ext uri="{FF2B5EF4-FFF2-40B4-BE49-F238E27FC236}">
-              <a16:creationId xmlns="" xmlns:a16="http://schemas.microsoft.com/office/drawing/2014/main" id="{EF87400A-AA39-C6BD-0F50-19DF27F0BEE1}"/>
+              <a16:creationId xmlns:a16="http://schemas.microsoft.com/office/drawing/2014/main" xmlns="" id="{EF87400A-AA39-C6BD-0F50-19DF27F0BEE1}"/>
             </a:ext>
           </a:extLst>
         </p:cNvPr>
@@ -17329,11 +17765,7 @@
             </a:r>
             <a:r>
               <a:rPr lang="en-US" sz="2400" dirty="0" smtClean="0"/>
-              <a:t>add Batch Normalization, make learning rate dynamic, not </a:t>
-            </a:r>
-            <a:r>
-              <a:rPr lang="en-US" sz="2400" dirty="0" smtClean="0"/>
-              <a:t>static</a:t>
+              <a:t>add Batch Normalization, make learning rate dynamic, not static</a:t>
             </a:r>
           </a:p>
         </p:txBody>
@@ -17416,7 +17848,7 @@
         <p:cNvPr id="1" name="">
           <a:extLst>
             <a:ext uri="{FF2B5EF4-FFF2-40B4-BE49-F238E27FC236}">
-              <a16:creationId xmlns="" xmlns:a16="http://schemas.microsoft.com/office/drawing/2014/main" id="{EF87400A-AA39-C6BD-0F50-19DF27F0BEE1}"/>
+              <a16:creationId xmlns:a16="http://schemas.microsoft.com/office/drawing/2014/main" xmlns="" id="{EF87400A-AA39-C6BD-0F50-19DF27F0BEE1}"/>
             </a:ext>
           </a:extLst>
         </p:cNvPr>
@@ -17540,11 +17972,7 @@
             <a:pPr algn="l"/>
             <a:r>
               <a:rPr lang="en-US" sz="2400" dirty="0" smtClean="0"/>
-              <a:t>Training time: </a:t>
-            </a:r>
-            <a:r>
-              <a:rPr lang="en-US" sz="2400" dirty="0" smtClean="0"/>
-              <a:t>400 minutes</a:t>
+              <a:t>Training time: 400 minutes</a:t>
             </a:r>
             <a:endParaRPr lang="en-US" sz="2400" dirty="0"/>
           </a:p>
@@ -18217,7 +18645,7 @@
         <p:cNvPr id="1" name="">
           <a:extLst>
             <a:ext uri="{FF2B5EF4-FFF2-40B4-BE49-F238E27FC236}">
-              <a16:creationId xmlns="" xmlns:a16="http://schemas.microsoft.com/office/drawing/2014/main" id="{39288295-DCAF-069C-8B1B-4576B8E372BB}"/>
+              <a16:creationId xmlns:a16="http://schemas.microsoft.com/office/drawing/2014/main" xmlns="" id="{39288295-DCAF-069C-8B1B-4576B8E372BB}"/>
             </a:ext>
           </a:extLst>
         </p:cNvPr>
@@ -18237,7 +18665,7 @@
           <p:cNvPr id="7" name="Title 6">
             <a:extLst>
               <a:ext uri="{FF2B5EF4-FFF2-40B4-BE49-F238E27FC236}">
-                <a16:creationId xmlns="" xmlns:a16="http://schemas.microsoft.com/office/drawing/2014/main" id="{61F85EF1-69F5-5E4D-E911-359BF0A3DBF3}"/>
+                <a16:creationId xmlns:a16="http://schemas.microsoft.com/office/drawing/2014/main" xmlns="" id="{61F85EF1-69F5-5E4D-E911-359BF0A3DBF3}"/>
               </a:ext>
             </a:extLst>
           </p:cNvPr>
@@ -18278,7 +18706,7 @@
           <p:cNvPr id="8" name="TextBox 7">
             <a:extLst>
               <a:ext uri="{FF2B5EF4-FFF2-40B4-BE49-F238E27FC236}">
-                <a16:creationId xmlns="" xmlns:a16="http://schemas.microsoft.com/office/drawing/2014/main" id="{F8C56A79-35B0-9EBF-8FD3-C903CBFF847D}"/>
+                <a16:creationId xmlns:a16="http://schemas.microsoft.com/office/drawing/2014/main" xmlns="" id="{F8C56A79-35B0-9EBF-8FD3-C903CBFF847D}"/>
               </a:ext>
             </a:extLst>
           </p:cNvPr>
@@ -18401,7 +18829,7 @@
           <p:cNvPr id="2" name="TextBox 1">
             <a:extLst>
               <a:ext uri="{FF2B5EF4-FFF2-40B4-BE49-F238E27FC236}">
-                <a16:creationId xmlns="" xmlns:a16="http://schemas.microsoft.com/office/drawing/2014/main" id="{144EF226-6026-E052-DD93-BEC3F237B30F}"/>
+                <a16:creationId xmlns:a16="http://schemas.microsoft.com/office/drawing/2014/main" xmlns="" id="{144EF226-6026-E052-DD93-BEC3F237B30F}"/>
               </a:ext>
             </a:extLst>
           </p:cNvPr>
@@ -18541,7 +18969,7 @@
         <p:cNvPr id="1" name="">
           <a:extLst>
             <a:ext uri="{FF2B5EF4-FFF2-40B4-BE49-F238E27FC236}">
-              <a16:creationId xmlns="" xmlns:a16="http://schemas.microsoft.com/office/drawing/2014/main" id="{8C579E26-FA2D-1C68-DB27-3D2C268F6B28}"/>
+              <a16:creationId xmlns:a16="http://schemas.microsoft.com/office/drawing/2014/main" xmlns="" id="{EF87400A-AA39-C6BD-0F50-19DF27F0BEE1}"/>
             </a:ext>
           </a:extLst>
         </p:cNvPr>
@@ -18558,10 +18986,1187 @@
       </p:grpSpPr>
       <p:sp>
         <p:nvSpPr>
+          <p:cNvPr id="3" name="Прямоугольник 2"/>
+          <p:cNvSpPr/>
+          <p:nvPr/>
+        </p:nvSpPr>
+        <p:spPr>
+          <a:xfrm>
+            <a:off x="0" y="5658740"/>
+            <a:ext cx="1876926" cy="1200329"/>
+          </a:xfrm>
+          <a:prstGeom prst="rect">
+            <a:avLst/>
+          </a:prstGeom>
+        </p:spPr>
+        <p:txBody>
+          <a:bodyPr wrap="square">
+            <a:spAutoFit/>
+          </a:bodyPr>
+          <a:lstStyle/>
+          <a:p>
+            <a:r>
+              <a:rPr lang="en-US" sz="7200" dirty="0" smtClean="0">
+                <a:solidFill>
+                  <a:schemeClr val="bg1"/>
+                </a:solidFill>
+              </a:rPr>
+              <a:t>V</a:t>
+            </a:r>
+            <a:r>
+              <a:rPr lang="ru-RU" sz="7200" dirty="0">
+                <a:solidFill>
+                  <a:schemeClr val="bg1"/>
+                </a:solidFill>
+              </a:rPr>
+              <a:t>4</a:t>
+            </a:r>
+            <a:endParaRPr lang="ru-RU" sz="7200" dirty="0">
+              <a:solidFill>
+                <a:schemeClr val="bg1"/>
+              </a:solidFill>
+            </a:endParaRPr>
+          </a:p>
+        </p:txBody>
+      </p:sp>
+      <p:sp>
+        <p:nvSpPr>
+          <p:cNvPr id="13" name="Заголовок 1"/>
+          <p:cNvSpPr txBox="1">
+            <a:spLocks/>
+          </p:cNvSpPr>
+          <p:nvPr/>
+        </p:nvSpPr>
+        <p:spPr>
+          <a:xfrm>
+            <a:off x="2201925" y="173736"/>
+            <a:ext cx="7653418" cy="625642"/>
+          </a:xfrm>
+          <a:prstGeom prst="rect">
+            <a:avLst/>
+          </a:prstGeom>
+        </p:spPr>
+        <p:txBody>
+          <a:bodyPr vert="horz" lIns="91440" tIns="45720" rIns="91440" bIns="45720" rtlCol="0" anchor="ctr" anchorCtr="0">
+            <a:noAutofit/>
+          </a:bodyPr>
+          <a:lstStyle>
+            <a:lvl1pPr algn="ctr" defTabSz="914400" rtl="0" eaLnBrk="1" latinLnBrk="0" hangingPunct="1">
+              <a:lnSpc>
+                <a:spcPct val="90000"/>
+              </a:lnSpc>
+              <a:spcBef>
+                <a:spcPct val="0"/>
+              </a:spcBef>
+              <a:buNone/>
+              <a:defRPr sz="4800" kern="1200" cap="all" spc="300" baseline="0">
+                <a:solidFill>
+                  <a:schemeClr val="bg1"/>
+                </a:solidFill>
+                <a:latin typeface="+mj-lt"/>
+                <a:ea typeface="+mj-ea"/>
+                <a:cs typeface="+mj-cs"/>
+              </a:defRPr>
+            </a:lvl1pPr>
+          </a:lstStyle>
+          <a:p>
+            <a:r>
+              <a:rPr lang="en-US" sz="2800" dirty="0" smtClean="0"/>
+              <a:t>Results(52000 photos trained model)</a:t>
+            </a:r>
+            <a:endParaRPr lang="en-US" sz="2800" dirty="0"/>
+          </a:p>
+        </p:txBody>
+      </p:sp>
+      <p:pic>
+        <p:nvPicPr>
+          <p:cNvPr id="1026" name="Picture 2"/>
+          <p:cNvPicPr>
+            <a:picLocks noChangeAspect="1" noChangeArrowheads="1"/>
+          </p:cNvPicPr>
+          <p:nvPr/>
+        </p:nvPicPr>
+        <p:blipFill>
+          <a:blip r:embed="rId3">
+            <a:extLst>
+              <a:ext uri="{28A0092B-C50C-407E-A947-70E740481C1C}">
+                <a14:useLocalDpi xmlns:a14="http://schemas.microsoft.com/office/drawing/2010/main" val="0"/>
+              </a:ext>
+            </a:extLst>
+          </a:blip>
+          <a:srcRect/>
+          <a:stretch>
+            <a:fillRect/>
+          </a:stretch>
+        </p:blipFill>
+        <p:spPr bwMode="auto">
+          <a:xfrm>
+            <a:off x="0" y="940712"/>
+            <a:ext cx="5975748" cy="3214727"/>
+          </a:xfrm>
+          <a:prstGeom prst="rect">
+            <a:avLst/>
+          </a:prstGeom>
+          <a:noFill/>
+          <a:ln>
+            <a:noFill/>
+          </a:ln>
+          <a:effectLst/>
+          <a:extLst>
+            <a:ext uri="{909E8E84-426E-40DD-AFC4-6F175D3DCCD1}">
+              <a14:hiddenFill xmlns:a14="http://schemas.microsoft.com/office/drawing/2010/main">
+                <a:solidFill>
+                  <a:schemeClr val="accent1"/>
+                </a:solidFill>
+              </a14:hiddenFill>
+            </a:ext>
+            <a:ext uri="{91240B29-F687-4F45-9708-019B960494DF}">
+              <a14:hiddenLine xmlns:a14="http://schemas.microsoft.com/office/drawing/2010/main" w="9525">
+                <a:solidFill>
+                  <a:schemeClr val="tx1"/>
+                </a:solidFill>
+                <a:miter lim="800000"/>
+                <a:headEnd/>
+                <a:tailEnd/>
+              </a14:hiddenLine>
+            </a:ext>
+            <a:ext uri="{AF507438-7753-43E0-B8FC-AC1667EBCBE1}">
+              <a14:hiddenEffects xmlns:a14="http://schemas.microsoft.com/office/drawing/2010/main">
+                <a:effectLst>
+                  <a:outerShdw dist="35921" dir="2700000" algn="ctr" rotWithShape="0">
+                    <a:schemeClr val="bg2"/>
+                  </a:outerShdw>
+                </a:effectLst>
+              </a14:hiddenEffects>
+            </a:ext>
+          </a:extLst>
+        </p:spPr>
+      </p:pic>
+      <p:pic>
+        <p:nvPicPr>
+          <p:cNvPr id="1027" name="Picture 3"/>
+          <p:cNvPicPr>
+            <a:picLocks noChangeAspect="1" noChangeArrowheads="1"/>
+          </p:cNvPicPr>
+          <p:nvPr/>
+        </p:nvPicPr>
+        <p:blipFill>
+          <a:blip r:embed="rId4">
+            <a:extLst>
+              <a:ext uri="{28A0092B-C50C-407E-A947-70E740481C1C}">
+                <a14:useLocalDpi xmlns:a14="http://schemas.microsoft.com/office/drawing/2010/main" val="0"/>
+              </a:ext>
+            </a:extLst>
+          </a:blip>
+          <a:srcRect/>
+          <a:stretch>
+            <a:fillRect/>
+          </a:stretch>
+        </p:blipFill>
+        <p:spPr bwMode="auto">
+          <a:xfrm>
+            <a:off x="6028634" y="940712"/>
+            <a:ext cx="6165425" cy="3214727"/>
+          </a:xfrm>
+          <a:prstGeom prst="rect">
+            <a:avLst/>
+          </a:prstGeom>
+          <a:noFill/>
+          <a:ln>
+            <a:noFill/>
+          </a:ln>
+          <a:effectLst/>
+          <a:extLst>
+            <a:ext uri="{909E8E84-426E-40DD-AFC4-6F175D3DCCD1}">
+              <a14:hiddenFill xmlns:a14="http://schemas.microsoft.com/office/drawing/2010/main">
+                <a:solidFill>
+                  <a:schemeClr val="accent1"/>
+                </a:solidFill>
+              </a14:hiddenFill>
+            </a:ext>
+            <a:ext uri="{91240B29-F687-4F45-9708-019B960494DF}">
+              <a14:hiddenLine xmlns:a14="http://schemas.microsoft.com/office/drawing/2010/main" w="9525">
+                <a:solidFill>
+                  <a:schemeClr val="tx1"/>
+                </a:solidFill>
+                <a:miter lim="800000"/>
+                <a:headEnd/>
+                <a:tailEnd/>
+              </a14:hiddenLine>
+            </a:ext>
+            <a:ext uri="{AF507438-7753-43E0-B8FC-AC1667EBCBE1}">
+              <a14:hiddenEffects xmlns:a14="http://schemas.microsoft.com/office/drawing/2010/main">
+                <a:effectLst>
+                  <a:outerShdw dist="35921" dir="2700000" algn="ctr" rotWithShape="0">
+                    <a:schemeClr val="bg2"/>
+                  </a:outerShdw>
+                </a:effectLst>
+              </a14:hiddenEffects>
+            </a:ext>
+          </a:extLst>
+        </p:spPr>
+      </p:pic>
+      <p:pic>
+        <p:nvPicPr>
+          <p:cNvPr id="1028" name="Picture 4"/>
+          <p:cNvPicPr>
+            <a:picLocks noChangeAspect="1" noChangeArrowheads="1"/>
+          </p:cNvPicPr>
+          <p:nvPr/>
+        </p:nvPicPr>
+        <p:blipFill>
+          <a:blip r:embed="rId5">
+            <a:extLst>
+              <a:ext uri="{28A0092B-C50C-407E-A947-70E740481C1C}">
+                <a14:useLocalDpi xmlns:a14="http://schemas.microsoft.com/office/drawing/2010/main" val="0"/>
+              </a:ext>
+            </a:extLst>
+          </a:blip>
+          <a:srcRect/>
+          <a:stretch>
+            <a:fillRect/>
+          </a:stretch>
+        </p:blipFill>
+        <p:spPr bwMode="auto">
+          <a:xfrm>
+            <a:off x="3508105" y="4175449"/>
+            <a:ext cx="5041058" cy="2683619"/>
+          </a:xfrm>
+          <a:prstGeom prst="rect">
+            <a:avLst/>
+          </a:prstGeom>
+          <a:noFill/>
+          <a:ln>
+            <a:noFill/>
+          </a:ln>
+          <a:effectLst/>
+          <a:extLst>
+            <a:ext uri="{909E8E84-426E-40DD-AFC4-6F175D3DCCD1}">
+              <a14:hiddenFill xmlns:a14="http://schemas.microsoft.com/office/drawing/2010/main">
+                <a:solidFill>
+                  <a:schemeClr val="accent1"/>
+                </a:solidFill>
+              </a14:hiddenFill>
+            </a:ext>
+            <a:ext uri="{91240B29-F687-4F45-9708-019B960494DF}">
+              <a14:hiddenLine xmlns:a14="http://schemas.microsoft.com/office/drawing/2010/main" w="9525">
+                <a:solidFill>
+                  <a:schemeClr val="tx1"/>
+                </a:solidFill>
+                <a:miter lim="800000"/>
+                <a:headEnd/>
+                <a:tailEnd/>
+              </a14:hiddenLine>
+            </a:ext>
+            <a:ext uri="{AF507438-7753-43E0-B8FC-AC1667EBCBE1}">
+              <a14:hiddenEffects xmlns:a14="http://schemas.microsoft.com/office/drawing/2010/main">
+                <a:effectLst>
+                  <a:outerShdw dist="35921" dir="2700000" algn="ctr" rotWithShape="0">
+                    <a:schemeClr val="bg2"/>
+                  </a:outerShdw>
+                </a:effectLst>
+              </a14:hiddenEffects>
+            </a:ext>
+          </a:extLst>
+        </p:spPr>
+      </p:pic>
+    </p:spTree>
+    <p:extLst>
+      <p:ext uri="{BB962C8B-B14F-4D97-AF65-F5344CB8AC3E}">
+        <p14:creationId xmlns:p14="http://schemas.microsoft.com/office/powerpoint/2010/main" val="3844802703"/>
+      </p:ext>
+    </p:extLst>
+  </p:cSld>
+  <p:clrMapOvr>
+    <a:masterClrMapping/>
+  </p:clrMapOvr>
+</p:sld>
+</file>
+
+<file path=ppt/slides/slide31.xml><?xml version="1.0" encoding="utf-8"?>
+<p:sld xmlns:a="http://schemas.openxmlformats.org/drawingml/2006/main" xmlns:r="http://schemas.openxmlformats.org/officeDocument/2006/relationships" xmlns:p="http://schemas.openxmlformats.org/presentationml/2006/main">
+  <p:cSld>
+    <p:spTree>
+      <p:nvGrpSpPr>
+        <p:cNvPr id="1" name="">
+          <a:extLst>
+            <a:ext uri="{FF2B5EF4-FFF2-40B4-BE49-F238E27FC236}">
+              <a16:creationId xmlns:a16="http://schemas.microsoft.com/office/drawing/2014/main" xmlns="" id="{EF87400A-AA39-C6BD-0F50-19DF27F0BEE1}"/>
+            </a:ext>
+          </a:extLst>
+        </p:cNvPr>
+        <p:cNvGrpSpPr/>
+        <p:nvPr/>
+      </p:nvGrpSpPr>
+      <p:grpSpPr>
+        <a:xfrm>
+          <a:off x="0" y="0"/>
+          <a:ext cx="0" cy="0"/>
+          <a:chOff x="0" y="0"/>
+          <a:chExt cx="0" cy="0"/>
+        </a:xfrm>
+      </p:grpSpPr>
+      <p:sp>
+        <p:nvSpPr>
+          <p:cNvPr id="3" name="Прямоугольник 2"/>
+          <p:cNvSpPr/>
+          <p:nvPr/>
+        </p:nvSpPr>
+        <p:spPr>
+          <a:xfrm>
+            <a:off x="0" y="5658740"/>
+            <a:ext cx="1876926" cy="1200329"/>
+          </a:xfrm>
+          <a:prstGeom prst="rect">
+            <a:avLst/>
+          </a:prstGeom>
+        </p:spPr>
+        <p:txBody>
+          <a:bodyPr wrap="square">
+            <a:spAutoFit/>
+          </a:bodyPr>
+          <a:lstStyle/>
+          <a:p>
+            <a:r>
+              <a:rPr lang="en-US" sz="7200" dirty="0" smtClean="0">
+                <a:solidFill>
+                  <a:schemeClr val="bg1"/>
+                </a:solidFill>
+              </a:rPr>
+              <a:t>V</a:t>
+            </a:r>
+            <a:r>
+              <a:rPr lang="ru-RU" sz="7200" dirty="0">
+                <a:solidFill>
+                  <a:schemeClr val="bg1"/>
+                </a:solidFill>
+              </a:rPr>
+              <a:t>4</a:t>
+            </a:r>
+            <a:endParaRPr lang="ru-RU" sz="7200" dirty="0">
+              <a:solidFill>
+                <a:schemeClr val="bg1"/>
+              </a:solidFill>
+            </a:endParaRPr>
+          </a:p>
+        </p:txBody>
+      </p:sp>
+      <p:sp>
+        <p:nvSpPr>
+          <p:cNvPr id="13" name="Заголовок 1"/>
+          <p:cNvSpPr txBox="1">
+            <a:spLocks/>
+          </p:cNvSpPr>
+          <p:nvPr/>
+        </p:nvSpPr>
+        <p:spPr>
+          <a:xfrm>
+            <a:off x="2201925" y="173736"/>
+            <a:ext cx="7653418" cy="625642"/>
+          </a:xfrm>
+          <a:prstGeom prst="rect">
+            <a:avLst/>
+          </a:prstGeom>
+        </p:spPr>
+        <p:txBody>
+          <a:bodyPr vert="horz" lIns="91440" tIns="45720" rIns="91440" bIns="45720" rtlCol="0" anchor="ctr" anchorCtr="0">
+            <a:noAutofit/>
+          </a:bodyPr>
+          <a:lstStyle>
+            <a:lvl1pPr algn="ctr" defTabSz="914400" rtl="0" eaLnBrk="1" latinLnBrk="0" hangingPunct="1">
+              <a:lnSpc>
+                <a:spcPct val="90000"/>
+              </a:lnSpc>
+              <a:spcBef>
+                <a:spcPct val="0"/>
+              </a:spcBef>
+              <a:buNone/>
+              <a:defRPr sz="4800" kern="1200" cap="all" spc="300" baseline="0">
+                <a:solidFill>
+                  <a:schemeClr val="bg1"/>
+                </a:solidFill>
+                <a:latin typeface="+mj-lt"/>
+                <a:ea typeface="+mj-ea"/>
+                <a:cs typeface="+mj-cs"/>
+              </a:defRPr>
+            </a:lvl1pPr>
+          </a:lstStyle>
+          <a:p>
+            <a:r>
+              <a:rPr lang="en-US" sz="2800" dirty="0" smtClean="0"/>
+              <a:t>Results(52000 photos trained model)</a:t>
+            </a:r>
+            <a:endParaRPr lang="en-US" sz="2800" dirty="0"/>
+          </a:p>
+        </p:txBody>
+      </p:sp>
+      <p:pic>
+        <p:nvPicPr>
+          <p:cNvPr id="2050" name="Picture 2"/>
+          <p:cNvPicPr>
+            <a:picLocks noChangeAspect="1" noChangeArrowheads="1"/>
+          </p:cNvPicPr>
+          <p:nvPr/>
+        </p:nvPicPr>
+        <p:blipFill>
+          <a:blip r:embed="rId3">
+            <a:extLst>
+              <a:ext uri="{28A0092B-C50C-407E-A947-70E740481C1C}">
+                <a14:useLocalDpi xmlns:a14="http://schemas.microsoft.com/office/drawing/2010/main" val="0"/>
+              </a:ext>
+            </a:extLst>
+          </a:blip>
+          <a:srcRect/>
+          <a:stretch>
+            <a:fillRect/>
+          </a:stretch>
+        </p:blipFill>
+        <p:spPr bwMode="auto">
+          <a:xfrm>
+            <a:off x="4255179" y="888997"/>
+            <a:ext cx="3546909" cy="3546909"/>
+          </a:xfrm>
+          <a:prstGeom prst="rect">
+            <a:avLst/>
+          </a:prstGeom>
+          <a:noFill/>
+          <a:ln>
+            <a:noFill/>
+          </a:ln>
+          <a:effectLst/>
+          <a:extLst>
+            <a:ext uri="{909E8E84-426E-40DD-AFC4-6F175D3DCCD1}">
+              <a14:hiddenFill xmlns:a14="http://schemas.microsoft.com/office/drawing/2010/main">
+                <a:solidFill>
+                  <a:schemeClr val="accent1"/>
+                </a:solidFill>
+              </a14:hiddenFill>
+            </a:ext>
+            <a:ext uri="{91240B29-F687-4F45-9708-019B960494DF}">
+              <a14:hiddenLine xmlns:a14="http://schemas.microsoft.com/office/drawing/2010/main" w="9525">
+                <a:solidFill>
+                  <a:schemeClr val="tx1"/>
+                </a:solidFill>
+                <a:miter lim="800000"/>
+                <a:headEnd/>
+                <a:tailEnd/>
+              </a14:hiddenLine>
+            </a:ext>
+            <a:ext uri="{AF507438-7753-43E0-B8FC-AC1667EBCBE1}">
+              <a14:hiddenEffects xmlns:a14="http://schemas.microsoft.com/office/drawing/2010/main">
+                <a:effectLst>
+                  <a:outerShdw dist="35921" dir="2700000" algn="ctr" rotWithShape="0">
+                    <a:schemeClr val="bg2"/>
+                  </a:outerShdw>
+                </a:effectLst>
+              </a14:hiddenEffects>
+            </a:ext>
+          </a:extLst>
+        </p:spPr>
+      </p:pic>
+      <p:pic>
+        <p:nvPicPr>
+          <p:cNvPr id="2051" name="Picture 3"/>
+          <p:cNvPicPr>
+            <a:picLocks noChangeAspect="1" noChangeArrowheads="1"/>
+          </p:cNvPicPr>
+          <p:nvPr/>
+        </p:nvPicPr>
+        <p:blipFill>
+          <a:blip r:embed="rId4">
+            <a:extLst>
+              <a:ext uri="{28A0092B-C50C-407E-A947-70E740481C1C}">
+                <a14:useLocalDpi xmlns:a14="http://schemas.microsoft.com/office/drawing/2010/main" val="0"/>
+              </a:ext>
+            </a:extLst>
+          </a:blip>
+          <a:srcRect/>
+          <a:stretch>
+            <a:fillRect/>
+          </a:stretch>
+        </p:blipFill>
+        <p:spPr bwMode="auto">
+          <a:xfrm>
+            <a:off x="0" y="889000"/>
+            <a:ext cx="3556000" cy="3556000"/>
+          </a:xfrm>
+          <a:prstGeom prst="rect">
+            <a:avLst/>
+          </a:prstGeom>
+          <a:noFill/>
+          <a:ln>
+            <a:noFill/>
+          </a:ln>
+          <a:effectLst/>
+          <a:extLst>
+            <a:ext uri="{909E8E84-426E-40DD-AFC4-6F175D3DCCD1}">
+              <a14:hiddenFill xmlns:a14="http://schemas.microsoft.com/office/drawing/2010/main">
+                <a:solidFill>
+                  <a:schemeClr val="accent1"/>
+                </a:solidFill>
+              </a14:hiddenFill>
+            </a:ext>
+            <a:ext uri="{91240B29-F687-4F45-9708-019B960494DF}">
+              <a14:hiddenLine xmlns:a14="http://schemas.microsoft.com/office/drawing/2010/main" w="9525">
+                <a:solidFill>
+                  <a:schemeClr val="tx1"/>
+                </a:solidFill>
+                <a:miter lim="800000"/>
+                <a:headEnd/>
+                <a:tailEnd/>
+              </a14:hiddenLine>
+            </a:ext>
+            <a:ext uri="{AF507438-7753-43E0-B8FC-AC1667EBCBE1}">
+              <a14:hiddenEffects xmlns:a14="http://schemas.microsoft.com/office/drawing/2010/main">
+                <a:effectLst>
+                  <a:outerShdw dist="35921" dir="2700000" algn="ctr" rotWithShape="0">
+                    <a:schemeClr val="bg2"/>
+                  </a:outerShdw>
+                </a:effectLst>
+              </a14:hiddenEffects>
+            </a:ext>
+          </a:extLst>
+        </p:spPr>
+      </p:pic>
+      <p:pic>
+        <p:nvPicPr>
+          <p:cNvPr id="2052" name="Picture 4"/>
+          <p:cNvPicPr>
+            <a:picLocks noChangeAspect="1" noChangeArrowheads="1"/>
+          </p:cNvPicPr>
+          <p:nvPr/>
+        </p:nvPicPr>
+        <p:blipFill>
+          <a:blip r:embed="rId5">
+            <a:extLst>
+              <a:ext uri="{28A0092B-C50C-407E-A947-70E740481C1C}">
+                <a14:useLocalDpi xmlns:a14="http://schemas.microsoft.com/office/drawing/2010/main" val="0"/>
+              </a:ext>
+            </a:extLst>
+          </a:blip>
+          <a:srcRect/>
+          <a:stretch>
+            <a:fillRect/>
+          </a:stretch>
+        </p:blipFill>
+        <p:spPr bwMode="auto">
+          <a:xfrm>
+            <a:off x="8636000" y="890049"/>
+            <a:ext cx="3556000" cy="3556000"/>
+          </a:xfrm>
+          <a:prstGeom prst="rect">
+            <a:avLst/>
+          </a:prstGeom>
+          <a:noFill/>
+          <a:ln>
+            <a:noFill/>
+          </a:ln>
+          <a:effectLst/>
+          <a:extLst>
+            <a:ext uri="{909E8E84-426E-40DD-AFC4-6F175D3DCCD1}">
+              <a14:hiddenFill xmlns:a14="http://schemas.microsoft.com/office/drawing/2010/main">
+                <a:solidFill>
+                  <a:schemeClr val="accent1"/>
+                </a:solidFill>
+              </a14:hiddenFill>
+            </a:ext>
+            <a:ext uri="{91240B29-F687-4F45-9708-019B960494DF}">
+              <a14:hiddenLine xmlns:a14="http://schemas.microsoft.com/office/drawing/2010/main" w="9525">
+                <a:solidFill>
+                  <a:schemeClr val="tx1"/>
+                </a:solidFill>
+                <a:miter lim="800000"/>
+                <a:headEnd/>
+                <a:tailEnd/>
+              </a14:hiddenLine>
+            </a:ext>
+            <a:ext uri="{AF507438-7753-43E0-B8FC-AC1667EBCBE1}">
+              <a14:hiddenEffects xmlns:a14="http://schemas.microsoft.com/office/drawing/2010/main">
+                <a:effectLst>
+                  <a:outerShdw dist="35921" dir="2700000" algn="ctr" rotWithShape="0">
+                    <a:schemeClr val="bg2"/>
+                  </a:outerShdw>
+                </a:effectLst>
+              </a14:hiddenEffects>
+            </a:ext>
+          </a:extLst>
+        </p:spPr>
+      </p:pic>
+      <p:sp>
+        <p:nvSpPr>
+          <p:cNvPr id="10" name="Прямоугольник 9"/>
+          <p:cNvSpPr/>
+          <p:nvPr/>
+        </p:nvSpPr>
+        <p:spPr>
+          <a:xfrm>
+            <a:off x="839537" y="4435909"/>
+            <a:ext cx="1876926" cy="523220"/>
+          </a:xfrm>
+          <a:prstGeom prst="rect">
+            <a:avLst/>
+          </a:prstGeom>
+        </p:spPr>
+        <p:txBody>
+          <a:bodyPr wrap="square">
+            <a:spAutoFit/>
+          </a:bodyPr>
+          <a:lstStyle/>
+          <a:p>
+            <a:pPr algn="ctr"/>
+            <a:r>
+              <a:rPr lang="en-US" sz="2800" dirty="0" smtClean="0">
+                <a:solidFill>
+                  <a:schemeClr val="bg1"/>
+                </a:solidFill>
+              </a:rPr>
+              <a:t>PNG(32KB)</a:t>
+            </a:r>
+            <a:endParaRPr lang="ru-RU" sz="2800" dirty="0">
+              <a:solidFill>
+                <a:schemeClr val="bg1"/>
+              </a:solidFill>
+            </a:endParaRPr>
+          </a:p>
+        </p:txBody>
+      </p:sp>
+      <p:sp>
+        <p:nvSpPr>
+          <p:cNvPr id="11" name="Прямоугольник 10"/>
+          <p:cNvSpPr/>
+          <p:nvPr/>
+        </p:nvSpPr>
+        <p:spPr>
+          <a:xfrm>
+            <a:off x="9391048" y="4447098"/>
+            <a:ext cx="2045903" cy="523220"/>
+          </a:xfrm>
+          <a:prstGeom prst="rect">
+            <a:avLst/>
+          </a:prstGeom>
+        </p:spPr>
+        <p:txBody>
+          <a:bodyPr wrap="square">
+            <a:spAutoFit/>
+          </a:bodyPr>
+          <a:lstStyle/>
+          <a:p>
+            <a:pPr algn="ctr"/>
+            <a:r>
+              <a:rPr lang="en-US" sz="2800" dirty="0" smtClean="0">
+                <a:solidFill>
+                  <a:schemeClr val="bg1"/>
+                </a:solidFill>
+              </a:rPr>
+              <a:t>JPG(2.72KB)</a:t>
+            </a:r>
+            <a:endParaRPr lang="ru-RU" sz="2800" dirty="0">
+              <a:solidFill>
+                <a:schemeClr val="bg1"/>
+              </a:solidFill>
+            </a:endParaRPr>
+          </a:p>
+        </p:txBody>
+      </p:sp>
+      <p:sp>
+        <p:nvSpPr>
+          <p:cNvPr id="12" name="Прямоугольник 11"/>
+          <p:cNvSpPr/>
+          <p:nvPr/>
+        </p:nvSpPr>
+        <p:spPr>
+          <a:xfrm>
+            <a:off x="4255179" y="4427048"/>
+            <a:ext cx="3546909" cy="1384995"/>
+          </a:xfrm>
+          <a:prstGeom prst="rect">
+            <a:avLst/>
+          </a:prstGeom>
+        </p:spPr>
+        <p:txBody>
+          <a:bodyPr wrap="square">
+            <a:spAutoFit/>
+          </a:bodyPr>
+          <a:lstStyle/>
+          <a:p>
+            <a:pPr algn="ctr"/>
+            <a:r>
+              <a:rPr lang="en-US" sz="2800" dirty="0" smtClean="0">
+                <a:solidFill>
+                  <a:schemeClr val="bg1"/>
+                </a:solidFill>
+              </a:rPr>
+              <a:t>AI</a:t>
+            </a:r>
+          </a:p>
+          <a:p>
+            <a:pPr algn="ctr"/>
+            <a:r>
+              <a:rPr lang="en-US" sz="2800" dirty="0" smtClean="0">
+                <a:solidFill>
+                  <a:schemeClr val="bg1"/>
+                </a:solidFill>
+              </a:rPr>
+              <a:t>Compressed 2.2KB</a:t>
+            </a:r>
+          </a:p>
+          <a:p>
+            <a:pPr algn="ctr"/>
+            <a:r>
+              <a:rPr lang="en-US" sz="2800" dirty="0" smtClean="0">
+                <a:solidFill>
+                  <a:schemeClr val="bg1"/>
+                </a:solidFill>
+              </a:rPr>
+              <a:t>Decompressed 30.6KB</a:t>
+            </a:r>
+            <a:endParaRPr lang="ru-RU" sz="2800" dirty="0">
+              <a:solidFill>
+                <a:schemeClr val="bg1"/>
+              </a:solidFill>
+            </a:endParaRPr>
+          </a:p>
+        </p:txBody>
+      </p:sp>
+    </p:spTree>
+    <p:extLst>
+      <p:ext uri="{BB962C8B-B14F-4D97-AF65-F5344CB8AC3E}">
+        <p14:creationId xmlns:p14="http://schemas.microsoft.com/office/powerpoint/2010/main" val="2394293538"/>
+      </p:ext>
+    </p:extLst>
+  </p:cSld>
+  <p:clrMapOvr>
+    <a:masterClrMapping/>
+  </p:clrMapOvr>
+</p:sld>
+</file>
+
+<file path=ppt/slides/slide32.xml><?xml version="1.0" encoding="utf-8"?>
+<p:sld xmlns:a="http://schemas.openxmlformats.org/drawingml/2006/main" xmlns:r="http://schemas.openxmlformats.org/officeDocument/2006/relationships" xmlns:p="http://schemas.openxmlformats.org/presentationml/2006/main">
+  <p:cSld>
+    <p:spTree>
+      <p:nvGrpSpPr>
+        <p:cNvPr id="1" name="">
+          <a:extLst>
+            <a:ext uri="{FF2B5EF4-FFF2-40B4-BE49-F238E27FC236}">
+              <a16:creationId xmlns:a16="http://schemas.microsoft.com/office/drawing/2014/main" xmlns="" id="{EF87400A-AA39-C6BD-0F50-19DF27F0BEE1}"/>
+            </a:ext>
+          </a:extLst>
+        </p:cNvPr>
+        <p:cNvGrpSpPr/>
+        <p:nvPr/>
+      </p:nvGrpSpPr>
+      <p:grpSpPr>
+        <a:xfrm>
+          <a:off x="0" y="0"/>
+          <a:ext cx="0" cy="0"/>
+          <a:chOff x="0" y="0"/>
+          <a:chExt cx="0" cy="0"/>
+        </a:xfrm>
+      </p:grpSpPr>
+      <p:sp>
+        <p:nvSpPr>
+          <p:cNvPr id="13" name="Заголовок 1"/>
+          <p:cNvSpPr txBox="1">
+            <a:spLocks/>
+          </p:cNvSpPr>
+          <p:nvPr/>
+        </p:nvSpPr>
+        <p:spPr>
+          <a:xfrm>
+            <a:off x="1831156" y="2072640"/>
+            <a:ext cx="8394955" cy="2926080"/>
+          </a:xfrm>
+          <a:prstGeom prst="rect">
+            <a:avLst/>
+          </a:prstGeom>
+        </p:spPr>
+        <p:txBody>
+          <a:bodyPr vert="horz" lIns="91440" tIns="45720" rIns="91440" bIns="45720" rtlCol="0" anchor="ctr" anchorCtr="0">
+            <a:noAutofit/>
+          </a:bodyPr>
+          <a:lstStyle>
+            <a:lvl1pPr algn="ctr" defTabSz="914400" rtl="0" eaLnBrk="1" latinLnBrk="0" hangingPunct="1">
+              <a:lnSpc>
+                <a:spcPct val="90000"/>
+              </a:lnSpc>
+              <a:spcBef>
+                <a:spcPct val="0"/>
+              </a:spcBef>
+              <a:buNone/>
+              <a:defRPr sz="4800" kern="1200" cap="all" spc="300" baseline="0">
+                <a:solidFill>
+                  <a:schemeClr val="bg1"/>
+                </a:solidFill>
+                <a:latin typeface="+mj-lt"/>
+                <a:ea typeface="+mj-ea"/>
+                <a:cs typeface="+mj-cs"/>
+              </a:defRPr>
+            </a:lvl1pPr>
+          </a:lstStyle>
+          <a:p>
+            <a:r>
+              <a:rPr lang="en-US" sz="2800" dirty="0" smtClean="0"/>
+              <a:t>In step 5 we will compare the time of compression and the requirements for jpg/ai compression</a:t>
+            </a:r>
+          </a:p>
+          <a:p>
+            <a:endParaRPr lang="en-US" sz="2800" dirty="0" smtClean="0"/>
+          </a:p>
+          <a:p>
+            <a:r>
+              <a:rPr lang="en-US" sz="2800" dirty="0" smtClean="0"/>
+              <a:t>Then </a:t>
+            </a:r>
+            <a:r>
+              <a:rPr lang="en-US" sz="2800" dirty="0" smtClean="0"/>
+              <a:t>we will try to optimize the time of ai compression/decompression</a:t>
+            </a:r>
+            <a:endParaRPr lang="en-US" sz="2800" dirty="0"/>
+          </a:p>
+        </p:txBody>
+      </p:sp>
+      <p:sp>
+        <p:nvSpPr>
+          <p:cNvPr id="14" name="Прямоугольник 13"/>
+          <p:cNvSpPr/>
+          <p:nvPr/>
+        </p:nvSpPr>
+        <p:spPr>
+          <a:xfrm>
+            <a:off x="4499553" y="0"/>
+            <a:ext cx="3058160" cy="1200329"/>
+          </a:xfrm>
+          <a:prstGeom prst="rect">
+            <a:avLst/>
+          </a:prstGeom>
+        </p:spPr>
+        <p:txBody>
+          <a:bodyPr wrap="square">
+            <a:spAutoFit/>
+          </a:bodyPr>
+          <a:lstStyle/>
+          <a:p>
+            <a:r>
+              <a:rPr lang="en-US" sz="7200" dirty="0" smtClean="0">
+                <a:solidFill>
+                  <a:schemeClr val="bg1"/>
+                </a:solidFill>
+              </a:rPr>
+              <a:t>Step 5</a:t>
+            </a:r>
+            <a:endParaRPr lang="ru-RU" sz="7200" dirty="0">
+              <a:solidFill>
+                <a:schemeClr val="bg1"/>
+              </a:solidFill>
+            </a:endParaRPr>
+          </a:p>
+        </p:txBody>
+      </p:sp>
+    </p:spTree>
+    <p:extLst>
+      <p:ext uri="{BB962C8B-B14F-4D97-AF65-F5344CB8AC3E}">
+        <p14:creationId xmlns:p14="http://schemas.microsoft.com/office/powerpoint/2010/main" val="2669163139"/>
+      </p:ext>
+    </p:extLst>
+  </p:cSld>
+  <p:clrMapOvr>
+    <a:masterClrMapping/>
+  </p:clrMapOvr>
+</p:sld>
+</file>
+
+<file path=ppt/slides/slide33.xml><?xml version="1.0" encoding="utf-8"?>
+<p:sld xmlns:a="http://schemas.openxmlformats.org/drawingml/2006/main" xmlns:r="http://schemas.openxmlformats.org/officeDocument/2006/relationships" xmlns:p="http://schemas.openxmlformats.org/presentationml/2006/main">
+  <p:cSld>
+    <p:spTree>
+      <p:nvGrpSpPr>
+        <p:cNvPr id="1" name="">
+          <a:extLst>
+            <a:ext uri="{FF2B5EF4-FFF2-40B4-BE49-F238E27FC236}">
+              <a16:creationId xmlns:a16="http://schemas.microsoft.com/office/drawing/2014/main" xmlns="" id="{EF87400A-AA39-C6BD-0F50-19DF27F0BEE1}"/>
+            </a:ext>
+          </a:extLst>
+        </p:cNvPr>
+        <p:cNvGrpSpPr/>
+        <p:nvPr/>
+      </p:nvGrpSpPr>
+      <p:grpSpPr>
+        <a:xfrm>
+          <a:off x="0" y="0"/>
+          <a:ext cx="0" cy="0"/>
+          <a:chOff x="0" y="0"/>
+          <a:chExt cx="0" cy="0"/>
+        </a:xfrm>
+      </p:grpSpPr>
+      <p:sp>
+        <p:nvSpPr>
+          <p:cNvPr id="13" name="Заголовок 1"/>
+          <p:cNvSpPr txBox="1">
+            <a:spLocks/>
+          </p:cNvSpPr>
+          <p:nvPr/>
+        </p:nvSpPr>
+        <p:spPr>
+          <a:xfrm>
+            <a:off x="451971" y="1595120"/>
+            <a:ext cx="4549324" cy="2682240"/>
+          </a:xfrm>
+          <a:prstGeom prst="rect">
+            <a:avLst/>
+          </a:prstGeom>
+        </p:spPr>
+        <p:txBody>
+          <a:bodyPr vert="horz" lIns="91440" tIns="45720" rIns="91440" bIns="45720" rtlCol="0" anchor="ctr" anchorCtr="0">
+            <a:noAutofit/>
+          </a:bodyPr>
+          <a:lstStyle>
+            <a:lvl1pPr algn="ctr" defTabSz="914400" rtl="0" eaLnBrk="1" latinLnBrk="0" hangingPunct="1">
+              <a:lnSpc>
+                <a:spcPct val="90000"/>
+              </a:lnSpc>
+              <a:spcBef>
+                <a:spcPct val="0"/>
+              </a:spcBef>
+              <a:buNone/>
+              <a:defRPr sz="4800" kern="1200" cap="all" spc="300" baseline="0">
+                <a:solidFill>
+                  <a:schemeClr val="bg1"/>
+                </a:solidFill>
+                <a:latin typeface="+mj-lt"/>
+                <a:ea typeface="+mj-ea"/>
+                <a:cs typeface="+mj-cs"/>
+              </a:defRPr>
+            </a:lvl1pPr>
+          </a:lstStyle>
+          <a:p>
+            <a:r>
+              <a:rPr lang="en-US" sz="2800" dirty="0" smtClean="0"/>
+              <a:t>JPG</a:t>
+            </a:r>
+            <a:endParaRPr lang="ru-RU" sz="2800" dirty="0" smtClean="0"/>
+          </a:p>
+          <a:p>
+            <a:r>
+              <a:rPr lang="en-US" sz="2800" dirty="0" smtClean="0"/>
+              <a:t>CT - </a:t>
+            </a:r>
+            <a:r>
+              <a:rPr lang="ru-RU" sz="2800" dirty="0" smtClean="0"/>
+              <a:t>0.0005</a:t>
+            </a:r>
+            <a:r>
+              <a:rPr lang="en-US" sz="2800" dirty="0" smtClean="0"/>
+              <a:t> seconds</a:t>
+            </a:r>
+            <a:endParaRPr lang="en-US" sz="2800" dirty="0" smtClean="0"/>
+          </a:p>
+        </p:txBody>
+      </p:sp>
+      <p:sp>
+        <p:nvSpPr>
+          <p:cNvPr id="14" name="Прямоугольник 13"/>
+          <p:cNvSpPr/>
+          <p:nvPr/>
+        </p:nvSpPr>
+        <p:spPr>
+          <a:xfrm>
+            <a:off x="2726633" y="-1"/>
+            <a:ext cx="6604000" cy="1200329"/>
+          </a:xfrm>
+          <a:prstGeom prst="rect">
+            <a:avLst/>
+          </a:prstGeom>
+        </p:spPr>
+        <p:txBody>
+          <a:bodyPr wrap="square">
+            <a:spAutoFit/>
+          </a:bodyPr>
+          <a:lstStyle/>
+          <a:p>
+            <a:r>
+              <a:rPr lang="en-US" sz="7200" dirty="0" smtClean="0">
+                <a:solidFill>
+                  <a:schemeClr val="bg1"/>
+                </a:solidFill>
+              </a:rPr>
+              <a:t>Time comparison</a:t>
+            </a:r>
+            <a:endParaRPr lang="ru-RU" sz="7200" dirty="0">
+              <a:solidFill>
+                <a:schemeClr val="bg1"/>
+              </a:solidFill>
+            </a:endParaRPr>
+          </a:p>
+        </p:txBody>
+      </p:sp>
+      <p:sp>
+        <p:nvSpPr>
+          <p:cNvPr id="4" name="Заголовок 1"/>
+          <p:cNvSpPr txBox="1">
+            <a:spLocks/>
+          </p:cNvSpPr>
+          <p:nvPr/>
+        </p:nvSpPr>
+        <p:spPr>
+          <a:xfrm>
+            <a:off x="6456531" y="1595120"/>
+            <a:ext cx="4549324" cy="2682240"/>
+          </a:xfrm>
+          <a:prstGeom prst="rect">
+            <a:avLst/>
+          </a:prstGeom>
+        </p:spPr>
+        <p:txBody>
+          <a:bodyPr vert="horz" lIns="91440" tIns="45720" rIns="91440" bIns="45720" rtlCol="0" anchor="ctr" anchorCtr="0">
+            <a:noAutofit/>
+          </a:bodyPr>
+          <a:lstStyle>
+            <a:lvl1pPr algn="ctr" defTabSz="914400" rtl="0" eaLnBrk="1" latinLnBrk="0" hangingPunct="1">
+              <a:lnSpc>
+                <a:spcPct val="90000"/>
+              </a:lnSpc>
+              <a:spcBef>
+                <a:spcPct val="0"/>
+              </a:spcBef>
+              <a:buNone/>
+              <a:defRPr sz="4800" kern="1200" cap="all" spc="300" baseline="0">
+                <a:solidFill>
+                  <a:schemeClr val="bg1"/>
+                </a:solidFill>
+                <a:latin typeface="+mj-lt"/>
+                <a:ea typeface="+mj-ea"/>
+                <a:cs typeface="+mj-cs"/>
+              </a:defRPr>
+            </a:lvl1pPr>
+          </a:lstStyle>
+          <a:p>
+            <a:r>
+              <a:rPr lang="en-US" sz="2800" dirty="0" smtClean="0"/>
+              <a:t>AI</a:t>
+            </a:r>
+          </a:p>
+          <a:p>
+            <a:r>
+              <a:rPr lang="en-US" sz="2800" dirty="0"/>
+              <a:t>CT - </a:t>
+            </a:r>
+            <a:r>
+              <a:rPr lang="en-US" sz="2800" dirty="0" smtClean="0"/>
+              <a:t>0.0295 seconds</a:t>
+            </a:r>
+          </a:p>
+          <a:p>
+            <a:r>
+              <a:rPr lang="en-US" sz="2800" dirty="0"/>
+              <a:t>DT - </a:t>
+            </a:r>
+            <a:r>
+              <a:rPr lang="en-US" sz="2800" dirty="0" smtClean="0"/>
+              <a:t>0.0098 seconds</a:t>
+            </a:r>
+          </a:p>
+          <a:p>
+            <a:endParaRPr lang="en-US" sz="2800" dirty="0"/>
+          </a:p>
+          <a:p>
+            <a:r>
+              <a:rPr lang="en-US" sz="2000" dirty="0" smtClean="0"/>
+              <a:t>All numbers include LZMA and quantization</a:t>
+            </a:r>
+            <a:endParaRPr lang="en-US" sz="2000" dirty="0"/>
+          </a:p>
+        </p:txBody>
+      </p:sp>
+      <p:sp>
+        <p:nvSpPr>
+          <p:cNvPr id="2" name="Прямоугольник 1"/>
+          <p:cNvSpPr/>
+          <p:nvPr/>
+        </p:nvSpPr>
+        <p:spPr>
+          <a:xfrm>
+            <a:off x="4732989" y="6200894"/>
+            <a:ext cx="2591287" cy="646331"/>
+          </a:xfrm>
+          <a:prstGeom prst="rect">
+            <a:avLst/>
+          </a:prstGeom>
+        </p:spPr>
+        <p:txBody>
+          <a:bodyPr wrap="none">
+            <a:spAutoFit/>
+          </a:bodyPr>
+          <a:lstStyle/>
+          <a:p>
+            <a:r>
+              <a:rPr lang="en-US" i="1" dirty="0" smtClean="0">
+                <a:solidFill>
+                  <a:schemeClr val="bg1"/>
+                </a:solidFill>
+              </a:rPr>
+              <a:t>CT - Compression time</a:t>
+            </a:r>
+          </a:p>
+          <a:p>
+            <a:r>
+              <a:rPr lang="en-US" i="1" dirty="0" smtClean="0">
+                <a:solidFill>
+                  <a:schemeClr val="bg1"/>
+                </a:solidFill>
+              </a:rPr>
+              <a:t>DT – Decompression time</a:t>
+            </a:r>
+            <a:endParaRPr lang="ru-RU" i="1" dirty="0">
+              <a:solidFill>
+                <a:schemeClr val="bg1"/>
+              </a:solidFill>
+            </a:endParaRPr>
+          </a:p>
+        </p:txBody>
+      </p:sp>
+    </p:spTree>
+    <p:extLst>
+      <p:ext uri="{BB962C8B-B14F-4D97-AF65-F5344CB8AC3E}">
+        <p14:creationId xmlns:p14="http://schemas.microsoft.com/office/powerpoint/2010/main" val="357402327"/>
+      </p:ext>
+    </p:extLst>
+  </p:cSld>
+  <p:clrMapOvr>
+    <a:masterClrMapping/>
+  </p:clrMapOvr>
+</p:sld>
+</file>
+
+<file path=ppt/slides/slide34.xml><?xml version="1.0" encoding="utf-8"?>
+<p:sld xmlns:a="http://schemas.openxmlformats.org/drawingml/2006/main" xmlns:r="http://schemas.openxmlformats.org/officeDocument/2006/relationships" xmlns:p="http://schemas.openxmlformats.org/presentationml/2006/main">
+  <p:cSld>
+    <p:spTree>
+      <p:nvGrpSpPr>
+        <p:cNvPr id="1" name="">
+          <a:extLst>
+            <a:ext uri="{FF2B5EF4-FFF2-40B4-BE49-F238E27FC236}">
+              <a16:creationId xmlns:a16="http://schemas.microsoft.com/office/drawing/2014/main" xmlns="" id="{8C579E26-FA2D-1C68-DB27-3D2C268F6B28}"/>
+            </a:ext>
+          </a:extLst>
+        </p:cNvPr>
+        <p:cNvGrpSpPr/>
+        <p:nvPr/>
+      </p:nvGrpSpPr>
+      <p:grpSpPr>
+        <a:xfrm>
+          <a:off x="0" y="0"/>
+          <a:ext cx="0" cy="0"/>
+          <a:chOff x="0" y="0"/>
+          <a:chExt cx="0" cy="0"/>
+        </a:xfrm>
+      </p:grpSpPr>
+      <p:sp>
+        <p:nvSpPr>
           <p:cNvPr id="7" name="Title 6">
             <a:extLst>
               <a:ext uri="{FF2B5EF4-FFF2-40B4-BE49-F238E27FC236}">
-                <a16:creationId xmlns="" xmlns:a16="http://schemas.microsoft.com/office/drawing/2014/main" id="{44A692C1-E622-D699-43E0-1ECB59404096}"/>
+                <a16:creationId xmlns:a16="http://schemas.microsoft.com/office/drawing/2014/main" xmlns="" id="{44A692C1-E622-D699-43E0-1ECB59404096}"/>
               </a:ext>
             </a:extLst>
           </p:cNvPr>
@@ -18620,7 +20225,7 @@
         <p:cNvPr id="1" name="">
           <a:extLst>
             <a:ext uri="{FF2B5EF4-FFF2-40B4-BE49-F238E27FC236}">
-              <a16:creationId xmlns="" xmlns:a16="http://schemas.microsoft.com/office/drawing/2014/main" id="{953B6214-BA54-21CA-C08F-F6E6CD6F9476}"/>
+              <a16:creationId xmlns:a16="http://schemas.microsoft.com/office/drawing/2014/main" xmlns="" id="{953B6214-BA54-21CA-C08F-F6E6CD6F9476}"/>
             </a:ext>
           </a:extLst>
         </p:cNvPr>
@@ -18640,7 +20245,7 @@
           <p:cNvPr id="7" name="Title 6">
             <a:extLst>
               <a:ext uri="{FF2B5EF4-FFF2-40B4-BE49-F238E27FC236}">
-                <a16:creationId xmlns="" xmlns:a16="http://schemas.microsoft.com/office/drawing/2014/main" id="{D1FCF065-2D37-1687-8F8E-2906BCCE04C9}"/>
+                <a16:creationId xmlns:a16="http://schemas.microsoft.com/office/drawing/2014/main" xmlns="" id="{D1FCF065-2D37-1687-8F8E-2906BCCE04C9}"/>
               </a:ext>
             </a:extLst>
           </p:cNvPr>
@@ -18680,7 +20285,7 @@
           <p:cNvPr id="8" name="TextBox 7">
             <a:extLst>
               <a:ext uri="{FF2B5EF4-FFF2-40B4-BE49-F238E27FC236}">
-                <a16:creationId xmlns="" xmlns:a16="http://schemas.microsoft.com/office/drawing/2014/main" id="{829DCAF4-0E7A-EA3D-F623-CCC0F2F22DFF}"/>
+                <a16:creationId xmlns:a16="http://schemas.microsoft.com/office/drawing/2014/main" xmlns="" id="{829DCAF4-0E7A-EA3D-F623-CCC0F2F22DFF}"/>
               </a:ext>
             </a:extLst>
           </p:cNvPr>
@@ -18819,7 +20424,7 @@
           <p:cNvPr id="3" name="TextBox 2">
             <a:extLst>
               <a:ext uri="{FF2B5EF4-FFF2-40B4-BE49-F238E27FC236}">
-                <a16:creationId xmlns="" xmlns:a16="http://schemas.microsoft.com/office/drawing/2014/main" id="{C529289A-69EA-F080-93CD-30695BDBF134}"/>
+                <a16:creationId xmlns:a16="http://schemas.microsoft.com/office/drawing/2014/main" xmlns="" id="{C529289A-69EA-F080-93CD-30695BDBF134}"/>
               </a:ext>
             </a:extLst>
           </p:cNvPr>
@@ -18921,7 +20526,7 @@
           <p:cNvPr id="6" name="TextBox 5">
             <a:extLst>
               <a:ext uri="{FF2B5EF4-FFF2-40B4-BE49-F238E27FC236}">
-                <a16:creationId xmlns="" xmlns:a16="http://schemas.microsoft.com/office/drawing/2014/main" id="{3C9745D3-7387-F090-C452-2E45D43F0971}"/>
+                <a16:creationId xmlns:a16="http://schemas.microsoft.com/office/drawing/2014/main" xmlns="" id="{3C9745D3-7387-F090-C452-2E45D43F0971}"/>
               </a:ext>
             </a:extLst>
           </p:cNvPr>
@@ -19056,7 +20661,7 @@
           <p:cNvPr id="9" name="Rectangle 8">
             <a:extLst>
               <a:ext uri="{FF2B5EF4-FFF2-40B4-BE49-F238E27FC236}">
-                <a16:creationId xmlns="" xmlns:a16="http://schemas.microsoft.com/office/drawing/2014/main" id="{3F9A327E-7B0F-6322-F8E7-5226A4116A9B}"/>
+                <a16:creationId xmlns:a16="http://schemas.microsoft.com/office/drawing/2014/main" xmlns="" id="{3F9A327E-7B0F-6322-F8E7-5226A4116A9B}"/>
               </a:ext>
             </a:extLst>
           </p:cNvPr>
@@ -19128,7 +20733,7 @@
         <p:cNvPr id="1" name="">
           <a:extLst>
             <a:ext uri="{FF2B5EF4-FFF2-40B4-BE49-F238E27FC236}">
-              <a16:creationId xmlns="" xmlns:a16="http://schemas.microsoft.com/office/drawing/2014/main" id="{00AB00F2-1ABB-46F7-FBD3-B7149DCD1A5B}"/>
+              <a16:creationId xmlns:a16="http://schemas.microsoft.com/office/drawing/2014/main" xmlns="" id="{00AB00F2-1ABB-46F7-FBD3-B7149DCD1A5B}"/>
             </a:ext>
           </a:extLst>
         </p:cNvPr>
@@ -19148,7 +20753,7 @@
           <p:cNvPr id="7" name="Title 6">
             <a:extLst>
               <a:ext uri="{FF2B5EF4-FFF2-40B4-BE49-F238E27FC236}">
-                <a16:creationId xmlns="" xmlns:a16="http://schemas.microsoft.com/office/drawing/2014/main" id="{65745319-EE7D-296C-2FFE-F56F0B6538A0}"/>
+                <a16:creationId xmlns:a16="http://schemas.microsoft.com/office/drawing/2014/main" xmlns="" id="{65745319-EE7D-296C-2FFE-F56F0B6538A0}"/>
               </a:ext>
             </a:extLst>
           </p:cNvPr>
@@ -19188,7 +20793,7 @@
           <p:cNvPr id="8" name="TextBox 7">
             <a:extLst>
               <a:ext uri="{FF2B5EF4-FFF2-40B4-BE49-F238E27FC236}">
-                <a16:creationId xmlns="" xmlns:a16="http://schemas.microsoft.com/office/drawing/2014/main" id="{6D710782-0111-EEBD-02DC-6E7ACC855995}"/>
+                <a16:creationId xmlns:a16="http://schemas.microsoft.com/office/drawing/2014/main" xmlns="" id="{6D710782-0111-EEBD-02DC-6E7ACC855995}"/>
               </a:ext>
             </a:extLst>
           </p:cNvPr>
@@ -19235,7 +20840,7 @@
           <p:cNvPr id="9" name="TextBox 8">
             <a:extLst>
               <a:ext uri="{FF2B5EF4-FFF2-40B4-BE49-F238E27FC236}">
-                <a16:creationId xmlns="" xmlns:a16="http://schemas.microsoft.com/office/drawing/2014/main" id="{AE941EAD-4479-E631-4FC0-8E1DFBDB66EF}"/>
+                <a16:creationId xmlns:a16="http://schemas.microsoft.com/office/drawing/2014/main" xmlns="" id="{AE941EAD-4479-E631-4FC0-8E1DFBDB66EF}"/>
               </a:ext>
             </a:extLst>
           </p:cNvPr>
@@ -19289,7 +20894,7 @@
           <p:cNvPr id="2" name="Rectangle 1">
             <a:extLst>
               <a:ext uri="{FF2B5EF4-FFF2-40B4-BE49-F238E27FC236}">
-                <a16:creationId xmlns="" xmlns:a16="http://schemas.microsoft.com/office/drawing/2014/main" id="{8BE59029-112F-330F-CBC2-D013521EFC34}"/>
+                <a16:creationId xmlns:a16="http://schemas.microsoft.com/office/drawing/2014/main" xmlns="" id="{8BE59029-112F-330F-CBC2-D013521EFC34}"/>
               </a:ext>
             </a:extLst>
           </p:cNvPr>
@@ -19345,7 +20950,7 @@
           <p:cNvPr id="3" name="TextBox 2">
             <a:extLst>
               <a:ext uri="{FF2B5EF4-FFF2-40B4-BE49-F238E27FC236}">
-                <a16:creationId xmlns="" xmlns:a16="http://schemas.microsoft.com/office/drawing/2014/main" id="{E5DE46A3-2E10-F599-6F94-3604A4BB1603}"/>
+                <a16:creationId xmlns:a16="http://schemas.microsoft.com/office/drawing/2014/main" xmlns="" id="{E5DE46A3-2E10-F599-6F94-3604A4BB1603}"/>
               </a:ext>
             </a:extLst>
           </p:cNvPr>
@@ -19392,7 +20997,7 @@
           <p:cNvPr id="4" name="Rectangle 3">
             <a:extLst>
               <a:ext uri="{FF2B5EF4-FFF2-40B4-BE49-F238E27FC236}">
-                <a16:creationId xmlns="" xmlns:a16="http://schemas.microsoft.com/office/drawing/2014/main" id="{09F4D9B4-F12A-0A44-0AFA-0BFA209DAD40}"/>
+                <a16:creationId xmlns:a16="http://schemas.microsoft.com/office/drawing/2014/main" xmlns="" id="{09F4D9B4-F12A-0A44-0AFA-0BFA209DAD40}"/>
               </a:ext>
             </a:extLst>
           </p:cNvPr>
@@ -19448,7 +21053,7 @@
           <p:cNvPr id="5" name="TextBox 4">
             <a:extLst>
               <a:ext uri="{FF2B5EF4-FFF2-40B4-BE49-F238E27FC236}">
-                <a16:creationId xmlns="" xmlns:a16="http://schemas.microsoft.com/office/drawing/2014/main" id="{4B8F1482-E9ED-644D-56F0-2E8E230275E4}"/>
+                <a16:creationId xmlns:a16="http://schemas.microsoft.com/office/drawing/2014/main" xmlns="" id="{4B8F1482-E9ED-644D-56F0-2E8E230275E4}"/>
               </a:ext>
             </a:extLst>
           </p:cNvPr>
@@ -19502,7 +21107,7 @@
           <p:cNvPr id="6" name="Rectangle 5">
             <a:extLst>
               <a:ext uri="{FF2B5EF4-FFF2-40B4-BE49-F238E27FC236}">
-                <a16:creationId xmlns="" xmlns:a16="http://schemas.microsoft.com/office/drawing/2014/main" id="{F36FF003-B68C-97DC-B023-B640B58811FB}"/>
+                <a16:creationId xmlns:a16="http://schemas.microsoft.com/office/drawing/2014/main" xmlns="" id="{F36FF003-B68C-97DC-B023-B640B58811FB}"/>
               </a:ext>
             </a:extLst>
           </p:cNvPr>
@@ -19566,7 +21171,7 @@
           <p:cNvPr id="10" name="TextBox 9">
             <a:extLst>
               <a:ext uri="{FF2B5EF4-FFF2-40B4-BE49-F238E27FC236}">
-                <a16:creationId xmlns="" xmlns:a16="http://schemas.microsoft.com/office/drawing/2014/main" id="{23E42A81-E323-6371-B6FE-90B77C71CF1C}"/>
+                <a16:creationId xmlns:a16="http://schemas.microsoft.com/office/drawing/2014/main" xmlns="" id="{23E42A81-E323-6371-B6FE-90B77C71CF1C}"/>
               </a:ext>
             </a:extLst>
           </p:cNvPr>
@@ -19620,7 +21225,7 @@
           <p:cNvPr id="12" name="Picture 11" descr="A white snake with blue eyes&#10;&#10;AI-generated content may be incorrect.">
             <a:extLst>
               <a:ext uri="{FF2B5EF4-FFF2-40B4-BE49-F238E27FC236}">
-                <a16:creationId xmlns="" xmlns:a16="http://schemas.microsoft.com/office/drawing/2014/main" id="{D9DE6AA5-2528-AC56-C9A1-0E28C374E6CD}"/>
+                <a16:creationId xmlns:a16="http://schemas.microsoft.com/office/drawing/2014/main" xmlns="" id="{D9DE6AA5-2528-AC56-C9A1-0E28C374E6CD}"/>
               </a:ext>
             </a:extLst>
           </p:cNvPr>
@@ -19656,7 +21261,7 @@
           <p:cNvPr id="14" name="Picture 13" descr="A black background with white text&#10;&#10;AI-generated content may be incorrect.">
             <a:extLst>
               <a:ext uri="{FF2B5EF4-FFF2-40B4-BE49-F238E27FC236}">
-                <a16:creationId xmlns="" xmlns:a16="http://schemas.microsoft.com/office/drawing/2014/main" id="{E5F34F0F-1868-BDDA-B7A2-4B9B8D5E70C7}"/>
+                <a16:creationId xmlns:a16="http://schemas.microsoft.com/office/drawing/2014/main" xmlns="" id="{E5F34F0F-1868-BDDA-B7A2-4B9B8D5E70C7}"/>
               </a:ext>
             </a:extLst>
           </p:cNvPr>
@@ -19692,7 +21297,7 @@
           <p:cNvPr id="16" name="Picture 15" descr="A black and green symbol with a checkered pattern&#10;&#10;AI-generated content may be incorrect.">
             <a:extLst>
               <a:ext uri="{FF2B5EF4-FFF2-40B4-BE49-F238E27FC236}">
-                <a16:creationId xmlns="" xmlns:a16="http://schemas.microsoft.com/office/drawing/2014/main" id="{45DD2A95-1335-EFEF-D0FB-5A8AFC7B3575}"/>
+                <a16:creationId xmlns:a16="http://schemas.microsoft.com/office/drawing/2014/main" xmlns="" id="{45DD2A95-1335-EFEF-D0FB-5A8AFC7B3575}"/>
               </a:ext>
             </a:extLst>
           </p:cNvPr>
@@ -19728,7 +21333,7 @@
           <p:cNvPr id="18" name="Picture 17" descr="A purple rectangular object with white text&#10;&#10;AI-generated content may be incorrect.">
             <a:extLst>
               <a:ext uri="{FF2B5EF4-FFF2-40B4-BE49-F238E27FC236}">
-                <a16:creationId xmlns="" xmlns:a16="http://schemas.microsoft.com/office/drawing/2014/main" id="{748AF984-AFF8-25B6-3929-06533135F867}"/>
+                <a16:creationId xmlns:a16="http://schemas.microsoft.com/office/drawing/2014/main" xmlns="" id="{748AF984-AFF8-25B6-3929-06533135F867}"/>
               </a:ext>
             </a:extLst>
           </p:cNvPr>
@@ -19764,7 +21369,7 @@
           <p:cNvPr id="20" name="Picture 19">
             <a:extLst>
               <a:ext uri="{FF2B5EF4-FFF2-40B4-BE49-F238E27FC236}">
-                <a16:creationId xmlns="" xmlns:a16="http://schemas.microsoft.com/office/drawing/2014/main" id="{995B517E-6B59-0EDF-176D-2C3A8DDD1E24}"/>
+                <a16:creationId xmlns:a16="http://schemas.microsoft.com/office/drawing/2014/main" xmlns="" id="{995B517E-6B59-0EDF-176D-2C3A8DDD1E24}"/>
               </a:ext>
             </a:extLst>
           </p:cNvPr>
@@ -19800,7 +21405,7 @@
           <p:cNvPr id="22" name="Picture 21" descr="A math equations and symbols&#10;&#10;AI-generated content may be incorrect.">
             <a:extLst>
               <a:ext uri="{FF2B5EF4-FFF2-40B4-BE49-F238E27FC236}">
-                <a16:creationId xmlns="" xmlns:a16="http://schemas.microsoft.com/office/drawing/2014/main" id="{F5515C3C-6DE4-6DC0-C477-32381037F16D}"/>
+                <a16:creationId xmlns:a16="http://schemas.microsoft.com/office/drawing/2014/main" xmlns="" id="{F5515C3C-6DE4-6DC0-C477-32381037F16D}"/>
               </a:ext>
             </a:extLst>
           </p:cNvPr>
@@ -19852,7 +21457,7 @@
         <p:cNvPr id="1" name="">
           <a:extLst>
             <a:ext uri="{FF2B5EF4-FFF2-40B4-BE49-F238E27FC236}">
-              <a16:creationId xmlns="" xmlns:a16="http://schemas.microsoft.com/office/drawing/2014/main" id="{DBE5E39A-F5D5-D29E-5B7F-DCFE051AAE1B}"/>
+              <a16:creationId xmlns:a16="http://schemas.microsoft.com/office/drawing/2014/main" xmlns="" id="{DBE5E39A-F5D5-D29E-5B7F-DCFE051AAE1B}"/>
             </a:ext>
           </a:extLst>
         </p:cNvPr>
@@ -19872,7 +21477,7 @@
           <p:cNvPr id="7" name="Title 6">
             <a:extLst>
               <a:ext uri="{FF2B5EF4-FFF2-40B4-BE49-F238E27FC236}">
-                <a16:creationId xmlns="" xmlns:a16="http://schemas.microsoft.com/office/drawing/2014/main" id="{B4656742-F44E-DEB8-0DE2-46FE8A3B4872}"/>
+                <a16:creationId xmlns:a16="http://schemas.microsoft.com/office/drawing/2014/main" xmlns="" id="{B4656742-F44E-DEB8-0DE2-46FE8A3B4872}"/>
               </a:ext>
             </a:extLst>
           </p:cNvPr>
@@ -19914,7 +21519,7 @@
           <p:cNvPr id="24" name="Text 1">
             <a:extLst>
               <a:ext uri="{FF2B5EF4-FFF2-40B4-BE49-F238E27FC236}">
-                <a16:creationId xmlns="" xmlns:a16="http://schemas.microsoft.com/office/drawing/2014/main" id="{472BFC16-825E-73E4-9596-F2CA527F48EA}"/>
+                <a16:creationId xmlns:a16="http://schemas.microsoft.com/office/drawing/2014/main" xmlns="" id="{472BFC16-825E-73E4-9596-F2CA527F48EA}"/>
               </a:ext>
             </a:extLst>
           </p:cNvPr>
@@ -20061,7 +21666,7 @@
           <p:cNvPr id="25" name="Text 2">
             <a:extLst>
               <a:ext uri="{FF2B5EF4-FFF2-40B4-BE49-F238E27FC236}">
-                <a16:creationId xmlns="" xmlns:a16="http://schemas.microsoft.com/office/drawing/2014/main" id="{0ED9AA18-9EE7-D709-C4C3-818089404EA4}"/>
+                <a16:creationId xmlns:a16="http://schemas.microsoft.com/office/drawing/2014/main" xmlns="" id="{0ED9AA18-9EE7-D709-C4C3-818089404EA4}"/>
               </a:ext>
             </a:extLst>
           </p:cNvPr>
@@ -20208,7 +21813,7 @@
           <p:cNvPr id="26" name="Image 1">
             <a:extLst>
               <a:ext uri="{FF2B5EF4-FFF2-40B4-BE49-F238E27FC236}">
-                <a16:creationId xmlns="" xmlns:a16="http://schemas.microsoft.com/office/drawing/2014/main" id="{3AA18FAE-20E6-DD3E-8389-A3A3C5E5F02F}"/>
+                <a16:creationId xmlns:a16="http://schemas.microsoft.com/office/drawing/2014/main" xmlns="" id="{3AA18FAE-20E6-DD3E-8389-A3A3C5E5F02F}"/>
               </a:ext>
             </a:extLst>
           </p:cNvPr>
@@ -20238,7 +21843,7 @@
           <p:cNvPr id="27" name="Image 3">
             <a:extLst>
               <a:ext uri="{FF2B5EF4-FFF2-40B4-BE49-F238E27FC236}">
-                <a16:creationId xmlns="" xmlns:a16="http://schemas.microsoft.com/office/drawing/2014/main" id="{0C8D0B1D-8793-388D-0ADB-907B849DA21A}"/>
+                <a16:creationId xmlns:a16="http://schemas.microsoft.com/office/drawing/2014/main" xmlns="" id="{0C8D0B1D-8793-388D-0ADB-907B849DA21A}"/>
               </a:ext>
             </a:extLst>
           </p:cNvPr>
@@ -20274,7 +21879,7 @@
           <p:cNvPr id="28" name="Text 5">
             <a:extLst>
               <a:ext uri="{FF2B5EF4-FFF2-40B4-BE49-F238E27FC236}">
-                <a16:creationId xmlns="" xmlns:a16="http://schemas.microsoft.com/office/drawing/2014/main" id="{6FEBA9B4-92F8-1783-D199-984E9BD35FE4}"/>
+                <a16:creationId xmlns:a16="http://schemas.microsoft.com/office/drawing/2014/main" xmlns="" id="{6FEBA9B4-92F8-1783-D199-984E9BD35FE4}"/>
               </a:ext>
             </a:extLst>
           </p:cNvPr>
@@ -20421,7 +22026,7 @@
           <p:cNvPr id="29" name="Text 6">
             <a:extLst>
               <a:ext uri="{FF2B5EF4-FFF2-40B4-BE49-F238E27FC236}">
-                <a16:creationId xmlns="" xmlns:a16="http://schemas.microsoft.com/office/drawing/2014/main" id="{A01B7A0E-C486-C1C0-401D-9E6A0598F71F}"/>
+                <a16:creationId xmlns:a16="http://schemas.microsoft.com/office/drawing/2014/main" xmlns="" id="{A01B7A0E-C486-C1C0-401D-9E6A0598F71F}"/>
               </a:ext>
             </a:extLst>
           </p:cNvPr>
@@ -20568,7 +22173,7 @@
           <p:cNvPr id="30" name="Image 2">
             <a:extLst>
               <a:ext uri="{FF2B5EF4-FFF2-40B4-BE49-F238E27FC236}">
-                <a16:creationId xmlns="" xmlns:a16="http://schemas.microsoft.com/office/drawing/2014/main" id="{4699EAB3-B451-FA65-3003-7F72825EBD8F}"/>
+                <a16:creationId xmlns:a16="http://schemas.microsoft.com/office/drawing/2014/main" xmlns="" id="{4699EAB3-B451-FA65-3003-7F72825EBD8F}"/>
               </a:ext>
             </a:extLst>
           </p:cNvPr>
@@ -20598,7 +22203,7 @@
           <p:cNvPr id="31" name="Text 3">
             <a:extLst>
               <a:ext uri="{FF2B5EF4-FFF2-40B4-BE49-F238E27FC236}">
-                <a16:creationId xmlns="" xmlns:a16="http://schemas.microsoft.com/office/drawing/2014/main" id="{3317EA26-C890-3AA8-57C6-07F0D9D86A26}"/>
+                <a16:creationId xmlns:a16="http://schemas.microsoft.com/office/drawing/2014/main" xmlns="" id="{3317EA26-C890-3AA8-57C6-07F0D9D86A26}"/>
               </a:ext>
             </a:extLst>
           </p:cNvPr>
@@ -20745,7 +22350,7 @@
           <p:cNvPr id="32" name="Text 4">
             <a:extLst>
               <a:ext uri="{FF2B5EF4-FFF2-40B4-BE49-F238E27FC236}">
-                <a16:creationId xmlns="" xmlns:a16="http://schemas.microsoft.com/office/drawing/2014/main" id="{2F075863-C6D6-3DCA-EAB9-909D73EE40B1}"/>
+                <a16:creationId xmlns:a16="http://schemas.microsoft.com/office/drawing/2014/main" xmlns="" id="{2F075863-C6D6-3DCA-EAB9-909D73EE40B1}"/>
               </a:ext>
             </a:extLst>
           </p:cNvPr>
@@ -20908,7 +22513,7 @@
         <p:cNvPr id="1" name="">
           <a:extLst>
             <a:ext uri="{FF2B5EF4-FFF2-40B4-BE49-F238E27FC236}">
-              <a16:creationId xmlns="" xmlns:a16="http://schemas.microsoft.com/office/drawing/2014/main" id="{7B580C78-F914-AF3B-B3F8-86674699E7E9}"/>
+              <a16:creationId xmlns:a16="http://schemas.microsoft.com/office/drawing/2014/main" xmlns="" id="{7B580C78-F914-AF3B-B3F8-86674699E7E9}"/>
             </a:ext>
           </a:extLst>
         </p:cNvPr>
@@ -20928,7 +22533,7 @@
           <p:cNvPr id="7" name="Title 6">
             <a:extLst>
               <a:ext uri="{FF2B5EF4-FFF2-40B4-BE49-F238E27FC236}">
-                <a16:creationId xmlns="" xmlns:a16="http://schemas.microsoft.com/office/drawing/2014/main" id="{6C658EAB-7DAF-BE2F-A84A-38A3402BEF3F}"/>
+                <a16:creationId xmlns:a16="http://schemas.microsoft.com/office/drawing/2014/main" xmlns="" id="{6C658EAB-7DAF-BE2F-A84A-38A3402BEF3F}"/>
               </a:ext>
             </a:extLst>
           </p:cNvPr>
@@ -20984,7 +22589,7 @@
           <p:cNvPr id="9" name="Picture 8" descr="A black background with white text&#10;&#10;AI-generated content may be incorrect.">
             <a:extLst>
               <a:ext uri="{FF2B5EF4-FFF2-40B4-BE49-F238E27FC236}">
-                <a16:creationId xmlns="" xmlns:a16="http://schemas.microsoft.com/office/drawing/2014/main" id="{C4E41495-4A51-AEA7-884E-CAA49182C5C7}"/>
+                <a16:creationId xmlns:a16="http://schemas.microsoft.com/office/drawing/2014/main" xmlns="" id="{C4E41495-4A51-AEA7-884E-CAA49182C5C7}"/>
               </a:ext>
             </a:extLst>
           </p:cNvPr>
@@ -21107,7 +22712,7 @@
         <p:cNvPr id="1" name="">
           <a:extLst>
             <a:ext uri="{FF2B5EF4-FFF2-40B4-BE49-F238E27FC236}">
-              <a16:creationId xmlns="" xmlns:a16="http://schemas.microsoft.com/office/drawing/2014/main" id="{7B580C78-F914-AF3B-B3F8-86674699E7E9}"/>
+              <a16:creationId xmlns:a16="http://schemas.microsoft.com/office/drawing/2014/main" xmlns="" id="{7B580C78-F914-AF3B-B3F8-86674699E7E9}"/>
             </a:ext>
           </a:extLst>
         </p:cNvPr>
@@ -21127,7 +22732,7 @@
           <p:cNvPr id="7" name="Title 6">
             <a:extLst>
               <a:ext uri="{FF2B5EF4-FFF2-40B4-BE49-F238E27FC236}">
-                <a16:creationId xmlns="" xmlns:a16="http://schemas.microsoft.com/office/drawing/2014/main" id="{6C658EAB-7DAF-BE2F-A84A-38A3402BEF3F}"/>
+                <a16:creationId xmlns:a16="http://schemas.microsoft.com/office/drawing/2014/main" xmlns="" id="{6C658EAB-7DAF-BE2F-A84A-38A3402BEF3F}"/>
               </a:ext>
             </a:extLst>
           </p:cNvPr>
@@ -21476,7 +23081,7 @@
         <p:cNvPr id="1" name="">
           <a:extLst>
             <a:ext uri="{FF2B5EF4-FFF2-40B4-BE49-F238E27FC236}">
-              <a16:creationId xmlns="" xmlns:a16="http://schemas.microsoft.com/office/drawing/2014/main" id="{FDF6AF63-1DBE-D11B-6DC9-B3687284A56C}"/>
+              <a16:creationId xmlns:a16="http://schemas.microsoft.com/office/drawing/2014/main" xmlns="" id="{FDF6AF63-1DBE-D11B-6DC9-B3687284A56C}"/>
             </a:ext>
           </a:extLst>
         </p:cNvPr>
@@ -21496,7 +23101,7 @@
           <p:cNvPr id="7" name="Title 6">
             <a:extLst>
               <a:ext uri="{FF2B5EF4-FFF2-40B4-BE49-F238E27FC236}">
-                <a16:creationId xmlns="" xmlns:a16="http://schemas.microsoft.com/office/drawing/2014/main" id="{C8FF4F10-97E7-7357-3F36-228622417091}"/>
+                <a16:creationId xmlns:a16="http://schemas.microsoft.com/office/drawing/2014/main" xmlns="" id="{C8FF4F10-97E7-7357-3F36-228622417091}"/>
               </a:ext>
             </a:extLst>
           </p:cNvPr>
@@ -22003,7 +23608,7 @@
   <a:extraClrSchemeLst/>
   <a:extLst>
     <a:ext uri="{05A4C25C-085E-4340-85A3-A5531E510DB2}">
-      <thm15:themeFamily xmlns="" xmlns:thm15="http://schemas.microsoft.com/office/thememl/2012/main" name="TM55661986_wac_CP_V19" id="{030227AD-26D8-46F7-B412-6532AF4DDFEA}" vid="{787E6F9C-FC70-455D-8D81-5DEDA8A08FF0}"/>
+      <thm15:themeFamily xmlns:thm15="http://schemas.microsoft.com/office/thememl/2012/main" xmlns="" name="TM55661986_wac_CP_V19" id="{030227AD-26D8-46F7-B412-6532AF4DDFEA}" vid="{787E6F9C-FC70-455D-8D81-5DEDA8A08FF0}"/>
     </a:ext>
   </a:extLst>
 </a:theme>
@@ -22298,7 +23903,7 @@
   <a:extraClrSchemeLst/>
   <a:extLst>
     <a:ext uri="{05A4C25C-085E-4340-85A3-A5531E510DB2}">
-      <thm15:themeFamily xmlns="" xmlns:thm15="http://schemas.microsoft.com/office/thememl/2012/main" name="Office Theme" id="{62F939B6-93AF-4DB8-9C6B-D6C7DFDC589F}" vid="{4A3C46E8-61CC-4603-A589-7422A47A8E4A}"/>
+      <thm15:themeFamily xmlns:thm15="http://schemas.microsoft.com/office/thememl/2012/main" xmlns="" name="Office Theme" id="{62F939B6-93AF-4DB8-9C6B-D6C7DFDC589F}" vid="{4A3C46E8-61CC-4603-A589-7422A47A8E4A}"/>
     </a:ext>
   </a:extLst>
 </a:theme>
@@ -22613,13 +24218,33 @@
   <a:extraClrSchemeLst/>
   <a:extLst>
     <a:ext uri="{05A4C25C-085E-4340-85A3-A5531E510DB2}">
-      <thm15:themeFamily xmlns="" xmlns:thm15="http://schemas.microsoft.com/office/thememl/2012/main" name="Office Theme" id="{2E142A2C-CD16-42D6-873A-C26D2A0506FA}" vid="{1BDDFF52-6CD6-40A5-AB3C-68EB2F1E4D0A}"/>
+      <thm15:themeFamily xmlns:thm15="http://schemas.microsoft.com/office/thememl/2012/main" xmlns="" name="Office Theme" id="{2E142A2C-CD16-42D6-873A-C26D2A0506FA}" vid="{1BDDFF52-6CD6-40A5-AB3C-68EB2F1E4D0A}"/>
     </a:ext>
   </a:extLst>
 </a:theme>
 </file>
 
 <file path=customXml/item1.xml><?xml version="1.0" encoding="utf-8"?>
+<p:properties xmlns:p="http://schemas.microsoft.com/office/2006/metadata/properties" xmlns:xsi="http://www.w3.org/2001/XMLSchema-instance" xmlns:pc="http://schemas.microsoft.com/office/infopath/2007/PartnerControls">
+  <documentManagement>
+    <_ip_UnifiedCompliancePolicyUIAction xmlns="http://schemas.microsoft.com/sharepoint/v3" xsi:nil="true"/>
+    <Image xmlns="71af3243-3dd4-4a8d-8c0d-dd76da1f02a5">
+      <Url xsi:nil="true"/>
+      <Description xsi:nil="true"/>
+    </Image>
+    <Status xmlns="71af3243-3dd4-4a8d-8c0d-dd76da1f02a5">Not started</Status>
+    <Background xmlns="71af3243-3dd4-4a8d-8c0d-dd76da1f02a5">false</Background>
+    <_ip_UnifiedCompliancePolicyProperties xmlns="http://schemas.microsoft.com/sharepoint/v3" xsi:nil="true"/>
+    <ImageTagsTaxHTField xmlns="71af3243-3dd4-4a8d-8c0d-dd76da1f02a5">
+      <Terms xmlns="http://schemas.microsoft.com/office/infopath/2007/PartnerControls"/>
+    </ImageTagsTaxHTField>
+    <TaxCatchAll xmlns="230e9df3-be65-4c73-a93b-d1236ebd677e" xsi:nil="true"/>
+    <MediaServiceKeyPoints xmlns="71af3243-3dd4-4a8d-8c0d-dd76da1f02a5" xsi:nil="true"/>
+  </documentManagement>
+</p:properties>
+</file>
+
+<file path=customXml/item2.xml><?xml version="1.0" encoding="utf-8"?>
 <ct:contentTypeSchema xmlns:ct="http://schemas.microsoft.com/office/2006/metadata/contentType" xmlns:ma="http://schemas.microsoft.com/office/2006/metadata/properties/metaAttributes" ct:_="" ma:_="" ma:contentTypeName="Document" ma:contentTypeID="0x01010079F111ED35F8CC479449609E8A0923A6" ma:contentTypeVersion="28" ma:contentTypeDescription="Create a new document." ma:contentTypeScope="" ma:versionID="60f5a4f2d2b0abadcf532d48ebf9cb71">
   <xsd:schema xmlns:xsd="http://www.w3.org/2001/XMLSchema" xmlns:xs="http://www.w3.org/2001/XMLSchema" xmlns:p="http://schemas.microsoft.com/office/2006/metadata/properties" xmlns:ns1="http://schemas.microsoft.com/sharepoint/v3" xmlns:ns2="71af3243-3dd4-4a8d-8c0d-dd76da1f02a5" xmlns:ns3="16c05727-aa75-4e4a-9b5f-8a80a1165891" xmlns:ns4="230e9df3-be65-4c73-a93b-d1236ebd677e" targetNamespace="http://schemas.microsoft.com/office/2006/metadata/properties" ma:root="true" ma:fieldsID="7dd78129e6a1811f84807ad11c651531" ns1:_="" ns2:_="" ns3:_="" ns4:_="">
     <xsd:import namespace="http://schemas.microsoft.com/sharepoint/v3"/>
@@ -22931,26 +24556,6 @@
 </ct:contentTypeSchema>
 </file>
 
-<file path=customXml/item2.xml><?xml version="1.0" encoding="utf-8"?>
-<p:properties xmlns:p="http://schemas.microsoft.com/office/2006/metadata/properties" xmlns:xsi="http://www.w3.org/2001/XMLSchema-instance" xmlns:pc="http://schemas.microsoft.com/office/infopath/2007/PartnerControls">
-  <documentManagement>
-    <_ip_UnifiedCompliancePolicyUIAction xmlns="http://schemas.microsoft.com/sharepoint/v3" xsi:nil="true"/>
-    <Image xmlns="71af3243-3dd4-4a8d-8c0d-dd76da1f02a5">
-      <Url xsi:nil="true"/>
-      <Description xsi:nil="true"/>
-    </Image>
-    <Status xmlns="71af3243-3dd4-4a8d-8c0d-dd76da1f02a5">Not started</Status>
-    <Background xmlns="71af3243-3dd4-4a8d-8c0d-dd76da1f02a5">false</Background>
-    <_ip_UnifiedCompliancePolicyProperties xmlns="http://schemas.microsoft.com/sharepoint/v3" xsi:nil="true"/>
-    <ImageTagsTaxHTField xmlns="71af3243-3dd4-4a8d-8c0d-dd76da1f02a5">
-      <Terms xmlns="http://schemas.microsoft.com/office/infopath/2007/PartnerControls"/>
-    </ImageTagsTaxHTField>
-    <TaxCatchAll xmlns="230e9df3-be65-4c73-a93b-d1236ebd677e" xsi:nil="true"/>
-    <MediaServiceKeyPoints xmlns="71af3243-3dd4-4a8d-8c0d-dd76da1f02a5" xsi:nil="true"/>
-  </documentManagement>
-</p:properties>
-</file>
-
 <file path=customXml/item3.xml><?xml version="1.0" encoding="utf-8"?>
 <?mso-contentType ?>
 <FormTemplates xmlns="http://schemas.microsoft.com/sharepoint/v3/contenttype/forms">
@@ -22961,6 +24566,25 @@
 </file>
 
 <file path=customXml/itemProps1.xml><?xml version="1.0" encoding="utf-8"?>
+<ds:datastoreItem xmlns:ds="http://schemas.openxmlformats.org/officeDocument/2006/customXml" ds:itemID="{85C2645A-E767-4D7E-984D-234E531E4556}">
+  <ds:schemaRefs>
+    <ds:schemaRef ds:uri="230e9df3-be65-4c73-a93b-d1236ebd677e"/>
+    <ds:schemaRef ds:uri="http://schemas.microsoft.com/office/2006/documentManagement/types"/>
+    <ds:schemaRef ds:uri="http://purl.org/dc/terms/"/>
+    <ds:schemaRef ds:uri="http://purl.org/dc/elements/1.1/"/>
+    <ds:schemaRef ds:uri="http://schemas.openxmlformats.org/package/2006/metadata/core-properties"/>
+    <ds:schemaRef ds:uri="71af3243-3dd4-4a8d-8c0d-dd76da1f02a5"/>
+    <ds:schemaRef ds:uri="http://www.w3.org/XML/1998/namespace"/>
+    <ds:schemaRef ds:uri="http://purl.org/dc/dcmitype/"/>
+    <ds:schemaRef ds:uri="http://schemas.microsoft.com/office/infopath/2007/PartnerControls"/>
+    <ds:schemaRef ds:uri="16c05727-aa75-4e4a-9b5f-8a80a1165891"/>
+    <ds:schemaRef ds:uri="http://schemas.microsoft.com/sharepoint/v3"/>
+    <ds:schemaRef ds:uri="http://schemas.microsoft.com/office/2006/metadata/properties"/>
+  </ds:schemaRefs>
+</ds:datastoreItem>
+</file>
+
+<file path=customXml/itemProps2.xml><?xml version="1.0" encoding="utf-8"?>
 <ds:datastoreItem xmlns:ds="http://schemas.openxmlformats.org/officeDocument/2006/customXml" ds:itemID="{5F2A2379-DD35-4769-BFD6-4857D72F808A}">
   <ds:schemaRefs>
     <ds:schemaRef ds:uri="http://schemas.microsoft.com/office/2006/metadata/contentType"/>
@@ -22981,25 +24605,6 @@
 </ds:datastoreItem>
 </file>
 
-<file path=customXml/itemProps2.xml><?xml version="1.0" encoding="utf-8"?>
-<ds:datastoreItem xmlns:ds="http://schemas.openxmlformats.org/officeDocument/2006/customXml" ds:itemID="{85C2645A-E767-4D7E-984D-234E531E4556}">
-  <ds:schemaRefs>
-    <ds:schemaRef ds:uri="230e9df3-be65-4c73-a93b-d1236ebd677e"/>
-    <ds:schemaRef ds:uri="http://schemas.microsoft.com/office/2006/documentManagement/types"/>
-    <ds:schemaRef ds:uri="http://purl.org/dc/terms/"/>
-    <ds:schemaRef ds:uri="http://purl.org/dc/elements/1.1/"/>
-    <ds:schemaRef ds:uri="http://schemas.openxmlformats.org/package/2006/metadata/core-properties"/>
-    <ds:schemaRef ds:uri="71af3243-3dd4-4a8d-8c0d-dd76da1f02a5"/>
-    <ds:schemaRef ds:uri="http://www.w3.org/XML/1998/namespace"/>
-    <ds:schemaRef ds:uri="http://purl.org/dc/dcmitype/"/>
-    <ds:schemaRef ds:uri="http://schemas.microsoft.com/office/infopath/2007/PartnerControls"/>
-    <ds:schemaRef ds:uri="16c05727-aa75-4e4a-9b5f-8a80a1165891"/>
-    <ds:schemaRef ds:uri="http://schemas.microsoft.com/sharepoint/v3"/>
-    <ds:schemaRef ds:uri="http://schemas.microsoft.com/office/2006/metadata/properties"/>
-  </ds:schemaRefs>
-</ds:datastoreItem>
-</file>
-
 <file path=customXml/itemProps3.xml><?xml version="1.0" encoding="utf-8"?>
 <ds:datastoreItem xmlns:ds="http://schemas.openxmlformats.org/officeDocument/2006/customXml" ds:itemID="{0F048343-1EA9-44C3-883E-652FAAF0713E}">
   <ds:schemaRefs>

</xml_diff>

<commit_message>
Final step on high quality images
</commit_message>
<xml_diff>
--- a/ai_compression_project.pptx
+++ b/ai_compression_project.pptx
@@ -5,10 +5,10 @@
     <p:sldMasterId id="2147483648" r:id="rId4"/>
   </p:sldMasterIdLst>
   <p:notesMasterIdLst>
-    <p:notesMasterId r:id="rId43"/>
+    <p:notesMasterId r:id="rId46"/>
   </p:notesMasterIdLst>
   <p:handoutMasterIdLst>
-    <p:handoutMasterId r:id="rId44"/>
+    <p:handoutMasterId r:id="rId47"/>
   </p:handoutMasterIdLst>
   <p:sldIdLst>
     <p:sldId id="281" r:id="rId5"/>
@@ -48,7 +48,10 @@
     <p:sldId id="322" r:id="rId39"/>
     <p:sldId id="323" r:id="rId40"/>
     <p:sldId id="324" r:id="rId41"/>
-    <p:sldId id="291" r:id="rId42"/>
+    <p:sldId id="325" r:id="rId42"/>
+    <p:sldId id="326" r:id="rId43"/>
+    <p:sldId id="327" r:id="rId44"/>
+    <p:sldId id="291" r:id="rId45"/>
   </p:sldIdLst>
   <p:sldSz cx="12192000" cy="6858000"/>
   <p:notesSz cx="6858000" cy="9144000"/>
@@ -258,7 +261,7 @@
           <a:p>
             <a:fld id="{0DC994AA-C437-4EF4-8BEF-0B832D7FA420}" type="datetimeFigureOut">
               <a:rPr lang="en-US" smtClean="0"/>
-              <a:t>3/10/2025</a:t>
+              <a:t>3/30/2025</a:t>
             </a:fld>
             <a:endParaRPr lang="en-US"/>
           </a:p>
@@ -435,7 +438,7 @@
           <a:p>
             <a:fld id="{3B4FE048-FAD0-D943-9A17-3C4CB7633182}" type="datetimeFigureOut">
               <a:rPr lang="en-US" smtClean="0"/>
-              <a:t>3/10/2025</a:t>
+              <a:t>3/30/2025</a:t>
             </a:fld>
             <a:endParaRPr lang="en-US"/>
           </a:p>
@@ -3926,7 +3929,7 @@
         <p:cNvPr id="1" name="">
           <a:extLst>
             <a:ext uri="{FF2B5EF4-FFF2-40B4-BE49-F238E27FC236}">
-              <a16:creationId xmlns="" xmlns:a16="http://schemas.microsoft.com/office/drawing/2014/main" id="{84F15084-9E64-0732-2172-D06E24D20324}"/>
+              <a16:creationId xmlns="" xmlns:a16="http://schemas.microsoft.com/office/drawing/2014/main" id="{84847B3D-F9FE-E845-0A9E-7B3E4737F607}"/>
             </a:ext>
           </a:extLst>
         </p:cNvPr>
@@ -3946,7 +3949,7 @@
           <p:cNvPr id="2" name="Slide Image Placeholder 1">
             <a:extLst>
               <a:ext uri="{FF2B5EF4-FFF2-40B4-BE49-F238E27FC236}">
-                <a16:creationId xmlns="" xmlns:a16="http://schemas.microsoft.com/office/drawing/2014/main" id="{7CCBBEEF-0F58-7DB2-13AB-6DAFC52BE070}"/>
+                <a16:creationId xmlns="" xmlns:a16="http://schemas.microsoft.com/office/drawing/2014/main" id="{A65C55DC-40F4-B8B2-A44F-CEE7EA9104C1}"/>
               </a:ext>
             </a:extLst>
           </p:cNvPr>
@@ -3964,7 +3967,7 @@
           <p:cNvPr id="3" name="Notes Placeholder 2">
             <a:extLst>
               <a:ext uri="{FF2B5EF4-FFF2-40B4-BE49-F238E27FC236}">
-                <a16:creationId xmlns="" xmlns:a16="http://schemas.microsoft.com/office/drawing/2014/main" id="{C62C92A2-0E82-6EA1-AA1F-C125D6D8C6A8}"/>
+                <a16:creationId xmlns="" xmlns:a16="http://schemas.microsoft.com/office/drawing/2014/main" id="{AFAEFE12-CFF9-2E00-9808-098A1D824723}"/>
               </a:ext>
             </a:extLst>
           </p:cNvPr>
@@ -3980,7 +3983,7 @@
           <a:bodyPr/>
           <a:lstStyle/>
           <a:p>
-            <a:endParaRPr lang="en-US"/>
+            <a:endParaRPr lang="en-US" dirty="0"/>
           </a:p>
         </p:txBody>
       </p:sp>
@@ -3989,7 +3992,7 @@
           <p:cNvPr id="4" name="Slide Number Placeholder 3">
             <a:extLst>
               <a:ext uri="{FF2B5EF4-FFF2-40B4-BE49-F238E27FC236}">
-                <a16:creationId xmlns="" xmlns:a16="http://schemas.microsoft.com/office/drawing/2014/main" id="{F80306BD-3757-CA40-4082-AACA5F6DB656}"/>
+                <a16:creationId xmlns="" xmlns:a16="http://schemas.microsoft.com/office/drawing/2014/main" id="{85084F94-5BAE-E3B2-298D-1E3D1D48D1F6}"/>
               </a:ext>
             </a:extLst>
           </p:cNvPr>
@@ -4016,7 +4019,223 @@
     </p:spTree>
     <p:extLst>
       <p:ext uri="{BB962C8B-B14F-4D97-AF65-F5344CB8AC3E}">
-        <p14:creationId xmlns:p14="http://schemas.microsoft.com/office/powerpoint/2010/main" val="2113507462"/>
+        <p14:creationId xmlns:p14="http://schemas.microsoft.com/office/powerpoint/2010/main" val="1899534547"/>
+      </p:ext>
+    </p:extLst>
+  </p:cSld>
+  <p:clrMapOvr>
+    <a:masterClrMapping/>
+  </p:clrMapOvr>
+</p:notes>
+</file>
+
+<file path=ppt/notesSlides/notesSlide38.xml><?xml version="1.0" encoding="utf-8"?>
+<p:notes xmlns:a="http://schemas.openxmlformats.org/drawingml/2006/main" xmlns:r="http://schemas.openxmlformats.org/officeDocument/2006/relationships" xmlns:p="http://schemas.openxmlformats.org/presentationml/2006/main">
+  <p:cSld>
+    <p:spTree>
+      <p:nvGrpSpPr>
+        <p:cNvPr id="1" name="">
+          <a:extLst>
+            <a:ext uri="{FF2B5EF4-FFF2-40B4-BE49-F238E27FC236}">
+              <a16:creationId xmlns="" xmlns:a16="http://schemas.microsoft.com/office/drawing/2014/main" id="{84847B3D-F9FE-E845-0A9E-7B3E4737F607}"/>
+            </a:ext>
+          </a:extLst>
+        </p:cNvPr>
+        <p:cNvGrpSpPr/>
+        <p:nvPr/>
+      </p:nvGrpSpPr>
+      <p:grpSpPr>
+        <a:xfrm>
+          <a:off x="0" y="0"/>
+          <a:ext cx="0" cy="0"/>
+          <a:chOff x="0" y="0"/>
+          <a:chExt cx="0" cy="0"/>
+        </a:xfrm>
+      </p:grpSpPr>
+      <p:sp>
+        <p:nvSpPr>
+          <p:cNvPr id="2" name="Slide Image Placeholder 1">
+            <a:extLst>
+              <a:ext uri="{FF2B5EF4-FFF2-40B4-BE49-F238E27FC236}">
+                <a16:creationId xmlns="" xmlns:a16="http://schemas.microsoft.com/office/drawing/2014/main" id="{A65C55DC-40F4-B8B2-A44F-CEE7EA9104C1}"/>
+              </a:ext>
+            </a:extLst>
+          </p:cNvPr>
+          <p:cNvSpPr>
+            <a:spLocks noGrp="1" noRot="1" noChangeAspect="1"/>
+          </p:cNvSpPr>
+          <p:nvPr>
+            <p:ph type="sldImg"/>
+          </p:nvPr>
+        </p:nvSpPr>
+        <p:spPr/>
+      </p:sp>
+      <p:sp>
+        <p:nvSpPr>
+          <p:cNvPr id="3" name="Notes Placeholder 2">
+            <a:extLst>
+              <a:ext uri="{FF2B5EF4-FFF2-40B4-BE49-F238E27FC236}">
+                <a16:creationId xmlns="" xmlns:a16="http://schemas.microsoft.com/office/drawing/2014/main" id="{AFAEFE12-CFF9-2E00-9808-098A1D824723}"/>
+              </a:ext>
+            </a:extLst>
+          </p:cNvPr>
+          <p:cNvSpPr>
+            <a:spLocks noGrp="1"/>
+          </p:cNvSpPr>
+          <p:nvPr>
+            <p:ph type="body" idx="1"/>
+          </p:nvPr>
+        </p:nvSpPr>
+        <p:spPr/>
+        <p:txBody>
+          <a:bodyPr/>
+          <a:lstStyle/>
+          <a:p>
+            <a:endParaRPr lang="en-US" dirty="0"/>
+          </a:p>
+        </p:txBody>
+      </p:sp>
+      <p:sp>
+        <p:nvSpPr>
+          <p:cNvPr id="4" name="Slide Number Placeholder 3">
+            <a:extLst>
+              <a:ext uri="{FF2B5EF4-FFF2-40B4-BE49-F238E27FC236}">
+                <a16:creationId xmlns="" xmlns:a16="http://schemas.microsoft.com/office/drawing/2014/main" id="{85084F94-5BAE-E3B2-298D-1E3D1D48D1F6}"/>
+              </a:ext>
+            </a:extLst>
+          </p:cNvPr>
+          <p:cNvSpPr>
+            <a:spLocks noGrp="1"/>
+          </p:cNvSpPr>
+          <p:nvPr>
+            <p:ph type="sldNum" sz="quarter" idx="5"/>
+          </p:nvPr>
+        </p:nvSpPr>
+        <p:spPr/>
+        <p:txBody>
+          <a:bodyPr/>
+          <a:lstStyle/>
+          <a:p>
+            <a:fld id="{55247812-3409-784D-BAE7-ABE53735D59F}" type="slidenum">
+              <a:rPr lang="en-US" smtClean="0"/>
+              <a:t>39</a:t>
+            </a:fld>
+            <a:endParaRPr lang="en-US"/>
+          </a:p>
+        </p:txBody>
+      </p:sp>
+    </p:spTree>
+    <p:extLst>
+      <p:ext uri="{BB962C8B-B14F-4D97-AF65-F5344CB8AC3E}">
+        <p14:creationId xmlns:p14="http://schemas.microsoft.com/office/powerpoint/2010/main" val="1899534547"/>
+      </p:ext>
+    </p:extLst>
+  </p:cSld>
+  <p:clrMapOvr>
+    <a:masterClrMapping/>
+  </p:clrMapOvr>
+</p:notes>
+</file>
+
+<file path=ppt/notesSlides/notesSlide39.xml><?xml version="1.0" encoding="utf-8"?>
+<p:notes xmlns:a="http://schemas.openxmlformats.org/drawingml/2006/main" xmlns:r="http://schemas.openxmlformats.org/officeDocument/2006/relationships" xmlns:p="http://schemas.openxmlformats.org/presentationml/2006/main">
+  <p:cSld>
+    <p:spTree>
+      <p:nvGrpSpPr>
+        <p:cNvPr id="1" name="">
+          <a:extLst>
+            <a:ext uri="{FF2B5EF4-FFF2-40B4-BE49-F238E27FC236}">
+              <a16:creationId xmlns="" xmlns:a16="http://schemas.microsoft.com/office/drawing/2014/main" id="{84847B3D-F9FE-E845-0A9E-7B3E4737F607}"/>
+            </a:ext>
+          </a:extLst>
+        </p:cNvPr>
+        <p:cNvGrpSpPr/>
+        <p:nvPr/>
+      </p:nvGrpSpPr>
+      <p:grpSpPr>
+        <a:xfrm>
+          <a:off x="0" y="0"/>
+          <a:ext cx="0" cy="0"/>
+          <a:chOff x="0" y="0"/>
+          <a:chExt cx="0" cy="0"/>
+        </a:xfrm>
+      </p:grpSpPr>
+      <p:sp>
+        <p:nvSpPr>
+          <p:cNvPr id="2" name="Slide Image Placeholder 1">
+            <a:extLst>
+              <a:ext uri="{FF2B5EF4-FFF2-40B4-BE49-F238E27FC236}">
+                <a16:creationId xmlns="" xmlns:a16="http://schemas.microsoft.com/office/drawing/2014/main" id="{A65C55DC-40F4-B8B2-A44F-CEE7EA9104C1}"/>
+              </a:ext>
+            </a:extLst>
+          </p:cNvPr>
+          <p:cNvSpPr>
+            <a:spLocks noGrp="1" noRot="1" noChangeAspect="1"/>
+          </p:cNvSpPr>
+          <p:nvPr>
+            <p:ph type="sldImg"/>
+          </p:nvPr>
+        </p:nvSpPr>
+        <p:spPr/>
+      </p:sp>
+      <p:sp>
+        <p:nvSpPr>
+          <p:cNvPr id="3" name="Notes Placeholder 2">
+            <a:extLst>
+              <a:ext uri="{FF2B5EF4-FFF2-40B4-BE49-F238E27FC236}">
+                <a16:creationId xmlns="" xmlns:a16="http://schemas.microsoft.com/office/drawing/2014/main" id="{AFAEFE12-CFF9-2E00-9808-098A1D824723}"/>
+              </a:ext>
+            </a:extLst>
+          </p:cNvPr>
+          <p:cNvSpPr>
+            <a:spLocks noGrp="1"/>
+          </p:cNvSpPr>
+          <p:nvPr>
+            <p:ph type="body" idx="1"/>
+          </p:nvPr>
+        </p:nvSpPr>
+        <p:spPr/>
+        <p:txBody>
+          <a:bodyPr/>
+          <a:lstStyle/>
+          <a:p>
+            <a:endParaRPr lang="en-US" dirty="0"/>
+          </a:p>
+        </p:txBody>
+      </p:sp>
+      <p:sp>
+        <p:nvSpPr>
+          <p:cNvPr id="4" name="Slide Number Placeholder 3">
+            <a:extLst>
+              <a:ext uri="{FF2B5EF4-FFF2-40B4-BE49-F238E27FC236}">
+                <a16:creationId xmlns="" xmlns:a16="http://schemas.microsoft.com/office/drawing/2014/main" id="{85084F94-5BAE-E3B2-298D-1E3D1D48D1F6}"/>
+              </a:ext>
+            </a:extLst>
+          </p:cNvPr>
+          <p:cNvSpPr>
+            <a:spLocks noGrp="1"/>
+          </p:cNvSpPr>
+          <p:nvPr>
+            <p:ph type="sldNum" sz="quarter" idx="5"/>
+          </p:nvPr>
+        </p:nvSpPr>
+        <p:spPr/>
+        <p:txBody>
+          <a:bodyPr/>
+          <a:lstStyle/>
+          <a:p>
+            <a:fld id="{55247812-3409-784D-BAE7-ABE53735D59F}" type="slidenum">
+              <a:rPr lang="en-US" smtClean="0"/>
+              <a:t>40</a:t>
+            </a:fld>
+            <a:endParaRPr lang="en-US"/>
+          </a:p>
+        </p:txBody>
+      </p:sp>
+    </p:spTree>
+    <p:extLst>
+      <p:ext uri="{BB962C8B-B14F-4D97-AF65-F5344CB8AC3E}">
+        <p14:creationId xmlns:p14="http://schemas.microsoft.com/office/powerpoint/2010/main" val="1899534547"/>
       </p:ext>
     </p:extLst>
   </p:cSld>
@@ -4125,6 +4344,114 @@
     <p:extLst>
       <p:ext uri="{BB962C8B-B14F-4D97-AF65-F5344CB8AC3E}">
         <p14:creationId xmlns:p14="http://schemas.microsoft.com/office/powerpoint/2010/main" val="1288405238"/>
+      </p:ext>
+    </p:extLst>
+  </p:cSld>
+  <p:clrMapOvr>
+    <a:masterClrMapping/>
+  </p:clrMapOvr>
+</p:notes>
+</file>
+
+<file path=ppt/notesSlides/notesSlide40.xml><?xml version="1.0" encoding="utf-8"?>
+<p:notes xmlns:a="http://schemas.openxmlformats.org/drawingml/2006/main" xmlns:r="http://schemas.openxmlformats.org/officeDocument/2006/relationships" xmlns:p="http://schemas.openxmlformats.org/presentationml/2006/main">
+  <p:cSld>
+    <p:spTree>
+      <p:nvGrpSpPr>
+        <p:cNvPr id="1" name="">
+          <a:extLst>
+            <a:ext uri="{FF2B5EF4-FFF2-40B4-BE49-F238E27FC236}">
+              <a16:creationId xmlns="" xmlns:a16="http://schemas.microsoft.com/office/drawing/2014/main" id="{84F15084-9E64-0732-2172-D06E24D20324}"/>
+            </a:ext>
+          </a:extLst>
+        </p:cNvPr>
+        <p:cNvGrpSpPr/>
+        <p:nvPr/>
+      </p:nvGrpSpPr>
+      <p:grpSpPr>
+        <a:xfrm>
+          <a:off x="0" y="0"/>
+          <a:ext cx="0" cy="0"/>
+          <a:chOff x="0" y="0"/>
+          <a:chExt cx="0" cy="0"/>
+        </a:xfrm>
+      </p:grpSpPr>
+      <p:sp>
+        <p:nvSpPr>
+          <p:cNvPr id="2" name="Slide Image Placeholder 1">
+            <a:extLst>
+              <a:ext uri="{FF2B5EF4-FFF2-40B4-BE49-F238E27FC236}">
+                <a16:creationId xmlns="" xmlns:a16="http://schemas.microsoft.com/office/drawing/2014/main" id="{7CCBBEEF-0F58-7DB2-13AB-6DAFC52BE070}"/>
+              </a:ext>
+            </a:extLst>
+          </p:cNvPr>
+          <p:cNvSpPr>
+            <a:spLocks noGrp="1" noRot="1" noChangeAspect="1"/>
+          </p:cNvSpPr>
+          <p:nvPr>
+            <p:ph type="sldImg"/>
+          </p:nvPr>
+        </p:nvSpPr>
+        <p:spPr/>
+      </p:sp>
+      <p:sp>
+        <p:nvSpPr>
+          <p:cNvPr id="3" name="Notes Placeholder 2">
+            <a:extLst>
+              <a:ext uri="{FF2B5EF4-FFF2-40B4-BE49-F238E27FC236}">
+                <a16:creationId xmlns="" xmlns:a16="http://schemas.microsoft.com/office/drawing/2014/main" id="{C62C92A2-0E82-6EA1-AA1F-C125D6D8C6A8}"/>
+              </a:ext>
+            </a:extLst>
+          </p:cNvPr>
+          <p:cNvSpPr>
+            <a:spLocks noGrp="1"/>
+          </p:cNvSpPr>
+          <p:nvPr>
+            <p:ph type="body" idx="1"/>
+          </p:nvPr>
+        </p:nvSpPr>
+        <p:spPr/>
+        <p:txBody>
+          <a:bodyPr/>
+          <a:lstStyle/>
+          <a:p>
+            <a:endParaRPr lang="en-US"/>
+          </a:p>
+        </p:txBody>
+      </p:sp>
+      <p:sp>
+        <p:nvSpPr>
+          <p:cNvPr id="4" name="Slide Number Placeholder 3">
+            <a:extLst>
+              <a:ext uri="{FF2B5EF4-FFF2-40B4-BE49-F238E27FC236}">
+                <a16:creationId xmlns="" xmlns:a16="http://schemas.microsoft.com/office/drawing/2014/main" id="{F80306BD-3757-CA40-4082-AACA5F6DB656}"/>
+              </a:ext>
+            </a:extLst>
+          </p:cNvPr>
+          <p:cNvSpPr>
+            <a:spLocks noGrp="1"/>
+          </p:cNvSpPr>
+          <p:nvPr>
+            <p:ph type="sldNum" sz="quarter" idx="5"/>
+          </p:nvPr>
+        </p:nvSpPr>
+        <p:spPr/>
+        <p:txBody>
+          <a:bodyPr/>
+          <a:lstStyle/>
+          <a:p>
+            <a:fld id="{55247812-3409-784D-BAE7-ABE53735D59F}" type="slidenum">
+              <a:rPr lang="en-US" smtClean="0"/>
+              <a:t>41</a:t>
+            </a:fld>
+            <a:endParaRPr lang="en-US"/>
+          </a:p>
+        </p:txBody>
+      </p:sp>
+    </p:spTree>
+    <p:extLst>
+      <p:ext uri="{BB962C8B-B14F-4D97-AF65-F5344CB8AC3E}">
+        <p14:creationId xmlns:p14="http://schemas.microsoft.com/office/powerpoint/2010/main" val="2113507462"/>
       </p:ext>
     </p:extLst>
   </p:cSld>
@@ -5247,7 +5574,7 @@
           <a:p>
             <a:fld id="{D6D8061D-18C3-4F4F-85EF-561633F58754}" type="datetimeFigureOut">
               <a:rPr lang="en-US" smtClean="0"/>
-              <a:t>3/10/2025</a:t>
+              <a:t>3/30/2025</a:t>
             </a:fld>
             <a:endParaRPr lang="en-US"/>
           </a:p>
@@ -5432,7 +5759,7 @@
           <a:p>
             <a:fld id="{D6D8061D-18C3-4F4F-85EF-561633F58754}" type="datetimeFigureOut">
               <a:rPr lang="en-US" smtClean="0"/>
-              <a:t>3/10/2025</a:t>
+              <a:t>3/30/2025</a:t>
             </a:fld>
             <a:endParaRPr lang="en-US"/>
           </a:p>
@@ -7175,7 +7502,7 @@
           <a:p>
             <a:fld id="{D6D8061D-18C3-4F4F-85EF-561633F58754}" type="datetimeFigureOut">
               <a:rPr lang="en-US" smtClean="0"/>
-              <a:t>3/10/2025</a:t>
+              <a:t>3/30/2025</a:t>
             </a:fld>
             <a:endParaRPr lang="en-US"/>
           </a:p>
@@ -7610,7 +7937,7 @@
           <a:p>
             <a:fld id="{D6D8061D-18C3-4F4F-85EF-561633F58754}" type="datetimeFigureOut">
               <a:rPr lang="en-US" smtClean="0"/>
-              <a:t>3/10/2025</a:t>
+              <a:t>3/30/2025</a:t>
             </a:fld>
             <a:endParaRPr lang="en-US"/>
           </a:p>
@@ -8269,7 +8596,7 @@
           <a:p>
             <a:fld id="{D6D8061D-18C3-4F4F-85EF-561633F58754}" type="datetimeFigureOut">
               <a:rPr lang="en-US" smtClean="0"/>
-              <a:t>3/10/2025</a:t>
+              <a:t>3/30/2025</a:t>
             </a:fld>
             <a:endParaRPr lang="en-US"/>
           </a:p>
@@ -8512,7 +8839,7 @@
           <a:p>
             <a:fld id="{D6D8061D-18C3-4F4F-85EF-561633F58754}" type="datetimeFigureOut">
               <a:rPr lang="en-US" smtClean="0"/>
-              <a:t>3/10/2025</a:t>
+              <a:t>3/30/2025</a:t>
             </a:fld>
             <a:endParaRPr lang="en-US"/>
           </a:p>
@@ -19470,8 +19797,8 @@
         </p:nvSpPr>
         <p:spPr>
           <a:xfrm>
-            <a:off x="2201925" y="173736"/>
-            <a:ext cx="7653418" cy="625642"/>
+            <a:off x="152400" y="173736"/>
+            <a:ext cx="11927839" cy="625642"/>
           </a:xfrm>
           <a:prstGeom prst="rect">
             <a:avLst/>
@@ -19503,7 +19830,31 @@
           <a:p>
             <a:r>
               <a:rPr lang="en-US" sz="2800" dirty="0" smtClean="0"/>
-              <a:t>Results(52000 photos trained model)</a:t>
+              <a:t>Results(52000 </a:t>
+            </a:r>
+            <a:r>
+              <a:rPr lang="en-US" sz="2800" dirty="0" smtClean="0"/>
+              <a:t>photos</a:t>
+            </a:r>
+            <a:r>
+              <a:rPr lang="ru-RU" sz="2800" dirty="0" smtClean="0"/>
+              <a:t>(128</a:t>
+            </a:r>
+            <a:r>
+              <a:rPr lang="en-US" sz="2800" dirty="0" smtClean="0"/>
+              <a:t>x128px</a:t>
+            </a:r>
+            <a:r>
+              <a:rPr lang="ru-RU" sz="2800" dirty="0" smtClean="0"/>
+              <a:t>)</a:t>
+            </a:r>
+            <a:r>
+              <a:rPr lang="en-US" sz="2800" dirty="0" smtClean="0"/>
+              <a:t> </a:t>
+            </a:r>
+            <a:r>
+              <a:rPr lang="en-US" sz="2800" dirty="0" smtClean="0"/>
+              <a:t>trained model)</a:t>
             </a:r>
             <a:endParaRPr lang="en-US" sz="2800" dirty="0"/>
           </a:p>
@@ -21159,7 +21510,7 @@
         </p:nvSpPr>
         <p:spPr>
           <a:xfrm>
-            <a:off x="783498" y="2245360"/>
+            <a:off x="3506378" y="2326640"/>
             <a:ext cx="4549324" cy="2682240"/>
           </a:xfrm>
           <a:prstGeom prst="rect">
@@ -21237,83 +21588,6 @@
             <a:r>
               <a:rPr lang="en-US" sz="1600" dirty="0"/>
               <a:t>solves the problem of "dead neurons" when part of the network stops learning.</a:t>
-            </a:r>
-            <a:endParaRPr lang="en-US" sz="1600" dirty="0" smtClean="0"/>
-          </a:p>
-        </p:txBody>
-      </p:sp>
-      <p:sp>
-        <p:nvSpPr>
-          <p:cNvPr id="5" name="Заголовок 1"/>
-          <p:cNvSpPr txBox="1">
-            <a:spLocks/>
-          </p:cNvSpPr>
-          <p:nvPr/>
-        </p:nvSpPr>
-        <p:spPr>
-          <a:xfrm>
-            <a:off x="6028632" y="2255520"/>
-            <a:ext cx="4549324" cy="2682240"/>
-          </a:xfrm>
-          <a:prstGeom prst="rect">
-            <a:avLst/>
-          </a:prstGeom>
-        </p:spPr>
-        <p:txBody>
-          <a:bodyPr vert="horz" lIns="91440" tIns="45720" rIns="91440" bIns="45720" rtlCol="0" anchor="ctr" anchorCtr="0">
-            <a:noAutofit/>
-          </a:bodyPr>
-          <a:lstStyle>
-            <a:lvl1pPr algn="ctr" defTabSz="914400" rtl="0" eaLnBrk="1" latinLnBrk="0" hangingPunct="1">
-              <a:lnSpc>
-                <a:spcPct val="90000"/>
-              </a:lnSpc>
-              <a:spcBef>
-                <a:spcPct val="0"/>
-              </a:spcBef>
-              <a:buNone/>
-              <a:defRPr sz="4800" kern="1200" cap="all" spc="300" baseline="0">
-                <a:solidFill>
-                  <a:schemeClr val="bg1"/>
-                </a:solidFill>
-                <a:latin typeface="+mj-lt"/>
-                <a:ea typeface="+mj-ea"/>
-                <a:cs typeface="+mj-cs"/>
-              </a:defRPr>
-            </a:lvl1pPr>
-          </a:lstStyle>
-          <a:p>
-            <a:r>
-              <a:rPr lang="en-US" sz="1600" dirty="0" smtClean="0"/>
-              <a:t>We </a:t>
-            </a:r>
-            <a:r>
-              <a:rPr lang="en-US" sz="1600" dirty="0"/>
-              <a:t>will also </a:t>
-            </a:r>
-            <a:r>
-              <a:rPr lang="en-US" sz="1600" dirty="0" smtClean="0"/>
-              <a:t>add</a:t>
-            </a:r>
-            <a:r>
-              <a:rPr lang="ru-RU" sz="1600" dirty="0" smtClean="0"/>
-              <a:t> </a:t>
-            </a:r>
-            <a:r>
-              <a:rPr lang="en-US" sz="1600" b="1" dirty="0" err="1"/>
-              <a:t>BatchNorm</a:t>
-            </a:r>
-            <a:r>
-              <a:rPr lang="en-US" sz="1600" dirty="0"/>
-              <a:t> normalization - Reduces the spread of values </a:t>
-            </a:r>
-            <a:r>
-              <a:rPr lang="en-US" sz="1600" dirty="0" smtClean="0"/>
-              <a:t>​​→ makes </a:t>
-            </a:r>
-            <a:r>
-              <a:rPr lang="en-US" sz="1600" dirty="0"/>
-              <a:t>the network more stable</a:t>
             </a:r>
             <a:endParaRPr lang="en-US" sz="1600" dirty="0" smtClean="0"/>
           </a:p>
@@ -21449,43 +21723,198 @@
           </a:p>
         </p:txBody>
       </p:sp>
-      <p:sp>
-        <p:nvSpPr>
-          <p:cNvPr id="2" name="Прямоугольник 1"/>
-          <p:cNvSpPr/>
+      <p:pic>
+        <p:nvPicPr>
+          <p:cNvPr id="2050" name="Picture 2"/>
+          <p:cNvPicPr>
+            <a:picLocks noChangeAspect="1" noChangeArrowheads="1"/>
+          </p:cNvPicPr>
           <p:nvPr/>
-        </p:nvSpPr>
-        <p:spPr>
-          <a:xfrm>
-            <a:off x="5474484" y="3005952"/>
-            <a:ext cx="936475" cy="369332"/>
+        </p:nvPicPr>
+        <p:blipFill>
+          <a:blip r:embed="rId3">
+            <a:extLst>
+              <a:ext uri="{28A0092B-C50C-407E-A947-70E740481C1C}">
+                <a14:useLocalDpi xmlns:a14="http://schemas.microsoft.com/office/drawing/2010/main" val="0"/>
+              </a:ext>
+            </a:extLst>
+          </a:blip>
+          <a:srcRect/>
+          <a:stretch>
+            <a:fillRect/>
+          </a:stretch>
+        </p:blipFill>
+        <p:spPr bwMode="auto">
+          <a:xfrm>
+            <a:off x="0" y="988853"/>
+            <a:ext cx="5933386" cy="3136107"/>
           </a:xfrm>
           <a:prstGeom prst="rect">
             <a:avLst/>
           </a:prstGeom>
-        </p:spPr>
-        <p:txBody>
-          <a:bodyPr wrap="none">
-            <a:spAutoFit/>
-          </a:bodyPr>
-          <a:lstStyle/>
-          <a:p>
-            <a:r>
-              <a:rPr lang="ru-RU" dirty="0" smtClean="0">
-                <a:solidFill>
-                  <a:schemeClr val="bg1"/>
-                </a:solidFill>
-              </a:rPr>
-              <a:t>???????</a:t>
-            </a:r>
-            <a:endParaRPr lang="ru-RU" dirty="0">
-              <a:solidFill>
-                <a:schemeClr val="bg1"/>
-              </a:solidFill>
-            </a:endParaRPr>
-          </a:p>
-        </p:txBody>
-      </p:sp>
+          <a:noFill/>
+          <a:ln>
+            <a:noFill/>
+          </a:ln>
+          <a:effectLst/>
+          <a:extLst>
+            <a:ext uri="{909E8E84-426E-40DD-AFC4-6F175D3DCCD1}">
+              <a14:hiddenFill xmlns:a14="http://schemas.microsoft.com/office/drawing/2010/main">
+                <a:solidFill>
+                  <a:schemeClr val="accent1"/>
+                </a:solidFill>
+              </a14:hiddenFill>
+            </a:ext>
+            <a:ext uri="{91240B29-F687-4F45-9708-019B960494DF}">
+              <a14:hiddenLine xmlns:a14="http://schemas.microsoft.com/office/drawing/2010/main" w="9525">
+                <a:solidFill>
+                  <a:schemeClr val="tx1"/>
+                </a:solidFill>
+                <a:miter lim="800000"/>
+                <a:headEnd/>
+                <a:tailEnd/>
+              </a14:hiddenLine>
+            </a:ext>
+            <a:ext uri="{AF507438-7753-43E0-B8FC-AC1667EBCBE1}">
+              <a14:hiddenEffects xmlns:a14="http://schemas.microsoft.com/office/drawing/2010/main">
+                <a:effectLst>
+                  <a:outerShdw dist="35921" dir="2700000" algn="ctr" rotWithShape="0">
+                    <a:schemeClr val="bg2"/>
+                  </a:outerShdw>
+                </a:effectLst>
+              </a14:hiddenEffects>
+            </a:ext>
+          </a:extLst>
+        </p:spPr>
+      </p:pic>
+      <p:pic>
+        <p:nvPicPr>
+          <p:cNvPr id="2051" name="Picture 3"/>
+          <p:cNvPicPr>
+            <a:picLocks noChangeAspect="1" noChangeArrowheads="1"/>
+          </p:cNvPicPr>
+          <p:nvPr/>
+        </p:nvPicPr>
+        <p:blipFill>
+          <a:blip r:embed="rId4">
+            <a:extLst>
+              <a:ext uri="{28A0092B-C50C-407E-A947-70E740481C1C}">
+                <a14:useLocalDpi xmlns:a14="http://schemas.microsoft.com/office/drawing/2010/main" val="0"/>
+              </a:ext>
+            </a:extLst>
+          </a:blip>
+          <a:srcRect/>
+          <a:stretch>
+            <a:fillRect/>
+          </a:stretch>
+        </p:blipFill>
+        <p:spPr bwMode="auto">
+          <a:xfrm>
+            <a:off x="6126907" y="988854"/>
+            <a:ext cx="6065094" cy="3136106"/>
+          </a:xfrm>
+          <a:prstGeom prst="rect">
+            <a:avLst/>
+          </a:prstGeom>
+          <a:noFill/>
+          <a:ln>
+            <a:noFill/>
+          </a:ln>
+          <a:effectLst/>
+          <a:extLst>
+            <a:ext uri="{909E8E84-426E-40DD-AFC4-6F175D3DCCD1}">
+              <a14:hiddenFill xmlns:a14="http://schemas.microsoft.com/office/drawing/2010/main">
+                <a:solidFill>
+                  <a:schemeClr val="accent1"/>
+                </a:solidFill>
+              </a14:hiddenFill>
+            </a:ext>
+            <a:ext uri="{91240B29-F687-4F45-9708-019B960494DF}">
+              <a14:hiddenLine xmlns:a14="http://schemas.microsoft.com/office/drawing/2010/main" w="9525">
+                <a:solidFill>
+                  <a:schemeClr val="tx1"/>
+                </a:solidFill>
+                <a:miter lim="800000"/>
+                <a:headEnd/>
+                <a:tailEnd/>
+              </a14:hiddenLine>
+            </a:ext>
+            <a:ext uri="{AF507438-7753-43E0-B8FC-AC1667EBCBE1}">
+              <a14:hiddenEffects xmlns:a14="http://schemas.microsoft.com/office/drawing/2010/main">
+                <a:effectLst>
+                  <a:outerShdw dist="35921" dir="2700000" algn="ctr" rotWithShape="0">
+                    <a:schemeClr val="bg2"/>
+                  </a:outerShdw>
+                </a:effectLst>
+              </a14:hiddenEffects>
+            </a:ext>
+          </a:extLst>
+        </p:spPr>
+      </p:pic>
+      <p:pic>
+        <p:nvPicPr>
+          <p:cNvPr id="2052" name="Picture 4"/>
+          <p:cNvPicPr>
+            <a:picLocks noChangeAspect="1" noChangeArrowheads="1"/>
+          </p:cNvPicPr>
+          <p:nvPr/>
+        </p:nvPicPr>
+        <p:blipFill>
+          <a:blip r:embed="rId5">
+            <a:extLst>
+              <a:ext uri="{28A0092B-C50C-407E-A947-70E740481C1C}">
+                <a14:useLocalDpi xmlns:a14="http://schemas.microsoft.com/office/drawing/2010/main" val="0"/>
+              </a:ext>
+            </a:extLst>
+          </a:blip>
+          <a:srcRect/>
+          <a:stretch>
+            <a:fillRect/>
+          </a:stretch>
+        </p:blipFill>
+        <p:spPr bwMode="auto">
+          <a:xfrm>
+            <a:off x="3404643" y="4219463"/>
+            <a:ext cx="5199725" cy="2639606"/>
+          </a:xfrm>
+          <a:prstGeom prst="rect">
+            <a:avLst/>
+          </a:prstGeom>
+          <a:noFill/>
+          <a:ln>
+            <a:noFill/>
+          </a:ln>
+          <a:effectLst/>
+          <a:extLst>
+            <a:ext uri="{909E8E84-426E-40DD-AFC4-6F175D3DCCD1}">
+              <a14:hiddenFill xmlns:a14="http://schemas.microsoft.com/office/drawing/2010/main">
+                <a:solidFill>
+                  <a:schemeClr val="accent1"/>
+                </a:solidFill>
+              </a14:hiddenFill>
+            </a:ext>
+            <a:ext uri="{91240B29-F687-4F45-9708-019B960494DF}">
+              <a14:hiddenLine xmlns:a14="http://schemas.microsoft.com/office/drawing/2010/main" w="9525">
+                <a:solidFill>
+                  <a:schemeClr val="tx1"/>
+                </a:solidFill>
+                <a:miter lim="800000"/>
+                <a:headEnd/>
+                <a:tailEnd/>
+              </a14:hiddenLine>
+            </a:ext>
+            <a:ext uri="{AF507438-7753-43E0-B8FC-AC1667EBCBE1}">
+              <a14:hiddenEffects xmlns:a14="http://schemas.microsoft.com/office/drawing/2010/main">
+                <a:effectLst>
+                  <a:outerShdw dist="35921" dir="2700000" algn="ctr" rotWithShape="0">
+                    <a:schemeClr val="bg2"/>
+                  </a:outerShdw>
+                </a:effectLst>
+              </a14:hiddenEffects>
+            </a:ext>
+          </a:extLst>
+        </p:spPr>
+      </p:pic>
     </p:spTree>
     <p:extLst>
       <p:ext uri="{BB962C8B-B14F-4D97-AF65-F5344CB8AC3E}">
@@ -21507,7 +21936,7 @@
         <p:cNvPr id="1" name="">
           <a:extLst>
             <a:ext uri="{FF2B5EF4-FFF2-40B4-BE49-F238E27FC236}">
-              <a16:creationId xmlns="" xmlns:a16="http://schemas.microsoft.com/office/drawing/2014/main" id="{8C579E26-FA2D-1C68-DB27-3D2C268F6B28}"/>
+              <a16:creationId xmlns="" xmlns:a16="http://schemas.microsoft.com/office/drawing/2014/main" id="{EF87400A-AA39-C6BD-0F50-19DF27F0BEE1}"/>
             </a:ext>
           </a:extLst>
         </p:cNvPr>
@@ -21524,43 +21953,275 @@
       </p:grpSpPr>
       <p:sp>
         <p:nvSpPr>
-          <p:cNvPr id="7" name="Title 6">
-            <a:extLst>
-              <a:ext uri="{FF2B5EF4-FFF2-40B4-BE49-F238E27FC236}">
-                <a16:creationId xmlns="" xmlns:a16="http://schemas.microsoft.com/office/drawing/2014/main" id="{44A692C1-E622-D699-43E0-1ECB59404096}"/>
-              </a:ext>
-            </a:extLst>
-          </p:cNvPr>
-          <p:cNvSpPr>
-            <a:spLocks noGrp="1"/>
+          <p:cNvPr id="13" name="Заголовок 1"/>
+          <p:cNvSpPr txBox="1">
+            <a:spLocks/>
           </p:cNvSpPr>
-          <p:nvPr>
-            <p:ph type="ctrTitle"/>
-          </p:nvPr>
+          <p:nvPr/>
         </p:nvSpPr>
         <p:spPr>
           <a:xfrm>
-            <a:off x="2344992" y="2857500"/>
-            <a:ext cx="7502015" cy="1143000"/>
-          </a:xfrm>
-        </p:spPr>
-        <p:txBody>
-          <a:bodyPr/>
+            <a:off x="451971" y="1595120"/>
+            <a:ext cx="4549324" cy="2682240"/>
+          </a:xfrm>
+          <a:prstGeom prst="rect">
+            <a:avLst/>
+          </a:prstGeom>
+        </p:spPr>
+        <p:txBody>
+          <a:bodyPr vert="horz" lIns="91440" tIns="45720" rIns="91440" bIns="45720" rtlCol="0" anchor="ctr" anchorCtr="0">
+            <a:noAutofit/>
+          </a:bodyPr>
+          <a:lstStyle>
+            <a:lvl1pPr algn="ctr" defTabSz="914400" rtl="0" eaLnBrk="1" latinLnBrk="0" hangingPunct="1">
+              <a:lnSpc>
+                <a:spcPct val="90000"/>
+              </a:lnSpc>
+              <a:spcBef>
+                <a:spcPct val="0"/>
+              </a:spcBef>
+              <a:buNone/>
+              <a:defRPr sz="4800" kern="1200" cap="all" spc="300" baseline="0">
+                <a:solidFill>
+                  <a:schemeClr val="bg1"/>
+                </a:solidFill>
+                <a:latin typeface="+mj-lt"/>
+                <a:ea typeface="+mj-ea"/>
+                <a:cs typeface="+mj-cs"/>
+              </a:defRPr>
+            </a:lvl1pPr>
+          </a:lstStyle>
+          <a:p>
+            <a:r>
+              <a:rPr lang="en-US" sz="2800" dirty="0" smtClean="0"/>
+              <a:t>JPG</a:t>
+            </a:r>
+            <a:endParaRPr lang="ru-RU" sz="2800" dirty="0" smtClean="0"/>
+          </a:p>
+          <a:p>
+            <a:r>
+              <a:rPr lang="en-US" sz="2800" dirty="0" smtClean="0"/>
+              <a:t>CT - </a:t>
+            </a:r>
+            <a:r>
+              <a:rPr lang="ru-RU" sz="2800" dirty="0" smtClean="0"/>
+              <a:t>0.</a:t>
+            </a:r>
+            <a:r>
+              <a:rPr lang="en-US" sz="2800" dirty="0" smtClean="0"/>
+              <a:t>08 </a:t>
+            </a:r>
+            <a:r>
+              <a:rPr lang="en-US" sz="2800" dirty="0" smtClean="0"/>
+              <a:t>seconds</a:t>
+            </a:r>
+            <a:endParaRPr lang="en-US" sz="2800" dirty="0" smtClean="0"/>
+          </a:p>
+        </p:txBody>
+      </p:sp>
+      <p:sp>
+        <p:nvSpPr>
+          <p:cNvPr id="14" name="Прямоугольник 13"/>
+          <p:cNvSpPr/>
+          <p:nvPr/>
+        </p:nvSpPr>
+        <p:spPr>
+          <a:xfrm>
+            <a:off x="2726633" y="-1"/>
+            <a:ext cx="6604000" cy="1200329"/>
+          </a:xfrm>
+          <a:prstGeom prst="rect">
+            <a:avLst/>
+          </a:prstGeom>
+        </p:spPr>
+        <p:txBody>
+          <a:bodyPr wrap="square">
+            <a:spAutoFit/>
+          </a:bodyPr>
           <a:lstStyle/>
           <a:p>
             <a:r>
-              <a:rPr lang="en-US" b="1" dirty="0">
-                <a:solidFill>
-                  <a:srgbClr val="FFFFFF"/>
-                </a:solidFill>
-                <a:latin typeface="Calibri Light (Headings)"/>
-                <a:ea typeface="Crimson Pro Bold"/>
-                <a:cs typeface="+mn-cs"/>
-              </a:rPr>
-              <a:t>Thank you</a:t>
-            </a:r>
-            <a:endParaRPr lang="en-US" b="1" dirty="0">
-              <a:latin typeface="Calibri Light (Headings)"/>
+              <a:rPr lang="en-US" sz="7200" dirty="0" smtClean="0">
+                <a:solidFill>
+                  <a:schemeClr val="bg1"/>
+                </a:solidFill>
+              </a:rPr>
+              <a:t>Time comparison</a:t>
+            </a:r>
+            <a:endParaRPr lang="ru-RU" sz="7200" dirty="0">
+              <a:solidFill>
+                <a:schemeClr val="bg1"/>
+              </a:solidFill>
+            </a:endParaRPr>
+          </a:p>
+        </p:txBody>
+      </p:sp>
+      <p:sp>
+        <p:nvSpPr>
+          <p:cNvPr id="4" name="Заголовок 1"/>
+          <p:cNvSpPr txBox="1">
+            <a:spLocks/>
+          </p:cNvSpPr>
+          <p:nvPr/>
+        </p:nvSpPr>
+        <p:spPr>
+          <a:xfrm>
+            <a:off x="6456531" y="1595120"/>
+            <a:ext cx="4549324" cy="2682240"/>
+          </a:xfrm>
+          <a:prstGeom prst="rect">
+            <a:avLst/>
+          </a:prstGeom>
+        </p:spPr>
+        <p:txBody>
+          <a:bodyPr vert="horz" lIns="91440" tIns="45720" rIns="91440" bIns="45720" rtlCol="0" anchor="ctr" anchorCtr="0">
+            <a:noAutofit/>
+          </a:bodyPr>
+          <a:lstStyle>
+            <a:lvl1pPr algn="ctr" defTabSz="914400" rtl="0" eaLnBrk="1" latinLnBrk="0" hangingPunct="1">
+              <a:lnSpc>
+                <a:spcPct val="90000"/>
+              </a:lnSpc>
+              <a:spcBef>
+                <a:spcPct val="0"/>
+              </a:spcBef>
+              <a:buNone/>
+              <a:defRPr sz="4800" kern="1200" cap="all" spc="300" baseline="0">
+                <a:solidFill>
+                  <a:schemeClr val="bg1"/>
+                </a:solidFill>
+                <a:latin typeface="+mj-lt"/>
+                <a:ea typeface="+mj-ea"/>
+                <a:cs typeface="+mj-cs"/>
+              </a:defRPr>
+            </a:lvl1pPr>
+          </a:lstStyle>
+          <a:p>
+            <a:r>
+              <a:rPr lang="en-US" sz="2800" dirty="0" smtClean="0"/>
+              <a:t>AI</a:t>
+            </a:r>
+          </a:p>
+          <a:p>
+            <a:r>
+              <a:rPr lang="en-US" sz="2800" dirty="0"/>
+              <a:t>CT - </a:t>
+            </a:r>
+            <a:r>
+              <a:rPr lang="en-US" sz="2800" dirty="0" smtClean="0"/>
+              <a:t>1 seconds</a:t>
+            </a:r>
+          </a:p>
+          <a:p>
+            <a:r>
+              <a:rPr lang="en-US" sz="2800" dirty="0"/>
+              <a:t>DT - </a:t>
+            </a:r>
+            <a:r>
+              <a:rPr lang="en-US" sz="2800" dirty="0" smtClean="0"/>
+              <a:t>0.2 seconds</a:t>
+            </a:r>
+          </a:p>
+          <a:p>
+            <a:endParaRPr lang="en-US" sz="2800" dirty="0"/>
+          </a:p>
+          <a:p>
+            <a:r>
+              <a:rPr lang="en-US" sz="2000" dirty="0" smtClean="0"/>
+              <a:t>All numbers include LZMA and quantization</a:t>
+            </a:r>
+            <a:endParaRPr lang="en-US" sz="2000" dirty="0"/>
+          </a:p>
+        </p:txBody>
+      </p:sp>
+      <p:sp>
+        <p:nvSpPr>
+          <p:cNvPr id="2" name="Прямоугольник 1"/>
+          <p:cNvSpPr/>
+          <p:nvPr/>
+        </p:nvSpPr>
+        <p:spPr>
+          <a:xfrm>
+            <a:off x="4732989" y="6200894"/>
+            <a:ext cx="2591287" cy="646331"/>
+          </a:xfrm>
+          <a:prstGeom prst="rect">
+            <a:avLst/>
+          </a:prstGeom>
+        </p:spPr>
+        <p:txBody>
+          <a:bodyPr wrap="none">
+            <a:spAutoFit/>
+          </a:bodyPr>
+          <a:lstStyle/>
+          <a:p>
+            <a:r>
+              <a:rPr lang="en-US" i="1" dirty="0" smtClean="0">
+                <a:solidFill>
+                  <a:schemeClr val="bg1"/>
+                </a:solidFill>
+              </a:rPr>
+              <a:t>CT - Compression time</a:t>
+            </a:r>
+          </a:p>
+          <a:p>
+            <a:r>
+              <a:rPr lang="en-US" i="1" dirty="0" smtClean="0">
+                <a:solidFill>
+                  <a:schemeClr val="bg1"/>
+                </a:solidFill>
+              </a:rPr>
+              <a:t>DT – Decompression time</a:t>
+            </a:r>
+            <a:endParaRPr lang="ru-RU" i="1" dirty="0">
+              <a:solidFill>
+                <a:schemeClr val="bg1"/>
+              </a:solidFill>
+            </a:endParaRPr>
+          </a:p>
+        </p:txBody>
+      </p:sp>
+      <p:sp>
+        <p:nvSpPr>
+          <p:cNvPr id="6" name="Прямоугольник 5"/>
+          <p:cNvSpPr/>
+          <p:nvPr/>
+        </p:nvSpPr>
+        <p:spPr>
+          <a:xfrm>
+            <a:off x="-1" y="5658740"/>
+            <a:ext cx="2529841" cy="1200329"/>
+          </a:xfrm>
+          <a:prstGeom prst="rect">
+            <a:avLst/>
+          </a:prstGeom>
+        </p:spPr>
+        <p:txBody>
+          <a:bodyPr wrap="square">
+            <a:spAutoFit/>
+          </a:bodyPr>
+          <a:lstStyle/>
+          <a:p>
+            <a:r>
+              <a:rPr lang="en-US" sz="7200" dirty="0" smtClean="0">
+                <a:solidFill>
+                  <a:schemeClr val="bg1"/>
+                </a:solidFill>
+              </a:rPr>
+              <a:t>Step </a:t>
+            </a:r>
+            <a:r>
+              <a:rPr lang="ru-RU" sz="7200" dirty="0" smtClean="0">
+                <a:solidFill>
+                  <a:schemeClr val="bg1"/>
+                </a:solidFill>
+              </a:rPr>
+              <a:t>7</a:t>
+            </a:r>
+            <a:endParaRPr lang="ru-RU" sz="7200" dirty="0">
+              <a:solidFill>
+                <a:schemeClr val="bg1"/>
+              </a:solidFill>
             </a:endParaRPr>
           </a:p>
         </p:txBody>
@@ -21568,7 +22229,300 @@
     </p:spTree>
     <p:extLst>
       <p:ext uri="{BB962C8B-B14F-4D97-AF65-F5344CB8AC3E}">
-        <p14:creationId xmlns:p14="http://schemas.microsoft.com/office/powerpoint/2010/main" val="4044571280"/>
+        <p14:creationId xmlns:p14="http://schemas.microsoft.com/office/powerpoint/2010/main" val="1785371677"/>
+      </p:ext>
+    </p:extLst>
+  </p:cSld>
+  <p:clrMapOvr>
+    <a:masterClrMapping/>
+  </p:clrMapOvr>
+</p:sld>
+</file>
+
+<file path=ppt/slides/slide39.xml><?xml version="1.0" encoding="utf-8"?>
+<p:sld xmlns:a="http://schemas.openxmlformats.org/drawingml/2006/main" xmlns:r="http://schemas.openxmlformats.org/officeDocument/2006/relationships" xmlns:p="http://schemas.openxmlformats.org/presentationml/2006/main">
+  <p:cSld>
+    <p:spTree>
+      <p:nvGrpSpPr>
+        <p:cNvPr id="1" name="">
+          <a:extLst>
+            <a:ext uri="{FF2B5EF4-FFF2-40B4-BE49-F238E27FC236}">
+              <a16:creationId xmlns="" xmlns:a16="http://schemas.microsoft.com/office/drawing/2014/main" id="{EF87400A-AA39-C6BD-0F50-19DF27F0BEE1}"/>
+            </a:ext>
+          </a:extLst>
+        </p:cNvPr>
+        <p:cNvGrpSpPr/>
+        <p:nvPr/>
+      </p:nvGrpSpPr>
+      <p:grpSpPr>
+        <a:xfrm>
+          <a:off x="0" y="0"/>
+          <a:ext cx="0" cy="0"/>
+          <a:chOff x="0" y="0"/>
+          <a:chExt cx="0" cy="0"/>
+        </a:xfrm>
+      </p:grpSpPr>
+      <p:sp>
+        <p:nvSpPr>
+          <p:cNvPr id="13" name="Заголовок 1"/>
+          <p:cNvSpPr txBox="1">
+            <a:spLocks/>
+          </p:cNvSpPr>
+          <p:nvPr/>
+        </p:nvSpPr>
+        <p:spPr>
+          <a:xfrm>
+            <a:off x="451971" y="1463040"/>
+            <a:ext cx="4549324" cy="3759200"/>
+          </a:xfrm>
+          <a:prstGeom prst="rect">
+            <a:avLst/>
+          </a:prstGeom>
+        </p:spPr>
+        <p:txBody>
+          <a:bodyPr vert="horz" lIns="91440" tIns="45720" rIns="91440" bIns="45720" rtlCol="0" anchor="ctr" anchorCtr="0">
+            <a:noAutofit/>
+          </a:bodyPr>
+          <a:lstStyle>
+            <a:lvl1pPr algn="ctr" defTabSz="914400" rtl="0" eaLnBrk="1" latinLnBrk="0" hangingPunct="1">
+              <a:lnSpc>
+                <a:spcPct val="90000"/>
+              </a:lnSpc>
+              <a:spcBef>
+                <a:spcPct val="0"/>
+              </a:spcBef>
+              <a:buNone/>
+              <a:defRPr sz="4800" kern="1200" cap="all" spc="300" baseline="0">
+                <a:solidFill>
+                  <a:schemeClr val="bg1"/>
+                </a:solidFill>
+                <a:latin typeface="+mj-lt"/>
+                <a:ea typeface="+mj-ea"/>
+                <a:cs typeface="+mj-cs"/>
+              </a:defRPr>
+            </a:lvl1pPr>
+          </a:lstStyle>
+          <a:p>
+            <a:r>
+              <a:rPr lang="en-US" sz="2800" dirty="0" smtClean="0"/>
+              <a:t>JPEG(+)</a:t>
+            </a:r>
+            <a:endParaRPr lang="ru-RU" sz="2800" dirty="0" smtClean="0"/>
+          </a:p>
+          <a:p>
+            <a:pPr marL="457200" indent="-457200" algn="l">
+              <a:buFont typeface="+mj-lt"/>
+              <a:buAutoNum type="arabicPeriod"/>
+            </a:pPr>
+            <a:r>
+              <a:rPr lang="ru-RU" sz="2000" dirty="0" smtClean="0"/>
+              <a:t>40 </a:t>
+            </a:r>
+            <a:r>
+              <a:rPr lang="en-US" sz="2000" dirty="0" smtClean="0"/>
+              <a:t>time faster</a:t>
+            </a:r>
+            <a:r>
+              <a:rPr lang="ru-RU" sz="2000" dirty="0" smtClean="0"/>
+              <a:t> </a:t>
+            </a:r>
+            <a:r>
+              <a:rPr lang="en-US" sz="2000" dirty="0" smtClean="0"/>
+              <a:t>compression</a:t>
+            </a:r>
+          </a:p>
+          <a:p>
+            <a:pPr marL="457200" indent="-457200" algn="l">
+              <a:buFont typeface="+mj-lt"/>
+              <a:buAutoNum type="arabicPeriod"/>
+            </a:pPr>
+            <a:r>
+              <a:rPr lang="en-US" sz="2000" dirty="0" smtClean="0"/>
+              <a:t>Better compressed quality</a:t>
+            </a:r>
+          </a:p>
+          <a:p>
+            <a:pPr marL="457200" indent="-457200" algn="l">
+              <a:buFont typeface="+mj-lt"/>
+              <a:buAutoNum type="arabicPeriod"/>
+            </a:pPr>
+            <a:r>
+              <a:rPr lang="en-US" sz="2000" dirty="0"/>
+              <a:t>Adaptable to different photo sizes and </a:t>
+            </a:r>
+            <a:r>
+              <a:rPr lang="en-US" sz="2000" dirty="0" smtClean="0"/>
+              <a:t>ratios</a:t>
+            </a:r>
+          </a:p>
+          <a:p>
+            <a:pPr marL="457200" indent="-457200" algn="l">
+              <a:buFont typeface="+mj-lt"/>
+              <a:buAutoNum type="arabicPeriod"/>
+            </a:pPr>
+            <a:r>
+              <a:rPr lang="en-US" sz="2000" dirty="0"/>
+              <a:t>Ability to select compression </a:t>
+            </a:r>
+            <a:r>
+              <a:rPr lang="en-US" sz="2000" dirty="0" smtClean="0"/>
+              <a:t>force</a:t>
+            </a:r>
+          </a:p>
+          <a:p>
+            <a:pPr marL="457200" indent="-457200" algn="l">
+              <a:buFont typeface="+mj-lt"/>
+              <a:buAutoNum type="arabicPeriod"/>
+            </a:pPr>
+            <a:r>
+              <a:rPr lang="en-US" sz="2000" dirty="0" smtClean="0"/>
+              <a:t>Doesn’t require python environment and libraries to work – just simple math</a:t>
+            </a:r>
+            <a:endParaRPr lang="en-US" sz="2000" dirty="0" smtClean="0"/>
+          </a:p>
+        </p:txBody>
+      </p:sp>
+      <p:sp>
+        <p:nvSpPr>
+          <p:cNvPr id="14" name="Прямоугольник 13"/>
+          <p:cNvSpPr/>
+          <p:nvPr/>
+        </p:nvSpPr>
+        <p:spPr>
+          <a:xfrm>
+            <a:off x="1920240" y="-1"/>
+            <a:ext cx="8229600" cy="830997"/>
+          </a:xfrm>
+          <a:prstGeom prst="rect">
+            <a:avLst/>
+          </a:prstGeom>
+        </p:spPr>
+        <p:txBody>
+          <a:bodyPr wrap="square">
+            <a:spAutoFit/>
+          </a:bodyPr>
+          <a:lstStyle/>
+          <a:p>
+            <a:r>
+              <a:rPr lang="en-US" sz="4800" dirty="0" smtClean="0">
+                <a:solidFill>
+                  <a:schemeClr val="bg1"/>
+                </a:solidFill>
+              </a:rPr>
+              <a:t>Results on high quality images</a:t>
+            </a:r>
+            <a:endParaRPr lang="ru-RU" sz="4800" dirty="0">
+              <a:solidFill>
+                <a:schemeClr val="bg1"/>
+              </a:solidFill>
+            </a:endParaRPr>
+          </a:p>
+        </p:txBody>
+      </p:sp>
+      <p:sp>
+        <p:nvSpPr>
+          <p:cNvPr id="4" name="Заголовок 1"/>
+          <p:cNvSpPr txBox="1">
+            <a:spLocks/>
+          </p:cNvSpPr>
+          <p:nvPr/>
+        </p:nvSpPr>
+        <p:spPr>
+          <a:xfrm>
+            <a:off x="6456531" y="1463040"/>
+            <a:ext cx="4549324" cy="2682240"/>
+          </a:xfrm>
+          <a:prstGeom prst="rect">
+            <a:avLst/>
+          </a:prstGeom>
+        </p:spPr>
+        <p:txBody>
+          <a:bodyPr vert="horz" lIns="91440" tIns="45720" rIns="91440" bIns="45720" rtlCol="0" anchor="ctr" anchorCtr="0">
+            <a:noAutofit/>
+          </a:bodyPr>
+          <a:lstStyle>
+            <a:lvl1pPr algn="ctr" defTabSz="914400" rtl="0" eaLnBrk="1" latinLnBrk="0" hangingPunct="1">
+              <a:lnSpc>
+                <a:spcPct val="90000"/>
+              </a:lnSpc>
+              <a:spcBef>
+                <a:spcPct val="0"/>
+              </a:spcBef>
+              <a:buNone/>
+              <a:defRPr sz="4800" kern="1200" cap="all" spc="300" baseline="0">
+                <a:solidFill>
+                  <a:schemeClr val="bg1"/>
+                </a:solidFill>
+                <a:latin typeface="+mj-lt"/>
+                <a:ea typeface="+mj-ea"/>
+                <a:cs typeface="+mj-cs"/>
+              </a:defRPr>
+            </a:lvl1pPr>
+          </a:lstStyle>
+          <a:p>
+            <a:r>
+              <a:rPr lang="en-US" sz="2800" dirty="0" smtClean="0"/>
+              <a:t>AI(+)</a:t>
+            </a:r>
+          </a:p>
+          <a:p>
+            <a:r>
+              <a:rPr lang="en-US" sz="2000" dirty="0" smtClean="0"/>
+              <a:t>There are no pluses</a:t>
+            </a:r>
+            <a:endParaRPr lang="en-US" sz="2000" dirty="0" smtClean="0"/>
+          </a:p>
+        </p:txBody>
+      </p:sp>
+      <p:sp>
+        <p:nvSpPr>
+          <p:cNvPr id="6" name="Прямоугольник 5"/>
+          <p:cNvSpPr/>
+          <p:nvPr/>
+        </p:nvSpPr>
+        <p:spPr>
+          <a:xfrm>
+            <a:off x="-1" y="5658740"/>
+            <a:ext cx="2529841" cy="1200329"/>
+          </a:xfrm>
+          <a:prstGeom prst="rect">
+            <a:avLst/>
+          </a:prstGeom>
+        </p:spPr>
+        <p:txBody>
+          <a:bodyPr wrap="square">
+            <a:spAutoFit/>
+          </a:bodyPr>
+          <a:lstStyle/>
+          <a:p>
+            <a:r>
+              <a:rPr lang="en-US" sz="7200" dirty="0" smtClean="0">
+                <a:solidFill>
+                  <a:schemeClr val="bg1"/>
+                </a:solidFill>
+              </a:rPr>
+              <a:t>Step </a:t>
+            </a:r>
+            <a:r>
+              <a:rPr lang="ru-RU" sz="7200" dirty="0" smtClean="0">
+                <a:solidFill>
+                  <a:schemeClr val="bg1"/>
+                </a:solidFill>
+              </a:rPr>
+              <a:t>7</a:t>
+            </a:r>
+            <a:endParaRPr lang="ru-RU" sz="7200" dirty="0">
+              <a:solidFill>
+                <a:schemeClr val="bg1"/>
+              </a:solidFill>
+            </a:endParaRPr>
+          </a:p>
+        </p:txBody>
+      </p:sp>
+    </p:spTree>
+    <p:extLst>
+      <p:ext uri="{BB962C8B-B14F-4D97-AF65-F5344CB8AC3E}">
+        <p14:creationId xmlns:p14="http://schemas.microsoft.com/office/powerpoint/2010/main" val="3813696930"/>
       </p:ext>
     </p:extLst>
   </p:cSld>
@@ -22077,6 +23031,374 @@
     <p:extLst>
       <p:ext uri="{BB962C8B-B14F-4D97-AF65-F5344CB8AC3E}">
         <p14:creationId xmlns:p14="http://schemas.microsoft.com/office/powerpoint/2010/main" val="1345207721"/>
+      </p:ext>
+    </p:extLst>
+  </p:cSld>
+  <p:clrMapOvr>
+    <a:masterClrMapping/>
+  </p:clrMapOvr>
+</p:sld>
+</file>
+
+<file path=ppt/slides/slide40.xml><?xml version="1.0" encoding="utf-8"?>
+<p:sld xmlns:a="http://schemas.openxmlformats.org/drawingml/2006/main" xmlns:r="http://schemas.openxmlformats.org/officeDocument/2006/relationships" xmlns:p="http://schemas.openxmlformats.org/presentationml/2006/main">
+  <p:cSld>
+    <p:spTree>
+      <p:nvGrpSpPr>
+        <p:cNvPr id="1" name="">
+          <a:extLst>
+            <a:ext uri="{FF2B5EF4-FFF2-40B4-BE49-F238E27FC236}">
+              <a16:creationId xmlns="" xmlns:a16="http://schemas.microsoft.com/office/drawing/2014/main" id="{EF87400A-AA39-C6BD-0F50-19DF27F0BEE1}"/>
+            </a:ext>
+          </a:extLst>
+        </p:cNvPr>
+        <p:cNvGrpSpPr/>
+        <p:nvPr/>
+      </p:nvGrpSpPr>
+      <p:grpSpPr>
+        <a:xfrm>
+          <a:off x="0" y="0"/>
+          <a:ext cx="0" cy="0"/>
+          <a:chOff x="0" y="0"/>
+          <a:chExt cx="0" cy="0"/>
+        </a:xfrm>
+      </p:grpSpPr>
+      <p:sp>
+        <p:nvSpPr>
+          <p:cNvPr id="4" name="Заголовок 1"/>
+          <p:cNvSpPr txBox="1">
+            <a:spLocks/>
+          </p:cNvSpPr>
+          <p:nvPr/>
+        </p:nvSpPr>
+        <p:spPr>
+          <a:xfrm>
+            <a:off x="4383891" y="81280"/>
+            <a:ext cx="3286909" cy="650240"/>
+          </a:xfrm>
+          <a:prstGeom prst="rect">
+            <a:avLst/>
+          </a:prstGeom>
+        </p:spPr>
+        <p:txBody>
+          <a:bodyPr vert="horz" lIns="91440" tIns="45720" rIns="91440" bIns="45720" rtlCol="0" anchor="ctr" anchorCtr="0">
+            <a:noAutofit/>
+          </a:bodyPr>
+          <a:lstStyle>
+            <a:lvl1pPr algn="ctr" defTabSz="914400" rtl="0" eaLnBrk="1" latinLnBrk="0" hangingPunct="1">
+              <a:lnSpc>
+                <a:spcPct val="90000"/>
+              </a:lnSpc>
+              <a:spcBef>
+                <a:spcPct val="0"/>
+              </a:spcBef>
+              <a:buNone/>
+              <a:defRPr sz="4800" kern="1200" cap="all" spc="300" baseline="0">
+                <a:solidFill>
+                  <a:schemeClr val="bg1"/>
+                </a:solidFill>
+                <a:latin typeface="+mj-lt"/>
+                <a:ea typeface="+mj-ea"/>
+                <a:cs typeface="+mj-cs"/>
+              </a:defRPr>
+            </a:lvl1pPr>
+          </a:lstStyle>
+          <a:p>
+            <a:r>
+              <a:rPr lang="en-US" sz="2800" dirty="0" smtClean="0"/>
+              <a:t>Conclusion</a:t>
+            </a:r>
+            <a:endParaRPr lang="en-US" sz="2000" dirty="0" smtClean="0"/>
+          </a:p>
+        </p:txBody>
+      </p:sp>
+      <p:sp>
+        <p:nvSpPr>
+          <p:cNvPr id="7" name="Заголовок 1"/>
+          <p:cNvSpPr txBox="1">
+            <a:spLocks/>
+          </p:cNvSpPr>
+          <p:nvPr/>
+        </p:nvSpPr>
+        <p:spPr>
+          <a:xfrm>
+            <a:off x="1810945" y="833120"/>
+            <a:ext cx="8432800" cy="650240"/>
+          </a:xfrm>
+          <a:prstGeom prst="rect">
+            <a:avLst/>
+          </a:prstGeom>
+        </p:spPr>
+        <p:txBody>
+          <a:bodyPr vert="horz" lIns="91440" tIns="45720" rIns="91440" bIns="45720" rtlCol="0" anchor="ctr" anchorCtr="0">
+            <a:noAutofit/>
+          </a:bodyPr>
+          <a:lstStyle>
+            <a:lvl1pPr algn="ctr" defTabSz="914400" rtl="0" eaLnBrk="1" latinLnBrk="0" hangingPunct="1">
+              <a:lnSpc>
+                <a:spcPct val="90000"/>
+              </a:lnSpc>
+              <a:spcBef>
+                <a:spcPct val="0"/>
+              </a:spcBef>
+              <a:buNone/>
+              <a:defRPr sz="4800" kern="1200" cap="all" spc="300" baseline="0">
+                <a:solidFill>
+                  <a:schemeClr val="bg1"/>
+                </a:solidFill>
+                <a:latin typeface="+mj-lt"/>
+                <a:ea typeface="+mj-ea"/>
+                <a:cs typeface="+mj-cs"/>
+              </a:defRPr>
+            </a:lvl1pPr>
+          </a:lstStyle>
+          <a:p>
+            <a:r>
+              <a:rPr lang="en-US" sz="2000" dirty="0" smtClean="0"/>
+              <a:t>AI can work well, in our example it worked better than math </a:t>
+            </a:r>
+            <a:r>
+              <a:rPr lang="en-US" sz="2000" dirty="0"/>
+              <a:t>on example of poor quality photos</a:t>
+            </a:r>
+            <a:endParaRPr lang="en-US" sz="1600" dirty="0" smtClean="0"/>
+          </a:p>
+        </p:txBody>
+      </p:sp>
+      <p:sp>
+        <p:nvSpPr>
+          <p:cNvPr id="8" name="Заголовок 1"/>
+          <p:cNvSpPr txBox="1">
+            <a:spLocks/>
+          </p:cNvSpPr>
+          <p:nvPr/>
+        </p:nvSpPr>
+        <p:spPr>
+          <a:xfrm>
+            <a:off x="1810945" y="1910080"/>
+            <a:ext cx="8432800" cy="650240"/>
+          </a:xfrm>
+          <a:prstGeom prst="rect">
+            <a:avLst/>
+          </a:prstGeom>
+        </p:spPr>
+        <p:txBody>
+          <a:bodyPr vert="horz" lIns="91440" tIns="45720" rIns="91440" bIns="45720" rtlCol="0" anchor="ctr" anchorCtr="0">
+            <a:noAutofit/>
+          </a:bodyPr>
+          <a:lstStyle>
+            <a:lvl1pPr algn="ctr" defTabSz="914400" rtl="0" eaLnBrk="1" latinLnBrk="0" hangingPunct="1">
+              <a:lnSpc>
+                <a:spcPct val="90000"/>
+              </a:lnSpc>
+              <a:spcBef>
+                <a:spcPct val="0"/>
+              </a:spcBef>
+              <a:buNone/>
+              <a:defRPr sz="4800" kern="1200" cap="all" spc="300" baseline="0">
+                <a:solidFill>
+                  <a:schemeClr val="bg1"/>
+                </a:solidFill>
+                <a:latin typeface="+mj-lt"/>
+                <a:ea typeface="+mj-ea"/>
+                <a:cs typeface="+mj-cs"/>
+              </a:defRPr>
+            </a:lvl1pPr>
+          </a:lstStyle>
+          <a:p>
+            <a:r>
+              <a:rPr lang="en-US" sz="2000" dirty="0" smtClean="0"/>
+              <a:t>But even in that case the compression time was </a:t>
+            </a:r>
+            <a:r>
+              <a:rPr lang="en-US" sz="2000" dirty="0" smtClean="0">
+                <a:solidFill>
+                  <a:srgbClr val="C00000"/>
+                </a:solidFill>
+              </a:rPr>
+              <a:t>60</a:t>
+            </a:r>
+            <a:r>
+              <a:rPr lang="en-US" sz="2000" dirty="0" smtClean="0"/>
+              <a:t> times more than simple math – in case of image compression that is on</a:t>
+            </a:r>
+            <a:r>
+              <a:rPr lang="en-US" sz="2000" dirty="0"/>
+              <a:t>e</a:t>
+            </a:r>
+            <a:r>
+              <a:rPr lang="en-US" sz="2000" dirty="0" smtClean="0"/>
+              <a:t> of the main troubles</a:t>
+            </a:r>
+            <a:endParaRPr lang="en-US" sz="1600" dirty="0" smtClean="0"/>
+          </a:p>
+        </p:txBody>
+      </p:sp>
+      <p:sp>
+        <p:nvSpPr>
+          <p:cNvPr id="9" name="Заголовок 1"/>
+          <p:cNvSpPr txBox="1">
+            <a:spLocks/>
+          </p:cNvSpPr>
+          <p:nvPr/>
+        </p:nvSpPr>
+        <p:spPr>
+          <a:xfrm>
+            <a:off x="1810945" y="2936240"/>
+            <a:ext cx="8432800" cy="3576320"/>
+          </a:xfrm>
+          <a:prstGeom prst="rect">
+            <a:avLst/>
+          </a:prstGeom>
+        </p:spPr>
+        <p:txBody>
+          <a:bodyPr vert="horz" lIns="91440" tIns="45720" rIns="91440" bIns="45720" rtlCol="0" anchor="ctr" anchorCtr="0">
+            <a:noAutofit/>
+          </a:bodyPr>
+          <a:lstStyle>
+            <a:lvl1pPr algn="ctr" defTabSz="914400" rtl="0" eaLnBrk="1" latinLnBrk="0" hangingPunct="1">
+              <a:lnSpc>
+                <a:spcPct val="90000"/>
+              </a:lnSpc>
+              <a:spcBef>
+                <a:spcPct val="0"/>
+              </a:spcBef>
+              <a:buNone/>
+              <a:defRPr sz="4800" kern="1200" cap="all" spc="300" baseline="0">
+                <a:solidFill>
+                  <a:schemeClr val="bg1"/>
+                </a:solidFill>
+                <a:latin typeface="+mj-lt"/>
+                <a:ea typeface="+mj-ea"/>
+                <a:cs typeface="+mj-cs"/>
+              </a:defRPr>
+            </a:lvl1pPr>
+          </a:lstStyle>
+          <a:p>
+            <a:r>
+              <a:rPr lang="en-US" sz="2000" dirty="0" smtClean="0"/>
+              <a:t>In </a:t>
+            </a:r>
+            <a:r>
+              <a:rPr lang="en-US" sz="2000" dirty="0"/>
+              <a:t>that research we got an extremely interesting conclusion - AI is not a magician, sometimes it loses to a regular mathematical formula and information theory in general.</a:t>
+            </a:r>
+          </a:p>
+          <a:p>
+            <a:endParaRPr lang="en-US" sz="2000" dirty="0"/>
+          </a:p>
+          <a:p>
+            <a:r>
+              <a:rPr lang="en-US" sz="2000" dirty="0"/>
+              <a:t>AI creates a wow effect, </a:t>
+            </a:r>
+            <a:r>
+              <a:rPr lang="en-US" sz="2000" dirty="0" smtClean="0"/>
+              <a:t>that </a:t>
+            </a:r>
+            <a:r>
+              <a:rPr lang="en-US" sz="2000" dirty="0"/>
+              <a:t>is why </a:t>
+            </a:r>
+            <a:r>
+              <a:rPr lang="en-US" sz="2000" dirty="0" smtClean="0"/>
+              <a:t>IT has </a:t>
+            </a:r>
+            <a:r>
+              <a:rPr lang="en-US" sz="2000" dirty="0"/>
+              <a:t>produced such a worldwide boom in the popularity of AI, but in low-level calculations aimed at maximum performance, it loses </a:t>
+            </a:r>
+            <a:r>
+              <a:rPr lang="en-US" sz="2000" dirty="0" smtClean="0"/>
+              <a:t>greatly.</a:t>
+            </a:r>
+            <a:endParaRPr lang="en-US" sz="1600" dirty="0" smtClean="0"/>
+          </a:p>
+        </p:txBody>
+      </p:sp>
+    </p:spTree>
+    <p:extLst>
+      <p:ext uri="{BB962C8B-B14F-4D97-AF65-F5344CB8AC3E}">
+        <p14:creationId xmlns:p14="http://schemas.microsoft.com/office/powerpoint/2010/main" val="1818153347"/>
+      </p:ext>
+    </p:extLst>
+  </p:cSld>
+  <p:clrMapOvr>
+    <a:masterClrMapping/>
+  </p:clrMapOvr>
+</p:sld>
+</file>
+
+<file path=ppt/slides/slide41.xml><?xml version="1.0" encoding="utf-8"?>
+<p:sld xmlns:a="http://schemas.openxmlformats.org/drawingml/2006/main" xmlns:r="http://schemas.openxmlformats.org/officeDocument/2006/relationships" xmlns:p="http://schemas.openxmlformats.org/presentationml/2006/main">
+  <p:cSld>
+    <p:spTree>
+      <p:nvGrpSpPr>
+        <p:cNvPr id="1" name="">
+          <a:extLst>
+            <a:ext uri="{FF2B5EF4-FFF2-40B4-BE49-F238E27FC236}">
+              <a16:creationId xmlns="" xmlns:a16="http://schemas.microsoft.com/office/drawing/2014/main" id="{8C579E26-FA2D-1C68-DB27-3D2C268F6B28}"/>
+            </a:ext>
+          </a:extLst>
+        </p:cNvPr>
+        <p:cNvGrpSpPr/>
+        <p:nvPr/>
+      </p:nvGrpSpPr>
+      <p:grpSpPr>
+        <a:xfrm>
+          <a:off x="0" y="0"/>
+          <a:ext cx="0" cy="0"/>
+          <a:chOff x="0" y="0"/>
+          <a:chExt cx="0" cy="0"/>
+        </a:xfrm>
+      </p:grpSpPr>
+      <p:sp>
+        <p:nvSpPr>
+          <p:cNvPr id="7" name="Title 6">
+            <a:extLst>
+              <a:ext uri="{FF2B5EF4-FFF2-40B4-BE49-F238E27FC236}">
+                <a16:creationId xmlns="" xmlns:a16="http://schemas.microsoft.com/office/drawing/2014/main" id="{44A692C1-E622-D699-43E0-1ECB59404096}"/>
+              </a:ext>
+            </a:extLst>
+          </p:cNvPr>
+          <p:cNvSpPr>
+            <a:spLocks noGrp="1"/>
+          </p:cNvSpPr>
+          <p:nvPr>
+            <p:ph type="ctrTitle"/>
+          </p:nvPr>
+        </p:nvSpPr>
+        <p:spPr>
+          <a:xfrm>
+            <a:off x="2344992" y="2857500"/>
+            <a:ext cx="7502015" cy="1143000"/>
+          </a:xfrm>
+        </p:spPr>
+        <p:txBody>
+          <a:bodyPr/>
+          <a:lstStyle/>
+          <a:p>
+            <a:r>
+              <a:rPr lang="en-US" b="1" dirty="0">
+                <a:solidFill>
+                  <a:srgbClr val="FFFFFF"/>
+                </a:solidFill>
+                <a:latin typeface="Calibri Light (Headings)"/>
+                <a:ea typeface="Crimson Pro Bold"/>
+                <a:cs typeface="+mn-cs"/>
+              </a:rPr>
+              <a:t>Thank you</a:t>
+            </a:r>
+            <a:endParaRPr lang="en-US" b="1" dirty="0">
+              <a:latin typeface="Calibri Light (Headings)"/>
+            </a:endParaRPr>
+          </a:p>
+        </p:txBody>
+      </p:sp>
+    </p:spTree>
+    <p:extLst>
+      <p:ext uri="{BB962C8B-B14F-4D97-AF65-F5344CB8AC3E}">
+        <p14:creationId xmlns:p14="http://schemas.microsoft.com/office/powerpoint/2010/main" val="4044571280"/>
       </p:ext>
     </p:extLst>
   </p:cSld>
@@ -25586,6 +26908,26 @@
 </file>
 
 <file path=customXml/item1.xml><?xml version="1.0" encoding="utf-8"?>
+<p:properties xmlns:p="http://schemas.microsoft.com/office/2006/metadata/properties" xmlns:xsi="http://www.w3.org/2001/XMLSchema-instance" xmlns:pc="http://schemas.microsoft.com/office/infopath/2007/PartnerControls">
+  <documentManagement>
+    <_ip_UnifiedCompliancePolicyUIAction xmlns="http://schemas.microsoft.com/sharepoint/v3" xsi:nil="true"/>
+    <Image xmlns="71af3243-3dd4-4a8d-8c0d-dd76da1f02a5">
+      <Url xsi:nil="true"/>
+      <Description xsi:nil="true"/>
+    </Image>
+    <Status xmlns="71af3243-3dd4-4a8d-8c0d-dd76da1f02a5">Not started</Status>
+    <Background xmlns="71af3243-3dd4-4a8d-8c0d-dd76da1f02a5">false</Background>
+    <_ip_UnifiedCompliancePolicyProperties xmlns="http://schemas.microsoft.com/sharepoint/v3" xsi:nil="true"/>
+    <ImageTagsTaxHTField xmlns="71af3243-3dd4-4a8d-8c0d-dd76da1f02a5">
+      <Terms xmlns="http://schemas.microsoft.com/office/infopath/2007/PartnerControls"/>
+    </ImageTagsTaxHTField>
+    <TaxCatchAll xmlns="230e9df3-be65-4c73-a93b-d1236ebd677e" xsi:nil="true"/>
+    <MediaServiceKeyPoints xmlns="71af3243-3dd4-4a8d-8c0d-dd76da1f02a5" xsi:nil="true"/>
+  </documentManagement>
+</p:properties>
+</file>
+
+<file path=customXml/item2.xml><?xml version="1.0" encoding="utf-8"?>
 <ct:contentTypeSchema xmlns:ct="http://schemas.microsoft.com/office/2006/metadata/contentType" xmlns:ma="http://schemas.microsoft.com/office/2006/metadata/properties/metaAttributes" ct:_="" ma:_="" ma:contentTypeName="Document" ma:contentTypeID="0x01010079F111ED35F8CC479449609E8A0923A6" ma:contentTypeVersion="28" ma:contentTypeDescription="Create a new document." ma:contentTypeScope="" ma:versionID="60f5a4f2d2b0abadcf532d48ebf9cb71">
   <xsd:schema xmlns:xsd="http://www.w3.org/2001/XMLSchema" xmlns:xs="http://www.w3.org/2001/XMLSchema" xmlns:p="http://schemas.microsoft.com/office/2006/metadata/properties" xmlns:ns1="http://schemas.microsoft.com/sharepoint/v3" xmlns:ns2="71af3243-3dd4-4a8d-8c0d-dd76da1f02a5" xmlns:ns3="16c05727-aa75-4e4a-9b5f-8a80a1165891" xmlns:ns4="230e9df3-be65-4c73-a93b-d1236ebd677e" targetNamespace="http://schemas.microsoft.com/office/2006/metadata/properties" ma:root="true" ma:fieldsID="7dd78129e6a1811f84807ad11c651531" ns1:_="" ns2:_="" ns3:_="" ns4:_="">
     <xsd:import namespace="http://schemas.microsoft.com/sharepoint/v3"/>
@@ -25897,7 +27239,7 @@
 </ct:contentTypeSchema>
 </file>
 
-<file path=customXml/item2.xml><?xml version="1.0" encoding="utf-8"?>
+<file path=customXml/item3.xml><?xml version="1.0" encoding="utf-8"?>
 <?mso-contentType ?>
 <FormTemplates xmlns="http://schemas.microsoft.com/sharepoint/v3/contenttype/forms">
   <Display>DocumentLibraryForm</Display>
@@ -25906,27 +27248,26 @@
 </FormTemplates>
 </file>
 
-<file path=customXml/item3.xml><?xml version="1.0" encoding="utf-8"?>
-<p:properties xmlns:p="http://schemas.microsoft.com/office/2006/metadata/properties" xmlns:xsi="http://www.w3.org/2001/XMLSchema-instance" xmlns:pc="http://schemas.microsoft.com/office/infopath/2007/PartnerControls">
-  <documentManagement>
-    <_ip_UnifiedCompliancePolicyUIAction xmlns="http://schemas.microsoft.com/sharepoint/v3" xsi:nil="true"/>
-    <Image xmlns="71af3243-3dd4-4a8d-8c0d-dd76da1f02a5">
-      <Url xsi:nil="true"/>
-      <Description xsi:nil="true"/>
-    </Image>
-    <Status xmlns="71af3243-3dd4-4a8d-8c0d-dd76da1f02a5">Not started</Status>
-    <Background xmlns="71af3243-3dd4-4a8d-8c0d-dd76da1f02a5">false</Background>
-    <_ip_UnifiedCompliancePolicyProperties xmlns="http://schemas.microsoft.com/sharepoint/v3" xsi:nil="true"/>
-    <ImageTagsTaxHTField xmlns="71af3243-3dd4-4a8d-8c0d-dd76da1f02a5">
-      <Terms xmlns="http://schemas.microsoft.com/office/infopath/2007/PartnerControls"/>
-    </ImageTagsTaxHTField>
-    <TaxCatchAll xmlns="230e9df3-be65-4c73-a93b-d1236ebd677e" xsi:nil="true"/>
-    <MediaServiceKeyPoints xmlns="71af3243-3dd4-4a8d-8c0d-dd76da1f02a5" xsi:nil="true"/>
-  </documentManagement>
-</p:properties>
+<file path=customXml/itemProps1.xml><?xml version="1.0" encoding="utf-8"?>
+<ds:datastoreItem xmlns:ds="http://schemas.openxmlformats.org/officeDocument/2006/customXml" ds:itemID="{85C2645A-E767-4D7E-984D-234E531E4556}">
+  <ds:schemaRefs>
+    <ds:schemaRef ds:uri="230e9df3-be65-4c73-a93b-d1236ebd677e"/>
+    <ds:schemaRef ds:uri="http://schemas.microsoft.com/office/2006/documentManagement/types"/>
+    <ds:schemaRef ds:uri="http://purl.org/dc/terms/"/>
+    <ds:schemaRef ds:uri="http://purl.org/dc/elements/1.1/"/>
+    <ds:schemaRef ds:uri="http://schemas.openxmlformats.org/package/2006/metadata/core-properties"/>
+    <ds:schemaRef ds:uri="71af3243-3dd4-4a8d-8c0d-dd76da1f02a5"/>
+    <ds:schemaRef ds:uri="http://www.w3.org/XML/1998/namespace"/>
+    <ds:schemaRef ds:uri="http://purl.org/dc/dcmitype/"/>
+    <ds:schemaRef ds:uri="http://schemas.microsoft.com/office/infopath/2007/PartnerControls"/>
+    <ds:schemaRef ds:uri="16c05727-aa75-4e4a-9b5f-8a80a1165891"/>
+    <ds:schemaRef ds:uri="http://schemas.microsoft.com/sharepoint/v3"/>
+    <ds:schemaRef ds:uri="http://schemas.microsoft.com/office/2006/metadata/properties"/>
+  </ds:schemaRefs>
+</ds:datastoreItem>
 </file>
 
-<file path=customXml/itemProps1.xml><?xml version="1.0" encoding="utf-8"?>
+<file path=customXml/itemProps2.xml><?xml version="1.0" encoding="utf-8"?>
 <ds:datastoreItem xmlns:ds="http://schemas.openxmlformats.org/officeDocument/2006/customXml" ds:itemID="{5F2A2379-DD35-4769-BFD6-4857D72F808A}">
   <ds:schemaRefs>
     <ds:schemaRef ds:uri="http://schemas.microsoft.com/office/2006/metadata/contentType"/>
@@ -25947,7 +27288,7 @@
 </ds:datastoreItem>
 </file>
 
-<file path=customXml/itemProps2.xml><?xml version="1.0" encoding="utf-8"?>
+<file path=customXml/itemProps3.xml><?xml version="1.0" encoding="utf-8"?>
 <ds:datastoreItem xmlns:ds="http://schemas.openxmlformats.org/officeDocument/2006/customXml" ds:itemID="{0F048343-1EA9-44C3-883E-652FAAF0713E}">
   <ds:schemaRefs>
     <ds:schemaRef ds:uri="http://schemas.microsoft.com/sharepoint/v3/contenttype/forms"/>
@@ -25955,25 +27296,6 @@
 </ds:datastoreItem>
 </file>
 
-<file path=customXml/itemProps3.xml><?xml version="1.0" encoding="utf-8"?>
-<ds:datastoreItem xmlns:ds="http://schemas.openxmlformats.org/officeDocument/2006/customXml" ds:itemID="{85C2645A-E767-4D7E-984D-234E531E4556}">
-  <ds:schemaRefs>
-    <ds:schemaRef ds:uri="230e9df3-be65-4c73-a93b-d1236ebd677e"/>
-    <ds:schemaRef ds:uri="http://schemas.microsoft.com/office/2006/documentManagement/types"/>
-    <ds:schemaRef ds:uri="http://purl.org/dc/terms/"/>
-    <ds:schemaRef ds:uri="http://purl.org/dc/elements/1.1/"/>
-    <ds:schemaRef ds:uri="http://schemas.openxmlformats.org/package/2006/metadata/core-properties"/>
-    <ds:schemaRef ds:uri="71af3243-3dd4-4a8d-8c0d-dd76da1f02a5"/>
-    <ds:schemaRef ds:uri="http://www.w3.org/XML/1998/namespace"/>
-    <ds:schemaRef ds:uri="http://purl.org/dc/dcmitype/"/>
-    <ds:schemaRef ds:uri="http://schemas.microsoft.com/office/infopath/2007/PartnerControls"/>
-    <ds:schemaRef ds:uri="16c05727-aa75-4e4a-9b5f-8a80a1165891"/>
-    <ds:schemaRef ds:uri="http://schemas.microsoft.com/sharepoint/v3"/>
-    <ds:schemaRef ds:uri="http://schemas.microsoft.com/office/2006/metadata/properties"/>
-  </ds:schemaRefs>
-</ds:datastoreItem>
-</file>
-
 <file path=docMetadata/LabelInfo.xml><?xml version="1.0" encoding="utf-8"?>
 <clbl:labelList xmlns:clbl="http://schemas.microsoft.com/office/2020/mipLabelMetadata"/>
 </file>
</xml_diff>